<commit_message>
modified lib and plate_mapper to get directory plate mapping to work
</commit_message>
<xml_diff>
--- a/docs/HNSCC_functional_assay_pipeline_development.pptx
+++ b/docs/HNSCC_functional_assay_pipeline_development.pptx
@@ -9,7 +9,8 @@
     <p:sldId id="260" r:id="rId3"/>
     <p:sldId id="257" r:id="rId4"/>
     <p:sldId id="258" r:id="rId5"/>
-    <p:sldId id="259" r:id="rId6"/>
+    <p:sldId id="261" r:id="rId6"/>
+    <p:sldId id="259" r:id="rId7"/>
   </p:sldIdLst>
   <p:sldSz cx="12192000" cy="6858000"/>
   <p:notesSz cx="6858000" cy="9144000"/>
@@ -4832,6 +4833,151 @@
           <p:cNvPr id="2" name="Title 1">
             <a:extLst>
               <a:ext uri="{FF2B5EF4-FFF2-40B4-BE49-F238E27FC236}">
+                <a16:creationId xmlns:a16="http://schemas.microsoft.com/office/drawing/2014/main" id="{2A317F86-1610-446D-A724-4889497B751D}"/>
+              </a:ext>
+            </a:extLst>
+          </p:cNvPr>
+          <p:cNvSpPr>
+            <a:spLocks noGrp="1"/>
+          </p:cNvSpPr>
+          <p:nvPr>
+            <p:ph type="title"/>
+          </p:nvPr>
+        </p:nvSpPr>
+        <p:spPr/>
+        <p:txBody>
+          <a:bodyPr/>
+          <a:lstStyle/>
+          <a:p>
+            <a:r>
+              <a:rPr lang="en-US" dirty="0"/>
+              <a:t>Data output documentation issues</a:t>
+            </a:r>
+          </a:p>
+        </p:txBody>
+      </p:sp>
+      <p:sp>
+        <p:nvSpPr>
+          <p:cNvPr id="3" name="Content Placeholder 2">
+            <a:extLst>
+              <a:ext uri="{FF2B5EF4-FFF2-40B4-BE49-F238E27FC236}">
+                <a16:creationId xmlns:a16="http://schemas.microsoft.com/office/drawing/2014/main" id="{E5775B40-57DE-42CA-A49B-0046E6B9E424}"/>
+              </a:ext>
+            </a:extLst>
+          </p:cNvPr>
+          <p:cNvSpPr>
+            <a:spLocks noGrp="1"/>
+          </p:cNvSpPr>
+          <p:nvPr>
+            <p:ph idx="1"/>
+          </p:nvPr>
+        </p:nvSpPr>
+        <p:spPr/>
+        <p:txBody>
+          <a:bodyPr>
+            <a:normAutofit/>
+          </a:bodyPr>
+          <a:lstStyle/>
+          <a:p>
+            <a:r>
+              <a:rPr lang="en-US" dirty="0"/>
+              <a:t>There are a number of assays that are labeled as having been normalized by positive controls (labeled as “blank490”), however, the output file shows discrepancies that indicate it was not.</a:t>
+            </a:r>
+          </a:p>
+          <a:p>
+            <a:r>
+              <a:rPr lang="en-US" dirty="0"/>
+              <a:t>[</a:t>
+            </a:r>
+            <a:r>
+              <a:rPr lang="en-US" dirty="0" err="1"/>
+              <a:t>lab_id</a:t>
+            </a:r>
+            <a:r>
+              <a:rPr lang="en-US" dirty="0"/>
+              <a:t>=10308,notes=NA]</a:t>
+            </a:r>
+          </a:p>
+          <a:p>
+            <a:r>
+              <a:rPr lang="en-US" dirty="0"/>
+              <a:t>[</a:t>
+            </a:r>
+            <a:r>
+              <a:rPr lang="en-US" dirty="0" err="1"/>
+              <a:t>lab_id</a:t>
+            </a:r>
+            <a:r>
+              <a:rPr lang="en-US" dirty="0"/>
+              <a:t>=10309,notes=matched normal 10308]</a:t>
+            </a:r>
+          </a:p>
+          <a:p>
+            <a:pPr marL="0" indent="0">
+              <a:buNone/>
+            </a:pPr>
+            <a:endParaRPr lang="en-US" dirty="0"/>
+          </a:p>
+          <a:p>
+            <a:pPr marL="0" indent="0">
+              <a:buNone/>
+            </a:pPr>
+            <a:endParaRPr lang="en-US" dirty="0"/>
+          </a:p>
+          <a:p>
+            <a:pPr marL="0" indent="0">
+              <a:buNone/>
+            </a:pPr>
+            <a:r>
+              <a:rPr lang="en-US" dirty="0"/>
+              <a:t>*these two assay outputs don’t have a 26</a:t>
+            </a:r>
+            <a:r>
+              <a:rPr lang="en-US" baseline="30000" dirty="0"/>
+              <a:t>th</a:t>
+            </a:r>
+            <a:r>
+              <a:rPr lang="en-US" dirty="0"/>
+              <a:t> column, which usually says “blank490” in each row. </a:t>
+            </a:r>
+          </a:p>
+        </p:txBody>
+      </p:sp>
+    </p:spTree>
+    <p:extLst>
+      <p:ext uri="{BB962C8B-B14F-4D97-AF65-F5344CB8AC3E}">
+        <p14:creationId xmlns:p14="http://schemas.microsoft.com/office/powerpoint/2010/main" val="4284564905"/>
+      </p:ext>
+    </p:extLst>
+  </p:cSld>
+  <p:clrMapOvr>
+    <a:masterClrMapping/>
+  </p:clrMapOvr>
+</p:sld>
+</file>
+
+<file path=ppt/slides/slide6.xml><?xml version="1.0" encoding="utf-8"?>
+<p:sld xmlns:a="http://schemas.openxmlformats.org/drawingml/2006/main" xmlns:r="http://schemas.openxmlformats.org/officeDocument/2006/relationships" xmlns:p="http://schemas.openxmlformats.org/presentationml/2006/main">
+  <p:cSld>
+    <p:spTree>
+      <p:nvGrpSpPr>
+        <p:cNvPr id="1" name=""/>
+        <p:cNvGrpSpPr/>
+        <p:nvPr/>
+      </p:nvGrpSpPr>
+      <p:grpSpPr>
+        <a:xfrm>
+          <a:off x="0" y="0"/>
+          <a:ext cx="0" cy="0"/>
+          <a:chOff x="0" y="0"/>
+          <a:chExt cx="0" cy="0"/>
+        </a:xfrm>
+      </p:grpSpPr>
+      <p:sp>
+        <p:nvSpPr>
+          <p:cNvPr id="2" name="Title 1">
+            <a:extLst>
+              <a:ext uri="{FF2B5EF4-FFF2-40B4-BE49-F238E27FC236}">
                 <a16:creationId xmlns:a16="http://schemas.microsoft.com/office/drawing/2014/main" id="{541CAFB3-FD96-4F76-A791-BBC842554556}"/>
               </a:ext>
             </a:extLst>

</xml_diff>

<commit_message>
updated pipeline overview graphic in ppt to address issues with probit_calc.py (conc var stored as string but combination agents need to be dealt with)
</commit_message>
<xml_diff>
--- a/docs/HNSCC_functional_assay_pipeline_development.pptx
+++ b/docs/HNSCC_functional_assay_pipeline_development.pptx
@@ -7,11 +7,12 @@
   <p:sldIdLst>
     <p:sldId id="256" r:id="rId2"/>
     <p:sldId id="260" r:id="rId3"/>
-    <p:sldId id="257" r:id="rId4"/>
-    <p:sldId id="258" r:id="rId5"/>
-    <p:sldId id="261" r:id="rId6"/>
-    <p:sldId id="259" r:id="rId7"/>
-    <p:sldId id="262" r:id="rId8"/>
+    <p:sldId id="263" r:id="rId4"/>
+    <p:sldId id="257" r:id="rId5"/>
+    <p:sldId id="258" r:id="rId6"/>
+    <p:sldId id="261" r:id="rId7"/>
+    <p:sldId id="259" r:id="rId8"/>
+    <p:sldId id="262" r:id="rId9"/>
   </p:sldIdLst>
   <p:sldSz cx="12192000" cy="6858000"/>
   <p:notesSz cx="6858000" cy="9144000"/>
@@ -4539,154 +4540,1466 @@
       </p:grpSpPr>
       <p:sp>
         <p:nvSpPr>
-          <p:cNvPr id="2" name="Title 1">
-            <a:extLst>
-              <a:ext uri="{FF2B5EF4-FFF2-40B4-BE49-F238E27FC236}">
-                <a16:creationId xmlns:a16="http://schemas.microsoft.com/office/drawing/2014/main" id="{0C9934DF-8684-482D-A4AA-A6412C0D074C}"/>
-              </a:ext>
-            </a:extLst>
-          </p:cNvPr>
-          <p:cNvSpPr>
-            <a:spLocks noGrp="1"/>
-          </p:cNvSpPr>
-          <p:nvPr>
-            <p:ph type="title"/>
-          </p:nvPr>
-        </p:nvSpPr>
-        <p:spPr/>
-        <p:txBody>
-          <a:bodyPr/>
-          <a:lstStyle/>
-          <a:p>
-            <a:r>
-              <a:rPr lang="en-US" dirty="0"/>
-              <a:t>Overview </a:t>
-            </a:r>
-          </a:p>
-        </p:txBody>
-      </p:sp>
-      <p:sp>
-        <p:nvSpPr>
-          <p:cNvPr id="3" name="Content Placeholder 2">
-            <a:extLst>
-              <a:ext uri="{FF2B5EF4-FFF2-40B4-BE49-F238E27FC236}">
-                <a16:creationId xmlns:a16="http://schemas.microsoft.com/office/drawing/2014/main" id="{D14D1252-27F6-45E4-AC18-DBBDBC8B95FE}"/>
-              </a:ext>
-            </a:extLst>
-          </p:cNvPr>
-          <p:cNvSpPr>
-            <a:spLocks noGrp="1"/>
-          </p:cNvSpPr>
-          <p:nvPr>
-            <p:ph idx="1"/>
-          </p:nvPr>
-        </p:nvSpPr>
-        <p:spPr/>
-        <p:txBody>
-          <a:bodyPr>
-            <a:normAutofit lnSpcReduction="10000"/>
+          <p:cNvPr id="10" name="Rectangle 9">
+            <a:extLst>
+              <a:ext uri="{FF2B5EF4-FFF2-40B4-BE49-F238E27FC236}">
+                <a16:creationId xmlns:a16="http://schemas.microsoft.com/office/drawing/2014/main" id="{6A4340BC-43EB-437A-BF1B-C7DA658DC13D}"/>
+              </a:ext>
+            </a:extLst>
+          </p:cNvPr>
+          <p:cNvSpPr/>
+          <p:nvPr/>
+        </p:nvSpPr>
+        <p:spPr>
+          <a:xfrm>
+            <a:off x="4927997" y="1742834"/>
+            <a:ext cx="1843088" cy="1990729"/>
+          </a:xfrm>
+          <a:prstGeom prst="rect">
+            <a:avLst/>
+          </a:prstGeom>
+        </p:spPr>
+        <p:style>
+          <a:lnRef idx="2">
+            <a:schemeClr val="dk1"/>
+          </a:lnRef>
+          <a:fillRef idx="1">
+            <a:schemeClr val="lt1"/>
+          </a:fillRef>
+          <a:effectRef idx="0">
+            <a:schemeClr val="dk1"/>
+          </a:effectRef>
+          <a:fontRef idx="minor">
+            <a:schemeClr val="dk1"/>
+          </a:fontRef>
+        </p:style>
+        <p:txBody>
+          <a:bodyPr rtlCol="0" anchor="ctr"/>
+          <a:lstStyle/>
+          <a:p>
+            <a:pPr algn="ctr"/>
+            <a:r>
+              <a:rPr lang="en-US" sz="1200" dirty="0"/>
+              <a:t>The zero value (positive control) of optical density is set by the </a:t>
+            </a:r>
+            <a:r>
+              <a:rPr lang="en-US" sz="1200" dirty="0" err="1"/>
+              <a:t>p.spec</a:t>
+            </a:r>
+            <a:r>
+              <a:rPr lang="en-US" sz="1200" dirty="0"/>
+              <a:t> software [blank490] but to interpret this value as cell viability, we need to scale optical density by plate controls….eg</a:t>
+            </a:r>
+          </a:p>
+          <a:p>
+            <a:pPr algn="ctr"/>
+            <a:r>
+              <a:rPr lang="en-US" sz="1200" dirty="0" err="1"/>
+              <a:t>Cell_viab</a:t>
+            </a:r>
+            <a:r>
+              <a:rPr lang="en-US" sz="1200" dirty="0"/>
+              <a:t> = </a:t>
+            </a:r>
+            <a:r>
+              <a:rPr lang="en-US" sz="1200" dirty="0" err="1"/>
+              <a:t>opt_dens</a:t>
+            </a:r>
+            <a:r>
+              <a:rPr lang="en-US" sz="1200" dirty="0"/>
+              <a:t> / </a:t>
+            </a:r>
+            <a:r>
+              <a:rPr lang="en-US" sz="1200" dirty="0" err="1"/>
+              <a:t>avg_plt_control</a:t>
+            </a:r>
+            <a:endParaRPr lang="en-US" sz="1200" dirty="0"/>
+          </a:p>
+        </p:txBody>
+      </p:sp>
+      <p:sp>
+        <p:nvSpPr>
+          <p:cNvPr id="9" name="Rectangle 8">
+            <a:extLst>
+              <a:ext uri="{FF2B5EF4-FFF2-40B4-BE49-F238E27FC236}">
+                <a16:creationId xmlns:a16="http://schemas.microsoft.com/office/drawing/2014/main" id="{1A30B135-2F23-4CDC-9A4F-89BC83BDAEF9}"/>
+              </a:ext>
+            </a:extLst>
+          </p:cNvPr>
+          <p:cNvSpPr/>
+          <p:nvPr/>
+        </p:nvSpPr>
+        <p:spPr>
+          <a:xfrm>
+            <a:off x="2527697" y="1733310"/>
+            <a:ext cx="1843088" cy="1133476"/>
+          </a:xfrm>
+          <a:prstGeom prst="rect">
+            <a:avLst/>
+          </a:prstGeom>
+        </p:spPr>
+        <p:style>
+          <a:lnRef idx="2">
+            <a:schemeClr val="dk1"/>
+          </a:lnRef>
+          <a:fillRef idx="1">
+            <a:schemeClr val="lt1"/>
+          </a:fillRef>
+          <a:effectRef idx="0">
+            <a:schemeClr val="dk1"/>
+          </a:effectRef>
+          <a:fontRef idx="minor">
+            <a:schemeClr val="dk1"/>
+          </a:fontRef>
+        </p:style>
+        <p:txBody>
+          <a:bodyPr rtlCol="0" anchor="ctr"/>
+          <a:lstStyle/>
+          <a:p>
+            <a:pPr algn="ctr"/>
+            <a:r>
+              <a:rPr lang="en-US" sz="1200" dirty="0"/>
+              <a:t>Convert from matrix format to long data and merge plate map. Critical output features: </a:t>
+            </a:r>
+          </a:p>
+          <a:p>
+            <a:pPr algn="ctr"/>
+            <a:r>
+              <a:rPr lang="en-US" sz="1200" dirty="0"/>
+              <a:t>[conc, </a:t>
+            </a:r>
+            <a:r>
+              <a:rPr lang="en-US" sz="1200" dirty="0" err="1"/>
+              <a:t>optical_density</a:t>
+            </a:r>
+            <a:r>
+              <a:rPr lang="en-US" sz="1200" dirty="0"/>
+              <a:t>, </a:t>
+            </a:r>
+            <a:r>
+              <a:rPr lang="en-US" sz="1200" dirty="0" err="1"/>
+              <a:t>lab_id</a:t>
+            </a:r>
+            <a:r>
+              <a:rPr lang="en-US" sz="1200" dirty="0"/>
+              <a:t>, inhibitor] </a:t>
+            </a:r>
+          </a:p>
+        </p:txBody>
+      </p:sp>
+      <p:sp>
+        <p:nvSpPr>
+          <p:cNvPr id="4" name="Rectangle: Rounded Corners 3">
+            <a:extLst>
+              <a:ext uri="{FF2B5EF4-FFF2-40B4-BE49-F238E27FC236}">
+                <a16:creationId xmlns:a16="http://schemas.microsoft.com/office/drawing/2014/main" id="{193C7284-B2C1-47ED-AEF4-38405D32A456}"/>
+              </a:ext>
+            </a:extLst>
+          </p:cNvPr>
+          <p:cNvSpPr/>
+          <p:nvPr/>
+        </p:nvSpPr>
+        <p:spPr>
+          <a:xfrm>
+            <a:off x="2527697" y="761761"/>
+            <a:ext cx="1843088" cy="971545"/>
+          </a:xfrm>
+          <a:prstGeom prst="roundRect">
+            <a:avLst/>
+          </a:prstGeom>
+        </p:spPr>
+        <p:style>
+          <a:lnRef idx="2">
+            <a:schemeClr val="accent1">
+              <a:shade val="50000"/>
+            </a:schemeClr>
+          </a:lnRef>
+          <a:fillRef idx="1">
+            <a:schemeClr val="accent1"/>
+          </a:fillRef>
+          <a:effectRef idx="0">
+            <a:schemeClr val="accent1"/>
+          </a:effectRef>
+          <a:fontRef idx="minor">
+            <a:schemeClr val="lt1"/>
+          </a:fontRef>
+        </p:style>
+        <p:txBody>
+          <a:bodyPr rtlCol="0" anchor="ctr"/>
+          <a:lstStyle/>
+          <a:p>
+            <a:pPr algn="ctr"/>
+            <a:r>
+              <a:rPr lang="en-US" dirty="0"/>
+              <a:t>Plate Mapping</a:t>
+            </a:r>
+          </a:p>
+          <a:p>
+            <a:pPr algn="ctr"/>
+            <a:r>
+              <a:rPr lang="en-US" sz="900" dirty="0"/>
+              <a:t>[HNSCC_plate_data_mapper.py]</a:t>
+            </a:r>
+          </a:p>
+        </p:txBody>
+      </p:sp>
+      <p:sp>
+        <p:nvSpPr>
+          <p:cNvPr id="5" name="Rectangle: Rounded Corners 4">
+            <a:extLst>
+              <a:ext uri="{FF2B5EF4-FFF2-40B4-BE49-F238E27FC236}">
+                <a16:creationId xmlns:a16="http://schemas.microsoft.com/office/drawing/2014/main" id="{797472C0-924C-453D-85FE-D9F751F91C8F}"/>
+              </a:ext>
+            </a:extLst>
+          </p:cNvPr>
+          <p:cNvSpPr/>
+          <p:nvPr/>
+        </p:nvSpPr>
+        <p:spPr>
+          <a:xfrm>
+            <a:off x="4927997" y="761761"/>
+            <a:ext cx="1843088" cy="990599"/>
+          </a:xfrm>
+          <a:prstGeom prst="roundRect">
+            <a:avLst/>
+          </a:prstGeom>
+        </p:spPr>
+        <p:style>
+          <a:lnRef idx="2">
+            <a:schemeClr val="accent1">
+              <a:shade val="50000"/>
+            </a:schemeClr>
+          </a:lnRef>
+          <a:fillRef idx="1">
+            <a:schemeClr val="accent1"/>
+          </a:fillRef>
+          <a:effectRef idx="0">
+            <a:schemeClr val="accent1"/>
+          </a:effectRef>
+          <a:fontRef idx="minor">
+            <a:schemeClr val="lt1"/>
+          </a:fontRef>
+        </p:style>
+        <p:txBody>
+          <a:bodyPr rtlCol="0" anchor="ctr"/>
+          <a:lstStyle/>
+          <a:p>
+            <a:pPr algn="ctr"/>
+            <a:r>
+              <a:rPr lang="en-US" dirty="0"/>
+              <a:t>Normalization (1) </a:t>
+            </a:r>
+          </a:p>
+          <a:p>
+            <a:pPr algn="ctr"/>
+            <a:r>
+              <a:rPr lang="en-US" sz="900" dirty="0"/>
+              <a:t>[name – not in dev yet]</a:t>
+            </a:r>
+          </a:p>
+        </p:txBody>
+      </p:sp>
+      <p:sp>
+        <p:nvSpPr>
+          <p:cNvPr id="6" name="Rectangle: Rounded Corners 5">
+            <a:extLst>
+              <a:ext uri="{FF2B5EF4-FFF2-40B4-BE49-F238E27FC236}">
+                <a16:creationId xmlns:a16="http://schemas.microsoft.com/office/drawing/2014/main" id="{C6C10FA8-B0D6-47D7-892A-BA503F3CCFD4}"/>
+              </a:ext>
+            </a:extLst>
+          </p:cNvPr>
+          <p:cNvSpPr/>
+          <p:nvPr/>
+        </p:nvSpPr>
+        <p:spPr>
+          <a:xfrm>
+            <a:off x="14288" y="1376359"/>
+            <a:ext cx="1943100" cy="990600"/>
+          </a:xfrm>
+          <a:prstGeom prst="roundRect">
+            <a:avLst/>
+          </a:prstGeom>
+          <a:solidFill>
+            <a:schemeClr val="accent2">
+              <a:lumMod val="75000"/>
+            </a:schemeClr>
+          </a:solidFill>
+        </p:spPr>
+        <p:style>
+          <a:lnRef idx="2">
+            <a:schemeClr val="accent1">
+              <a:shade val="50000"/>
+            </a:schemeClr>
+          </a:lnRef>
+          <a:fillRef idx="1">
+            <a:schemeClr val="accent1"/>
+          </a:fillRef>
+          <a:effectRef idx="0">
+            <a:schemeClr val="accent1"/>
+          </a:effectRef>
+          <a:fontRef idx="minor">
+            <a:schemeClr val="lt1"/>
+          </a:fontRef>
+        </p:style>
+        <p:txBody>
+          <a:bodyPr rtlCol="0" anchor="ctr"/>
+          <a:lstStyle/>
+          <a:p>
+            <a:pPr algn="ctr"/>
+            <a:r>
+              <a:rPr lang="en-US" dirty="0"/>
+              <a:t>Photo spectrometer</a:t>
+            </a:r>
+          </a:p>
+          <a:p>
+            <a:pPr algn="ctr"/>
+            <a:r>
+              <a:rPr lang="en-US" dirty="0"/>
+              <a:t>Output </a:t>
+            </a:r>
+          </a:p>
+        </p:txBody>
+      </p:sp>
+      <p:sp>
+        <p:nvSpPr>
+          <p:cNvPr id="7" name="Rectangle: Rounded Corners 6">
+            <a:extLst>
+              <a:ext uri="{FF2B5EF4-FFF2-40B4-BE49-F238E27FC236}">
+                <a16:creationId xmlns:a16="http://schemas.microsoft.com/office/drawing/2014/main" id="{D82A4DB4-FBC5-48B8-B9F0-A45C22464930}"/>
+              </a:ext>
+            </a:extLst>
+          </p:cNvPr>
+          <p:cNvSpPr/>
+          <p:nvPr/>
+        </p:nvSpPr>
+        <p:spPr>
+          <a:xfrm>
+            <a:off x="14288" y="118046"/>
+            <a:ext cx="1943100" cy="1063053"/>
+          </a:xfrm>
+          <a:prstGeom prst="roundRect">
+            <a:avLst/>
+          </a:prstGeom>
+          <a:solidFill>
+            <a:schemeClr val="accent2">
+              <a:lumMod val="75000"/>
+            </a:schemeClr>
+          </a:solidFill>
+        </p:spPr>
+        <p:style>
+          <a:lnRef idx="2">
+            <a:schemeClr val="accent1">
+              <a:shade val="50000"/>
+            </a:schemeClr>
+          </a:lnRef>
+          <a:fillRef idx="1">
+            <a:schemeClr val="accent1"/>
+          </a:fillRef>
+          <a:effectRef idx="0">
+            <a:schemeClr val="accent1"/>
+          </a:effectRef>
+          <a:fontRef idx="minor">
+            <a:schemeClr val="lt1"/>
+          </a:fontRef>
+        </p:style>
+        <p:txBody>
+          <a:bodyPr rtlCol="0" anchor="ctr"/>
+          <a:lstStyle/>
+          <a:p>
+            <a:pPr algn="ctr"/>
+            <a:r>
+              <a:rPr lang="en-US" dirty="0"/>
+              <a:t>Plate Map</a:t>
+            </a:r>
+          </a:p>
+        </p:txBody>
+      </p:sp>
+      <p:sp>
+        <p:nvSpPr>
+          <p:cNvPr id="8" name="Rectangle: Rounded Corners 7">
+            <a:extLst>
+              <a:ext uri="{FF2B5EF4-FFF2-40B4-BE49-F238E27FC236}">
+                <a16:creationId xmlns:a16="http://schemas.microsoft.com/office/drawing/2014/main" id="{A41BBD15-2A23-4A78-A2C4-5BD7D8B92923}"/>
+              </a:ext>
+            </a:extLst>
+          </p:cNvPr>
+          <p:cNvSpPr/>
+          <p:nvPr/>
+        </p:nvSpPr>
+        <p:spPr>
+          <a:xfrm>
+            <a:off x="3052762" y="4238625"/>
+            <a:ext cx="1662113" cy="990599"/>
+          </a:xfrm>
+          <a:prstGeom prst="roundRect">
+            <a:avLst/>
+          </a:prstGeom>
+        </p:spPr>
+        <p:style>
+          <a:lnRef idx="2">
+            <a:schemeClr val="accent1">
+              <a:shade val="50000"/>
+            </a:schemeClr>
+          </a:lnRef>
+          <a:fillRef idx="1">
+            <a:schemeClr val="accent1"/>
+          </a:fillRef>
+          <a:effectRef idx="0">
+            <a:schemeClr val="accent1"/>
+          </a:effectRef>
+          <a:fontRef idx="minor">
+            <a:schemeClr val="lt1"/>
+          </a:fontRef>
+        </p:style>
+        <p:txBody>
+          <a:bodyPr rtlCol="0" anchor="ctr"/>
+          <a:lstStyle/>
+          <a:p>
+            <a:pPr algn="ctr"/>
+            <a:r>
+              <a:rPr lang="en-US" dirty="0"/>
+              <a:t>Single-agent / Combination Split</a:t>
+            </a:r>
+          </a:p>
+          <a:p>
+            <a:pPr algn="ctr"/>
+            <a:r>
+              <a:rPr lang="en-US" sz="900" dirty="0"/>
+              <a:t>[name – not in dev yet]</a:t>
+            </a:r>
+          </a:p>
+        </p:txBody>
+      </p:sp>
+      <p:sp>
+        <p:nvSpPr>
+          <p:cNvPr id="11" name="Rectangle 10">
+            <a:extLst>
+              <a:ext uri="{FF2B5EF4-FFF2-40B4-BE49-F238E27FC236}">
+                <a16:creationId xmlns:a16="http://schemas.microsoft.com/office/drawing/2014/main" id="{E04EB8EF-55B2-46F6-84B0-5768C4CA29F0}"/>
+              </a:ext>
+            </a:extLst>
+          </p:cNvPr>
+          <p:cNvSpPr/>
+          <p:nvPr/>
+        </p:nvSpPr>
+        <p:spPr>
+          <a:xfrm>
+            <a:off x="7185422" y="1761888"/>
+            <a:ext cx="1843088" cy="752476"/>
+          </a:xfrm>
+          <a:prstGeom prst="rect">
+            <a:avLst/>
+          </a:prstGeom>
+        </p:spPr>
+        <p:style>
+          <a:lnRef idx="2">
+            <a:schemeClr val="dk1"/>
+          </a:lnRef>
+          <a:fillRef idx="1">
+            <a:schemeClr val="lt1"/>
+          </a:fillRef>
+          <a:effectRef idx="0">
+            <a:schemeClr val="dk1"/>
+          </a:effectRef>
+          <a:fontRef idx="minor">
+            <a:schemeClr val="dk1"/>
+          </a:fontRef>
+        </p:style>
+        <p:txBody>
+          <a:bodyPr rtlCol="0" anchor="ctr"/>
+          <a:lstStyle/>
+          <a:p>
+            <a:pPr algn="ctr"/>
+            <a:r>
+              <a:rPr lang="en-US" sz="1200" dirty="0"/>
+              <a:t>A ceiling and floor must be set to constrain cell viability within [0,1].  </a:t>
+            </a:r>
+          </a:p>
+        </p:txBody>
+      </p:sp>
+      <p:sp>
+        <p:nvSpPr>
+          <p:cNvPr id="12" name="Rectangle: Rounded Corners 11">
+            <a:extLst>
+              <a:ext uri="{FF2B5EF4-FFF2-40B4-BE49-F238E27FC236}">
+                <a16:creationId xmlns:a16="http://schemas.microsoft.com/office/drawing/2014/main" id="{4BE75838-738C-4D64-BD60-FCB6E46DFA95}"/>
+              </a:ext>
+            </a:extLst>
+          </p:cNvPr>
+          <p:cNvSpPr/>
+          <p:nvPr/>
+        </p:nvSpPr>
+        <p:spPr>
+          <a:xfrm>
+            <a:off x="7185422" y="761765"/>
+            <a:ext cx="1843088" cy="990599"/>
+          </a:xfrm>
+          <a:prstGeom prst="roundRect">
+            <a:avLst/>
+          </a:prstGeom>
+        </p:spPr>
+        <p:style>
+          <a:lnRef idx="2">
+            <a:schemeClr val="accent1">
+              <a:shade val="50000"/>
+            </a:schemeClr>
+          </a:lnRef>
+          <a:fillRef idx="1">
+            <a:schemeClr val="accent1"/>
+          </a:fillRef>
+          <a:effectRef idx="0">
+            <a:schemeClr val="accent1"/>
+          </a:effectRef>
+          <a:fontRef idx="minor">
+            <a:schemeClr val="lt1"/>
+          </a:fontRef>
+        </p:style>
+        <p:txBody>
+          <a:bodyPr rtlCol="0" anchor="ctr"/>
+          <a:lstStyle/>
+          <a:p>
+            <a:pPr algn="ctr"/>
+            <a:r>
+              <a:rPr lang="en-US" dirty="0"/>
+              <a:t>Normalization</a:t>
+            </a:r>
+          </a:p>
+          <a:p>
+            <a:pPr algn="ctr"/>
+            <a:r>
+              <a:rPr lang="en-US" dirty="0"/>
+              <a:t>(2) </a:t>
+            </a:r>
+          </a:p>
+          <a:p>
+            <a:pPr algn="ctr"/>
+            <a:r>
+              <a:rPr lang="en-US" sz="900" dirty="0"/>
+              <a:t>[name – not in dev yet]</a:t>
+            </a:r>
+          </a:p>
+        </p:txBody>
+      </p:sp>
+      <p:sp>
+        <p:nvSpPr>
+          <p:cNvPr id="13" name="Rectangle 12">
+            <a:extLst>
+              <a:ext uri="{FF2B5EF4-FFF2-40B4-BE49-F238E27FC236}">
+                <a16:creationId xmlns:a16="http://schemas.microsoft.com/office/drawing/2014/main" id="{E7F93816-43F2-4B1A-9171-0FF2E4500C69}"/>
+              </a:ext>
+            </a:extLst>
+          </p:cNvPr>
+          <p:cNvSpPr/>
+          <p:nvPr/>
+        </p:nvSpPr>
+        <p:spPr>
+          <a:xfrm>
+            <a:off x="9442847" y="1733310"/>
+            <a:ext cx="1843088" cy="752476"/>
+          </a:xfrm>
+          <a:prstGeom prst="rect">
+            <a:avLst/>
+          </a:prstGeom>
+        </p:spPr>
+        <p:style>
+          <a:lnRef idx="2">
+            <a:schemeClr val="dk1"/>
+          </a:lnRef>
+          <a:fillRef idx="1">
+            <a:schemeClr val="lt1"/>
+          </a:fillRef>
+          <a:effectRef idx="0">
+            <a:schemeClr val="dk1"/>
+          </a:effectRef>
+          <a:fontRef idx="minor">
+            <a:schemeClr val="dk1"/>
+          </a:fontRef>
+        </p:style>
+        <p:txBody>
+          <a:bodyPr rtlCol="0" anchor="ctr"/>
+          <a:lstStyle/>
+          <a:p>
+            <a:pPr algn="ctr"/>
+            <a:r>
+              <a:rPr lang="en-US" sz="1200" dirty="0"/>
+              <a:t>If we have replicates, then they are averaged.  </a:t>
+            </a:r>
+          </a:p>
+        </p:txBody>
+      </p:sp>
+      <p:sp>
+        <p:nvSpPr>
+          <p:cNvPr id="14" name="Rectangle: Rounded Corners 13">
+            <a:extLst>
+              <a:ext uri="{FF2B5EF4-FFF2-40B4-BE49-F238E27FC236}">
+                <a16:creationId xmlns:a16="http://schemas.microsoft.com/office/drawing/2014/main" id="{E73C5A82-F3C2-4E54-AE36-C924CDC3C367}"/>
+              </a:ext>
+            </a:extLst>
+          </p:cNvPr>
+          <p:cNvSpPr/>
+          <p:nvPr/>
+        </p:nvSpPr>
+        <p:spPr>
+          <a:xfrm>
+            <a:off x="9442847" y="761764"/>
+            <a:ext cx="1843088" cy="990599"/>
+          </a:xfrm>
+          <a:prstGeom prst="roundRect">
+            <a:avLst/>
+          </a:prstGeom>
+        </p:spPr>
+        <p:style>
+          <a:lnRef idx="2">
+            <a:schemeClr val="accent1">
+              <a:shade val="50000"/>
+            </a:schemeClr>
+          </a:lnRef>
+          <a:fillRef idx="1">
+            <a:schemeClr val="accent1"/>
+          </a:fillRef>
+          <a:effectRef idx="0">
+            <a:schemeClr val="accent1"/>
+          </a:effectRef>
+          <a:fontRef idx="minor">
+            <a:schemeClr val="lt1"/>
+          </a:fontRef>
+        </p:style>
+        <p:txBody>
+          <a:bodyPr rtlCol="0" anchor="ctr"/>
+          <a:lstStyle/>
+          <a:p>
+            <a:pPr algn="ctr"/>
+            <a:r>
+              <a:rPr lang="en-US" dirty="0"/>
+              <a:t>Normalization</a:t>
+            </a:r>
+          </a:p>
+          <a:p>
+            <a:pPr algn="ctr"/>
+            <a:r>
+              <a:rPr lang="en-US" dirty="0"/>
+              <a:t>(3) </a:t>
+            </a:r>
+          </a:p>
+          <a:p>
+            <a:pPr algn="ctr"/>
+            <a:r>
+              <a:rPr lang="en-US" sz="900" dirty="0"/>
+              <a:t>[name – not in dev yet]</a:t>
+            </a:r>
+          </a:p>
+        </p:txBody>
+      </p:sp>
+      <p:sp>
+        <p:nvSpPr>
+          <p:cNvPr id="15" name="Rectangle 14">
+            <a:extLst>
+              <a:ext uri="{FF2B5EF4-FFF2-40B4-BE49-F238E27FC236}">
+                <a16:creationId xmlns:a16="http://schemas.microsoft.com/office/drawing/2014/main" id="{87CA49F1-FAE7-47BA-847B-A196A3941387}"/>
+              </a:ext>
+            </a:extLst>
+          </p:cNvPr>
+          <p:cNvSpPr/>
+          <p:nvPr/>
+        </p:nvSpPr>
+        <p:spPr>
+          <a:xfrm>
+            <a:off x="533400" y="5248273"/>
+            <a:ext cx="1843088" cy="1238252"/>
+          </a:xfrm>
+          <a:prstGeom prst="rect">
+            <a:avLst/>
+          </a:prstGeom>
+        </p:spPr>
+        <p:style>
+          <a:lnRef idx="2">
+            <a:schemeClr val="dk1"/>
+          </a:lnRef>
+          <a:fillRef idx="1">
+            <a:schemeClr val="lt1"/>
+          </a:fillRef>
+          <a:effectRef idx="0">
+            <a:schemeClr val="dk1"/>
+          </a:effectRef>
+          <a:fontRef idx="minor">
+            <a:schemeClr val="dk1"/>
+          </a:fontRef>
+        </p:style>
+        <p:txBody>
+          <a:bodyPr rtlCol="0" anchor="ctr"/>
+          <a:lstStyle/>
+          <a:p>
+            <a:pPr algn="ctr"/>
+            <a:r>
+              <a:rPr lang="en-US" sz="1200" dirty="0"/>
+              <a:t>??? Check Dan </a:t>
+            </a:r>
+            <a:r>
+              <a:rPr lang="en-US" sz="1200" dirty="0" err="1"/>
+              <a:t>Bottomly’s</a:t>
+            </a:r>
+            <a:r>
+              <a:rPr lang="en-US" sz="1200" dirty="0"/>
+              <a:t> documentation ??? I believe this step drops data when </a:t>
+            </a:r>
+            <a:r>
+              <a:rPr lang="en-US" sz="1200" dirty="0" err="1"/>
+              <a:t>replicate_auc</a:t>
+            </a:r>
+            <a:r>
+              <a:rPr lang="en-US" sz="1200" dirty="0"/>
+              <a:t> – </a:t>
+            </a:r>
+            <a:r>
+              <a:rPr lang="en-US" sz="1200" dirty="0" err="1"/>
+              <a:t>avg_replacate_auc</a:t>
+            </a:r>
+            <a:r>
+              <a:rPr lang="en-US" sz="1200" dirty="0"/>
+              <a:t> &gt; </a:t>
+            </a:r>
+            <a:r>
+              <a:rPr lang="en-US" sz="1200" dirty="0" err="1"/>
+              <a:t>some_value</a:t>
+            </a:r>
+            <a:endParaRPr lang="en-US" sz="1200" dirty="0"/>
+          </a:p>
+        </p:txBody>
+      </p:sp>
+      <p:sp>
+        <p:nvSpPr>
+          <p:cNvPr id="16" name="Rectangle: Rounded Corners 15">
+            <a:extLst>
+              <a:ext uri="{FF2B5EF4-FFF2-40B4-BE49-F238E27FC236}">
+                <a16:creationId xmlns:a16="http://schemas.microsoft.com/office/drawing/2014/main" id="{4370392D-A95D-4954-BA28-E3499372B6EA}"/>
+              </a:ext>
+            </a:extLst>
+          </p:cNvPr>
+          <p:cNvSpPr/>
+          <p:nvPr/>
+        </p:nvSpPr>
+        <p:spPr>
+          <a:xfrm>
+            <a:off x="533400" y="4238621"/>
+            <a:ext cx="1843088" cy="990599"/>
+          </a:xfrm>
+          <a:prstGeom prst="roundRect">
+            <a:avLst/>
+          </a:prstGeom>
+        </p:spPr>
+        <p:style>
+          <a:lnRef idx="2">
+            <a:schemeClr val="accent1">
+              <a:shade val="50000"/>
+            </a:schemeClr>
+          </a:lnRef>
+          <a:fillRef idx="1">
+            <a:schemeClr val="accent1"/>
+          </a:fillRef>
+          <a:effectRef idx="0">
+            <a:schemeClr val="accent1"/>
+          </a:effectRef>
+          <a:fontRef idx="minor">
+            <a:schemeClr val="lt1"/>
+          </a:fontRef>
+        </p:style>
+        <p:txBody>
+          <a:bodyPr rtlCol="0" anchor="ctr"/>
+          <a:lstStyle/>
+          <a:p>
+            <a:pPr algn="ctr"/>
+            <a:r>
+              <a:rPr lang="en-US" dirty="0"/>
+              <a:t>Quality Control</a:t>
+            </a:r>
+          </a:p>
+          <a:p>
+            <a:pPr algn="ctr"/>
+            <a:r>
+              <a:rPr lang="en-US" sz="900" dirty="0"/>
+              <a:t>[name – not in dev yet]</a:t>
+            </a:r>
+          </a:p>
+        </p:txBody>
+      </p:sp>
+      <p:cxnSp>
+        <p:nvCxnSpPr>
+          <p:cNvPr id="20" name="Connector: Elbow 19">
+            <a:extLst>
+              <a:ext uri="{FF2B5EF4-FFF2-40B4-BE49-F238E27FC236}">
+                <a16:creationId xmlns:a16="http://schemas.microsoft.com/office/drawing/2014/main" id="{39B6E618-CE45-4915-A4A3-E69CCF35737B}"/>
+              </a:ext>
+            </a:extLst>
+          </p:cNvPr>
+          <p:cNvCxnSpPr>
+            <a:stCxn id="14" idx="3"/>
+            <a:endCxn id="16" idx="1"/>
+          </p:cNvCxnSpPr>
+          <p:nvPr/>
+        </p:nvCxnSpPr>
+        <p:spPr>
+          <a:xfrm flipH="1">
+            <a:off x="533400" y="1257064"/>
+            <a:ext cx="10752535" cy="3476857"/>
+          </a:xfrm>
+          <a:prstGeom prst="bentConnector5">
+            <a:avLst>
+              <a:gd name="adj1" fmla="val -2126"/>
+              <a:gd name="adj2" fmla="val 80957"/>
+              <a:gd name="adj3" fmla="val 102126"/>
+            </a:avLst>
+          </a:prstGeom>
+          <a:ln>
+            <a:tailEnd type="triangle"/>
+          </a:ln>
+        </p:spPr>
+        <p:style>
+          <a:lnRef idx="1">
+            <a:schemeClr val="accent1"/>
+          </a:lnRef>
+          <a:fillRef idx="0">
+            <a:schemeClr val="accent1"/>
+          </a:fillRef>
+          <a:effectRef idx="0">
+            <a:schemeClr val="accent1"/>
+          </a:effectRef>
+          <a:fontRef idx="minor">
+            <a:schemeClr val="tx1"/>
+          </a:fontRef>
+        </p:style>
+      </p:cxnSp>
+      <p:sp>
+        <p:nvSpPr>
+          <p:cNvPr id="22" name="Rectangle: Rounded Corners 21">
+            <a:extLst>
+              <a:ext uri="{FF2B5EF4-FFF2-40B4-BE49-F238E27FC236}">
+                <a16:creationId xmlns:a16="http://schemas.microsoft.com/office/drawing/2014/main" id="{5C4DD129-C784-4D04-9C24-E40DDCD0D3DF}"/>
+              </a:ext>
+            </a:extLst>
+          </p:cNvPr>
+          <p:cNvSpPr/>
+          <p:nvPr/>
+        </p:nvSpPr>
+        <p:spPr>
+          <a:xfrm>
+            <a:off x="5903119" y="4986338"/>
+            <a:ext cx="1662113" cy="990599"/>
+          </a:xfrm>
+          <a:prstGeom prst="roundRect">
+            <a:avLst/>
+          </a:prstGeom>
+        </p:spPr>
+        <p:style>
+          <a:lnRef idx="2">
+            <a:schemeClr val="accent1">
+              <a:shade val="50000"/>
+            </a:schemeClr>
+          </a:lnRef>
+          <a:fillRef idx="1">
+            <a:schemeClr val="accent1"/>
+          </a:fillRef>
+          <a:effectRef idx="0">
+            <a:schemeClr val="accent1"/>
+          </a:effectRef>
+          <a:fontRef idx="minor">
+            <a:schemeClr val="lt1"/>
+          </a:fontRef>
+        </p:style>
+        <p:txBody>
+          <a:bodyPr rtlCol="0" anchor="ctr"/>
+          <a:lstStyle/>
+          <a:p>
+            <a:pPr algn="ctr"/>
+            <a:r>
+              <a:rPr lang="en-US" dirty="0"/>
+              <a:t>Combination-Agents Normalization</a:t>
+            </a:r>
+          </a:p>
+          <a:p>
+            <a:pPr algn="ctr"/>
+            <a:r>
+              <a:rPr lang="en-US" sz="900" dirty="0"/>
+              <a:t>[name – not in dev yet]</a:t>
+            </a:r>
+          </a:p>
+        </p:txBody>
+      </p:sp>
+      <p:sp>
+        <p:nvSpPr>
+          <p:cNvPr id="23" name="Rectangle 22">
+            <a:extLst>
+              <a:ext uri="{FF2B5EF4-FFF2-40B4-BE49-F238E27FC236}">
+                <a16:creationId xmlns:a16="http://schemas.microsoft.com/office/drawing/2014/main" id="{327CE092-1F7B-4C9F-8F42-9D535FEE76B5}"/>
+              </a:ext>
+            </a:extLst>
+          </p:cNvPr>
+          <p:cNvSpPr/>
+          <p:nvPr/>
+        </p:nvSpPr>
+        <p:spPr>
+          <a:xfrm>
+            <a:off x="5836444" y="5976936"/>
+            <a:ext cx="1843088" cy="881063"/>
+          </a:xfrm>
+          <a:prstGeom prst="rect">
+            <a:avLst/>
+          </a:prstGeom>
+        </p:spPr>
+        <p:style>
+          <a:lnRef idx="2">
+            <a:schemeClr val="dk1"/>
+          </a:lnRef>
+          <a:fillRef idx="1">
+            <a:schemeClr val="lt1"/>
+          </a:fillRef>
+          <a:effectRef idx="0">
+            <a:schemeClr val="dk1"/>
+          </a:effectRef>
+          <a:fontRef idx="minor">
+            <a:schemeClr val="dk1"/>
+          </a:fontRef>
+        </p:style>
+        <p:txBody>
+          <a:bodyPr rtlCol="0" anchor="ctr"/>
+          <a:lstStyle/>
+          <a:p>
+            <a:pPr algn="ctr"/>
+            <a:r>
+              <a:rPr lang="en-US" sz="1200" dirty="0"/>
+              <a:t>Concentrations have to be represented as </a:t>
+            </a:r>
+            <a:r>
+              <a:rPr lang="en-US" sz="1200" dirty="0" err="1"/>
+              <a:t>euclidean</a:t>
+            </a:r>
+            <a:r>
+              <a:rPr lang="en-US" sz="1200" dirty="0"/>
+              <a:t> distances in concentration space to provide accurate plate to fit along. </a:t>
+            </a:r>
+          </a:p>
+        </p:txBody>
+      </p:sp>
+      <p:sp>
+        <p:nvSpPr>
+          <p:cNvPr id="24" name="Rectangle: Rounded Corners 23">
+            <a:extLst>
+              <a:ext uri="{FF2B5EF4-FFF2-40B4-BE49-F238E27FC236}">
+                <a16:creationId xmlns:a16="http://schemas.microsoft.com/office/drawing/2014/main" id="{166D446E-B385-473D-B5D5-0F426DB64B1D}"/>
+              </a:ext>
+            </a:extLst>
+          </p:cNvPr>
+          <p:cNvSpPr/>
+          <p:nvPr/>
+        </p:nvSpPr>
+        <p:spPr>
+          <a:xfrm>
+            <a:off x="8836819" y="4238624"/>
+            <a:ext cx="1662113" cy="990599"/>
+          </a:xfrm>
+          <a:prstGeom prst="roundRect">
+            <a:avLst/>
+          </a:prstGeom>
+        </p:spPr>
+        <p:style>
+          <a:lnRef idx="2">
+            <a:schemeClr val="accent1">
+              <a:shade val="50000"/>
+            </a:schemeClr>
+          </a:lnRef>
+          <a:fillRef idx="1">
+            <a:schemeClr val="accent1"/>
+          </a:fillRef>
+          <a:effectRef idx="0">
+            <a:schemeClr val="accent1"/>
+          </a:effectRef>
+          <a:fontRef idx="minor">
+            <a:schemeClr val="lt1"/>
+          </a:fontRef>
+        </p:style>
+        <p:txBody>
+          <a:bodyPr rtlCol="0" anchor="ctr"/>
+          <a:lstStyle/>
+          <a:p>
+            <a:pPr algn="ctr"/>
+            <a:r>
+              <a:rPr lang="en-US" dirty="0" err="1"/>
+              <a:t>Probit</a:t>
+            </a:r>
+            <a:r>
+              <a:rPr lang="en-US" dirty="0"/>
+              <a:t> Fit &amp; Overfitting QC</a:t>
+            </a:r>
+          </a:p>
+          <a:p>
+            <a:pPr algn="ctr"/>
+            <a:r>
+              <a:rPr lang="en-US" sz="900" dirty="0"/>
+              <a:t>[name – not in dev yet]</a:t>
+            </a:r>
+          </a:p>
+        </p:txBody>
+      </p:sp>
+      <p:sp>
+        <p:nvSpPr>
+          <p:cNvPr id="25" name="Rectangle 24">
+            <a:extLst>
+              <a:ext uri="{FF2B5EF4-FFF2-40B4-BE49-F238E27FC236}">
+                <a16:creationId xmlns:a16="http://schemas.microsoft.com/office/drawing/2014/main" id="{44F8A642-34FC-4C9D-BD5E-4F69D6C4C988}"/>
+              </a:ext>
+            </a:extLst>
+          </p:cNvPr>
+          <p:cNvSpPr/>
+          <p:nvPr/>
+        </p:nvSpPr>
+        <p:spPr>
+          <a:xfrm>
+            <a:off x="8753476" y="5229220"/>
+            <a:ext cx="1843088" cy="881063"/>
+          </a:xfrm>
+          <a:prstGeom prst="rect">
+            <a:avLst/>
+          </a:prstGeom>
+        </p:spPr>
+        <p:style>
+          <a:lnRef idx="2">
+            <a:schemeClr val="dk1"/>
+          </a:lnRef>
+          <a:fillRef idx="1">
+            <a:schemeClr val="lt1"/>
+          </a:fillRef>
+          <a:effectRef idx="0">
+            <a:schemeClr val="dk1"/>
+          </a:effectRef>
+          <a:fontRef idx="minor">
+            <a:schemeClr val="dk1"/>
+          </a:fontRef>
+        </p:style>
+        <p:txBody>
+          <a:bodyPr rtlCol="0" anchor="ctr"/>
+          <a:lstStyle/>
+          <a:p>
+            <a:pPr algn="ctr"/>
+            <a:endParaRPr lang="en-US" sz="1200" dirty="0"/>
+          </a:p>
+        </p:txBody>
+      </p:sp>
+      <p:cxnSp>
+        <p:nvCxnSpPr>
+          <p:cNvPr id="27" name="Connector: Elbow 26">
+            <a:extLst>
+              <a:ext uri="{FF2B5EF4-FFF2-40B4-BE49-F238E27FC236}">
+                <a16:creationId xmlns:a16="http://schemas.microsoft.com/office/drawing/2014/main" id="{4AC5317C-CAC3-47EA-BF1B-C7DAAEFEAFA8}"/>
+              </a:ext>
+            </a:extLst>
+          </p:cNvPr>
+          <p:cNvCxnSpPr>
+            <a:stCxn id="8" idx="3"/>
+            <a:endCxn id="24" idx="1"/>
+          </p:cNvCxnSpPr>
+          <p:nvPr/>
+        </p:nvCxnSpPr>
+        <p:spPr>
+          <a:xfrm flipV="1">
+            <a:off x="4714875" y="4733924"/>
+            <a:ext cx="4121944" cy="1"/>
+          </a:xfrm>
+          <a:prstGeom prst="bentConnector3">
+            <a:avLst/>
+          </a:prstGeom>
+          <a:ln>
+            <a:tailEnd type="triangle"/>
+          </a:ln>
+        </p:spPr>
+        <p:style>
+          <a:lnRef idx="1">
+            <a:schemeClr val="accent1"/>
+          </a:lnRef>
+          <a:fillRef idx="0">
+            <a:schemeClr val="accent1"/>
+          </a:fillRef>
+          <a:effectRef idx="0">
+            <a:schemeClr val="accent1"/>
+          </a:effectRef>
+          <a:fontRef idx="minor">
+            <a:schemeClr val="tx1"/>
+          </a:fontRef>
+        </p:style>
+      </p:cxnSp>
+      <p:cxnSp>
+        <p:nvCxnSpPr>
+          <p:cNvPr id="32" name="Connector: Elbow 31">
+            <a:extLst>
+              <a:ext uri="{FF2B5EF4-FFF2-40B4-BE49-F238E27FC236}">
+                <a16:creationId xmlns:a16="http://schemas.microsoft.com/office/drawing/2014/main" id="{3F772146-2F83-4C22-A1E1-342FABC4DDEA}"/>
+              </a:ext>
+            </a:extLst>
+          </p:cNvPr>
+          <p:cNvCxnSpPr>
+            <a:stCxn id="8" idx="3"/>
+            <a:endCxn id="22" idx="1"/>
+          </p:cNvCxnSpPr>
+          <p:nvPr/>
+        </p:nvCxnSpPr>
+        <p:spPr>
+          <a:xfrm>
+            <a:off x="4714875" y="4733925"/>
+            <a:ext cx="1188244" cy="747713"/>
+          </a:xfrm>
+          <a:prstGeom prst="bentConnector3">
+            <a:avLst/>
+          </a:prstGeom>
+          <a:ln>
+            <a:tailEnd type="triangle"/>
+          </a:ln>
+        </p:spPr>
+        <p:style>
+          <a:lnRef idx="1">
+            <a:schemeClr val="accent1"/>
+          </a:lnRef>
+          <a:fillRef idx="0">
+            <a:schemeClr val="accent1"/>
+          </a:fillRef>
+          <a:effectRef idx="0">
+            <a:schemeClr val="accent1"/>
+          </a:effectRef>
+          <a:fontRef idx="minor">
+            <a:schemeClr val="tx1"/>
+          </a:fontRef>
+        </p:style>
+      </p:cxnSp>
+      <p:cxnSp>
+        <p:nvCxnSpPr>
+          <p:cNvPr id="34" name="Connector: Elbow 33">
+            <a:extLst>
+              <a:ext uri="{FF2B5EF4-FFF2-40B4-BE49-F238E27FC236}">
+                <a16:creationId xmlns:a16="http://schemas.microsoft.com/office/drawing/2014/main" id="{32119134-244D-4348-BD8D-67E2FA402905}"/>
+              </a:ext>
+            </a:extLst>
+          </p:cNvPr>
+          <p:cNvCxnSpPr>
+            <a:stCxn id="22" idx="3"/>
+            <a:endCxn id="24" idx="1"/>
+          </p:cNvCxnSpPr>
+          <p:nvPr/>
+        </p:nvCxnSpPr>
+        <p:spPr>
+          <a:xfrm flipV="1">
+            <a:off x="7565232" y="4733924"/>
+            <a:ext cx="1271587" cy="747714"/>
+          </a:xfrm>
+          <a:prstGeom prst="bentConnector3">
+            <a:avLst/>
+          </a:prstGeom>
+          <a:ln>
+            <a:tailEnd type="triangle"/>
+          </a:ln>
+        </p:spPr>
+        <p:style>
+          <a:lnRef idx="1">
+            <a:schemeClr val="accent1"/>
+          </a:lnRef>
+          <a:fillRef idx="0">
+            <a:schemeClr val="accent1"/>
+          </a:fillRef>
+          <a:effectRef idx="0">
+            <a:schemeClr val="accent1"/>
+          </a:effectRef>
+          <a:fontRef idx="minor">
+            <a:schemeClr val="tx1"/>
+          </a:fontRef>
+        </p:style>
+      </p:cxnSp>
+      <p:sp>
+        <p:nvSpPr>
+          <p:cNvPr id="35" name="TextBox 34">
+            <a:extLst>
+              <a:ext uri="{FF2B5EF4-FFF2-40B4-BE49-F238E27FC236}">
+                <a16:creationId xmlns:a16="http://schemas.microsoft.com/office/drawing/2014/main" id="{A023506D-3C78-4D3C-B858-72512FFC1144}"/>
+              </a:ext>
+            </a:extLst>
+          </p:cNvPr>
+          <p:cNvSpPr txBox="1"/>
+          <p:nvPr/>
+        </p:nvSpPr>
+        <p:spPr>
+          <a:xfrm>
+            <a:off x="6365967" y="4495563"/>
+            <a:ext cx="819455" cy="246221"/>
+          </a:xfrm>
+          <a:prstGeom prst="rect">
+            <a:avLst/>
+          </a:prstGeom>
+          <a:noFill/>
+        </p:spPr>
+        <p:txBody>
+          <a:bodyPr wrap="none" rtlCol="0">
+            <a:spAutoFit/>
           </a:bodyPr>
           <a:lstStyle/>
           <a:p>
             <a:r>
-              <a:rPr lang="en-US" dirty="0"/>
-              <a:t>Number of HNSCC patients:  11 HNSCC patients [7/20] </a:t>
-            </a:r>
-          </a:p>
-          <a:p>
-            <a:r>
-              <a:rPr lang="en-US" dirty="0"/>
-              <a:t>Plate map versions </a:t>
-            </a:r>
-          </a:p>
-          <a:p>
-            <a:pPr lvl="1"/>
-            <a:r>
-              <a:rPr lang="en-US" dirty="0"/>
-              <a:t>Plates 1-3 (rev 001), Plates 1-6 (rev 002) &lt;- combinatorial </a:t>
-            </a:r>
-          </a:p>
-          <a:p>
-            <a:pPr lvl="1"/>
-            <a:r>
-              <a:rPr lang="en-US" dirty="0"/>
-              <a:t>Tyner panels – still need to be re-worked into HNSCC format</a:t>
-            </a:r>
-          </a:p>
-          <a:p>
-            <a:pPr lvl="1"/>
-            <a:r>
-              <a:rPr lang="en-US" dirty="0"/>
-              <a:t>+1 assay with 7… require additional work </a:t>
-            </a:r>
-          </a:p>
-          <a:p>
-            <a:pPr lvl="1"/>
-            <a:r>
-              <a:rPr lang="en-US" dirty="0"/>
-              <a:t>Excel files with pages: meta, concentration_&lt;num&gt;, inhibitor_&lt;num&gt;</a:t>
-            </a:r>
-          </a:p>
-          <a:p>
-            <a:r>
-              <a:rPr lang="en-US" dirty="0"/>
-              <a:t>Naming convention</a:t>
-            </a:r>
-          </a:p>
-          <a:p>
-            <a:pPr lvl="1"/>
-            <a:r>
-              <a:rPr lang="en-US" dirty="0"/>
-              <a:t>Unique ID for each assay? Or we need to distinguish replicates</a:t>
-            </a:r>
-          </a:p>
-          <a:p>
-            <a:pPr lvl="1"/>
-            <a:r>
-              <a:rPr lang="en-US" dirty="0"/>
-              <a:t>Date of assay? </a:t>
-            </a:r>
-          </a:p>
-          <a:p>
-            <a:pPr lvl="1"/>
-            <a:r>
-              <a:rPr lang="en-US" dirty="0"/>
-              <a:t>MTS sitting time? </a:t>
-            </a:r>
-          </a:p>
-          <a:p>
-            <a:pPr lvl="1"/>
-            <a:r>
-              <a:rPr lang="en-US" dirty="0" err="1"/>
-              <a:t>lab_id</a:t>
-            </a:r>
-            <a:r>
-              <a:rPr lang="en-US" dirty="0"/>
-              <a:t>=XXXXX-norm=XXX-</a:t>
-            </a:r>
-            <a:r>
-              <a:rPr lang="en-US" dirty="0" err="1"/>
-              <a:t>plate_version_id</a:t>
-            </a:r>
-            <a:r>
-              <a:rPr lang="en-US" dirty="0"/>
-              <a:t>=XXXX</a:t>
-            </a:r>
-          </a:p>
-          <a:p>
-            <a:pPr lvl="1"/>
-            <a:endParaRPr lang="en-US" dirty="0"/>
-          </a:p>
-          <a:p>
-            <a:pPr lvl="1"/>
-            <a:endParaRPr lang="en-US" dirty="0"/>
-          </a:p>
-        </p:txBody>
-      </p:sp>
+              <a:rPr lang="en-US" sz="1000" dirty="0"/>
+              <a:t>Single agent</a:t>
+            </a:r>
+          </a:p>
+        </p:txBody>
+      </p:sp>
+      <p:cxnSp>
+        <p:nvCxnSpPr>
+          <p:cNvPr id="37" name="Connector: Elbow 36">
+            <a:extLst>
+              <a:ext uri="{FF2B5EF4-FFF2-40B4-BE49-F238E27FC236}">
+                <a16:creationId xmlns:a16="http://schemas.microsoft.com/office/drawing/2014/main" id="{200F9EFA-8A24-478B-B621-6E021720A03C}"/>
+              </a:ext>
+            </a:extLst>
+          </p:cNvPr>
+          <p:cNvCxnSpPr>
+            <a:stCxn id="16" idx="3"/>
+            <a:endCxn id="8" idx="1"/>
+          </p:cNvCxnSpPr>
+          <p:nvPr/>
+        </p:nvCxnSpPr>
+        <p:spPr>
+          <a:xfrm>
+            <a:off x="2376488" y="4733921"/>
+            <a:ext cx="676274" cy="4"/>
+          </a:xfrm>
+          <a:prstGeom prst="bentConnector3">
+            <a:avLst/>
+          </a:prstGeom>
+          <a:ln>
+            <a:tailEnd type="triangle"/>
+          </a:ln>
+        </p:spPr>
+        <p:style>
+          <a:lnRef idx="1">
+            <a:schemeClr val="accent1"/>
+          </a:lnRef>
+          <a:fillRef idx="0">
+            <a:schemeClr val="accent1"/>
+          </a:fillRef>
+          <a:effectRef idx="0">
+            <a:schemeClr val="accent1"/>
+          </a:effectRef>
+          <a:fontRef idx="minor">
+            <a:schemeClr val="tx1"/>
+          </a:fontRef>
+        </p:style>
+      </p:cxnSp>
+      <p:cxnSp>
+        <p:nvCxnSpPr>
+          <p:cNvPr id="42" name="Connector: Elbow 41">
+            <a:extLst>
+              <a:ext uri="{FF2B5EF4-FFF2-40B4-BE49-F238E27FC236}">
+                <a16:creationId xmlns:a16="http://schemas.microsoft.com/office/drawing/2014/main" id="{BDBB7400-744E-4BD2-8112-34334606A46D}"/>
+              </a:ext>
+            </a:extLst>
+          </p:cNvPr>
+          <p:cNvCxnSpPr>
+            <a:stCxn id="12" idx="3"/>
+            <a:endCxn id="14" idx="1"/>
+          </p:cNvCxnSpPr>
+          <p:nvPr/>
+        </p:nvCxnSpPr>
+        <p:spPr>
+          <a:xfrm flipV="1">
+            <a:off x="9028510" y="1257064"/>
+            <a:ext cx="414337" cy="1"/>
+          </a:xfrm>
+          <a:prstGeom prst="bentConnector3">
+            <a:avLst/>
+          </a:prstGeom>
+          <a:ln>
+            <a:tailEnd type="triangle"/>
+          </a:ln>
+        </p:spPr>
+        <p:style>
+          <a:lnRef idx="1">
+            <a:schemeClr val="accent1"/>
+          </a:lnRef>
+          <a:fillRef idx="0">
+            <a:schemeClr val="accent1"/>
+          </a:fillRef>
+          <a:effectRef idx="0">
+            <a:schemeClr val="accent1"/>
+          </a:effectRef>
+          <a:fontRef idx="minor">
+            <a:schemeClr val="tx1"/>
+          </a:fontRef>
+        </p:style>
+      </p:cxnSp>
+      <p:cxnSp>
+        <p:nvCxnSpPr>
+          <p:cNvPr id="46" name="Connector: Elbow 45">
+            <a:extLst>
+              <a:ext uri="{FF2B5EF4-FFF2-40B4-BE49-F238E27FC236}">
+                <a16:creationId xmlns:a16="http://schemas.microsoft.com/office/drawing/2014/main" id="{28DD8D46-FFF1-4F1F-9353-223CADAC0240}"/>
+              </a:ext>
+            </a:extLst>
+          </p:cNvPr>
+          <p:cNvCxnSpPr>
+            <a:stCxn id="5" idx="3"/>
+            <a:endCxn id="12" idx="1"/>
+          </p:cNvCxnSpPr>
+          <p:nvPr/>
+        </p:nvCxnSpPr>
+        <p:spPr>
+          <a:xfrm>
+            <a:off x="6771085" y="1257061"/>
+            <a:ext cx="414337" cy="4"/>
+          </a:xfrm>
+          <a:prstGeom prst="bentConnector3">
+            <a:avLst/>
+          </a:prstGeom>
+          <a:ln>
+            <a:tailEnd type="triangle"/>
+          </a:ln>
+        </p:spPr>
+        <p:style>
+          <a:lnRef idx="1">
+            <a:schemeClr val="accent1"/>
+          </a:lnRef>
+          <a:fillRef idx="0">
+            <a:schemeClr val="accent1"/>
+          </a:fillRef>
+          <a:effectRef idx="0">
+            <a:schemeClr val="accent1"/>
+          </a:effectRef>
+          <a:fontRef idx="minor">
+            <a:schemeClr val="tx1"/>
+          </a:fontRef>
+        </p:style>
+      </p:cxnSp>
+      <p:cxnSp>
+        <p:nvCxnSpPr>
+          <p:cNvPr id="54" name="Straight Arrow Connector 53">
+            <a:extLst>
+              <a:ext uri="{FF2B5EF4-FFF2-40B4-BE49-F238E27FC236}">
+                <a16:creationId xmlns:a16="http://schemas.microsoft.com/office/drawing/2014/main" id="{50106116-BE84-49F2-9EA6-61D559998207}"/>
+              </a:ext>
+            </a:extLst>
+          </p:cNvPr>
+          <p:cNvCxnSpPr>
+            <a:stCxn id="4" idx="3"/>
+            <a:endCxn id="5" idx="1"/>
+          </p:cNvCxnSpPr>
+          <p:nvPr/>
+        </p:nvCxnSpPr>
+        <p:spPr>
+          <a:xfrm>
+            <a:off x="4370785" y="1247534"/>
+            <a:ext cx="557212" cy="9527"/>
+          </a:xfrm>
+          <a:prstGeom prst="straightConnector1">
+            <a:avLst/>
+          </a:prstGeom>
+          <a:ln>
+            <a:tailEnd type="triangle"/>
+          </a:ln>
+        </p:spPr>
+        <p:style>
+          <a:lnRef idx="1">
+            <a:schemeClr val="accent1"/>
+          </a:lnRef>
+          <a:fillRef idx="0">
+            <a:schemeClr val="accent1"/>
+          </a:fillRef>
+          <a:effectRef idx="0">
+            <a:schemeClr val="accent1"/>
+          </a:effectRef>
+          <a:fontRef idx="minor">
+            <a:schemeClr val="tx1"/>
+          </a:fontRef>
+        </p:style>
+      </p:cxnSp>
+      <p:cxnSp>
+        <p:nvCxnSpPr>
+          <p:cNvPr id="56" name="Connector: Elbow 55">
+            <a:extLst>
+              <a:ext uri="{FF2B5EF4-FFF2-40B4-BE49-F238E27FC236}">
+                <a16:creationId xmlns:a16="http://schemas.microsoft.com/office/drawing/2014/main" id="{BE15BE37-F947-4C81-A10A-02C20E653A5A}"/>
+              </a:ext>
+            </a:extLst>
+          </p:cNvPr>
+          <p:cNvCxnSpPr>
+            <a:stCxn id="7" idx="3"/>
+            <a:endCxn id="4" idx="1"/>
+          </p:cNvCxnSpPr>
+          <p:nvPr/>
+        </p:nvCxnSpPr>
+        <p:spPr>
+          <a:xfrm>
+            <a:off x="1957388" y="649573"/>
+            <a:ext cx="570309" cy="597961"/>
+          </a:xfrm>
+          <a:prstGeom prst="bentConnector3">
+            <a:avLst/>
+          </a:prstGeom>
+          <a:ln>
+            <a:tailEnd type="triangle"/>
+          </a:ln>
+        </p:spPr>
+        <p:style>
+          <a:lnRef idx="1">
+            <a:schemeClr val="accent1"/>
+          </a:lnRef>
+          <a:fillRef idx="0">
+            <a:schemeClr val="accent1"/>
+          </a:fillRef>
+          <a:effectRef idx="0">
+            <a:schemeClr val="accent1"/>
+          </a:effectRef>
+          <a:fontRef idx="minor">
+            <a:schemeClr val="tx1"/>
+          </a:fontRef>
+        </p:style>
+      </p:cxnSp>
+      <p:cxnSp>
+        <p:nvCxnSpPr>
+          <p:cNvPr id="59" name="Connector: Elbow 58">
+            <a:extLst>
+              <a:ext uri="{FF2B5EF4-FFF2-40B4-BE49-F238E27FC236}">
+                <a16:creationId xmlns:a16="http://schemas.microsoft.com/office/drawing/2014/main" id="{76F118B5-2782-4BF9-B983-9020DA116658}"/>
+              </a:ext>
+            </a:extLst>
+          </p:cNvPr>
+          <p:cNvCxnSpPr>
+            <a:stCxn id="6" idx="3"/>
+            <a:endCxn id="4" idx="1"/>
+          </p:cNvCxnSpPr>
+          <p:nvPr/>
+        </p:nvCxnSpPr>
+        <p:spPr>
+          <a:xfrm flipV="1">
+            <a:off x="1957388" y="1247534"/>
+            <a:ext cx="570309" cy="624125"/>
+          </a:xfrm>
+          <a:prstGeom prst="bentConnector3">
+            <a:avLst/>
+          </a:prstGeom>
+          <a:ln>
+            <a:tailEnd type="triangle"/>
+          </a:ln>
+        </p:spPr>
+        <p:style>
+          <a:lnRef idx="1">
+            <a:schemeClr val="accent1"/>
+          </a:lnRef>
+          <a:fillRef idx="0">
+            <a:schemeClr val="accent1"/>
+          </a:fillRef>
+          <a:effectRef idx="0">
+            <a:schemeClr val="accent1"/>
+          </a:effectRef>
+          <a:fontRef idx="minor">
+            <a:schemeClr val="tx1"/>
+          </a:fontRef>
+        </p:style>
+      </p:cxnSp>
     </p:spTree>
     <p:extLst>
       <p:ext uri="{BB962C8B-B14F-4D97-AF65-F5344CB8AC3E}">
-        <p14:creationId xmlns:p14="http://schemas.microsoft.com/office/powerpoint/2010/main" val="3771634021"/>
+        <p14:creationId xmlns:p14="http://schemas.microsoft.com/office/powerpoint/2010/main" val="718333327"/>
       </p:ext>
     </p:extLst>
   </p:cSld>
@@ -4718,7 +6031,7 @@
           <p:cNvPr id="2" name="Title 1">
             <a:extLst>
               <a:ext uri="{FF2B5EF4-FFF2-40B4-BE49-F238E27FC236}">
-                <a16:creationId xmlns:a16="http://schemas.microsoft.com/office/drawing/2014/main" id="{4C925E0A-FDA2-482C-B32C-BD02E0F5FDD5}"/>
+                <a16:creationId xmlns:a16="http://schemas.microsoft.com/office/drawing/2014/main" id="{0C9934DF-8684-482D-A4AA-A6412C0D074C}"/>
               </a:ext>
             </a:extLst>
           </p:cNvPr>
@@ -4736,7 +6049,7 @@
           <a:p>
             <a:r>
               <a:rPr lang="en-US" dirty="0"/>
-              <a:t>Plate Map Revisions </a:t>
+              <a:t>Overview </a:t>
             </a:r>
           </a:p>
         </p:txBody>
@@ -4746,7 +6059,7 @@
           <p:cNvPr id="3" name="Content Placeholder 2">
             <a:extLst>
               <a:ext uri="{FF2B5EF4-FFF2-40B4-BE49-F238E27FC236}">
-                <a16:creationId xmlns:a16="http://schemas.microsoft.com/office/drawing/2014/main" id="{287DDDA0-A034-491E-AF68-7EC8860582A7}"/>
+                <a16:creationId xmlns:a16="http://schemas.microsoft.com/office/drawing/2014/main" id="{D14D1252-27F6-45E4-AC18-DBBDBC8B95FE}"/>
               </a:ext>
             </a:extLst>
           </p:cNvPr>
@@ -4759,42 +6072,102 @@
         </p:nvSpPr>
         <p:spPr/>
         <p:txBody>
-          <a:bodyPr/>
-          <a:lstStyle/>
-          <a:p>
-            <a:r>
-              <a:rPr lang="en-US" dirty="0"/>
-              <a:t>Drug Names, there are some inconsistencies – need to define clear nomenclature to avoid redundancy. </a:t>
+          <a:bodyPr>
+            <a:normAutofit lnSpcReduction="10000"/>
+          </a:bodyPr>
+          <a:lstStyle/>
+          <a:p>
+            <a:r>
+              <a:rPr lang="en-US" dirty="0"/>
+              <a:t>Number of HNSCC patients:  11 HNSCC patients [7/20] </a:t>
+            </a:r>
+          </a:p>
+          <a:p>
+            <a:r>
+              <a:rPr lang="en-US" dirty="0"/>
+              <a:t>Plate map versions </a:t>
             </a:r>
           </a:p>
           <a:p>
             <a:pPr lvl="1"/>
             <a:r>
               <a:rPr lang="en-US" dirty="0"/>
-              <a:t>I can provide a list of all used names, if someone can review and choose the right names. </a:t>
+              <a:t>Plates 1-3 (rev 001), Plates 1-6 (rev 002) &lt;- combinatorial </a:t>
             </a:r>
           </a:p>
           <a:p>
             <a:pPr lvl="1"/>
             <a:r>
               <a:rPr lang="en-US" dirty="0"/>
-              <a:t>Alternatively, if there is a list of acceptable drug names, I can do it myself. </a:t>
-            </a:r>
-          </a:p>
-          <a:p>
-            <a:r>
-              <a:rPr lang="en-US" dirty="0"/>
-              <a:t>I’d like a review of my concentration mapping [request] </a:t>
+              <a:t>Tyner panels – still need to be re-worked into HNSCC format</a:t>
             </a:r>
           </a:p>
           <a:p>
             <a:pPr lvl="1"/>
             <a:r>
               <a:rPr lang="en-US" dirty="0"/>
-              <a:t>Ashley volunteered to review, but a second pair of eyes would be useful as well. </a:t>
-            </a:r>
-          </a:p>
-          <a:p>
+              <a:t>+1 assay with 7… require additional work </a:t>
+            </a:r>
+          </a:p>
+          <a:p>
+            <a:pPr lvl="1"/>
+            <a:r>
+              <a:rPr lang="en-US" dirty="0"/>
+              <a:t>Excel files with pages: meta, concentration_&lt;num&gt;, inhibitor_&lt;num&gt;</a:t>
+            </a:r>
+          </a:p>
+          <a:p>
+            <a:r>
+              <a:rPr lang="en-US" dirty="0"/>
+              <a:t>Naming convention</a:t>
+            </a:r>
+          </a:p>
+          <a:p>
+            <a:pPr lvl="1"/>
+            <a:r>
+              <a:rPr lang="en-US" dirty="0"/>
+              <a:t>Unique ID for each assay? Or we need to distinguish replicates</a:t>
+            </a:r>
+          </a:p>
+          <a:p>
+            <a:pPr lvl="1"/>
+            <a:r>
+              <a:rPr lang="en-US" dirty="0"/>
+              <a:t>Date of assay? </a:t>
+            </a:r>
+          </a:p>
+          <a:p>
+            <a:pPr lvl="1"/>
+            <a:r>
+              <a:rPr lang="en-US" dirty="0"/>
+              <a:t>MTS sitting time? </a:t>
+            </a:r>
+          </a:p>
+          <a:p>
+            <a:pPr lvl="1"/>
+            <a:r>
+              <a:rPr lang="en-US" dirty="0" err="1"/>
+              <a:t>lab_id</a:t>
+            </a:r>
+            <a:r>
+              <a:rPr lang="en-US" dirty="0"/>
+              <a:t>=XXXXX-norm=XXX-</a:t>
+            </a:r>
+            <a:r>
+              <a:rPr lang="en-US" dirty="0" err="1"/>
+              <a:t>plate_version_id</a:t>
+            </a:r>
+            <a:r>
+              <a:rPr lang="en-US" dirty="0"/>
+              <a:t>=XXXX</a:t>
+            </a:r>
+          </a:p>
+          <a:p>
+            <a:pPr lvl="1"/>
+            <a:endParaRPr lang="en-US" dirty="0"/>
+          </a:p>
+          <a:p>
+            <a:pPr lvl="1"/>
             <a:endParaRPr lang="en-US" dirty="0"/>
           </a:p>
         </p:txBody>
@@ -4802,7 +6175,7 @@
     </p:spTree>
     <p:extLst>
       <p:ext uri="{BB962C8B-B14F-4D97-AF65-F5344CB8AC3E}">
-        <p14:creationId xmlns:p14="http://schemas.microsoft.com/office/powerpoint/2010/main" val="629140933"/>
+        <p14:creationId xmlns:p14="http://schemas.microsoft.com/office/powerpoint/2010/main" val="3771634021"/>
       </p:ext>
     </p:extLst>
   </p:cSld>
@@ -4834,7 +6207,7 @@
           <p:cNvPr id="2" name="Title 1">
             <a:extLst>
               <a:ext uri="{FF2B5EF4-FFF2-40B4-BE49-F238E27FC236}">
-                <a16:creationId xmlns:a16="http://schemas.microsoft.com/office/drawing/2014/main" id="{2A317F86-1610-446D-A724-4889497B751D}"/>
+                <a16:creationId xmlns:a16="http://schemas.microsoft.com/office/drawing/2014/main" id="{4C925E0A-FDA2-482C-B32C-BD02E0F5FDD5}"/>
               </a:ext>
             </a:extLst>
           </p:cNvPr>
@@ -4852,7 +6225,7 @@
           <a:p>
             <a:r>
               <a:rPr lang="en-US" dirty="0"/>
-              <a:t>Data output documentation issues</a:t>
+              <a:t>Plate Map Revisions </a:t>
             </a:r>
           </a:p>
         </p:txBody>
@@ -4862,7 +6235,7 @@
           <p:cNvPr id="3" name="Content Placeholder 2">
             <a:extLst>
               <a:ext uri="{FF2B5EF4-FFF2-40B4-BE49-F238E27FC236}">
-                <a16:creationId xmlns:a16="http://schemas.microsoft.com/office/drawing/2014/main" id="{E5775B40-57DE-42CA-A49B-0046E6B9E424}"/>
+                <a16:creationId xmlns:a16="http://schemas.microsoft.com/office/drawing/2014/main" id="{287DDDA0-A034-491E-AF68-7EC8860582A7}"/>
               </a:ext>
             </a:extLst>
           </p:cNvPr>
@@ -4875,79 +6248,50 @@
         </p:nvSpPr>
         <p:spPr/>
         <p:txBody>
-          <a:bodyPr>
-            <a:normAutofit/>
-          </a:bodyPr>
-          <a:lstStyle/>
-          <a:p>
-            <a:r>
-              <a:rPr lang="en-US" dirty="0"/>
-              <a:t>There are a number of assays that are labeled as having been normalized by positive controls (labeled as “blank490”), however, the output file shows discrepancies that indicate it was not.</a:t>
-            </a:r>
-          </a:p>
-          <a:p>
-            <a:r>
-              <a:rPr lang="en-US" dirty="0"/>
-              <a:t>[</a:t>
-            </a:r>
-            <a:r>
-              <a:rPr lang="en-US" dirty="0" err="1"/>
-              <a:t>lab_id</a:t>
-            </a:r>
-            <a:r>
-              <a:rPr lang="en-US" dirty="0"/>
-              <a:t>=10308,notes=NA]</a:t>
-            </a:r>
-          </a:p>
-          <a:p>
-            <a:r>
-              <a:rPr lang="en-US" dirty="0"/>
-              <a:t>[</a:t>
-            </a:r>
-            <a:r>
-              <a:rPr lang="en-US" dirty="0" err="1"/>
-              <a:t>lab_id</a:t>
-            </a:r>
-            <a:r>
-              <a:rPr lang="en-US" dirty="0"/>
-              <a:t>=10309,notes=matched normal 10308]</a:t>
-            </a:r>
-          </a:p>
-          <a:p>
-            <a:pPr marL="0" indent="0">
-              <a:buNone/>
-            </a:pPr>
+          <a:bodyPr/>
+          <a:lstStyle/>
+          <a:p>
+            <a:r>
+              <a:rPr lang="en-US" dirty="0"/>
+              <a:t>Drug Names, there are some inconsistencies – need to define clear nomenclature to avoid redundancy. </a:t>
+            </a:r>
+          </a:p>
+          <a:p>
+            <a:pPr lvl="1"/>
+            <a:r>
+              <a:rPr lang="en-US" dirty="0"/>
+              <a:t>I can provide a list of all used names, if someone can review and choose the right names. </a:t>
+            </a:r>
+          </a:p>
+          <a:p>
+            <a:pPr lvl="1"/>
+            <a:r>
+              <a:rPr lang="en-US" dirty="0"/>
+              <a:t>Alternatively, if there is a list of acceptable drug names, I can do it myself. </a:t>
+            </a:r>
+          </a:p>
+          <a:p>
+            <a:r>
+              <a:rPr lang="en-US" dirty="0"/>
+              <a:t>I’d like a review of my concentration mapping [request] </a:t>
+            </a:r>
+          </a:p>
+          <a:p>
+            <a:pPr lvl="1"/>
+            <a:r>
+              <a:rPr lang="en-US" dirty="0"/>
+              <a:t>Ashley volunteered to review, but a second pair of eyes would be useful as well. </a:t>
+            </a:r>
+          </a:p>
+          <a:p>
             <a:endParaRPr lang="en-US" dirty="0"/>
-          </a:p>
-          <a:p>
-            <a:pPr marL="0" indent="0">
-              <a:buNone/>
-            </a:pPr>
-            <a:endParaRPr lang="en-US" dirty="0"/>
-          </a:p>
-          <a:p>
-            <a:pPr marL="0" indent="0">
-              <a:buNone/>
-            </a:pPr>
-            <a:r>
-              <a:rPr lang="en-US" dirty="0"/>
-              <a:t>*these two assay outputs don’t have a 26</a:t>
-            </a:r>
-            <a:r>
-              <a:rPr lang="en-US" baseline="30000" dirty="0"/>
-              <a:t>th</a:t>
-            </a:r>
-            <a:r>
-              <a:rPr lang="en-US" dirty="0"/>
-              <a:t> column, which usually says “blank490” in each row. </a:t>
-            </a:r>
           </a:p>
         </p:txBody>
       </p:sp>
     </p:spTree>
     <p:extLst>
       <p:ext uri="{BB962C8B-B14F-4D97-AF65-F5344CB8AC3E}">
-        <p14:creationId xmlns:p14="http://schemas.microsoft.com/office/powerpoint/2010/main" val="4284564905"/>
+        <p14:creationId xmlns:p14="http://schemas.microsoft.com/office/powerpoint/2010/main" val="629140933"/>
       </p:ext>
     </p:extLst>
   </p:cSld>
@@ -4979,6 +6323,151 @@
           <p:cNvPr id="2" name="Title 1">
             <a:extLst>
               <a:ext uri="{FF2B5EF4-FFF2-40B4-BE49-F238E27FC236}">
+                <a16:creationId xmlns:a16="http://schemas.microsoft.com/office/drawing/2014/main" id="{2A317F86-1610-446D-A724-4889497B751D}"/>
+              </a:ext>
+            </a:extLst>
+          </p:cNvPr>
+          <p:cNvSpPr>
+            <a:spLocks noGrp="1"/>
+          </p:cNvSpPr>
+          <p:nvPr>
+            <p:ph type="title"/>
+          </p:nvPr>
+        </p:nvSpPr>
+        <p:spPr/>
+        <p:txBody>
+          <a:bodyPr/>
+          <a:lstStyle/>
+          <a:p>
+            <a:r>
+              <a:rPr lang="en-US" dirty="0"/>
+              <a:t>Data output documentation issues</a:t>
+            </a:r>
+          </a:p>
+        </p:txBody>
+      </p:sp>
+      <p:sp>
+        <p:nvSpPr>
+          <p:cNvPr id="3" name="Content Placeholder 2">
+            <a:extLst>
+              <a:ext uri="{FF2B5EF4-FFF2-40B4-BE49-F238E27FC236}">
+                <a16:creationId xmlns:a16="http://schemas.microsoft.com/office/drawing/2014/main" id="{E5775B40-57DE-42CA-A49B-0046E6B9E424}"/>
+              </a:ext>
+            </a:extLst>
+          </p:cNvPr>
+          <p:cNvSpPr>
+            <a:spLocks noGrp="1"/>
+          </p:cNvSpPr>
+          <p:nvPr>
+            <p:ph idx="1"/>
+          </p:nvPr>
+        </p:nvSpPr>
+        <p:spPr/>
+        <p:txBody>
+          <a:bodyPr>
+            <a:normAutofit/>
+          </a:bodyPr>
+          <a:lstStyle/>
+          <a:p>
+            <a:r>
+              <a:rPr lang="en-US" dirty="0"/>
+              <a:t>There are a number of assays that are labeled as having been normalized by positive controls (labeled as “blank490”), however, the output file shows discrepancies that indicate it was not.</a:t>
+            </a:r>
+          </a:p>
+          <a:p>
+            <a:r>
+              <a:rPr lang="en-US" dirty="0"/>
+              <a:t>[</a:t>
+            </a:r>
+            <a:r>
+              <a:rPr lang="en-US" dirty="0" err="1"/>
+              <a:t>lab_id</a:t>
+            </a:r>
+            <a:r>
+              <a:rPr lang="en-US" dirty="0"/>
+              <a:t>=10308,notes=NA]</a:t>
+            </a:r>
+          </a:p>
+          <a:p>
+            <a:r>
+              <a:rPr lang="en-US" dirty="0"/>
+              <a:t>[</a:t>
+            </a:r>
+            <a:r>
+              <a:rPr lang="en-US" dirty="0" err="1"/>
+              <a:t>lab_id</a:t>
+            </a:r>
+            <a:r>
+              <a:rPr lang="en-US" dirty="0"/>
+              <a:t>=10309,notes=matched normal 10308]</a:t>
+            </a:r>
+          </a:p>
+          <a:p>
+            <a:pPr marL="0" indent="0">
+              <a:buNone/>
+            </a:pPr>
+            <a:endParaRPr lang="en-US" dirty="0"/>
+          </a:p>
+          <a:p>
+            <a:pPr marL="0" indent="0">
+              <a:buNone/>
+            </a:pPr>
+            <a:endParaRPr lang="en-US" dirty="0"/>
+          </a:p>
+          <a:p>
+            <a:pPr marL="0" indent="0">
+              <a:buNone/>
+            </a:pPr>
+            <a:r>
+              <a:rPr lang="en-US" dirty="0"/>
+              <a:t>*these two assay outputs don’t have a 26</a:t>
+            </a:r>
+            <a:r>
+              <a:rPr lang="en-US" baseline="30000" dirty="0"/>
+              <a:t>th</a:t>
+            </a:r>
+            <a:r>
+              <a:rPr lang="en-US" dirty="0"/>
+              <a:t> column, which usually says “blank490” in each row. </a:t>
+            </a:r>
+          </a:p>
+        </p:txBody>
+      </p:sp>
+    </p:spTree>
+    <p:extLst>
+      <p:ext uri="{BB962C8B-B14F-4D97-AF65-F5344CB8AC3E}">
+        <p14:creationId xmlns:p14="http://schemas.microsoft.com/office/powerpoint/2010/main" val="4284564905"/>
+      </p:ext>
+    </p:extLst>
+  </p:cSld>
+  <p:clrMapOvr>
+    <a:masterClrMapping/>
+  </p:clrMapOvr>
+</p:sld>
+</file>
+
+<file path=ppt/slides/slide7.xml><?xml version="1.0" encoding="utf-8"?>
+<p:sld xmlns:a="http://schemas.openxmlformats.org/drawingml/2006/main" xmlns:r="http://schemas.openxmlformats.org/officeDocument/2006/relationships" xmlns:p="http://schemas.openxmlformats.org/presentationml/2006/main">
+  <p:cSld>
+    <p:spTree>
+      <p:nvGrpSpPr>
+        <p:cNvPr id="1" name=""/>
+        <p:cNvGrpSpPr/>
+        <p:nvPr/>
+      </p:nvGrpSpPr>
+      <p:grpSpPr>
+        <a:xfrm>
+          <a:off x="0" y="0"/>
+          <a:ext cx="0" cy="0"/>
+          <a:chOff x="0" y="0"/>
+          <a:chExt cx="0" cy="0"/>
+        </a:xfrm>
+      </p:grpSpPr>
+      <p:sp>
+        <p:nvSpPr>
+          <p:cNvPr id="2" name="Title 1">
+            <a:extLst>
+              <a:ext uri="{FF2B5EF4-FFF2-40B4-BE49-F238E27FC236}">
                 <a16:creationId xmlns:a16="http://schemas.microsoft.com/office/drawing/2014/main" id="{541CAFB3-FD96-4F76-A791-BBC842554556}"/>
               </a:ext>
             </a:extLst>
@@ -5116,7 +6605,7 @@
 </p:sld>
 </file>
 
-<file path=ppt/slides/slide7.xml><?xml version="1.0" encoding="utf-8"?>
+<file path=ppt/slides/slide8.xml><?xml version="1.0" encoding="utf-8"?>
 <p:sld xmlns:a="http://schemas.openxmlformats.org/drawingml/2006/main" xmlns:r="http://schemas.openxmlformats.org/officeDocument/2006/relationships" xmlns:p="http://schemas.openxmlformats.org/presentationml/2006/main">
   <p:cSld>
     <p:spTree>

</xml_diff>

<commit_message>
major changes, rewriting pipeline within panel class for ease. + Deleted data
</commit_message>
<xml_diff>
--- a/docs/HNSCC_functional_assay_pipeline_development.pptx
+++ b/docs/HNSCC_functional_assay_pipeline_development.pptx
@@ -8,11 +8,13 @@
     <p:sldId id="256" r:id="rId2"/>
     <p:sldId id="260" r:id="rId3"/>
     <p:sldId id="263" r:id="rId4"/>
-    <p:sldId id="257" r:id="rId5"/>
-    <p:sldId id="258" r:id="rId6"/>
-    <p:sldId id="261" r:id="rId7"/>
-    <p:sldId id="259" r:id="rId8"/>
-    <p:sldId id="262" r:id="rId9"/>
+    <p:sldId id="264" r:id="rId5"/>
+    <p:sldId id="257" r:id="rId6"/>
+    <p:sldId id="258" r:id="rId7"/>
+    <p:sldId id="261" r:id="rId8"/>
+    <p:sldId id="259" r:id="rId9"/>
+    <p:sldId id="265" r:id="rId10"/>
+    <p:sldId id="262" r:id="rId11"/>
   </p:sldIdLst>
   <p:sldSz cx="12192000" cy="6858000"/>
   <p:notesSz cx="6858000" cy="9144000"/>
@@ -266,7 +268,7 @@
           <a:p>
             <a:fld id="{ABBD65A0-F140-476D-B606-1C9D07B9F5C7}" type="datetimeFigureOut">
               <a:rPr lang="en-US" smtClean="0"/>
-              <a:t>8/13/2019</a:t>
+              <a:t>8/14/2019</a:t>
             </a:fld>
             <a:endParaRPr lang="en-US"/>
           </a:p>
@@ -464,7 +466,7 @@
           <a:p>
             <a:fld id="{ABBD65A0-F140-476D-B606-1C9D07B9F5C7}" type="datetimeFigureOut">
               <a:rPr lang="en-US" smtClean="0"/>
-              <a:t>8/13/2019</a:t>
+              <a:t>8/14/2019</a:t>
             </a:fld>
             <a:endParaRPr lang="en-US"/>
           </a:p>
@@ -672,7 +674,7 @@
           <a:p>
             <a:fld id="{ABBD65A0-F140-476D-B606-1C9D07B9F5C7}" type="datetimeFigureOut">
               <a:rPr lang="en-US" smtClean="0"/>
-              <a:t>8/13/2019</a:t>
+              <a:t>8/14/2019</a:t>
             </a:fld>
             <a:endParaRPr lang="en-US"/>
           </a:p>
@@ -870,7 +872,7 @@
           <a:p>
             <a:fld id="{ABBD65A0-F140-476D-B606-1C9D07B9F5C7}" type="datetimeFigureOut">
               <a:rPr lang="en-US" smtClean="0"/>
-              <a:t>8/13/2019</a:t>
+              <a:t>8/14/2019</a:t>
             </a:fld>
             <a:endParaRPr lang="en-US"/>
           </a:p>
@@ -1145,7 +1147,7 @@
           <a:p>
             <a:fld id="{ABBD65A0-F140-476D-B606-1C9D07B9F5C7}" type="datetimeFigureOut">
               <a:rPr lang="en-US" smtClean="0"/>
-              <a:t>8/13/2019</a:t>
+              <a:t>8/14/2019</a:t>
             </a:fld>
             <a:endParaRPr lang="en-US"/>
           </a:p>
@@ -1410,7 +1412,7 @@
           <a:p>
             <a:fld id="{ABBD65A0-F140-476D-B606-1C9D07B9F5C7}" type="datetimeFigureOut">
               <a:rPr lang="en-US" smtClean="0"/>
-              <a:t>8/13/2019</a:t>
+              <a:t>8/14/2019</a:t>
             </a:fld>
             <a:endParaRPr lang="en-US"/>
           </a:p>
@@ -1822,7 +1824,7 @@
           <a:p>
             <a:fld id="{ABBD65A0-F140-476D-B606-1C9D07B9F5C7}" type="datetimeFigureOut">
               <a:rPr lang="en-US" smtClean="0"/>
-              <a:t>8/13/2019</a:t>
+              <a:t>8/14/2019</a:t>
             </a:fld>
             <a:endParaRPr lang="en-US"/>
           </a:p>
@@ -1963,7 +1965,7 @@
           <a:p>
             <a:fld id="{ABBD65A0-F140-476D-B606-1C9D07B9F5C7}" type="datetimeFigureOut">
               <a:rPr lang="en-US" smtClean="0"/>
-              <a:t>8/13/2019</a:t>
+              <a:t>8/14/2019</a:t>
             </a:fld>
             <a:endParaRPr lang="en-US"/>
           </a:p>
@@ -2076,7 +2078,7 @@
           <a:p>
             <a:fld id="{ABBD65A0-F140-476D-B606-1C9D07B9F5C7}" type="datetimeFigureOut">
               <a:rPr lang="en-US" smtClean="0"/>
-              <a:t>8/13/2019</a:t>
+              <a:t>8/14/2019</a:t>
             </a:fld>
             <a:endParaRPr lang="en-US"/>
           </a:p>
@@ -2387,7 +2389,7 @@
           <a:p>
             <a:fld id="{ABBD65A0-F140-476D-B606-1C9D07B9F5C7}" type="datetimeFigureOut">
               <a:rPr lang="en-US" smtClean="0"/>
-              <a:t>8/13/2019</a:t>
+              <a:t>8/14/2019</a:t>
             </a:fld>
             <a:endParaRPr lang="en-US"/>
           </a:p>
@@ -2675,7 +2677,7 @@
           <a:p>
             <a:fld id="{ABBD65A0-F140-476D-B606-1C9D07B9F5C7}" type="datetimeFigureOut">
               <a:rPr lang="en-US" smtClean="0"/>
-              <a:t>8/13/2019</a:t>
+              <a:t>8/14/2019</a:t>
             </a:fld>
             <a:endParaRPr lang="en-US"/>
           </a:p>
@@ -2916,7 +2918,7 @@
           <a:p>
             <a:fld id="{ABBD65A0-F140-476D-B606-1C9D07B9F5C7}" type="datetimeFigureOut">
               <a:rPr lang="en-US" smtClean="0"/>
-              <a:t>8/13/2019</a:t>
+              <a:t>8/14/2019</a:t>
             </a:fld>
             <a:endParaRPr lang="en-US"/>
           </a:p>
@@ -3402,6 +3404,359 @@
 </p:sld>
 </file>
 
+<file path=ppt/slides/slide10.xml><?xml version="1.0" encoding="utf-8"?>
+<p:sld xmlns:a="http://schemas.openxmlformats.org/drawingml/2006/main" xmlns:r="http://schemas.openxmlformats.org/officeDocument/2006/relationships" xmlns:p="http://schemas.openxmlformats.org/presentationml/2006/main">
+  <p:cSld>
+    <p:spTree>
+      <p:nvGrpSpPr>
+        <p:cNvPr id="1" name=""/>
+        <p:cNvGrpSpPr/>
+        <p:nvPr/>
+      </p:nvGrpSpPr>
+      <p:grpSpPr>
+        <a:xfrm>
+          <a:off x="0" y="0"/>
+          <a:ext cx="0" cy="0"/>
+          <a:chOff x="0" y="0"/>
+          <a:chExt cx="0" cy="0"/>
+        </a:xfrm>
+      </p:grpSpPr>
+      <p:sp>
+        <p:nvSpPr>
+          <p:cNvPr id="2" name="Title 1">
+            <a:extLst>
+              <a:ext uri="{FF2B5EF4-FFF2-40B4-BE49-F238E27FC236}">
+                <a16:creationId xmlns:a16="http://schemas.microsoft.com/office/drawing/2014/main" id="{9F360E29-9B45-4B5B-98A2-111B090352C2}"/>
+              </a:ext>
+            </a:extLst>
+          </p:cNvPr>
+          <p:cNvSpPr>
+            <a:spLocks noGrp="1"/>
+          </p:cNvSpPr>
+          <p:nvPr>
+            <p:ph type="title"/>
+          </p:nvPr>
+        </p:nvSpPr>
+        <p:spPr/>
+        <p:txBody>
+          <a:bodyPr/>
+          <a:lstStyle/>
+          <a:p>
+            <a:r>
+              <a:rPr lang="en-US" dirty="0"/>
+              <a:t>Overview: Map data</a:t>
+            </a:r>
+          </a:p>
+        </p:txBody>
+      </p:sp>
+      <p:sp>
+        <p:nvSpPr>
+          <p:cNvPr id="3" name="Content Placeholder 2">
+            <a:extLst>
+              <a:ext uri="{FF2B5EF4-FFF2-40B4-BE49-F238E27FC236}">
+                <a16:creationId xmlns:a16="http://schemas.microsoft.com/office/drawing/2014/main" id="{FA0710EA-D085-4E5E-A0C6-5941BA94FFD8}"/>
+              </a:ext>
+            </a:extLst>
+          </p:cNvPr>
+          <p:cNvSpPr>
+            <a:spLocks noGrp="1"/>
+          </p:cNvSpPr>
+          <p:nvPr>
+            <p:ph idx="1"/>
+          </p:nvPr>
+        </p:nvSpPr>
+        <p:spPr>
+          <a:xfrm>
+            <a:off x="838200" y="4168134"/>
+            <a:ext cx="10515600" cy="527050"/>
+          </a:xfrm>
+          <a:solidFill>
+            <a:schemeClr val="tx1"/>
+          </a:solidFill>
+        </p:spPr>
+        <p:txBody>
+          <a:bodyPr>
+            <a:normAutofit/>
+          </a:bodyPr>
+          <a:lstStyle/>
+          <a:p>
+            <a:pPr marL="0" indent="0">
+              <a:buNone/>
+            </a:pPr>
+            <a:r>
+              <a:rPr lang="en-US" dirty="0">
+                <a:solidFill>
+                  <a:schemeClr val="bg1"/>
+                </a:solidFill>
+              </a:rPr>
+              <a:t>$ python ./python/HNSCC_plate_data_mapper.py ./</a:t>
+            </a:r>
+            <a:r>
+              <a:rPr lang="en-US" dirty="0" err="1">
+                <a:solidFill>
+                  <a:schemeClr val="bg1"/>
+                </a:solidFill>
+              </a:rPr>
+              <a:t>plate_maps</a:t>
+            </a:r>
+            <a:r>
+              <a:rPr lang="en-US" dirty="0">
+                <a:solidFill>
+                  <a:schemeClr val="bg1"/>
+                </a:solidFill>
+              </a:rPr>
+              <a:t> ./data</a:t>
+            </a:r>
+          </a:p>
+          <a:p>
+            <a:pPr marL="0" indent="0">
+              <a:buNone/>
+            </a:pPr>
+            <a:endParaRPr lang="en-US" dirty="0"/>
+          </a:p>
+        </p:txBody>
+      </p:sp>
+      <p:pic>
+        <p:nvPicPr>
+          <p:cNvPr id="4" name="Picture 3">
+            <a:extLst>
+              <a:ext uri="{FF2B5EF4-FFF2-40B4-BE49-F238E27FC236}">
+                <a16:creationId xmlns:a16="http://schemas.microsoft.com/office/drawing/2014/main" id="{7FA2CC9D-BFEB-4B5D-88AF-E714897551B1}"/>
+              </a:ext>
+            </a:extLst>
+          </p:cNvPr>
+          <p:cNvPicPr>
+            <a:picLocks noChangeAspect="1"/>
+          </p:cNvPicPr>
+          <p:nvPr/>
+        </p:nvPicPr>
+        <p:blipFill>
+          <a:blip r:embed="rId2"/>
+          <a:stretch>
+            <a:fillRect/>
+          </a:stretch>
+        </p:blipFill>
+        <p:spPr>
+          <a:xfrm>
+            <a:off x="838199" y="2025361"/>
+            <a:ext cx="5166629" cy="1155989"/>
+          </a:xfrm>
+          <a:prstGeom prst="rect">
+            <a:avLst/>
+          </a:prstGeom>
+        </p:spPr>
+      </p:pic>
+      <p:pic>
+        <p:nvPicPr>
+          <p:cNvPr id="5" name="Picture 4">
+            <a:extLst>
+              <a:ext uri="{FF2B5EF4-FFF2-40B4-BE49-F238E27FC236}">
+                <a16:creationId xmlns:a16="http://schemas.microsoft.com/office/drawing/2014/main" id="{751211C4-0F36-4B7E-B294-3A95CA8C9A28}"/>
+              </a:ext>
+            </a:extLst>
+          </p:cNvPr>
+          <p:cNvPicPr>
+            <a:picLocks noChangeAspect="1"/>
+          </p:cNvPicPr>
+          <p:nvPr/>
+        </p:nvPicPr>
+        <p:blipFill>
+          <a:blip r:embed="rId3"/>
+          <a:stretch>
+            <a:fillRect/>
+          </a:stretch>
+        </p:blipFill>
+        <p:spPr>
+          <a:xfrm>
+            <a:off x="6305550" y="452646"/>
+            <a:ext cx="3543300" cy="2114125"/>
+          </a:xfrm>
+          <a:prstGeom prst="rect">
+            <a:avLst/>
+          </a:prstGeom>
+        </p:spPr>
+      </p:pic>
+      <p:pic>
+        <p:nvPicPr>
+          <p:cNvPr id="6" name="Picture 5">
+            <a:extLst>
+              <a:ext uri="{FF2B5EF4-FFF2-40B4-BE49-F238E27FC236}">
+                <a16:creationId xmlns:a16="http://schemas.microsoft.com/office/drawing/2014/main" id="{2BC8002F-5D88-4758-B6C4-1310A8656676}"/>
+              </a:ext>
+            </a:extLst>
+          </p:cNvPr>
+          <p:cNvPicPr>
+            <a:picLocks noChangeAspect="1"/>
+          </p:cNvPicPr>
+          <p:nvPr/>
+        </p:nvPicPr>
+        <p:blipFill>
+          <a:blip r:embed="rId4"/>
+          <a:stretch>
+            <a:fillRect/>
+          </a:stretch>
+        </p:blipFill>
+        <p:spPr>
+          <a:xfrm>
+            <a:off x="6305550" y="2686166"/>
+            <a:ext cx="4924425" cy="1013540"/>
+          </a:xfrm>
+          <a:prstGeom prst="rect">
+            <a:avLst/>
+          </a:prstGeom>
+        </p:spPr>
+      </p:pic>
+      <p:pic>
+        <p:nvPicPr>
+          <p:cNvPr id="7" name="Picture 6">
+            <a:extLst>
+              <a:ext uri="{FF2B5EF4-FFF2-40B4-BE49-F238E27FC236}">
+                <a16:creationId xmlns:a16="http://schemas.microsoft.com/office/drawing/2014/main" id="{86785D44-A0F5-4478-9A4B-C1BE5CEA9A7A}"/>
+              </a:ext>
+            </a:extLst>
+          </p:cNvPr>
+          <p:cNvPicPr>
+            <a:picLocks noChangeAspect="1"/>
+          </p:cNvPicPr>
+          <p:nvPr/>
+        </p:nvPicPr>
+        <p:blipFill>
+          <a:blip r:embed="rId5"/>
+          <a:stretch>
+            <a:fillRect/>
+          </a:stretch>
+        </p:blipFill>
+        <p:spPr>
+          <a:xfrm>
+            <a:off x="838200" y="5273087"/>
+            <a:ext cx="1352550" cy="1364250"/>
+          </a:xfrm>
+          <a:prstGeom prst="rect">
+            <a:avLst/>
+          </a:prstGeom>
+        </p:spPr>
+      </p:pic>
+      <p:pic>
+        <p:nvPicPr>
+          <p:cNvPr id="8" name="Picture 7">
+            <a:extLst>
+              <a:ext uri="{FF2B5EF4-FFF2-40B4-BE49-F238E27FC236}">
+                <a16:creationId xmlns:a16="http://schemas.microsoft.com/office/drawing/2014/main" id="{024E0D60-02ED-4BBE-AFC0-90140B566B07}"/>
+              </a:ext>
+            </a:extLst>
+          </p:cNvPr>
+          <p:cNvPicPr>
+            <a:picLocks noChangeAspect="1"/>
+          </p:cNvPicPr>
+          <p:nvPr/>
+        </p:nvPicPr>
+        <p:blipFill>
+          <a:blip r:embed="rId6"/>
+          <a:stretch>
+            <a:fillRect/>
+          </a:stretch>
+        </p:blipFill>
+        <p:spPr>
+          <a:xfrm>
+            <a:off x="3933826" y="5334354"/>
+            <a:ext cx="7658100" cy="1302983"/>
+          </a:xfrm>
+          <a:prstGeom prst="rect">
+            <a:avLst/>
+          </a:prstGeom>
+        </p:spPr>
+      </p:pic>
+      <p:sp>
+        <p:nvSpPr>
+          <p:cNvPr id="9" name="TextBox 8">
+            <a:extLst>
+              <a:ext uri="{FF2B5EF4-FFF2-40B4-BE49-F238E27FC236}">
+                <a16:creationId xmlns:a16="http://schemas.microsoft.com/office/drawing/2014/main" id="{0D4309C0-85CA-4E6D-AB16-BF476D6B8B89}"/>
+              </a:ext>
+            </a:extLst>
+          </p:cNvPr>
+          <p:cNvSpPr txBox="1"/>
+          <p:nvPr/>
+        </p:nvSpPr>
+        <p:spPr>
+          <a:xfrm>
+            <a:off x="523875" y="4903755"/>
+            <a:ext cx="2394566" cy="369332"/>
+          </a:xfrm>
+          <a:prstGeom prst="rect">
+            <a:avLst/>
+          </a:prstGeom>
+          <a:noFill/>
+        </p:spPr>
+        <p:txBody>
+          <a:bodyPr wrap="none" rtlCol="0">
+            <a:spAutoFit/>
+          </a:bodyPr>
+          <a:lstStyle/>
+          <a:p>
+            <a:r>
+              <a:rPr lang="en-US" dirty="0"/>
+              <a:t>Unique inhibitor names</a:t>
+            </a:r>
+          </a:p>
+        </p:txBody>
+      </p:sp>
+      <p:sp>
+        <p:nvSpPr>
+          <p:cNvPr id="10" name="TextBox 9">
+            <a:extLst>
+              <a:ext uri="{FF2B5EF4-FFF2-40B4-BE49-F238E27FC236}">
+                <a16:creationId xmlns:a16="http://schemas.microsoft.com/office/drawing/2014/main" id="{0B536242-8FC1-429F-92FF-1463E5AF1A41}"/>
+              </a:ext>
+            </a:extLst>
+          </p:cNvPr>
+          <p:cNvSpPr txBox="1"/>
+          <p:nvPr/>
+        </p:nvSpPr>
+        <p:spPr>
+          <a:xfrm>
+            <a:off x="4029093" y="4924283"/>
+            <a:ext cx="7071744" cy="369332"/>
+          </a:xfrm>
+          <a:prstGeom prst="rect">
+            <a:avLst/>
+          </a:prstGeom>
+          <a:noFill/>
+        </p:spPr>
+        <p:txBody>
+          <a:bodyPr wrap="none" rtlCol="0">
+            <a:spAutoFit/>
+          </a:bodyPr>
+          <a:lstStyle/>
+          <a:p>
+            <a:r>
+              <a:rPr lang="en-US" dirty="0"/>
+              <a:t>Functional Data: position, </a:t>
+            </a:r>
+            <a:r>
+              <a:rPr lang="en-US" dirty="0" err="1"/>
+              <a:t>lab_id</a:t>
+            </a:r>
+            <a:r>
+              <a:rPr lang="en-US" dirty="0"/>
+              <a:t> -&gt; concentration, inhibitor (long format) </a:t>
+            </a:r>
+          </a:p>
+        </p:txBody>
+      </p:sp>
+    </p:spTree>
+    <p:extLst>
+      <p:ext uri="{BB962C8B-B14F-4D97-AF65-F5344CB8AC3E}">
+        <p14:creationId xmlns:p14="http://schemas.microsoft.com/office/powerpoint/2010/main" val="4159740835"/>
+      </p:ext>
+    </p:extLst>
+  </p:cSld>
+  <p:clrMapOvr>
+    <a:masterClrMapping/>
+  </p:clrMapOvr>
+</p:sld>
+</file>
+
 <file path=ppt/slides/slide2.xml><?xml version="1.0" encoding="utf-8"?>
 <p:sld xmlns:a="http://schemas.openxmlformats.org/drawingml/2006/main" xmlns:r="http://schemas.openxmlformats.org/officeDocument/2006/relationships" xmlns:p="http://schemas.openxmlformats.org/presentationml/2006/main">
   <p:cSld>
@@ -4552,8 +4907,8 @@
         </p:nvSpPr>
         <p:spPr>
           <a:xfrm>
-            <a:off x="4927997" y="1742834"/>
-            <a:ext cx="1843088" cy="1990729"/>
+            <a:off x="7227944" y="1742834"/>
+            <a:ext cx="2689210" cy="1381353"/>
           </a:xfrm>
           <a:prstGeom prst="rect">
             <a:avLst/>
@@ -4579,41 +4934,51 @@
           <a:p>
             <a:pPr algn="ctr"/>
             <a:r>
-              <a:rPr lang="en-US" sz="1200" dirty="0"/>
+              <a:rPr lang="en-US" sz="1100" dirty="0"/>
               <a:t>The zero value (positive control) of optical density is set by the </a:t>
             </a:r>
             <a:r>
-              <a:rPr lang="en-US" sz="1200" dirty="0" err="1"/>
+              <a:rPr lang="en-US" sz="1100" dirty="0" err="1"/>
               <a:t>p.spec</a:t>
             </a:r>
             <a:r>
-              <a:rPr lang="en-US" sz="1200" dirty="0"/>
-              <a:t> software [blank490] but to interpret this value as cell viability, we need to scale optical density by plate controls….eg</a:t>
+              <a:rPr lang="en-US" sz="1100" dirty="0"/>
+              <a:t> software [blank490] but to interpret assay value as cell viability, we need to scale optical density by plate controls: </a:t>
             </a:r>
           </a:p>
           <a:p>
             <a:pPr algn="ctr"/>
             <a:r>
-              <a:rPr lang="en-US" sz="1200" dirty="0" err="1"/>
+              <a:rPr lang="en-US" sz="1100" b="1" dirty="0" err="1"/>
               <a:t>Cell_viab</a:t>
             </a:r>
             <a:r>
-              <a:rPr lang="en-US" sz="1200" dirty="0"/>
+              <a:rPr lang="en-US" sz="1100" b="1" dirty="0"/>
               <a:t> = </a:t>
             </a:r>
             <a:r>
-              <a:rPr lang="en-US" sz="1200" dirty="0" err="1"/>
+              <a:rPr lang="en-US" sz="1100" b="1" dirty="0" err="1"/>
               <a:t>opt_dens</a:t>
             </a:r>
             <a:r>
-              <a:rPr lang="en-US" sz="1200" dirty="0"/>
+              <a:rPr lang="en-US" sz="1100" b="1" dirty="0"/>
               <a:t> / </a:t>
             </a:r>
             <a:r>
-              <a:rPr lang="en-US" sz="1200" dirty="0" err="1"/>
+              <a:rPr lang="en-US" sz="1100" b="1" dirty="0" err="1"/>
               <a:t>avg_plt_control</a:t>
             </a:r>
-            <a:endParaRPr lang="en-US" sz="1200" dirty="0"/>
+            <a:r>
+              <a:rPr lang="en-US" sz="1100" b="1" dirty="0"/>
+              <a:t> </a:t>
+            </a:r>
+          </a:p>
+          <a:p>
+            <a:pPr algn="ctr"/>
+            <a:r>
+              <a:rPr lang="en-US" sz="1100" dirty="0"/>
+              <a:t>[This sets PAC control value as cell viability of 1] </a:t>
+            </a:r>
           </a:p>
         </p:txBody>
       </p:sp>
@@ -4757,7 +5122,7 @@
         </p:nvSpPr>
         <p:spPr>
           <a:xfrm>
-            <a:off x="4927997" y="761761"/>
+            <a:off x="7717291" y="761761"/>
             <a:ext cx="1843088" cy="990599"/>
           </a:xfrm>
           <a:prstGeom prst="roundRect">
@@ -4916,10 +5281,10 @@
       </p:sp>
       <p:sp>
         <p:nvSpPr>
-          <p:cNvPr id="8" name="Rectangle: Rounded Corners 7">
-            <a:extLst>
-              <a:ext uri="{FF2B5EF4-FFF2-40B4-BE49-F238E27FC236}">
-                <a16:creationId xmlns:a16="http://schemas.microsoft.com/office/drawing/2014/main" id="{A41BBD15-2A23-4A78-A2C4-5BD7D8B92923}"/>
+          <p:cNvPr id="11" name="Rectangle 10">
+            <a:extLst>
+              <a:ext uri="{FF2B5EF4-FFF2-40B4-BE49-F238E27FC236}">
+                <a16:creationId xmlns:a16="http://schemas.microsoft.com/office/drawing/2014/main" id="{E04EB8EF-55B2-46F6-84B0-5768C4CA29F0}"/>
               </a:ext>
             </a:extLst>
           </p:cNvPr>
@@ -4928,64 +5293,8 @@
         </p:nvSpPr>
         <p:spPr>
           <a:xfrm>
-            <a:off x="3052762" y="4238625"/>
-            <a:ext cx="1662113" cy="990599"/>
-          </a:xfrm>
-          <a:prstGeom prst="roundRect">
-            <a:avLst/>
-          </a:prstGeom>
-        </p:spPr>
-        <p:style>
-          <a:lnRef idx="2">
-            <a:schemeClr val="accent1">
-              <a:shade val="50000"/>
-            </a:schemeClr>
-          </a:lnRef>
-          <a:fillRef idx="1">
-            <a:schemeClr val="accent1"/>
-          </a:fillRef>
-          <a:effectRef idx="0">
-            <a:schemeClr val="accent1"/>
-          </a:effectRef>
-          <a:fontRef idx="minor">
-            <a:schemeClr val="lt1"/>
-          </a:fontRef>
-        </p:style>
-        <p:txBody>
-          <a:bodyPr rtlCol="0" anchor="ctr"/>
-          <a:lstStyle/>
-          <a:p>
-            <a:pPr algn="ctr"/>
-            <a:r>
-              <a:rPr lang="en-US" dirty="0"/>
-              <a:t>Single-agent / Combination Split</a:t>
-            </a:r>
-          </a:p>
-          <a:p>
-            <a:pPr algn="ctr"/>
-            <a:r>
-              <a:rPr lang="en-US" sz="900" dirty="0"/>
-              <a:t>[name – not in dev yet]</a:t>
-            </a:r>
-          </a:p>
-        </p:txBody>
-      </p:sp>
-      <p:sp>
-        <p:nvSpPr>
-          <p:cNvPr id="11" name="Rectangle 10">
-            <a:extLst>
-              <a:ext uri="{FF2B5EF4-FFF2-40B4-BE49-F238E27FC236}">
-                <a16:creationId xmlns:a16="http://schemas.microsoft.com/office/drawing/2014/main" id="{E04EB8EF-55B2-46F6-84B0-5768C4CA29F0}"/>
-              </a:ext>
-            </a:extLst>
-          </p:cNvPr>
-          <p:cNvSpPr/>
-          <p:nvPr/>
-        </p:nvSpPr>
-        <p:spPr>
-          <a:xfrm>
-            <a:off x="7185422" y="1761888"/>
-            <a:ext cx="1843088" cy="752476"/>
+            <a:off x="9974716" y="1742827"/>
+            <a:ext cx="1843088" cy="962022"/>
           </a:xfrm>
           <a:prstGeom prst="rect">
             <a:avLst/>
@@ -5012,8 +5321,20 @@
             <a:pPr algn="ctr"/>
             <a:r>
               <a:rPr lang="en-US" sz="1200" dirty="0"/>
-              <a:t>A ceiling and floor must be set to constrain cell viability within [0,1].  </a:t>
-            </a:r>
+              <a:t>Set floor of zero </a:t>
+            </a:r>
+          </a:p>
+          <a:p>
+            <a:pPr algn="ctr"/>
+            <a:r>
+              <a:rPr lang="en-US" sz="1200" dirty="0"/>
+              <a:t>QC: </a:t>
+            </a:r>
+            <a:r>
+              <a:rPr lang="en-US" sz="1200" b="1" dirty="0"/>
+              <a:t>Negative assay value adjustment ?</a:t>
+            </a:r>
+            <a:endParaRPr lang="en-US" sz="1200" dirty="0"/>
           </a:p>
         </p:txBody>
       </p:sp>
@@ -5031,8 +5352,8 @@
         </p:nvSpPr>
         <p:spPr>
           <a:xfrm>
-            <a:off x="7185422" y="761765"/>
-            <a:ext cx="1843088" cy="990599"/>
+            <a:off x="9974716" y="761765"/>
+            <a:ext cx="1843088" cy="981069"/>
           </a:xfrm>
           <a:prstGeom prst="roundRect">
             <a:avLst/>
@@ -5094,8 +5415,8 @@
         </p:nvSpPr>
         <p:spPr>
           <a:xfrm>
-            <a:off x="9442847" y="1733310"/>
-            <a:ext cx="1843088" cy="752476"/>
+            <a:off x="494110" y="5200637"/>
+            <a:ext cx="2382440" cy="1533768"/>
           </a:xfrm>
           <a:prstGeom prst="rect">
             <a:avLst/>
@@ -5119,10 +5440,25 @@
           <a:bodyPr rtlCol="0" anchor="ctr"/>
           <a:lstStyle/>
           <a:p>
-            <a:pPr algn="ctr"/>
-            <a:r>
-              <a:rPr lang="en-US" sz="1200" dirty="0"/>
-              <a:t>If we have replicates, then they are averaged.  </a:t>
+            <a:pPr marL="228600" indent="-228600" algn="ctr">
+              <a:buAutoNum type="arabicParenBoth"/>
+            </a:pPr>
+            <a:r>
+              <a:rPr lang="en-US" sz="1100" b="1" dirty="0"/>
+              <a:t>Within-plate replicates are fit with linear regression and drugs with AUC differences &gt; 1 are removed. Remaining are averaged. </a:t>
+            </a:r>
+          </a:p>
+          <a:p>
+            <a:pPr marL="228600" indent="-228600" algn="ctr">
+              <a:buAutoNum type="arabicParenBoth"/>
+            </a:pPr>
+            <a:r>
+              <a:rPr lang="en-US" sz="1100" b="1" dirty="0"/>
+              <a:t>Across-plate replicates are fit with linear regression and AUC differences &gt; 0.75 are removed. Remaining are averaged.  </a:t>
+            </a:r>
+            <a:r>
+              <a:rPr lang="en-US" sz="1100" dirty="0"/>
+              <a:t> </a:t>
             </a:r>
           </a:p>
         </p:txBody>
@@ -5141,12 +5477,18 @@
         </p:nvSpPr>
         <p:spPr>
           <a:xfrm>
-            <a:off x="9442847" y="761764"/>
-            <a:ext cx="1843088" cy="990599"/>
+            <a:off x="765572" y="4229088"/>
+            <a:ext cx="1843088" cy="971545"/>
           </a:xfrm>
           <a:prstGeom prst="roundRect">
             <a:avLst/>
           </a:prstGeom>
+          <a:solidFill>
+            <a:schemeClr val="accent1">
+              <a:lumMod val="60000"/>
+              <a:lumOff val="40000"/>
+            </a:schemeClr>
+          </a:solidFill>
         </p:spPr>
         <p:style>
           <a:lnRef idx="2">
@@ -5204,8 +5546,8 @@
         </p:nvSpPr>
         <p:spPr>
           <a:xfrm>
-            <a:off x="533400" y="5248273"/>
-            <a:ext cx="1843088" cy="1238252"/>
+            <a:off x="3902104" y="5229214"/>
+            <a:ext cx="1843088" cy="862010"/>
           </a:xfrm>
           <a:prstGeom prst="rect">
             <a:avLst/>
@@ -5232,37 +5574,15 @@
             <a:pPr algn="ctr"/>
             <a:r>
               <a:rPr lang="en-US" sz="1200" dirty="0"/>
-              <a:t>??? Check Dan </a:t>
-            </a:r>
-            <a:r>
-              <a:rPr lang="en-US" sz="1200" dirty="0" err="1"/>
-              <a:t>Bottomly’s</a:t>
-            </a:r>
+              <a:t>Apply ceiling of 1 </a:t>
+            </a:r>
+          </a:p>
+          <a:p>
+            <a:pPr algn="ctr"/>
             <a:r>
               <a:rPr lang="en-US" sz="1200" dirty="0"/>
-              <a:t> documentation ??? I believe this step drops data when </a:t>
-            </a:r>
-            <a:r>
-              <a:rPr lang="en-US" sz="1200" dirty="0" err="1"/>
-              <a:t>replicate_auc</a:t>
-            </a:r>
-            <a:r>
-              <a:rPr lang="en-US" sz="1200" dirty="0"/>
-              <a:t> – </a:t>
-            </a:r>
-            <a:r>
-              <a:rPr lang="en-US" sz="1200" dirty="0" err="1"/>
-              <a:t>avg_replacate_auc</a:t>
-            </a:r>
-            <a:r>
-              <a:rPr lang="en-US" sz="1200" dirty="0"/>
-              <a:t> &gt; </a:t>
-            </a:r>
-            <a:r>
-              <a:rPr lang="en-US" sz="1200" dirty="0" err="1"/>
-              <a:t>some_value</a:t>
-            </a:r>
-            <a:endParaRPr lang="en-US" sz="1200" dirty="0"/>
+              <a:t>(Dan’s protocol uses 100 – note for AUC threshold adjustments)  </a:t>
+            </a:r>
           </a:p>
         </p:txBody>
       </p:sp>
@@ -5280,7 +5600,7 @@
         </p:nvSpPr>
         <p:spPr>
           <a:xfrm>
-            <a:off x="533400" y="4238621"/>
+            <a:off x="3902104" y="4229088"/>
             <a:ext cx="1843088" cy="990599"/>
           </a:xfrm>
           <a:prstGeom prst="roundRect">
@@ -5310,64 +5630,12 @@
             <a:pPr algn="ctr"/>
             <a:r>
               <a:rPr lang="en-US" dirty="0"/>
-              <a:t>Quality Control</a:t>
-            </a:r>
-          </a:p>
-          <a:p>
-            <a:pPr algn="ctr"/>
-            <a:r>
-              <a:rPr lang="en-US" sz="900" dirty="0"/>
-              <a:t>[name – not in dev yet]</a:t>
-            </a:r>
-          </a:p>
-        </p:txBody>
-      </p:sp>
-      <p:cxnSp>
-        <p:nvCxnSpPr>
-          <p:cNvPr id="20" name="Connector: Elbow 19">
-            <a:extLst>
-              <a:ext uri="{FF2B5EF4-FFF2-40B4-BE49-F238E27FC236}">
-                <a16:creationId xmlns:a16="http://schemas.microsoft.com/office/drawing/2014/main" id="{39B6E618-CE45-4915-A4A3-E69CCF35737B}"/>
-              </a:ext>
-            </a:extLst>
-          </p:cNvPr>
-          <p:cNvCxnSpPr>
-            <a:stCxn id="14" idx="3"/>
-            <a:endCxn id="16" idx="1"/>
-          </p:cNvCxnSpPr>
-          <p:nvPr/>
-        </p:nvCxnSpPr>
-        <p:spPr>
-          <a:xfrm flipH="1">
-            <a:off x="533400" y="1257064"/>
-            <a:ext cx="10752535" cy="3476857"/>
-          </a:xfrm>
-          <a:prstGeom prst="bentConnector5">
-            <a:avLst>
-              <a:gd name="adj1" fmla="val -2126"/>
-              <a:gd name="adj2" fmla="val 80957"/>
-              <a:gd name="adj3" fmla="val 102126"/>
-            </a:avLst>
-          </a:prstGeom>
-          <a:ln>
-            <a:tailEnd type="triangle"/>
-          </a:ln>
-        </p:spPr>
-        <p:style>
-          <a:lnRef idx="1">
-            <a:schemeClr val="accent1"/>
-          </a:lnRef>
-          <a:fillRef idx="0">
-            <a:schemeClr val="accent1"/>
-          </a:fillRef>
-          <a:effectRef idx="0">
-            <a:schemeClr val="accent1"/>
-          </a:effectRef>
-          <a:fontRef idx="minor">
-            <a:schemeClr val="tx1"/>
-          </a:fontRef>
-        </p:style>
-      </p:cxnSp>
+              <a:t>Normalization (4)</a:t>
+            </a:r>
+            <a:endParaRPr lang="en-US" sz="900" dirty="0"/>
+          </a:p>
+        </p:txBody>
+      </p:sp>
       <p:sp>
         <p:nvSpPr>
           <p:cNvPr id="22" name="Rectangle: Rounded Corners 21">
@@ -5382,7 +5650,7 @@
         </p:nvSpPr>
         <p:spPr>
           <a:xfrm>
-            <a:off x="5903119" y="4986338"/>
+            <a:off x="5043146" y="1628781"/>
             <a:ext cx="1662113" cy="990599"/>
           </a:xfrm>
           <a:prstGeom prst="roundRect">
@@ -5438,7 +5706,7 @@
         </p:nvSpPr>
         <p:spPr>
           <a:xfrm>
-            <a:off x="5836444" y="5976936"/>
+            <a:off x="5013380" y="2619380"/>
             <a:ext cx="1843088" cy="881063"/>
           </a:xfrm>
           <a:prstGeom prst="rect">
@@ -5493,7 +5761,7 @@
         </p:nvSpPr>
         <p:spPr>
           <a:xfrm>
-            <a:off x="8836819" y="4238624"/>
+            <a:off x="7185422" y="4229091"/>
             <a:ext cx="1662113" cy="990599"/>
           </a:xfrm>
           <a:prstGeom prst="roundRect">
@@ -5522,19 +5790,15 @@
           <a:p>
             <a:pPr algn="ctr"/>
             <a:r>
-              <a:rPr lang="en-US" dirty="0" err="1"/>
-              <a:t>Probit</a:t>
-            </a:r>
-            <a:r>
-              <a:rPr lang="en-US" dirty="0"/>
-              <a:t> Fit &amp; Overfitting QC</a:t>
+              <a:rPr lang="en-US" dirty="0"/>
+              <a:t>Regression Fitting</a:t>
             </a:r>
           </a:p>
           <a:p>
             <a:pPr algn="ctr"/>
             <a:r>
               <a:rPr lang="en-US" sz="900" dirty="0"/>
-              <a:t>[name – not in dev yet]</a:t>
+              <a:t>[Probit_calc.py]</a:t>
             </a:r>
           </a:p>
         </p:txBody>
@@ -5553,8 +5817,8 @@
         </p:nvSpPr>
         <p:spPr>
           <a:xfrm>
-            <a:off x="8753476" y="5229220"/>
-            <a:ext cx="1843088" cy="881063"/>
+            <a:off x="6613071" y="5219687"/>
+            <a:ext cx="2947308" cy="1104907"/>
           </a:xfrm>
           <a:prstGeom prst="rect">
             <a:avLst/>
@@ -5579,190 +5843,108 @@
           <a:lstStyle/>
           <a:p>
             <a:pPr algn="ctr"/>
-            <a:endParaRPr lang="en-US" sz="1200" dirty="0"/>
+            <a:r>
+              <a:rPr lang="en-US" sz="1200" dirty="0" err="1"/>
+              <a:t>Probit</a:t>
+            </a:r>
+            <a:r>
+              <a:rPr lang="en-US" sz="1200" dirty="0"/>
+              <a:t> Regression &amp; 5</a:t>
+            </a:r>
+            <a:r>
+              <a:rPr lang="en-US" sz="1200" baseline="30000" dirty="0"/>
+              <a:t>th</a:t>
+            </a:r>
+            <a:r>
+              <a:rPr lang="en-US" sz="1200" dirty="0"/>
+              <a:t> order polynomial regression. For each calculate: </a:t>
+            </a:r>
+          </a:p>
+          <a:p>
+            <a:pPr algn="ctr"/>
+            <a:r>
+              <a:rPr lang="en-US" sz="1200" b="1" dirty="0"/>
+              <a:t>AIC, BIC </a:t>
+            </a:r>
+          </a:p>
+          <a:p>
+            <a:pPr algn="ctr"/>
+            <a:r>
+              <a:rPr lang="en-US" sz="1200" b="1" dirty="0"/>
+              <a:t>Deviance</a:t>
+            </a:r>
+          </a:p>
+          <a:p>
+            <a:pPr algn="ctr"/>
+            <a:r>
+              <a:rPr lang="en-US" sz="1200" b="1" dirty="0"/>
+              <a:t>P value, z-statistic</a:t>
+            </a:r>
+          </a:p>
+          <a:p>
+            <a:pPr algn="ctr"/>
+            <a:r>
+              <a:rPr lang="en-US" sz="1200" b="1" dirty="0"/>
+              <a:t>AUC</a:t>
+            </a:r>
+          </a:p>
+        </p:txBody>
+      </p:sp>
+      <p:sp>
+        <p:nvSpPr>
+          <p:cNvPr id="35" name="TextBox 34">
+            <a:extLst>
+              <a:ext uri="{FF2B5EF4-FFF2-40B4-BE49-F238E27FC236}">
+                <a16:creationId xmlns:a16="http://schemas.microsoft.com/office/drawing/2014/main" id="{A023506D-3C78-4D3C-B858-72512FFC1144}"/>
+              </a:ext>
+            </a:extLst>
+          </p:cNvPr>
+          <p:cNvSpPr txBox="1"/>
+          <p:nvPr/>
+        </p:nvSpPr>
+        <p:spPr>
+          <a:xfrm>
+            <a:off x="5552317" y="1057988"/>
+            <a:ext cx="869149" cy="246221"/>
+          </a:xfrm>
+          <a:prstGeom prst="rect">
+            <a:avLst/>
+          </a:prstGeom>
+          <a:noFill/>
+        </p:spPr>
+        <p:txBody>
+          <a:bodyPr wrap="none" rtlCol="0">
+            <a:spAutoFit/>
+          </a:bodyPr>
+          <a:lstStyle/>
+          <a:p>
+            <a:r>
+              <a:rPr lang="en-US" sz="1000" dirty="0"/>
+              <a:t>Single agents</a:t>
+            </a:r>
           </a:p>
         </p:txBody>
       </p:sp>
       <p:cxnSp>
         <p:nvCxnSpPr>
-          <p:cNvPr id="27" name="Connector: Elbow 26">
-            <a:extLst>
-              <a:ext uri="{FF2B5EF4-FFF2-40B4-BE49-F238E27FC236}">
-                <a16:creationId xmlns:a16="http://schemas.microsoft.com/office/drawing/2014/main" id="{4AC5317C-CAC3-47EA-BF1B-C7DAAEFEAFA8}"/>
+          <p:cNvPr id="37" name="Connector: Elbow 36">
+            <a:extLst>
+              <a:ext uri="{FF2B5EF4-FFF2-40B4-BE49-F238E27FC236}">
+                <a16:creationId xmlns:a16="http://schemas.microsoft.com/office/drawing/2014/main" id="{200F9EFA-8A24-478B-B621-6E021720A03C}"/>
               </a:ext>
             </a:extLst>
           </p:cNvPr>
           <p:cNvCxnSpPr>
-            <a:stCxn id="8" idx="3"/>
+            <a:cxnSpLocks/>
+            <a:stCxn id="16" idx="3"/>
             <a:endCxn id="24" idx="1"/>
           </p:cNvCxnSpPr>
           <p:nvPr/>
         </p:nvCxnSpPr>
         <p:spPr>
-          <a:xfrm flipV="1">
-            <a:off x="4714875" y="4733924"/>
-            <a:ext cx="4121944" cy="1"/>
-          </a:xfrm>
-          <a:prstGeom prst="bentConnector3">
-            <a:avLst/>
-          </a:prstGeom>
-          <a:ln>
-            <a:tailEnd type="triangle"/>
-          </a:ln>
-        </p:spPr>
-        <p:style>
-          <a:lnRef idx="1">
-            <a:schemeClr val="accent1"/>
-          </a:lnRef>
-          <a:fillRef idx="0">
-            <a:schemeClr val="accent1"/>
-          </a:fillRef>
-          <a:effectRef idx="0">
-            <a:schemeClr val="accent1"/>
-          </a:effectRef>
-          <a:fontRef idx="minor">
-            <a:schemeClr val="tx1"/>
-          </a:fontRef>
-        </p:style>
-      </p:cxnSp>
-      <p:cxnSp>
-        <p:nvCxnSpPr>
-          <p:cNvPr id="32" name="Connector: Elbow 31">
-            <a:extLst>
-              <a:ext uri="{FF2B5EF4-FFF2-40B4-BE49-F238E27FC236}">
-                <a16:creationId xmlns:a16="http://schemas.microsoft.com/office/drawing/2014/main" id="{3F772146-2F83-4C22-A1E1-342FABC4DDEA}"/>
-              </a:ext>
-            </a:extLst>
-          </p:cNvPr>
-          <p:cNvCxnSpPr>
-            <a:stCxn id="8" idx="3"/>
-            <a:endCxn id="22" idx="1"/>
-          </p:cNvCxnSpPr>
-          <p:nvPr/>
-        </p:nvCxnSpPr>
-        <p:spPr>
-          <a:xfrm>
-            <a:off x="4714875" y="4733925"/>
-            <a:ext cx="1188244" cy="747713"/>
-          </a:xfrm>
-          <a:prstGeom prst="bentConnector3">
-            <a:avLst/>
-          </a:prstGeom>
-          <a:ln>
-            <a:tailEnd type="triangle"/>
-          </a:ln>
-        </p:spPr>
-        <p:style>
-          <a:lnRef idx="1">
-            <a:schemeClr val="accent1"/>
-          </a:lnRef>
-          <a:fillRef idx="0">
-            <a:schemeClr val="accent1"/>
-          </a:fillRef>
-          <a:effectRef idx="0">
-            <a:schemeClr val="accent1"/>
-          </a:effectRef>
-          <a:fontRef idx="minor">
-            <a:schemeClr val="tx1"/>
-          </a:fontRef>
-        </p:style>
-      </p:cxnSp>
-      <p:cxnSp>
-        <p:nvCxnSpPr>
-          <p:cNvPr id="34" name="Connector: Elbow 33">
-            <a:extLst>
-              <a:ext uri="{FF2B5EF4-FFF2-40B4-BE49-F238E27FC236}">
-                <a16:creationId xmlns:a16="http://schemas.microsoft.com/office/drawing/2014/main" id="{32119134-244D-4348-BD8D-67E2FA402905}"/>
-              </a:ext>
-            </a:extLst>
-          </p:cNvPr>
-          <p:cNvCxnSpPr>
-            <a:stCxn id="22" idx="3"/>
-            <a:endCxn id="24" idx="1"/>
-          </p:cNvCxnSpPr>
-          <p:nvPr/>
-        </p:nvCxnSpPr>
-        <p:spPr>
-          <a:xfrm flipV="1">
-            <a:off x="7565232" y="4733924"/>
-            <a:ext cx="1271587" cy="747714"/>
-          </a:xfrm>
-          <a:prstGeom prst="bentConnector3">
-            <a:avLst/>
-          </a:prstGeom>
-          <a:ln>
-            <a:tailEnd type="triangle"/>
-          </a:ln>
-        </p:spPr>
-        <p:style>
-          <a:lnRef idx="1">
-            <a:schemeClr val="accent1"/>
-          </a:lnRef>
-          <a:fillRef idx="0">
-            <a:schemeClr val="accent1"/>
-          </a:fillRef>
-          <a:effectRef idx="0">
-            <a:schemeClr val="accent1"/>
-          </a:effectRef>
-          <a:fontRef idx="minor">
-            <a:schemeClr val="tx1"/>
-          </a:fontRef>
-        </p:style>
-      </p:cxnSp>
-      <p:sp>
-        <p:nvSpPr>
-          <p:cNvPr id="35" name="TextBox 34">
-            <a:extLst>
-              <a:ext uri="{FF2B5EF4-FFF2-40B4-BE49-F238E27FC236}">
-                <a16:creationId xmlns:a16="http://schemas.microsoft.com/office/drawing/2014/main" id="{A023506D-3C78-4D3C-B858-72512FFC1144}"/>
-              </a:ext>
-            </a:extLst>
-          </p:cNvPr>
-          <p:cNvSpPr txBox="1"/>
-          <p:nvPr/>
-        </p:nvSpPr>
-        <p:spPr>
-          <a:xfrm>
-            <a:off x="6365967" y="4495563"/>
-            <a:ext cx="819455" cy="246221"/>
-          </a:xfrm>
-          <a:prstGeom prst="rect">
-            <a:avLst/>
-          </a:prstGeom>
-          <a:noFill/>
-        </p:spPr>
-        <p:txBody>
-          <a:bodyPr wrap="none" rtlCol="0">
-            <a:spAutoFit/>
-          </a:bodyPr>
-          <a:lstStyle/>
-          <a:p>
-            <a:r>
-              <a:rPr lang="en-US" sz="1000" dirty="0"/>
-              <a:t>Single agent</a:t>
-            </a:r>
-          </a:p>
-        </p:txBody>
-      </p:sp>
-      <p:cxnSp>
-        <p:nvCxnSpPr>
-          <p:cNvPr id="37" name="Connector: Elbow 36">
-            <a:extLst>
-              <a:ext uri="{FF2B5EF4-FFF2-40B4-BE49-F238E27FC236}">
-                <a16:creationId xmlns:a16="http://schemas.microsoft.com/office/drawing/2014/main" id="{200F9EFA-8A24-478B-B621-6E021720A03C}"/>
-              </a:ext>
-            </a:extLst>
-          </p:cNvPr>
-          <p:cNvCxnSpPr>
-            <a:stCxn id="16" idx="3"/>
-            <a:endCxn id="8" idx="1"/>
-          </p:cNvCxnSpPr>
-          <p:nvPr/>
-        </p:nvCxnSpPr>
-        <p:spPr>
-          <a:xfrm>
-            <a:off x="2376488" y="4733921"/>
-            <a:ext cx="676274" cy="4"/>
+          <a:xfrm>
+            <a:off x="5745192" y="4724388"/>
+            <a:ext cx="1440230" cy="3"/>
           </a:xfrm>
           <a:prstGeom prst="bentConnector3">
             <a:avLst/>
@@ -5796,18 +5978,23 @@
             </a:extLst>
           </p:cNvPr>
           <p:cNvCxnSpPr>
+            <a:cxnSpLocks/>
             <a:stCxn id="12" idx="3"/>
             <a:endCxn id="14" idx="1"/>
           </p:cNvCxnSpPr>
           <p:nvPr/>
         </p:nvCxnSpPr>
         <p:spPr>
-          <a:xfrm flipV="1">
-            <a:off x="9028510" y="1257064"/>
-            <a:ext cx="414337" cy="1"/>
-          </a:xfrm>
-          <a:prstGeom prst="bentConnector3">
-            <a:avLst/>
+          <a:xfrm flipH="1">
+            <a:off x="765572" y="1252300"/>
+            <a:ext cx="11052232" cy="3462561"/>
+          </a:xfrm>
+          <a:prstGeom prst="bentConnector5">
+            <a:avLst>
+              <a:gd name="adj1" fmla="val -2068"/>
+              <a:gd name="adj2" fmla="val 72940"/>
+              <a:gd name="adj3" fmla="val 102068"/>
+            </a:avLst>
           </a:prstGeom>
           <a:ln>
             <a:tailEnd type="triangle"/>
@@ -5838,60 +6025,21 @@
             </a:extLst>
           </p:cNvPr>
           <p:cNvCxnSpPr>
+            <a:cxnSpLocks/>
             <a:stCxn id="5" idx="3"/>
             <a:endCxn id="12" idx="1"/>
           </p:cNvCxnSpPr>
           <p:nvPr/>
         </p:nvCxnSpPr>
         <p:spPr>
-          <a:xfrm>
-            <a:off x="6771085" y="1257061"/>
-            <a:ext cx="414337" cy="4"/>
+          <a:xfrm flipV="1">
+            <a:off x="9560379" y="1252300"/>
+            <a:ext cx="414337" cy="4761"/>
           </a:xfrm>
           <a:prstGeom prst="bentConnector3">
-            <a:avLst/>
-          </a:prstGeom>
-          <a:ln>
-            <a:tailEnd type="triangle"/>
-          </a:ln>
-        </p:spPr>
-        <p:style>
-          <a:lnRef idx="1">
-            <a:schemeClr val="accent1"/>
-          </a:lnRef>
-          <a:fillRef idx="0">
-            <a:schemeClr val="accent1"/>
-          </a:fillRef>
-          <a:effectRef idx="0">
-            <a:schemeClr val="accent1"/>
-          </a:effectRef>
-          <a:fontRef idx="minor">
-            <a:schemeClr val="tx1"/>
-          </a:fontRef>
-        </p:style>
-      </p:cxnSp>
-      <p:cxnSp>
-        <p:nvCxnSpPr>
-          <p:cNvPr id="54" name="Straight Arrow Connector 53">
-            <a:extLst>
-              <a:ext uri="{FF2B5EF4-FFF2-40B4-BE49-F238E27FC236}">
-                <a16:creationId xmlns:a16="http://schemas.microsoft.com/office/drawing/2014/main" id="{50106116-BE84-49F2-9EA6-61D559998207}"/>
-              </a:ext>
-            </a:extLst>
-          </p:cNvPr>
-          <p:cNvCxnSpPr>
-            <a:stCxn id="4" idx="3"/>
-            <a:endCxn id="5" idx="1"/>
-          </p:cNvCxnSpPr>
-          <p:nvPr/>
-        </p:nvCxnSpPr>
-        <p:spPr>
-          <a:xfrm>
-            <a:off x="4370785" y="1247534"/>
-            <a:ext cx="557212" cy="9527"/>
-          </a:xfrm>
-          <a:prstGeom prst="straightConnector1">
-            <a:avLst/>
+            <a:avLst>
+              <a:gd name="adj1" fmla="val 50000"/>
+            </a:avLst>
           </a:prstGeom>
           <a:ln>
             <a:tailEnd type="triangle"/>
@@ -5996,6 +6144,502 @@
           </a:fontRef>
         </p:style>
       </p:cxnSp>
+      <p:sp>
+        <p:nvSpPr>
+          <p:cNvPr id="31" name="Rectangle: Rounded Corners 30">
+            <a:extLst>
+              <a:ext uri="{FF2B5EF4-FFF2-40B4-BE49-F238E27FC236}">
+                <a16:creationId xmlns:a16="http://schemas.microsoft.com/office/drawing/2014/main" id="{D2ED3B51-58BF-41CB-9E78-8A2410C61004}"/>
+              </a:ext>
+            </a:extLst>
+          </p:cNvPr>
+          <p:cNvSpPr/>
+          <p:nvPr/>
+        </p:nvSpPr>
+        <p:spPr>
+          <a:xfrm>
+            <a:off x="9921478" y="4229088"/>
+            <a:ext cx="1662113" cy="990599"/>
+          </a:xfrm>
+          <a:prstGeom prst="roundRect">
+            <a:avLst/>
+          </a:prstGeom>
+        </p:spPr>
+        <p:style>
+          <a:lnRef idx="2">
+            <a:schemeClr val="accent1">
+              <a:shade val="50000"/>
+            </a:schemeClr>
+          </a:lnRef>
+          <a:fillRef idx="1">
+            <a:schemeClr val="accent1"/>
+          </a:fillRef>
+          <a:effectRef idx="0">
+            <a:schemeClr val="accent1"/>
+          </a:effectRef>
+          <a:fontRef idx="minor">
+            <a:schemeClr val="lt1"/>
+          </a:fontRef>
+        </p:style>
+        <p:txBody>
+          <a:bodyPr rtlCol="0" anchor="ctr"/>
+          <a:lstStyle/>
+          <a:p>
+            <a:pPr algn="ctr"/>
+            <a:r>
+              <a:rPr lang="en-US" dirty="0"/>
+              <a:t>post-processing</a:t>
+            </a:r>
+          </a:p>
+          <a:p>
+            <a:pPr algn="ctr"/>
+            <a:r>
+              <a:rPr lang="en-US" sz="900" dirty="0"/>
+              <a:t>[name – not in dev yet]</a:t>
+            </a:r>
+          </a:p>
+        </p:txBody>
+      </p:sp>
+      <p:sp>
+        <p:nvSpPr>
+          <p:cNvPr id="33" name="Rectangle 32">
+            <a:extLst>
+              <a:ext uri="{FF2B5EF4-FFF2-40B4-BE49-F238E27FC236}">
+                <a16:creationId xmlns:a16="http://schemas.microsoft.com/office/drawing/2014/main" id="{9BA202C5-0C46-4E82-98BC-E15CFAA5C3CD}"/>
+              </a:ext>
+            </a:extLst>
+          </p:cNvPr>
+          <p:cNvSpPr/>
+          <p:nvPr/>
+        </p:nvSpPr>
+        <p:spPr>
+          <a:xfrm>
+            <a:off x="9854802" y="5229207"/>
+            <a:ext cx="1843088" cy="1269564"/>
+          </a:xfrm>
+          <a:prstGeom prst="rect">
+            <a:avLst/>
+          </a:prstGeom>
+        </p:spPr>
+        <p:style>
+          <a:lnRef idx="2">
+            <a:schemeClr val="dk1"/>
+          </a:lnRef>
+          <a:fillRef idx="1">
+            <a:schemeClr val="lt1"/>
+          </a:fillRef>
+          <a:effectRef idx="0">
+            <a:schemeClr val="dk1"/>
+          </a:effectRef>
+          <a:fontRef idx="minor">
+            <a:schemeClr val="dk1"/>
+          </a:fontRef>
+        </p:style>
+        <p:txBody>
+          <a:bodyPr rtlCol="0" anchor="ctr"/>
+          <a:lstStyle/>
+          <a:p>
+            <a:pPr algn="ctr"/>
+            <a:r>
+              <a:rPr lang="en-US" sz="1200" dirty="0"/>
+              <a:t>Remove runs with: </a:t>
+            </a:r>
+          </a:p>
+          <a:p>
+            <a:pPr algn="ctr"/>
+            <a:r>
+              <a:rPr lang="en-US" sz="1200" b="1" dirty="0"/>
+              <a:t>[</a:t>
+            </a:r>
+            <a:r>
+              <a:rPr lang="en-US" sz="1200" b="1" dirty="0" err="1"/>
+              <a:t>probit</a:t>
+            </a:r>
+            <a:r>
+              <a:rPr lang="en-US" sz="1200" b="1" dirty="0"/>
+              <a:t>] AIC &gt; 12</a:t>
+            </a:r>
+          </a:p>
+          <a:p>
+            <a:pPr algn="ctr"/>
+            <a:r>
+              <a:rPr lang="en-US" sz="1200" b="1" dirty="0"/>
+              <a:t>[</a:t>
+            </a:r>
+            <a:r>
+              <a:rPr lang="en-US" sz="1200" b="1" dirty="0" err="1"/>
+              <a:t>probit</a:t>
+            </a:r>
+            <a:r>
+              <a:rPr lang="en-US" sz="1200" b="1" dirty="0"/>
+              <a:t>] Deviance &gt; 2</a:t>
+            </a:r>
+          </a:p>
+          <a:p>
+            <a:pPr algn="ctr"/>
+            <a:r>
+              <a:rPr lang="en-US" sz="1200" dirty="0"/>
+              <a:t>Flag runs where: </a:t>
+            </a:r>
+          </a:p>
+          <a:p>
+            <a:pPr algn="ctr"/>
+            <a:r>
+              <a:rPr lang="en-US" sz="1200" b="1" dirty="0"/>
+              <a:t>[</a:t>
+            </a:r>
+            <a:r>
+              <a:rPr lang="en-US" sz="1200" b="1" dirty="0" err="1"/>
+              <a:t>probit</a:t>
+            </a:r>
+            <a:r>
+              <a:rPr lang="en-US" sz="1200" b="1" dirty="0"/>
+              <a:t>] AIC &lt; [poly reg] AIC </a:t>
+            </a:r>
+          </a:p>
+        </p:txBody>
+      </p:sp>
+      <p:cxnSp>
+        <p:nvCxnSpPr>
+          <p:cNvPr id="17" name="Connector: Elbow 16">
+            <a:extLst>
+              <a:ext uri="{FF2B5EF4-FFF2-40B4-BE49-F238E27FC236}">
+                <a16:creationId xmlns:a16="http://schemas.microsoft.com/office/drawing/2014/main" id="{530F30A7-EA33-470B-BA30-AED110703EDD}"/>
+              </a:ext>
+            </a:extLst>
+          </p:cNvPr>
+          <p:cNvCxnSpPr>
+            <a:stCxn id="24" idx="3"/>
+            <a:endCxn id="31" idx="1"/>
+          </p:cNvCxnSpPr>
+          <p:nvPr/>
+        </p:nvCxnSpPr>
+        <p:spPr>
+          <a:xfrm flipV="1">
+            <a:off x="8847535" y="4724388"/>
+            <a:ext cx="1073943" cy="3"/>
+          </a:xfrm>
+          <a:prstGeom prst="bentConnector3">
+            <a:avLst/>
+          </a:prstGeom>
+          <a:ln>
+            <a:tailEnd type="triangle"/>
+          </a:ln>
+        </p:spPr>
+        <p:style>
+          <a:lnRef idx="1">
+            <a:schemeClr val="accent1"/>
+          </a:lnRef>
+          <a:fillRef idx="0">
+            <a:schemeClr val="accent1"/>
+          </a:fillRef>
+          <a:effectRef idx="0">
+            <a:schemeClr val="accent1"/>
+          </a:effectRef>
+          <a:fontRef idx="minor">
+            <a:schemeClr val="tx1"/>
+          </a:fontRef>
+        </p:style>
+      </p:cxnSp>
+      <p:cxnSp>
+        <p:nvCxnSpPr>
+          <p:cNvPr id="58" name="Straight Arrow Connector 57">
+            <a:extLst>
+              <a:ext uri="{FF2B5EF4-FFF2-40B4-BE49-F238E27FC236}">
+                <a16:creationId xmlns:a16="http://schemas.microsoft.com/office/drawing/2014/main" id="{8AAB3372-4B90-4AF5-AD59-61059D2AE32B}"/>
+              </a:ext>
+            </a:extLst>
+          </p:cNvPr>
+          <p:cNvCxnSpPr>
+            <a:stCxn id="4" idx="3"/>
+            <a:endCxn id="5" idx="1"/>
+          </p:cNvCxnSpPr>
+          <p:nvPr/>
+        </p:nvCxnSpPr>
+        <p:spPr>
+          <a:xfrm>
+            <a:off x="4370785" y="1247534"/>
+            <a:ext cx="3346506" cy="9527"/>
+          </a:xfrm>
+          <a:prstGeom prst="straightConnector1">
+            <a:avLst/>
+          </a:prstGeom>
+          <a:ln>
+            <a:tailEnd type="triangle"/>
+          </a:ln>
+        </p:spPr>
+        <p:style>
+          <a:lnRef idx="1">
+            <a:schemeClr val="accent1"/>
+          </a:lnRef>
+          <a:fillRef idx="0">
+            <a:schemeClr val="accent1"/>
+          </a:fillRef>
+          <a:effectRef idx="0">
+            <a:schemeClr val="accent1"/>
+          </a:effectRef>
+          <a:fontRef idx="minor">
+            <a:schemeClr val="tx1"/>
+          </a:fontRef>
+        </p:style>
+      </p:cxnSp>
+      <p:cxnSp>
+        <p:nvCxnSpPr>
+          <p:cNvPr id="61" name="Connector: Elbow 60">
+            <a:extLst>
+              <a:ext uri="{FF2B5EF4-FFF2-40B4-BE49-F238E27FC236}">
+                <a16:creationId xmlns:a16="http://schemas.microsoft.com/office/drawing/2014/main" id="{7C5C2281-7977-438D-835B-06C09A7BA0BE}"/>
+              </a:ext>
+            </a:extLst>
+          </p:cNvPr>
+          <p:cNvCxnSpPr>
+            <a:stCxn id="4" idx="3"/>
+            <a:endCxn id="22" idx="1"/>
+          </p:cNvCxnSpPr>
+          <p:nvPr/>
+        </p:nvCxnSpPr>
+        <p:spPr>
+          <a:xfrm>
+            <a:off x="4370785" y="1247534"/>
+            <a:ext cx="672361" cy="876547"/>
+          </a:xfrm>
+          <a:prstGeom prst="bentConnector3">
+            <a:avLst/>
+          </a:prstGeom>
+          <a:ln>
+            <a:tailEnd type="triangle"/>
+          </a:ln>
+        </p:spPr>
+        <p:style>
+          <a:lnRef idx="1">
+            <a:schemeClr val="accent1"/>
+          </a:lnRef>
+          <a:fillRef idx="0">
+            <a:schemeClr val="accent1"/>
+          </a:fillRef>
+          <a:effectRef idx="0">
+            <a:schemeClr val="accent1"/>
+          </a:effectRef>
+          <a:fontRef idx="minor">
+            <a:schemeClr val="tx1"/>
+          </a:fontRef>
+        </p:style>
+      </p:cxnSp>
+      <p:cxnSp>
+        <p:nvCxnSpPr>
+          <p:cNvPr id="63" name="Connector: Elbow 62">
+            <a:extLst>
+              <a:ext uri="{FF2B5EF4-FFF2-40B4-BE49-F238E27FC236}">
+                <a16:creationId xmlns:a16="http://schemas.microsoft.com/office/drawing/2014/main" id="{A30579E9-46E2-42C6-BC52-19809B089591}"/>
+              </a:ext>
+            </a:extLst>
+          </p:cNvPr>
+          <p:cNvCxnSpPr>
+            <a:cxnSpLocks/>
+            <a:stCxn id="22" idx="3"/>
+            <a:endCxn id="5" idx="1"/>
+          </p:cNvCxnSpPr>
+          <p:nvPr/>
+        </p:nvCxnSpPr>
+        <p:spPr>
+          <a:xfrm flipV="1">
+            <a:off x="6705259" y="1257061"/>
+            <a:ext cx="1012032" cy="867020"/>
+          </a:xfrm>
+          <a:prstGeom prst="bentConnector3">
+            <a:avLst>
+              <a:gd name="adj1" fmla="val 31445"/>
+            </a:avLst>
+          </a:prstGeom>
+          <a:ln>
+            <a:tailEnd type="triangle"/>
+          </a:ln>
+        </p:spPr>
+        <p:style>
+          <a:lnRef idx="1">
+            <a:schemeClr val="accent1"/>
+          </a:lnRef>
+          <a:fillRef idx="0">
+            <a:schemeClr val="accent1"/>
+          </a:fillRef>
+          <a:effectRef idx="0">
+            <a:schemeClr val="accent1"/>
+          </a:effectRef>
+          <a:fontRef idx="minor">
+            <a:schemeClr val="tx1"/>
+          </a:fontRef>
+        </p:style>
+      </p:cxnSp>
+      <p:cxnSp>
+        <p:nvCxnSpPr>
+          <p:cNvPr id="69" name="Straight Arrow Connector 68">
+            <a:extLst>
+              <a:ext uri="{FF2B5EF4-FFF2-40B4-BE49-F238E27FC236}">
+                <a16:creationId xmlns:a16="http://schemas.microsoft.com/office/drawing/2014/main" id="{83AFE46F-3F73-41FC-8C34-497DC5B03B40}"/>
+              </a:ext>
+            </a:extLst>
+          </p:cNvPr>
+          <p:cNvCxnSpPr>
+            <a:stCxn id="14" idx="3"/>
+            <a:endCxn id="16" idx="1"/>
+          </p:cNvCxnSpPr>
+          <p:nvPr/>
+        </p:nvCxnSpPr>
+        <p:spPr>
+          <a:xfrm>
+            <a:off x="2608660" y="4714861"/>
+            <a:ext cx="1293444" cy="9527"/>
+          </a:xfrm>
+          <a:prstGeom prst="straightConnector1">
+            <a:avLst/>
+          </a:prstGeom>
+          <a:ln>
+            <a:tailEnd type="triangle"/>
+          </a:ln>
+        </p:spPr>
+        <p:style>
+          <a:lnRef idx="1">
+            <a:schemeClr val="accent1"/>
+          </a:lnRef>
+          <a:fillRef idx="0">
+            <a:schemeClr val="accent1"/>
+          </a:fillRef>
+          <a:effectRef idx="0">
+            <a:schemeClr val="accent1"/>
+          </a:effectRef>
+          <a:fontRef idx="minor">
+            <a:schemeClr val="tx1"/>
+          </a:fontRef>
+        </p:style>
+      </p:cxnSp>
+      <p:cxnSp>
+        <p:nvCxnSpPr>
+          <p:cNvPr id="72" name="Straight Arrow Connector 71">
+            <a:extLst>
+              <a:ext uri="{FF2B5EF4-FFF2-40B4-BE49-F238E27FC236}">
+                <a16:creationId xmlns:a16="http://schemas.microsoft.com/office/drawing/2014/main" id="{3B6F7AEA-BA36-45A3-8608-43CB4FFA93CE}"/>
+              </a:ext>
+            </a:extLst>
+          </p:cNvPr>
+          <p:cNvCxnSpPr>
+            <a:cxnSpLocks/>
+          </p:cNvCxnSpPr>
+          <p:nvPr/>
+        </p:nvCxnSpPr>
+        <p:spPr>
+          <a:xfrm flipV="1">
+            <a:off x="4291230" y="606405"/>
+            <a:ext cx="200025" cy="219789"/>
+          </a:xfrm>
+          <a:prstGeom prst="straightConnector1">
+            <a:avLst/>
+          </a:prstGeom>
+          <a:ln>
+            <a:tailEnd type="triangle"/>
+          </a:ln>
+        </p:spPr>
+        <p:style>
+          <a:lnRef idx="1">
+            <a:schemeClr val="accent1"/>
+          </a:lnRef>
+          <a:fillRef idx="0">
+            <a:schemeClr val="accent1"/>
+          </a:fillRef>
+          <a:effectRef idx="0">
+            <a:schemeClr val="accent1"/>
+          </a:effectRef>
+          <a:fontRef idx="minor">
+            <a:schemeClr val="tx1"/>
+          </a:fontRef>
+        </p:style>
+      </p:cxnSp>
+      <p:sp>
+        <p:nvSpPr>
+          <p:cNvPr id="73" name="Oval 72">
+            <a:extLst>
+              <a:ext uri="{FF2B5EF4-FFF2-40B4-BE49-F238E27FC236}">
+                <a16:creationId xmlns:a16="http://schemas.microsoft.com/office/drawing/2014/main" id="{AC34EA5C-59D5-4CCD-BDCD-8C616F9467DF}"/>
+              </a:ext>
+            </a:extLst>
+          </p:cNvPr>
+          <p:cNvSpPr/>
+          <p:nvPr/>
+        </p:nvSpPr>
+        <p:spPr>
+          <a:xfrm>
+            <a:off x="4391242" y="-39715"/>
+            <a:ext cx="740567" cy="720522"/>
+          </a:xfrm>
+          <a:prstGeom prst="ellipse">
+            <a:avLst/>
+          </a:prstGeom>
+          <a:solidFill>
+            <a:srgbClr val="FFC000"/>
+          </a:solidFill>
+        </p:spPr>
+        <p:style>
+          <a:lnRef idx="2">
+            <a:schemeClr val="accent1">
+              <a:shade val="50000"/>
+            </a:schemeClr>
+          </a:lnRef>
+          <a:fillRef idx="1">
+            <a:schemeClr val="accent1"/>
+          </a:fillRef>
+          <a:effectRef idx="0">
+            <a:schemeClr val="accent1"/>
+          </a:effectRef>
+          <a:fontRef idx="minor">
+            <a:schemeClr val="lt1"/>
+          </a:fontRef>
+        </p:style>
+        <p:txBody>
+          <a:bodyPr rtlCol="0" anchor="ctr"/>
+          <a:lstStyle/>
+          <a:p>
+            <a:pPr algn="ctr"/>
+            <a:r>
+              <a:rPr lang="en-US" sz="1000" dirty="0"/>
+              <a:t>Check ‘Blank490’</a:t>
+            </a:r>
+          </a:p>
+        </p:txBody>
+      </p:sp>
+      <p:sp>
+        <p:nvSpPr>
+          <p:cNvPr id="76" name="TextBox 75">
+            <a:extLst>
+              <a:ext uri="{FF2B5EF4-FFF2-40B4-BE49-F238E27FC236}">
+                <a16:creationId xmlns:a16="http://schemas.microsoft.com/office/drawing/2014/main" id="{E8D1D97D-6E01-4DB2-A0E9-545B44EBC05D}"/>
+              </a:ext>
+            </a:extLst>
+          </p:cNvPr>
+          <p:cNvSpPr txBox="1"/>
+          <p:nvPr/>
+        </p:nvSpPr>
+        <p:spPr>
+          <a:xfrm>
+            <a:off x="890118" y="3784239"/>
+            <a:ext cx="1986432" cy="461665"/>
+          </a:xfrm>
+          <a:prstGeom prst="rect">
+            <a:avLst/>
+          </a:prstGeom>
+          <a:noFill/>
+        </p:spPr>
+        <p:txBody>
+          <a:bodyPr wrap="square" rtlCol="0">
+            <a:spAutoFit/>
+          </a:bodyPr>
+          <a:lstStyle/>
+          <a:p>
+            <a:r>
+              <a:rPr lang="en-US" sz="1200" dirty="0"/>
+              <a:t>No within or across plate replicates on these panels</a:t>
+            </a:r>
+          </a:p>
+        </p:txBody>
+      </p:sp>
     </p:spTree>
     <p:extLst>
       <p:ext uri="{BB962C8B-B14F-4D97-AF65-F5344CB8AC3E}">
@@ -6031,7 +6675,7 @@
           <p:cNvPr id="2" name="Title 1">
             <a:extLst>
               <a:ext uri="{FF2B5EF4-FFF2-40B4-BE49-F238E27FC236}">
-                <a16:creationId xmlns:a16="http://schemas.microsoft.com/office/drawing/2014/main" id="{0C9934DF-8684-482D-A4AA-A6412C0D074C}"/>
+                <a16:creationId xmlns:a16="http://schemas.microsoft.com/office/drawing/2014/main" id="{9419F395-B090-4B39-AAC3-A8B83C1867CA}"/>
               </a:ext>
             </a:extLst>
           </p:cNvPr>
@@ -6049,7 +6693,7 @@
           <a:p>
             <a:r>
               <a:rPr lang="en-US" dirty="0"/>
-              <a:t>Overview </a:t>
+              <a:t>Combination-agent concentration space fit </a:t>
             </a:r>
           </a:p>
         </p:txBody>
@@ -6059,7 +6703,7 @@
           <p:cNvPr id="3" name="Content Placeholder 2">
             <a:extLst>
               <a:ext uri="{FF2B5EF4-FFF2-40B4-BE49-F238E27FC236}">
-                <a16:creationId xmlns:a16="http://schemas.microsoft.com/office/drawing/2014/main" id="{D14D1252-27F6-45E4-AC18-DBBDBC8B95FE}"/>
+                <a16:creationId xmlns:a16="http://schemas.microsoft.com/office/drawing/2014/main" id="{1BC46CEB-FD9D-41AC-891F-1603D33C54E4}"/>
               </a:ext>
             </a:extLst>
           </p:cNvPr>
@@ -6070,7 +6714,12 @@
             <p:ph idx="1"/>
           </p:nvPr>
         </p:nvSpPr>
-        <p:spPr/>
+        <p:spPr>
+          <a:xfrm>
+            <a:off x="838200" y="1825625"/>
+            <a:ext cx="5257800" cy="1603375"/>
+          </a:xfrm>
+        </p:spPr>
         <p:txBody>
           <a:bodyPr>
             <a:normAutofit lnSpcReduction="10000"/>
@@ -6079,103 +6728,892 @@
           <a:p>
             <a:r>
               <a:rPr lang="en-US" dirty="0"/>
-              <a:t>Number of HNSCC patients:  11 HNSCC patients [7/20] </a:t>
-            </a:r>
-          </a:p>
-          <a:p>
-            <a:r>
-              <a:rPr lang="en-US" dirty="0"/>
-              <a:t>Plate map versions </a:t>
-            </a:r>
-          </a:p>
-          <a:p>
-            <a:pPr lvl="1"/>
-            <a:r>
-              <a:rPr lang="en-US" dirty="0"/>
-              <a:t>Plates 1-3 (rev 001), Plates 1-6 (rev 002) &lt;- combinatorial </a:t>
-            </a:r>
-          </a:p>
-          <a:p>
-            <a:pPr lvl="1"/>
-            <a:r>
-              <a:rPr lang="en-US" dirty="0"/>
-              <a:t>Tyner panels – still need to be re-worked into HNSCC format</a:t>
-            </a:r>
-          </a:p>
-          <a:p>
-            <a:pPr lvl="1"/>
-            <a:r>
-              <a:rPr lang="en-US" dirty="0"/>
-              <a:t>+1 assay with 7… require additional work </a:t>
-            </a:r>
-          </a:p>
-          <a:p>
-            <a:pPr lvl="1"/>
-            <a:r>
-              <a:rPr lang="en-US" dirty="0"/>
-              <a:t>Excel files with pages: meta, concentration_&lt;num&gt;, inhibitor_&lt;num&gt;</a:t>
-            </a:r>
-          </a:p>
-          <a:p>
-            <a:r>
-              <a:rPr lang="en-US" dirty="0"/>
-              <a:t>Naming convention</a:t>
-            </a:r>
-          </a:p>
-          <a:p>
-            <a:pPr lvl="1"/>
-            <a:r>
-              <a:rPr lang="en-US" dirty="0"/>
-              <a:t>Unique ID for each assay? Or we need to distinguish replicates</a:t>
-            </a:r>
-          </a:p>
-          <a:p>
-            <a:pPr lvl="1"/>
-            <a:r>
-              <a:rPr lang="en-US" dirty="0"/>
-              <a:t>Date of assay? </a:t>
-            </a:r>
-          </a:p>
-          <a:p>
-            <a:pPr lvl="1"/>
-            <a:r>
-              <a:rPr lang="en-US" dirty="0"/>
-              <a:t>MTS sitting time? </a:t>
-            </a:r>
-          </a:p>
-          <a:p>
-            <a:pPr lvl="1"/>
+              <a:t>For combination-agent assays, we have to choose a plane to fit our </a:t>
+            </a:r>
             <a:r>
               <a:rPr lang="en-US" dirty="0" err="1"/>
-              <a:t>lab_id</a:t>
-            </a:r>
-            <a:r>
-              <a:rPr lang="en-US" dirty="0"/>
-              <a:t>=XXXXX-norm=XXX-</a:t>
+              <a:t>probit</a:t>
+            </a:r>
+            <a:r>
+              <a:rPr lang="en-US" dirty="0"/>
+              <a:t> along and we really only have one good choice. </a:t>
+            </a:r>
+          </a:p>
+        </p:txBody>
+      </p:sp>
+      <p:cxnSp>
+        <p:nvCxnSpPr>
+          <p:cNvPr id="5" name="Straight Arrow Connector 4">
+            <a:extLst>
+              <a:ext uri="{FF2B5EF4-FFF2-40B4-BE49-F238E27FC236}">
+                <a16:creationId xmlns:a16="http://schemas.microsoft.com/office/drawing/2014/main" id="{56299915-9366-4908-915D-7C96E0A134B3}"/>
+              </a:ext>
+            </a:extLst>
+          </p:cNvPr>
+          <p:cNvCxnSpPr/>
+          <p:nvPr/>
+        </p:nvCxnSpPr>
+        <p:spPr>
+          <a:xfrm flipV="1">
+            <a:off x="7505700" y="2085975"/>
+            <a:ext cx="0" cy="3381375"/>
+          </a:xfrm>
+          <a:prstGeom prst="straightConnector1">
+            <a:avLst/>
+          </a:prstGeom>
+          <a:ln>
+            <a:tailEnd type="triangle"/>
+          </a:ln>
+        </p:spPr>
+        <p:style>
+          <a:lnRef idx="1">
+            <a:schemeClr val="accent1"/>
+          </a:lnRef>
+          <a:fillRef idx="0">
+            <a:schemeClr val="accent1"/>
+          </a:fillRef>
+          <a:effectRef idx="0">
+            <a:schemeClr val="accent1"/>
+          </a:effectRef>
+          <a:fontRef idx="minor">
+            <a:schemeClr val="tx1"/>
+          </a:fontRef>
+        </p:style>
+      </p:cxnSp>
+      <p:cxnSp>
+        <p:nvCxnSpPr>
+          <p:cNvPr id="7" name="Straight Arrow Connector 6">
+            <a:extLst>
+              <a:ext uri="{FF2B5EF4-FFF2-40B4-BE49-F238E27FC236}">
+                <a16:creationId xmlns:a16="http://schemas.microsoft.com/office/drawing/2014/main" id="{5C15DD3C-416C-4F7E-8CFE-FA77FCA01199}"/>
+              </a:ext>
+            </a:extLst>
+          </p:cNvPr>
+          <p:cNvCxnSpPr/>
+          <p:nvPr/>
+        </p:nvCxnSpPr>
+        <p:spPr>
+          <a:xfrm>
+            <a:off x="7505700" y="5486400"/>
+            <a:ext cx="3686175" cy="0"/>
+          </a:xfrm>
+          <a:prstGeom prst="straightConnector1">
+            <a:avLst/>
+          </a:prstGeom>
+          <a:ln>
+            <a:tailEnd type="triangle"/>
+          </a:ln>
+        </p:spPr>
+        <p:style>
+          <a:lnRef idx="1">
+            <a:schemeClr val="accent1"/>
+          </a:lnRef>
+          <a:fillRef idx="0">
+            <a:schemeClr val="accent1"/>
+          </a:fillRef>
+          <a:effectRef idx="0">
+            <a:schemeClr val="accent1"/>
+          </a:effectRef>
+          <a:fontRef idx="minor">
+            <a:schemeClr val="tx1"/>
+          </a:fontRef>
+        </p:style>
+      </p:cxnSp>
+      <p:sp>
+        <p:nvSpPr>
+          <p:cNvPr id="8" name="Oval 7">
+            <a:extLst>
+              <a:ext uri="{FF2B5EF4-FFF2-40B4-BE49-F238E27FC236}">
+                <a16:creationId xmlns:a16="http://schemas.microsoft.com/office/drawing/2014/main" id="{B60CEC32-304A-4F5B-BCE7-BBF322B7B554}"/>
+              </a:ext>
+            </a:extLst>
+          </p:cNvPr>
+          <p:cNvSpPr/>
+          <p:nvPr/>
+        </p:nvSpPr>
+        <p:spPr>
+          <a:xfrm>
+            <a:off x="7348540" y="5310190"/>
+            <a:ext cx="314320" cy="314319"/>
+          </a:xfrm>
+          <a:prstGeom prst="ellipse">
+            <a:avLst/>
+          </a:prstGeom>
+        </p:spPr>
+        <p:style>
+          <a:lnRef idx="2">
+            <a:schemeClr val="accent1">
+              <a:shade val="50000"/>
+            </a:schemeClr>
+          </a:lnRef>
+          <a:fillRef idx="1">
+            <a:schemeClr val="accent1"/>
+          </a:fillRef>
+          <a:effectRef idx="0">
+            <a:schemeClr val="accent1"/>
+          </a:effectRef>
+          <a:fontRef idx="minor">
+            <a:schemeClr val="lt1"/>
+          </a:fontRef>
+        </p:style>
+        <p:txBody>
+          <a:bodyPr rtlCol="0" anchor="ctr"/>
+          <a:lstStyle/>
+          <a:p>
+            <a:pPr algn="ctr"/>
+            <a:endParaRPr lang="en-US"/>
+          </a:p>
+        </p:txBody>
+      </p:sp>
+      <p:sp>
+        <p:nvSpPr>
+          <p:cNvPr id="9" name="Oval 8">
+            <a:extLst>
+              <a:ext uri="{FF2B5EF4-FFF2-40B4-BE49-F238E27FC236}">
+                <a16:creationId xmlns:a16="http://schemas.microsoft.com/office/drawing/2014/main" id="{F10203AB-BBA0-4C0E-8089-6840EC6B1516}"/>
+              </a:ext>
+            </a:extLst>
+          </p:cNvPr>
+          <p:cNvSpPr/>
+          <p:nvPr/>
+        </p:nvSpPr>
+        <p:spPr>
+          <a:xfrm>
+            <a:off x="7424742" y="5376865"/>
+            <a:ext cx="161916" cy="180968"/>
+          </a:xfrm>
+          <a:prstGeom prst="ellipse">
+            <a:avLst/>
+          </a:prstGeom>
+          <a:solidFill>
+            <a:schemeClr val="bg1"/>
+          </a:solidFill>
+        </p:spPr>
+        <p:style>
+          <a:lnRef idx="2">
+            <a:schemeClr val="accent1">
+              <a:shade val="50000"/>
+            </a:schemeClr>
+          </a:lnRef>
+          <a:fillRef idx="1">
+            <a:schemeClr val="accent1"/>
+          </a:fillRef>
+          <a:effectRef idx="0">
+            <a:schemeClr val="accent1"/>
+          </a:effectRef>
+          <a:fontRef idx="minor">
+            <a:schemeClr val="lt1"/>
+          </a:fontRef>
+        </p:style>
+        <p:txBody>
+          <a:bodyPr rtlCol="0" anchor="ctr"/>
+          <a:lstStyle/>
+          <a:p>
+            <a:pPr algn="ctr"/>
+            <a:endParaRPr lang="en-US"/>
+          </a:p>
+        </p:txBody>
+      </p:sp>
+      <p:sp>
+        <p:nvSpPr>
+          <p:cNvPr id="10" name="TextBox 9">
+            <a:extLst>
+              <a:ext uri="{FF2B5EF4-FFF2-40B4-BE49-F238E27FC236}">
+                <a16:creationId xmlns:a16="http://schemas.microsoft.com/office/drawing/2014/main" id="{BE5AFCE2-98E4-43ED-9796-C2CABAAFEDFF}"/>
+              </a:ext>
+            </a:extLst>
+          </p:cNvPr>
+          <p:cNvSpPr txBox="1"/>
+          <p:nvPr/>
+        </p:nvSpPr>
+        <p:spPr>
+          <a:xfrm>
+            <a:off x="8681650" y="5557833"/>
+            <a:ext cx="2167901" cy="369332"/>
+          </a:xfrm>
+          <a:prstGeom prst="rect">
+            <a:avLst/>
+          </a:prstGeom>
+          <a:noFill/>
+        </p:spPr>
+        <p:txBody>
+          <a:bodyPr wrap="none" rtlCol="0">
+            <a:spAutoFit/>
+          </a:bodyPr>
+          <a:lstStyle/>
+          <a:p>
+            <a:r>
+              <a:rPr lang="en-US" dirty="0"/>
+              <a:t>Drug 1 concentration</a:t>
+            </a:r>
+          </a:p>
+        </p:txBody>
+      </p:sp>
+      <p:sp>
+        <p:nvSpPr>
+          <p:cNvPr id="11" name="TextBox 10">
+            <a:extLst>
+              <a:ext uri="{FF2B5EF4-FFF2-40B4-BE49-F238E27FC236}">
+                <a16:creationId xmlns:a16="http://schemas.microsoft.com/office/drawing/2014/main" id="{DD0D197A-1D48-4F41-94CF-D15FF9181B22}"/>
+              </a:ext>
+            </a:extLst>
+          </p:cNvPr>
+          <p:cNvSpPr txBox="1"/>
+          <p:nvPr/>
+        </p:nvSpPr>
+        <p:spPr>
+          <a:xfrm rot="16200000">
+            <a:off x="6092898" y="3513416"/>
+            <a:ext cx="2167901" cy="369332"/>
+          </a:xfrm>
+          <a:prstGeom prst="rect">
+            <a:avLst/>
+          </a:prstGeom>
+          <a:noFill/>
+        </p:spPr>
+        <p:txBody>
+          <a:bodyPr wrap="none" rtlCol="0">
+            <a:spAutoFit/>
+          </a:bodyPr>
+          <a:lstStyle/>
+          <a:p>
+            <a:r>
+              <a:rPr lang="en-US" dirty="0"/>
+              <a:t>Drug 2 concentration</a:t>
+            </a:r>
+          </a:p>
+        </p:txBody>
+      </p:sp>
+      <p:sp>
+        <p:nvSpPr>
+          <p:cNvPr id="12" name="TextBox 11">
+            <a:extLst>
+              <a:ext uri="{FF2B5EF4-FFF2-40B4-BE49-F238E27FC236}">
+                <a16:creationId xmlns:a16="http://schemas.microsoft.com/office/drawing/2014/main" id="{325CDB35-3521-4F77-9036-E584A47AAC9D}"/>
+              </a:ext>
+            </a:extLst>
+          </p:cNvPr>
+          <p:cNvSpPr txBox="1"/>
+          <p:nvPr/>
+        </p:nvSpPr>
+        <p:spPr>
+          <a:xfrm>
+            <a:off x="6891523" y="5301343"/>
+            <a:ext cx="914033" cy="646331"/>
+          </a:xfrm>
+          <a:prstGeom prst="rect">
+            <a:avLst/>
+          </a:prstGeom>
+          <a:noFill/>
+        </p:spPr>
+        <p:txBody>
+          <a:bodyPr wrap="none" rtlCol="0">
+            <a:spAutoFit/>
+          </a:bodyPr>
+          <a:lstStyle/>
+          <a:p>
+            <a:r>
+              <a:rPr lang="en-US" dirty="0"/>
+              <a:t>Cell</a:t>
+            </a:r>
+          </a:p>
+          <a:p>
+            <a:r>
+              <a:rPr lang="en-US" dirty="0"/>
+              <a:t>viability</a:t>
+            </a:r>
+          </a:p>
+        </p:txBody>
+      </p:sp>
+      <p:cxnSp>
+        <p:nvCxnSpPr>
+          <p:cNvPr id="14" name="Straight Connector 13">
+            <a:extLst>
+              <a:ext uri="{FF2B5EF4-FFF2-40B4-BE49-F238E27FC236}">
+                <a16:creationId xmlns:a16="http://schemas.microsoft.com/office/drawing/2014/main" id="{FBAC09AF-9D84-4AEC-BD83-384C1C0CA695}"/>
+              </a:ext>
+            </a:extLst>
+          </p:cNvPr>
+          <p:cNvCxnSpPr/>
+          <p:nvPr/>
+        </p:nvCxnSpPr>
+        <p:spPr>
+          <a:xfrm flipV="1">
+            <a:off x="7975692" y="3644143"/>
+            <a:ext cx="2772351" cy="1419225"/>
+          </a:xfrm>
+          <a:prstGeom prst="line">
+            <a:avLst/>
+          </a:prstGeom>
+        </p:spPr>
+        <p:style>
+          <a:lnRef idx="1">
+            <a:schemeClr val="accent1"/>
+          </a:lnRef>
+          <a:fillRef idx="0">
+            <a:schemeClr val="accent1"/>
+          </a:fillRef>
+          <a:effectRef idx="0">
+            <a:schemeClr val="accent1"/>
+          </a:effectRef>
+          <a:fontRef idx="minor">
+            <a:schemeClr val="tx1"/>
+          </a:fontRef>
+        </p:style>
+      </p:cxnSp>
+      <p:sp>
+        <p:nvSpPr>
+          <p:cNvPr id="15" name="Multiplication Sign 14">
+            <a:extLst>
+              <a:ext uri="{FF2B5EF4-FFF2-40B4-BE49-F238E27FC236}">
+                <a16:creationId xmlns:a16="http://schemas.microsoft.com/office/drawing/2014/main" id="{FF25F358-D960-4CF3-82AC-93D51F6D34E3}"/>
+              </a:ext>
+            </a:extLst>
+          </p:cNvPr>
+          <p:cNvSpPr/>
+          <p:nvPr/>
+        </p:nvSpPr>
+        <p:spPr>
+          <a:xfrm>
+            <a:off x="7958137" y="4931568"/>
+            <a:ext cx="238125" cy="233363"/>
+          </a:xfrm>
+          <a:prstGeom prst="mathMultiply">
+            <a:avLst/>
+          </a:prstGeom>
+          <a:solidFill>
+            <a:srgbClr val="FF0000"/>
+          </a:solidFill>
+        </p:spPr>
+        <p:style>
+          <a:lnRef idx="2">
+            <a:schemeClr val="accent1">
+              <a:shade val="50000"/>
+            </a:schemeClr>
+          </a:lnRef>
+          <a:fillRef idx="1">
+            <a:schemeClr val="accent1"/>
+          </a:fillRef>
+          <a:effectRef idx="0">
+            <a:schemeClr val="accent1"/>
+          </a:effectRef>
+          <a:fontRef idx="minor">
+            <a:schemeClr val="lt1"/>
+          </a:fontRef>
+        </p:style>
+        <p:txBody>
+          <a:bodyPr rtlCol="0" anchor="ctr"/>
+          <a:lstStyle/>
+          <a:p>
+            <a:pPr algn="ctr"/>
+            <a:endParaRPr lang="en-US"/>
+          </a:p>
+        </p:txBody>
+      </p:sp>
+      <p:sp>
+        <p:nvSpPr>
+          <p:cNvPr id="16" name="Multiplication Sign 15">
+            <a:extLst>
+              <a:ext uri="{FF2B5EF4-FFF2-40B4-BE49-F238E27FC236}">
+                <a16:creationId xmlns:a16="http://schemas.microsoft.com/office/drawing/2014/main" id="{F2ED463D-9533-46C0-B562-D731C558ACD6}"/>
+              </a:ext>
+            </a:extLst>
+          </p:cNvPr>
+          <p:cNvSpPr/>
+          <p:nvPr/>
+        </p:nvSpPr>
+        <p:spPr>
+          <a:xfrm>
+            <a:off x="8443525" y="4665351"/>
+            <a:ext cx="238125" cy="233363"/>
+          </a:xfrm>
+          <a:prstGeom prst="mathMultiply">
+            <a:avLst/>
+          </a:prstGeom>
+          <a:solidFill>
+            <a:srgbClr val="FF0000"/>
+          </a:solidFill>
+        </p:spPr>
+        <p:style>
+          <a:lnRef idx="2">
+            <a:schemeClr val="accent1">
+              <a:shade val="50000"/>
+            </a:schemeClr>
+          </a:lnRef>
+          <a:fillRef idx="1">
+            <a:schemeClr val="accent1"/>
+          </a:fillRef>
+          <a:effectRef idx="0">
+            <a:schemeClr val="accent1"/>
+          </a:effectRef>
+          <a:fontRef idx="minor">
+            <a:schemeClr val="lt1"/>
+          </a:fontRef>
+        </p:style>
+        <p:txBody>
+          <a:bodyPr rtlCol="0" anchor="ctr"/>
+          <a:lstStyle/>
+          <a:p>
+            <a:pPr algn="ctr"/>
+            <a:endParaRPr lang="en-US"/>
+          </a:p>
+        </p:txBody>
+      </p:sp>
+      <p:sp>
+        <p:nvSpPr>
+          <p:cNvPr id="17" name="Multiplication Sign 16">
+            <a:extLst>
+              <a:ext uri="{FF2B5EF4-FFF2-40B4-BE49-F238E27FC236}">
+                <a16:creationId xmlns:a16="http://schemas.microsoft.com/office/drawing/2014/main" id="{4C67C690-EC5F-4D77-8F51-FA5E52115841}"/>
+              </a:ext>
+            </a:extLst>
+          </p:cNvPr>
+          <p:cNvSpPr/>
+          <p:nvPr/>
+        </p:nvSpPr>
+        <p:spPr>
+          <a:xfrm>
+            <a:off x="9013319" y="4430315"/>
+            <a:ext cx="209550" cy="176213"/>
+          </a:xfrm>
+          <a:prstGeom prst="mathMultiply">
+            <a:avLst/>
+          </a:prstGeom>
+          <a:solidFill>
+            <a:srgbClr val="FF0000"/>
+          </a:solidFill>
+        </p:spPr>
+        <p:style>
+          <a:lnRef idx="2">
+            <a:schemeClr val="accent1">
+              <a:shade val="50000"/>
+            </a:schemeClr>
+          </a:lnRef>
+          <a:fillRef idx="1">
+            <a:schemeClr val="accent1"/>
+          </a:fillRef>
+          <a:effectRef idx="0">
+            <a:schemeClr val="accent1"/>
+          </a:effectRef>
+          <a:fontRef idx="minor">
+            <a:schemeClr val="lt1"/>
+          </a:fontRef>
+        </p:style>
+        <p:txBody>
+          <a:bodyPr rtlCol="0" anchor="ctr"/>
+          <a:lstStyle/>
+          <a:p>
+            <a:pPr algn="ctr"/>
+            <a:endParaRPr lang="en-US"/>
+          </a:p>
+        </p:txBody>
+      </p:sp>
+      <p:sp>
+        <p:nvSpPr>
+          <p:cNvPr id="18" name="Multiplication Sign 17">
+            <a:extLst>
+              <a:ext uri="{FF2B5EF4-FFF2-40B4-BE49-F238E27FC236}">
+                <a16:creationId xmlns:a16="http://schemas.microsoft.com/office/drawing/2014/main" id="{16686CEB-E865-4451-95C4-A68C4DE3C1CB}"/>
+              </a:ext>
+            </a:extLst>
+          </p:cNvPr>
+          <p:cNvSpPr/>
+          <p:nvPr/>
+        </p:nvSpPr>
+        <p:spPr>
+          <a:xfrm>
+            <a:off x="9448050" y="4162576"/>
+            <a:ext cx="238125" cy="233363"/>
+          </a:xfrm>
+          <a:prstGeom prst="mathMultiply">
+            <a:avLst/>
+          </a:prstGeom>
+          <a:solidFill>
+            <a:srgbClr val="FF0000"/>
+          </a:solidFill>
+        </p:spPr>
+        <p:style>
+          <a:lnRef idx="2">
+            <a:schemeClr val="accent1">
+              <a:shade val="50000"/>
+            </a:schemeClr>
+          </a:lnRef>
+          <a:fillRef idx="1">
+            <a:schemeClr val="accent1"/>
+          </a:fillRef>
+          <a:effectRef idx="0">
+            <a:schemeClr val="accent1"/>
+          </a:effectRef>
+          <a:fontRef idx="minor">
+            <a:schemeClr val="lt1"/>
+          </a:fontRef>
+        </p:style>
+        <p:txBody>
+          <a:bodyPr rtlCol="0" anchor="ctr"/>
+          <a:lstStyle/>
+          <a:p>
+            <a:pPr algn="ctr"/>
+            <a:endParaRPr lang="en-US"/>
+          </a:p>
+        </p:txBody>
+      </p:sp>
+      <p:sp>
+        <p:nvSpPr>
+          <p:cNvPr id="19" name="Multiplication Sign 18">
+            <a:extLst>
+              <a:ext uri="{FF2B5EF4-FFF2-40B4-BE49-F238E27FC236}">
+                <a16:creationId xmlns:a16="http://schemas.microsoft.com/office/drawing/2014/main" id="{706A1DDA-37F7-44D6-89F4-899EECA260BD}"/>
+              </a:ext>
+            </a:extLst>
+          </p:cNvPr>
+          <p:cNvSpPr/>
+          <p:nvPr/>
+        </p:nvSpPr>
+        <p:spPr>
+          <a:xfrm>
+            <a:off x="9978623" y="3884612"/>
+            <a:ext cx="238125" cy="233363"/>
+          </a:xfrm>
+          <a:prstGeom prst="mathMultiply">
+            <a:avLst/>
+          </a:prstGeom>
+          <a:solidFill>
+            <a:srgbClr val="FF0000"/>
+          </a:solidFill>
+        </p:spPr>
+        <p:style>
+          <a:lnRef idx="2">
+            <a:schemeClr val="accent1">
+              <a:shade val="50000"/>
+            </a:schemeClr>
+          </a:lnRef>
+          <a:fillRef idx="1">
+            <a:schemeClr val="accent1"/>
+          </a:fillRef>
+          <a:effectRef idx="0">
+            <a:schemeClr val="accent1"/>
+          </a:effectRef>
+          <a:fontRef idx="minor">
+            <a:schemeClr val="lt1"/>
+          </a:fontRef>
+        </p:style>
+        <p:txBody>
+          <a:bodyPr rtlCol="0" anchor="ctr"/>
+          <a:lstStyle/>
+          <a:p>
+            <a:pPr algn="ctr"/>
+            <a:endParaRPr lang="en-US"/>
+          </a:p>
+        </p:txBody>
+      </p:sp>
+      <p:sp>
+        <p:nvSpPr>
+          <p:cNvPr id="20" name="Multiplication Sign 19">
+            <a:extLst>
+              <a:ext uri="{FF2B5EF4-FFF2-40B4-BE49-F238E27FC236}">
+                <a16:creationId xmlns:a16="http://schemas.microsoft.com/office/drawing/2014/main" id="{F1323D51-E793-4412-9100-E7AC12C652BD}"/>
+              </a:ext>
+            </a:extLst>
+          </p:cNvPr>
+          <p:cNvSpPr/>
+          <p:nvPr/>
+        </p:nvSpPr>
+        <p:spPr>
+          <a:xfrm>
+            <a:off x="10479544" y="3651249"/>
+            <a:ext cx="238125" cy="233363"/>
+          </a:xfrm>
+          <a:prstGeom prst="mathMultiply">
+            <a:avLst/>
+          </a:prstGeom>
+          <a:solidFill>
+            <a:srgbClr val="FF0000"/>
+          </a:solidFill>
+        </p:spPr>
+        <p:style>
+          <a:lnRef idx="2">
+            <a:schemeClr val="accent1">
+              <a:shade val="50000"/>
+            </a:schemeClr>
+          </a:lnRef>
+          <a:fillRef idx="1">
+            <a:schemeClr val="accent1"/>
+          </a:fillRef>
+          <a:effectRef idx="0">
+            <a:schemeClr val="accent1"/>
+          </a:effectRef>
+          <a:fontRef idx="minor">
+            <a:schemeClr val="lt1"/>
+          </a:fontRef>
+        </p:style>
+        <p:txBody>
+          <a:bodyPr rtlCol="0" anchor="ctr"/>
+          <a:lstStyle/>
+          <a:p>
+            <a:pPr algn="ctr"/>
+            <a:endParaRPr lang="en-US"/>
+          </a:p>
+        </p:txBody>
+      </p:sp>
+      <p:cxnSp>
+        <p:nvCxnSpPr>
+          <p:cNvPr id="21" name="Straight Arrow Connector 20">
+            <a:extLst>
+              <a:ext uri="{FF2B5EF4-FFF2-40B4-BE49-F238E27FC236}">
+                <a16:creationId xmlns:a16="http://schemas.microsoft.com/office/drawing/2014/main" id="{0442808B-8C8C-49B7-BCF2-61F5CD2C2EBC}"/>
+              </a:ext>
+            </a:extLst>
+          </p:cNvPr>
+          <p:cNvCxnSpPr>
+            <a:cxnSpLocks/>
+          </p:cNvCxnSpPr>
+          <p:nvPr/>
+        </p:nvCxnSpPr>
+        <p:spPr>
+          <a:xfrm flipV="1">
+            <a:off x="1894070" y="4162576"/>
+            <a:ext cx="0" cy="1958427"/>
+          </a:xfrm>
+          <a:prstGeom prst="straightConnector1">
+            <a:avLst/>
+          </a:prstGeom>
+          <a:ln>
+            <a:tailEnd type="triangle"/>
+          </a:ln>
+        </p:spPr>
+        <p:style>
+          <a:lnRef idx="1">
+            <a:schemeClr val="accent1"/>
+          </a:lnRef>
+          <a:fillRef idx="0">
+            <a:schemeClr val="accent1"/>
+          </a:fillRef>
+          <a:effectRef idx="0">
+            <a:schemeClr val="accent1"/>
+          </a:effectRef>
+          <a:fontRef idx="minor">
+            <a:schemeClr val="tx1"/>
+          </a:fontRef>
+        </p:style>
+      </p:cxnSp>
+      <p:sp>
+        <p:nvSpPr>
+          <p:cNvPr id="22" name="TextBox 21">
+            <a:extLst>
+              <a:ext uri="{FF2B5EF4-FFF2-40B4-BE49-F238E27FC236}">
+                <a16:creationId xmlns:a16="http://schemas.microsoft.com/office/drawing/2014/main" id="{4FFBB1A3-D1C0-41F5-86BB-3B5C61D376DD}"/>
+              </a:ext>
+            </a:extLst>
+          </p:cNvPr>
+          <p:cNvSpPr txBox="1"/>
+          <p:nvPr/>
+        </p:nvSpPr>
+        <p:spPr>
+          <a:xfrm>
+            <a:off x="2012152" y="6121002"/>
+            <a:ext cx="3568093" cy="369332"/>
+          </a:xfrm>
+          <a:prstGeom prst="rect">
+            <a:avLst/>
+          </a:prstGeom>
+          <a:noFill/>
+        </p:spPr>
+        <p:txBody>
+          <a:bodyPr wrap="none" rtlCol="0">
+            <a:spAutoFit/>
+          </a:bodyPr>
+          <a:lstStyle/>
+          <a:p>
+            <a:r>
+              <a:rPr lang="en-US" dirty="0"/>
+              <a:t>(drg1_conc^2 + drg2_conc^2)^(0.5) </a:t>
+            </a:r>
+          </a:p>
+        </p:txBody>
+      </p:sp>
+      <p:sp>
+        <p:nvSpPr>
+          <p:cNvPr id="23" name="TextBox 22">
+            <a:extLst>
+              <a:ext uri="{FF2B5EF4-FFF2-40B4-BE49-F238E27FC236}">
+                <a16:creationId xmlns:a16="http://schemas.microsoft.com/office/drawing/2014/main" id="{B0B9AA6F-BEC9-4ED4-8129-DE3BD186AE2E}"/>
+              </a:ext>
+            </a:extLst>
+          </p:cNvPr>
+          <p:cNvSpPr txBox="1"/>
+          <p:nvPr/>
+        </p:nvSpPr>
+        <p:spPr>
+          <a:xfrm rot="16200000">
+            <a:off x="1151442" y="4933022"/>
+            <a:ext cx="971741" cy="369332"/>
+          </a:xfrm>
+          <a:prstGeom prst="rect">
+            <a:avLst/>
+          </a:prstGeom>
+          <a:noFill/>
+        </p:spPr>
+        <p:txBody>
+          <a:bodyPr wrap="none" rtlCol="0">
+            <a:spAutoFit/>
+          </a:bodyPr>
+          <a:lstStyle/>
+          <a:p>
+            <a:r>
+              <a:rPr lang="en-US" dirty="0"/>
+              <a:t>Cell </a:t>
             </a:r>
             <a:r>
               <a:rPr lang="en-US" dirty="0" err="1"/>
-              <a:t>plate_version_id</a:t>
-            </a:r>
-            <a:r>
-              <a:rPr lang="en-US" dirty="0"/>
-              <a:t>=XXXX</a:t>
-            </a:r>
-          </a:p>
-          <a:p>
-            <a:pPr lvl="1"/>
+              <a:t>viab</a:t>
+            </a:r>
             <a:endParaRPr lang="en-US" dirty="0"/>
           </a:p>
-          <a:p>
-            <a:pPr lvl="1"/>
-            <a:endParaRPr lang="en-US" dirty="0"/>
+        </p:txBody>
+      </p:sp>
+      <p:cxnSp>
+        <p:nvCxnSpPr>
+          <p:cNvPr id="24" name="Straight Arrow Connector 23">
+            <a:extLst>
+              <a:ext uri="{FF2B5EF4-FFF2-40B4-BE49-F238E27FC236}">
+                <a16:creationId xmlns:a16="http://schemas.microsoft.com/office/drawing/2014/main" id="{32979A00-9734-473F-A083-46CF3A610393}"/>
+              </a:ext>
+            </a:extLst>
+          </p:cNvPr>
+          <p:cNvCxnSpPr/>
+          <p:nvPr/>
+        </p:nvCxnSpPr>
+        <p:spPr>
+          <a:xfrm>
+            <a:off x="1894070" y="6121002"/>
+            <a:ext cx="3686175" cy="0"/>
+          </a:xfrm>
+          <a:prstGeom prst="straightConnector1">
+            <a:avLst/>
+          </a:prstGeom>
+          <a:ln>
+            <a:tailEnd type="triangle"/>
+          </a:ln>
+        </p:spPr>
+        <p:style>
+          <a:lnRef idx="1">
+            <a:schemeClr val="accent1"/>
+          </a:lnRef>
+          <a:fillRef idx="0">
+            <a:schemeClr val="accent1"/>
+          </a:fillRef>
+          <a:effectRef idx="0">
+            <a:schemeClr val="accent1"/>
+          </a:effectRef>
+          <a:fontRef idx="minor">
+            <a:schemeClr val="tx1"/>
+          </a:fontRef>
+        </p:style>
+      </p:cxnSp>
+      <p:sp>
+        <p:nvSpPr>
+          <p:cNvPr id="28" name="Freeform: Shape 27">
+            <a:extLst>
+              <a:ext uri="{FF2B5EF4-FFF2-40B4-BE49-F238E27FC236}">
+                <a16:creationId xmlns:a16="http://schemas.microsoft.com/office/drawing/2014/main" id="{7443A75E-8707-441A-8FAD-9B33ED1856DB}"/>
+              </a:ext>
+            </a:extLst>
+          </p:cNvPr>
+          <p:cNvSpPr/>
+          <p:nvPr/>
+        </p:nvSpPr>
+        <p:spPr>
+          <a:xfrm>
+            <a:off x="2051038" y="4368430"/>
+            <a:ext cx="3273878" cy="1558735"/>
+          </a:xfrm>
+          <a:custGeom>
+            <a:avLst/>
+            <a:gdLst>
+              <a:gd name="connsiteX0" fmla="*/ 0 w 3273878"/>
+              <a:gd name="connsiteY0" fmla="*/ 0 h 1558735"/>
+              <a:gd name="connsiteX1" fmla="*/ 1510393 w 3273878"/>
+              <a:gd name="connsiteY1" fmla="*/ 261257 h 1558735"/>
+              <a:gd name="connsiteX2" fmla="*/ 2326821 w 3273878"/>
+              <a:gd name="connsiteY2" fmla="*/ 1387929 h 1558735"/>
+              <a:gd name="connsiteX3" fmla="*/ 3273878 w 3273878"/>
+              <a:gd name="connsiteY3" fmla="*/ 1534886 h 1558735"/>
+            </a:gdLst>
+            <a:ahLst/>
+            <a:cxnLst>
+              <a:cxn ang="0">
+                <a:pos x="connsiteX0" y="connsiteY0"/>
+              </a:cxn>
+              <a:cxn ang="0">
+                <a:pos x="connsiteX1" y="connsiteY1"/>
+              </a:cxn>
+              <a:cxn ang="0">
+                <a:pos x="connsiteX2" y="connsiteY2"/>
+              </a:cxn>
+              <a:cxn ang="0">
+                <a:pos x="connsiteX3" y="connsiteY3"/>
+              </a:cxn>
+            </a:cxnLst>
+            <a:rect l="l" t="t" r="r" b="b"/>
+            <a:pathLst>
+              <a:path w="3273878" h="1558735">
+                <a:moveTo>
+                  <a:pt x="0" y="0"/>
+                </a:moveTo>
+                <a:cubicBezTo>
+                  <a:pt x="561295" y="14968"/>
+                  <a:pt x="1122590" y="29936"/>
+                  <a:pt x="1510393" y="261257"/>
+                </a:cubicBezTo>
+                <a:cubicBezTo>
+                  <a:pt x="1898196" y="492578"/>
+                  <a:pt x="2032907" y="1175658"/>
+                  <a:pt x="2326821" y="1387929"/>
+                </a:cubicBezTo>
+                <a:cubicBezTo>
+                  <a:pt x="2620735" y="1600200"/>
+                  <a:pt x="2947306" y="1567543"/>
+                  <a:pt x="3273878" y="1534886"/>
+                </a:cubicBezTo>
+              </a:path>
+            </a:pathLst>
+          </a:custGeom>
+          <a:noFill/>
+          <a:ln>
+            <a:solidFill>
+              <a:srgbClr val="FF0000"/>
+            </a:solidFill>
+          </a:ln>
+        </p:spPr>
+        <p:style>
+          <a:lnRef idx="2">
+            <a:schemeClr val="accent1">
+              <a:shade val="50000"/>
+            </a:schemeClr>
+          </a:lnRef>
+          <a:fillRef idx="1">
+            <a:schemeClr val="accent1"/>
+          </a:fillRef>
+          <a:effectRef idx="0">
+            <a:schemeClr val="accent1"/>
+          </a:effectRef>
+          <a:fontRef idx="minor">
+            <a:schemeClr val="lt1"/>
+          </a:fontRef>
+        </p:style>
+        <p:txBody>
+          <a:bodyPr rtlCol="0" anchor="ctr"/>
+          <a:lstStyle/>
+          <a:p>
+            <a:pPr algn="ctr"/>
+            <a:endParaRPr lang="en-US"/>
           </a:p>
         </p:txBody>
       </p:sp>
     </p:spTree>
     <p:extLst>
       <p:ext uri="{BB962C8B-B14F-4D97-AF65-F5344CB8AC3E}">
-        <p14:creationId xmlns:p14="http://schemas.microsoft.com/office/powerpoint/2010/main" val="3771634021"/>
+        <p14:creationId xmlns:p14="http://schemas.microsoft.com/office/powerpoint/2010/main" val="1481365021"/>
       </p:ext>
     </p:extLst>
   </p:cSld>
@@ -6207,7 +7645,7 @@
           <p:cNvPr id="2" name="Title 1">
             <a:extLst>
               <a:ext uri="{FF2B5EF4-FFF2-40B4-BE49-F238E27FC236}">
-                <a16:creationId xmlns:a16="http://schemas.microsoft.com/office/drawing/2014/main" id="{4C925E0A-FDA2-482C-B32C-BD02E0F5FDD5}"/>
+                <a16:creationId xmlns:a16="http://schemas.microsoft.com/office/drawing/2014/main" id="{0C9934DF-8684-482D-A4AA-A6412C0D074C}"/>
               </a:ext>
             </a:extLst>
           </p:cNvPr>
@@ -6225,7 +7663,7 @@
           <a:p>
             <a:r>
               <a:rPr lang="en-US" dirty="0"/>
-              <a:t>Plate Map Revisions </a:t>
+              <a:t>Overview </a:t>
             </a:r>
           </a:p>
         </p:txBody>
@@ -6235,7 +7673,7 @@
           <p:cNvPr id="3" name="Content Placeholder 2">
             <a:extLst>
               <a:ext uri="{FF2B5EF4-FFF2-40B4-BE49-F238E27FC236}">
-                <a16:creationId xmlns:a16="http://schemas.microsoft.com/office/drawing/2014/main" id="{287DDDA0-A034-491E-AF68-7EC8860582A7}"/>
+                <a16:creationId xmlns:a16="http://schemas.microsoft.com/office/drawing/2014/main" id="{D14D1252-27F6-45E4-AC18-DBBDBC8B95FE}"/>
               </a:ext>
             </a:extLst>
           </p:cNvPr>
@@ -6248,42 +7686,102 @@
         </p:nvSpPr>
         <p:spPr/>
         <p:txBody>
-          <a:bodyPr/>
-          <a:lstStyle/>
-          <a:p>
-            <a:r>
-              <a:rPr lang="en-US" dirty="0"/>
-              <a:t>Drug Names, there are some inconsistencies – need to define clear nomenclature to avoid redundancy. </a:t>
+          <a:bodyPr>
+            <a:normAutofit lnSpcReduction="10000"/>
+          </a:bodyPr>
+          <a:lstStyle/>
+          <a:p>
+            <a:r>
+              <a:rPr lang="en-US" dirty="0"/>
+              <a:t>Number of HNSCC patients:  11 HNSCC patients [7/20] </a:t>
+            </a:r>
+          </a:p>
+          <a:p>
+            <a:r>
+              <a:rPr lang="en-US" dirty="0"/>
+              <a:t>Plate map versions </a:t>
             </a:r>
           </a:p>
           <a:p>
             <a:pPr lvl="1"/>
             <a:r>
               <a:rPr lang="en-US" dirty="0"/>
-              <a:t>I can provide a list of all used names, if someone can review and choose the right names. </a:t>
+              <a:t>Plates 1-3 (rev 001), Plates 1-6 (rev 002) &lt;- combinatorial </a:t>
             </a:r>
           </a:p>
           <a:p>
             <a:pPr lvl="1"/>
             <a:r>
               <a:rPr lang="en-US" dirty="0"/>
-              <a:t>Alternatively, if there is a list of acceptable drug names, I can do it myself. </a:t>
-            </a:r>
-          </a:p>
-          <a:p>
-            <a:r>
-              <a:rPr lang="en-US" dirty="0"/>
-              <a:t>I’d like a review of my concentration mapping [request] </a:t>
+              <a:t>Tyner panels – still need to be re-worked into HNSCC format</a:t>
             </a:r>
           </a:p>
           <a:p>
             <a:pPr lvl="1"/>
             <a:r>
               <a:rPr lang="en-US" dirty="0"/>
-              <a:t>Ashley volunteered to review, but a second pair of eyes would be useful as well. </a:t>
-            </a:r>
-          </a:p>
-          <a:p>
+              <a:t>+1 assay with 7… require additional work </a:t>
+            </a:r>
+          </a:p>
+          <a:p>
+            <a:pPr lvl="1"/>
+            <a:r>
+              <a:rPr lang="en-US" dirty="0"/>
+              <a:t>Excel files with pages: meta, concentration_&lt;num&gt;, inhibitor_&lt;num&gt;</a:t>
+            </a:r>
+          </a:p>
+          <a:p>
+            <a:r>
+              <a:rPr lang="en-US" dirty="0"/>
+              <a:t>Naming convention</a:t>
+            </a:r>
+          </a:p>
+          <a:p>
+            <a:pPr lvl="1"/>
+            <a:r>
+              <a:rPr lang="en-US" dirty="0"/>
+              <a:t>Unique ID for each assay? Or we need to distinguish replicates</a:t>
+            </a:r>
+          </a:p>
+          <a:p>
+            <a:pPr lvl="1"/>
+            <a:r>
+              <a:rPr lang="en-US" dirty="0"/>
+              <a:t>Date of assay? </a:t>
+            </a:r>
+          </a:p>
+          <a:p>
+            <a:pPr lvl="1"/>
+            <a:r>
+              <a:rPr lang="en-US" dirty="0"/>
+              <a:t>MTS sitting time? </a:t>
+            </a:r>
+          </a:p>
+          <a:p>
+            <a:pPr lvl="1"/>
+            <a:r>
+              <a:rPr lang="en-US" dirty="0" err="1"/>
+              <a:t>lab_id</a:t>
+            </a:r>
+            <a:r>
+              <a:rPr lang="en-US" dirty="0"/>
+              <a:t>=XXXXX-norm=XXX-</a:t>
+            </a:r>
+            <a:r>
+              <a:rPr lang="en-US" dirty="0" err="1"/>
+              <a:t>plate_version_id</a:t>
+            </a:r>
+            <a:r>
+              <a:rPr lang="en-US" dirty="0"/>
+              <a:t>=XXXX</a:t>
+            </a:r>
+          </a:p>
+          <a:p>
+            <a:pPr lvl="1"/>
+            <a:endParaRPr lang="en-US" dirty="0"/>
+          </a:p>
+          <a:p>
+            <a:pPr lvl="1"/>
             <a:endParaRPr lang="en-US" dirty="0"/>
           </a:p>
         </p:txBody>
@@ -6291,7 +7789,7 @@
     </p:spTree>
     <p:extLst>
       <p:ext uri="{BB962C8B-B14F-4D97-AF65-F5344CB8AC3E}">
-        <p14:creationId xmlns:p14="http://schemas.microsoft.com/office/powerpoint/2010/main" val="629140933"/>
+        <p14:creationId xmlns:p14="http://schemas.microsoft.com/office/powerpoint/2010/main" val="3771634021"/>
       </p:ext>
     </p:extLst>
   </p:cSld>
@@ -6323,7 +7821,7 @@
           <p:cNvPr id="2" name="Title 1">
             <a:extLst>
               <a:ext uri="{FF2B5EF4-FFF2-40B4-BE49-F238E27FC236}">
-                <a16:creationId xmlns:a16="http://schemas.microsoft.com/office/drawing/2014/main" id="{2A317F86-1610-446D-A724-4889497B751D}"/>
+                <a16:creationId xmlns:a16="http://schemas.microsoft.com/office/drawing/2014/main" id="{4C925E0A-FDA2-482C-B32C-BD02E0F5FDD5}"/>
               </a:ext>
             </a:extLst>
           </p:cNvPr>
@@ -6341,7 +7839,7 @@
           <a:p>
             <a:r>
               <a:rPr lang="en-US" dirty="0"/>
-              <a:t>Data output documentation issues</a:t>
+              <a:t>Plate Map Revisions </a:t>
             </a:r>
           </a:p>
         </p:txBody>
@@ -6351,7 +7849,7 @@
           <p:cNvPr id="3" name="Content Placeholder 2">
             <a:extLst>
               <a:ext uri="{FF2B5EF4-FFF2-40B4-BE49-F238E27FC236}">
-                <a16:creationId xmlns:a16="http://schemas.microsoft.com/office/drawing/2014/main" id="{E5775B40-57DE-42CA-A49B-0046E6B9E424}"/>
+                <a16:creationId xmlns:a16="http://schemas.microsoft.com/office/drawing/2014/main" id="{287DDDA0-A034-491E-AF68-7EC8860582A7}"/>
               </a:ext>
             </a:extLst>
           </p:cNvPr>
@@ -6364,79 +7862,50 @@
         </p:nvSpPr>
         <p:spPr/>
         <p:txBody>
-          <a:bodyPr>
-            <a:normAutofit/>
-          </a:bodyPr>
-          <a:lstStyle/>
-          <a:p>
-            <a:r>
-              <a:rPr lang="en-US" dirty="0"/>
-              <a:t>There are a number of assays that are labeled as having been normalized by positive controls (labeled as “blank490”), however, the output file shows discrepancies that indicate it was not.</a:t>
-            </a:r>
-          </a:p>
-          <a:p>
-            <a:r>
-              <a:rPr lang="en-US" dirty="0"/>
-              <a:t>[</a:t>
-            </a:r>
-            <a:r>
-              <a:rPr lang="en-US" dirty="0" err="1"/>
-              <a:t>lab_id</a:t>
-            </a:r>
-            <a:r>
-              <a:rPr lang="en-US" dirty="0"/>
-              <a:t>=10308,notes=NA]</a:t>
-            </a:r>
-          </a:p>
-          <a:p>
-            <a:r>
-              <a:rPr lang="en-US" dirty="0"/>
-              <a:t>[</a:t>
-            </a:r>
-            <a:r>
-              <a:rPr lang="en-US" dirty="0" err="1"/>
-              <a:t>lab_id</a:t>
-            </a:r>
-            <a:r>
-              <a:rPr lang="en-US" dirty="0"/>
-              <a:t>=10309,notes=matched normal 10308]</a:t>
-            </a:r>
-          </a:p>
-          <a:p>
-            <a:pPr marL="0" indent="0">
-              <a:buNone/>
-            </a:pPr>
+          <a:bodyPr/>
+          <a:lstStyle/>
+          <a:p>
+            <a:r>
+              <a:rPr lang="en-US" dirty="0"/>
+              <a:t>Drug Names, there are some inconsistencies – need to define clear nomenclature to avoid redundancy. </a:t>
+            </a:r>
+          </a:p>
+          <a:p>
+            <a:pPr lvl="1"/>
+            <a:r>
+              <a:rPr lang="en-US" dirty="0"/>
+              <a:t>I can provide a list of all used names, if someone can review and choose the right names. </a:t>
+            </a:r>
+          </a:p>
+          <a:p>
+            <a:pPr lvl="1"/>
+            <a:r>
+              <a:rPr lang="en-US" dirty="0"/>
+              <a:t>Alternatively, if there is a list of acceptable drug names, I can do it myself. </a:t>
+            </a:r>
+          </a:p>
+          <a:p>
+            <a:r>
+              <a:rPr lang="en-US" dirty="0"/>
+              <a:t>I’d like a review of my concentration mapping [request] </a:t>
+            </a:r>
+          </a:p>
+          <a:p>
+            <a:pPr lvl="1"/>
+            <a:r>
+              <a:rPr lang="en-US" dirty="0"/>
+              <a:t>Ashley volunteered to review, but a second pair of eyes would be useful as well. </a:t>
+            </a:r>
+          </a:p>
+          <a:p>
             <a:endParaRPr lang="en-US" dirty="0"/>
-          </a:p>
-          <a:p>
-            <a:pPr marL="0" indent="0">
-              <a:buNone/>
-            </a:pPr>
-            <a:endParaRPr lang="en-US" dirty="0"/>
-          </a:p>
-          <a:p>
-            <a:pPr marL="0" indent="0">
-              <a:buNone/>
-            </a:pPr>
-            <a:r>
-              <a:rPr lang="en-US" dirty="0"/>
-              <a:t>*these two assay outputs don’t have a 26</a:t>
-            </a:r>
-            <a:r>
-              <a:rPr lang="en-US" baseline="30000" dirty="0"/>
-              <a:t>th</a:t>
-            </a:r>
-            <a:r>
-              <a:rPr lang="en-US" dirty="0"/>
-              <a:t> column, which usually says “blank490” in each row. </a:t>
-            </a:r>
           </a:p>
         </p:txBody>
       </p:sp>
     </p:spTree>
     <p:extLst>
       <p:ext uri="{BB962C8B-B14F-4D97-AF65-F5344CB8AC3E}">
-        <p14:creationId xmlns:p14="http://schemas.microsoft.com/office/powerpoint/2010/main" val="4284564905"/>
+        <p14:creationId xmlns:p14="http://schemas.microsoft.com/office/powerpoint/2010/main" val="629140933"/>
       </p:ext>
     </p:extLst>
   </p:cSld>
@@ -6468,7 +7937,7 @@
           <p:cNvPr id="2" name="Title 1">
             <a:extLst>
               <a:ext uri="{FF2B5EF4-FFF2-40B4-BE49-F238E27FC236}">
-                <a16:creationId xmlns:a16="http://schemas.microsoft.com/office/drawing/2014/main" id="{541CAFB3-FD96-4F76-A791-BBC842554556}"/>
+                <a16:creationId xmlns:a16="http://schemas.microsoft.com/office/drawing/2014/main" id="{2A317F86-1610-446D-A724-4889497B751D}"/>
               </a:ext>
             </a:extLst>
           </p:cNvPr>
@@ -6486,7 +7955,7 @@
           <a:p>
             <a:r>
               <a:rPr lang="en-US" dirty="0"/>
-              <a:t>Standing Questions</a:t>
+              <a:t>Data output documentation issues</a:t>
             </a:r>
           </a:p>
         </p:txBody>
@@ -6496,7 +7965,7 @@
           <p:cNvPr id="3" name="Content Placeholder 2">
             <a:extLst>
               <a:ext uri="{FF2B5EF4-FFF2-40B4-BE49-F238E27FC236}">
-                <a16:creationId xmlns:a16="http://schemas.microsoft.com/office/drawing/2014/main" id="{F1B73B27-1B41-4F73-9206-3BA2925E5813}"/>
+                <a16:creationId xmlns:a16="http://schemas.microsoft.com/office/drawing/2014/main" id="{E5775B40-57DE-42CA-A49B-0046E6B9E424}"/>
               </a:ext>
             </a:extLst>
           </p:cNvPr>
@@ -6509,85 +7978,71 @@
         </p:nvSpPr>
         <p:spPr/>
         <p:txBody>
-          <a:bodyPr/>
-          <a:lstStyle/>
-          <a:p>
-            <a:r>
-              <a:rPr lang="en-US" dirty="0"/>
-              <a:t>Blank 490, how is this normalization done?</a:t>
-            </a:r>
-          </a:p>
-          <a:p>
-            <a:r>
-              <a:rPr lang="en-US" dirty="0"/>
-              <a:t>Scope of documentation?   </a:t>
-            </a:r>
-          </a:p>
-          <a:p>
-            <a:pPr lvl="1"/>
-            <a:r>
-              <a:rPr lang="en-US" dirty="0"/>
-              <a:t>Code version control – </a:t>
+          <a:bodyPr>
+            <a:normAutofit/>
+          </a:bodyPr>
+          <a:lstStyle/>
+          <a:p>
+            <a:r>
+              <a:rPr lang="en-US" dirty="0"/>
+              <a:t>There are a number of assays that are labeled as having been normalized by positive controls (labeled as “blank490”), however, the output file shows discrepancies that indicate it was not.</a:t>
+            </a:r>
+          </a:p>
+          <a:p>
+            <a:r>
+              <a:rPr lang="en-US" dirty="0"/>
+              <a:t>[</a:t>
             </a:r>
             <a:r>
               <a:rPr lang="en-US" dirty="0" err="1"/>
-              <a:t>github</a:t>
-            </a:r>
-            <a:r>
-              <a:rPr lang="en-US" dirty="0"/>
-              <a:t> repo? </a:t>
-            </a:r>
-          </a:p>
-          <a:p>
-            <a:pPr lvl="1"/>
+              <a:t>lab_id</a:t>
+            </a:r>
+            <a:r>
+              <a:rPr lang="en-US" dirty="0"/>
+              <a:t>=10308,notes=NA]</a:t>
+            </a:r>
+          </a:p>
+          <a:p>
+            <a:r>
+              <a:rPr lang="en-US" dirty="0"/>
+              <a:t>[</a:t>
+            </a:r>
             <a:r>
               <a:rPr lang="en-US" dirty="0" err="1"/>
-              <a:t>Biocompute</a:t>
-            </a:r>
-            <a:r>
-              <a:rPr lang="en-US" dirty="0"/>
-              <a:t> object </a:t>
-            </a:r>
-          </a:p>
-          <a:p>
-            <a:pPr lvl="1"/>
-            <a:r>
-              <a:rPr lang="en-US" dirty="0"/>
-              <a:t>R/</a:t>
-            </a:r>
-            <a:r>
-              <a:rPr lang="en-US" dirty="0" err="1"/>
-              <a:t>Doxygen</a:t>
-            </a:r>
+              <a:t>lab_id</a:t>
+            </a:r>
+            <a:r>
+              <a:rPr lang="en-US" dirty="0"/>
+              <a:t>=10309,notes=matched normal 10308]</a:t>
+            </a:r>
+          </a:p>
+          <a:p>
+            <a:pPr marL="0" indent="0">
+              <a:buNone/>
+            </a:pPr>
             <a:endParaRPr lang="en-US" dirty="0"/>
           </a:p>
           <a:p>
-            <a:r>
-              <a:rPr lang="en-US" dirty="0"/>
-              <a:t>Scope of testing? </a:t>
-            </a:r>
-          </a:p>
-          <a:p>
-            <a:pPr lvl="1"/>
-            <a:r>
-              <a:rPr lang="en-US" dirty="0"/>
-              <a:t>Doc-testing / unit-testing </a:t>
-            </a:r>
-          </a:p>
-          <a:p>
-            <a:r>
-              <a:rPr lang="en-US" dirty="0"/>
-              <a:t>Language Preference? Currently using mix of python, R, bash</a:t>
-            </a:r>
-          </a:p>
-          <a:p>
-            <a:r>
-              <a:rPr lang="en-US" dirty="0" err="1"/>
-              <a:t>Dockerize</a:t>
-            </a:r>
-            <a:r>
-              <a:rPr lang="en-US" dirty="0"/>
-              <a:t> environment? </a:t>
+            <a:pPr marL="0" indent="0">
+              <a:buNone/>
+            </a:pPr>
+            <a:endParaRPr lang="en-US" dirty="0"/>
+          </a:p>
+          <a:p>
+            <a:pPr marL="0" indent="0">
+              <a:buNone/>
+            </a:pPr>
+            <a:r>
+              <a:rPr lang="en-US" dirty="0"/>
+              <a:t>*these two assay outputs don’t have a 26</a:t>
+            </a:r>
+            <a:r>
+              <a:rPr lang="en-US" baseline="30000" dirty="0"/>
+              <a:t>th</a:t>
+            </a:r>
+            <a:r>
+              <a:rPr lang="en-US" dirty="0"/>
+              <a:t> column, which usually says “blank490” in each row. </a:t>
             </a:r>
           </a:p>
         </p:txBody>
@@ -6595,7 +8050,7 @@
     </p:spTree>
     <p:extLst>
       <p:ext uri="{BB962C8B-B14F-4D97-AF65-F5344CB8AC3E}">
-        <p14:creationId xmlns:p14="http://schemas.microsoft.com/office/powerpoint/2010/main" val="2085471528"/>
+        <p14:creationId xmlns:p14="http://schemas.microsoft.com/office/powerpoint/2010/main" val="4284564905"/>
       </p:ext>
     </p:extLst>
   </p:cSld>
@@ -6627,7 +8082,7 @@
           <p:cNvPr id="2" name="Title 1">
             <a:extLst>
               <a:ext uri="{FF2B5EF4-FFF2-40B4-BE49-F238E27FC236}">
-                <a16:creationId xmlns:a16="http://schemas.microsoft.com/office/drawing/2014/main" id="{9F360E29-9B45-4B5B-98A2-111B090352C2}"/>
+                <a16:creationId xmlns:a16="http://schemas.microsoft.com/office/drawing/2014/main" id="{541CAFB3-FD96-4F76-A791-BBC842554556}"/>
               </a:ext>
             </a:extLst>
           </p:cNvPr>
@@ -6645,7 +8100,7 @@
           <a:p>
             <a:r>
               <a:rPr lang="en-US" dirty="0"/>
-              <a:t>Overview: Map data</a:t>
+              <a:t>Standing Questions</a:t>
             </a:r>
           </a:p>
         </p:txBody>
@@ -6655,7 +8110,7 @@
           <p:cNvPr id="3" name="Content Placeholder 2">
             <a:extLst>
               <a:ext uri="{FF2B5EF4-FFF2-40B4-BE49-F238E27FC236}">
-                <a16:creationId xmlns:a16="http://schemas.microsoft.com/office/drawing/2014/main" id="{FA0710EA-D085-4E5E-A0C6-5941BA94FFD8}"/>
+                <a16:creationId xmlns:a16="http://schemas.microsoft.com/office/drawing/2014/main" id="{F1B73B27-1B41-4F73-9206-3BA2925E5813}"/>
               </a:ext>
             </a:extLst>
           </p:cNvPr>
@@ -6666,281 +8121,87 @@
             <p:ph idx="1"/>
           </p:nvPr>
         </p:nvSpPr>
-        <p:spPr>
-          <a:xfrm>
-            <a:off x="838200" y="4168134"/>
-            <a:ext cx="10515600" cy="527050"/>
-          </a:xfrm>
-          <a:solidFill>
-            <a:schemeClr val="tx1"/>
-          </a:solidFill>
-        </p:spPr>
-        <p:txBody>
-          <a:bodyPr>
-            <a:normAutofit/>
-          </a:bodyPr>
-          <a:lstStyle/>
-          <a:p>
-            <a:pPr marL="0" indent="0">
-              <a:buNone/>
-            </a:pPr>
-            <a:r>
-              <a:rPr lang="en-US" dirty="0">
-                <a:solidFill>
-                  <a:schemeClr val="bg1"/>
-                </a:solidFill>
-              </a:rPr>
-              <a:t>$ python ./python/HNSCC_plate_data_mapper.py ./</a:t>
-            </a:r>
-            <a:r>
-              <a:rPr lang="en-US" dirty="0" err="1">
-                <a:solidFill>
-                  <a:schemeClr val="bg1"/>
-                </a:solidFill>
-              </a:rPr>
-              <a:t>plate_maps</a:t>
-            </a:r>
-            <a:r>
-              <a:rPr lang="en-US" dirty="0">
-                <a:solidFill>
-                  <a:schemeClr val="bg1"/>
-                </a:solidFill>
-              </a:rPr>
-              <a:t> ./data</a:t>
-            </a:r>
-          </a:p>
-          <a:p>
-            <a:pPr marL="0" indent="0">
-              <a:buNone/>
-            </a:pPr>
+        <p:spPr/>
+        <p:txBody>
+          <a:bodyPr/>
+          <a:lstStyle/>
+          <a:p>
+            <a:r>
+              <a:rPr lang="en-US" dirty="0"/>
+              <a:t>Blank 490, how is this normalization done?</a:t>
+            </a:r>
+          </a:p>
+          <a:p>
+            <a:r>
+              <a:rPr lang="en-US" dirty="0"/>
+              <a:t>Scope of documentation?   </a:t>
+            </a:r>
+          </a:p>
+          <a:p>
+            <a:pPr lvl="1"/>
+            <a:r>
+              <a:rPr lang="en-US" dirty="0"/>
+              <a:t>Code version control – </a:t>
+            </a:r>
+            <a:r>
+              <a:rPr lang="en-US" dirty="0" err="1"/>
+              <a:t>github</a:t>
+            </a:r>
+            <a:r>
+              <a:rPr lang="en-US" dirty="0"/>
+              <a:t> repo? </a:t>
+            </a:r>
+          </a:p>
+          <a:p>
+            <a:pPr lvl="1"/>
+            <a:r>
+              <a:rPr lang="en-US" dirty="0" err="1"/>
+              <a:t>Biocompute</a:t>
+            </a:r>
+            <a:r>
+              <a:rPr lang="en-US" dirty="0"/>
+              <a:t> object </a:t>
+            </a:r>
+          </a:p>
+          <a:p>
+            <a:pPr lvl="1"/>
+            <a:r>
+              <a:rPr lang="en-US" dirty="0"/>
+              <a:t>R/</a:t>
+            </a:r>
+            <a:r>
+              <a:rPr lang="en-US" dirty="0" err="1"/>
+              <a:t>Doxygen</a:t>
+            </a:r>
             <a:endParaRPr lang="en-US" dirty="0"/>
           </a:p>
-        </p:txBody>
-      </p:sp>
-      <p:pic>
-        <p:nvPicPr>
-          <p:cNvPr id="4" name="Picture 3">
-            <a:extLst>
-              <a:ext uri="{FF2B5EF4-FFF2-40B4-BE49-F238E27FC236}">
-                <a16:creationId xmlns:a16="http://schemas.microsoft.com/office/drawing/2014/main" id="{7FA2CC9D-BFEB-4B5D-88AF-E714897551B1}"/>
-              </a:ext>
-            </a:extLst>
-          </p:cNvPr>
-          <p:cNvPicPr>
-            <a:picLocks noChangeAspect="1"/>
-          </p:cNvPicPr>
-          <p:nvPr/>
-        </p:nvPicPr>
-        <p:blipFill>
-          <a:blip r:embed="rId2"/>
-          <a:stretch>
-            <a:fillRect/>
-          </a:stretch>
-        </p:blipFill>
-        <p:spPr>
-          <a:xfrm>
-            <a:off x="838199" y="2025361"/>
-            <a:ext cx="5166629" cy="1155989"/>
-          </a:xfrm>
-          <a:prstGeom prst="rect">
-            <a:avLst/>
-          </a:prstGeom>
-        </p:spPr>
-      </p:pic>
-      <p:pic>
-        <p:nvPicPr>
-          <p:cNvPr id="5" name="Picture 4">
-            <a:extLst>
-              <a:ext uri="{FF2B5EF4-FFF2-40B4-BE49-F238E27FC236}">
-                <a16:creationId xmlns:a16="http://schemas.microsoft.com/office/drawing/2014/main" id="{751211C4-0F36-4B7E-B294-3A95CA8C9A28}"/>
-              </a:ext>
-            </a:extLst>
-          </p:cNvPr>
-          <p:cNvPicPr>
-            <a:picLocks noChangeAspect="1"/>
-          </p:cNvPicPr>
-          <p:nvPr/>
-        </p:nvPicPr>
-        <p:blipFill>
-          <a:blip r:embed="rId3"/>
-          <a:stretch>
-            <a:fillRect/>
-          </a:stretch>
-        </p:blipFill>
-        <p:spPr>
-          <a:xfrm>
-            <a:off x="6305550" y="452646"/>
-            <a:ext cx="3543300" cy="2114125"/>
-          </a:xfrm>
-          <a:prstGeom prst="rect">
-            <a:avLst/>
-          </a:prstGeom>
-        </p:spPr>
-      </p:pic>
-      <p:pic>
-        <p:nvPicPr>
-          <p:cNvPr id="6" name="Picture 5">
-            <a:extLst>
-              <a:ext uri="{FF2B5EF4-FFF2-40B4-BE49-F238E27FC236}">
-                <a16:creationId xmlns:a16="http://schemas.microsoft.com/office/drawing/2014/main" id="{2BC8002F-5D88-4758-B6C4-1310A8656676}"/>
-              </a:ext>
-            </a:extLst>
-          </p:cNvPr>
-          <p:cNvPicPr>
-            <a:picLocks noChangeAspect="1"/>
-          </p:cNvPicPr>
-          <p:nvPr/>
-        </p:nvPicPr>
-        <p:blipFill>
-          <a:blip r:embed="rId4"/>
-          <a:stretch>
-            <a:fillRect/>
-          </a:stretch>
-        </p:blipFill>
-        <p:spPr>
-          <a:xfrm>
-            <a:off x="6305550" y="2686166"/>
-            <a:ext cx="4924425" cy="1013540"/>
-          </a:xfrm>
-          <a:prstGeom prst="rect">
-            <a:avLst/>
-          </a:prstGeom>
-        </p:spPr>
-      </p:pic>
-      <p:pic>
-        <p:nvPicPr>
-          <p:cNvPr id="7" name="Picture 6">
-            <a:extLst>
-              <a:ext uri="{FF2B5EF4-FFF2-40B4-BE49-F238E27FC236}">
-                <a16:creationId xmlns:a16="http://schemas.microsoft.com/office/drawing/2014/main" id="{86785D44-A0F5-4478-9A4B-C1BE5CEA9A7A}"/>
-              </a:ext>
-            </a:extLst>
-          </p:cNvPr>
-          <p:cNvPicPr>
-            <a:picLocks noChangeAspect="1"/>
-          </p:cNvPicPr>
-          <p:nvPr/>
-        </p:nvPicPr>
-        <p:blipFill>
-          <a:blip r:embed="rId5"/>
-          <a:stretch>
-            <a:fillRect/>
-          </a:stretch>
-        </p:blipFill>
-        <p:spPr>
-          <a:xfrm>
-            <a:off x="838200" y="5273087"/>
-            <a:ext cx="1352550" cy="1364250"/>
-          </a:xfrm>
-          <a:prstGeom prst="rect">
-            <a:avLst/>
-          </a:prstGeom>
-        </p:spPr>
-      </p:pic>
-      <p:pic>
-        <p:nvPicPr>
-          <p:cNvPr id="8" name="Picture 7">
-            <a:extLst>
-              <a:ext uri="{FF2B5EF4-FFF2-40B4-BE49-F238E27FC236}">
-                <a16:creationId xmlns:a16="http://schemas.microsoft.com/office/drawing/2014/main" id="{024E0D60-02ED-4BBE-AFC0-90140B566B07}"/>
-              </a:ext>
-            </a:extLst>
-          </p:cNvPr>
-          <p:cNvPicPr>
-            <a:picLocks noChangeAspect="1"/>
-          </p:cNvPicPr>
-          <p:nvPr/>
-        </p:nvPicPr>
-        <p:blipFill>
-          <a:blip r:embed="rId6"/>
-          <a:stretch>
-            <a:fillRect/>
-          </a:stretch>
-        </p:blipFill>
-        <p:spPr>
-          <a:xfrm>
-            <a:off x="3933826" y="5334354"/>
-            <a:ext cx="7658100" cy="1302983"/>
-          </a:xfrm>
-          <a:prstGeom prst="rect">
-            <a:avLst/>
-          </a:prstGeom>
-        </p:spPr>
-      </p:pic>
-      <p:sp>
-        <p:nvSpPr>
-          <p:cNvPr id="9" name="TextBox 8">
-            <a:extLst>
-              <a:ext uri="{FF2B5EF4-FFF2-40B4-BE49-F238E27FC236}">
-                <a16:creationId xmlns:a16="http://schemas.microsoft.com/office/drawing/2014/main" id="{0D4309C0-85CA-4E6D-AB16-BF476D6B8B89}"/>
-              </a:ext>
-            </a:extLst>
-          </p:cNvPr>
-          <p:cNvSpPr txBox="1"/>
-          <p:nvPr/>
-        </p:nvSpPr>
-        <p:spPr>
-          <a:xfrm>
-            <a:off x="523875" y="4903755"/>
-            <a:ext cx="2394566" cy="369332"/>
-          </a:xfrm>
-          <a:prstGeom prst="rect">
-            <a:avLst/>
-          </a:prstGeom>
-          <a:noFill/>
-        </p:spPr>
-        <p:txBody>
-          <a:bodyPr wrap="none" rtlCol="0">
-            <a:spAutoFit/>
-          </a:bodyPr>
-          <a:lstStyle/>
-          <a:p>
-            <a:r>
-              <a:rPr lang="en-US" dirty="0"/>
-              <a:t>Unique inhibitor names</a:t>
-            </a:r>
-          </a:p>
-        </p:txBody>
-      </p:sp>
-      <p:sp>
-        <p:nvSpPr>
-          <p:cNvPr id="10" name="TextBox 9">
-            <a:extLst>
-              <a:ext uri="{FF2B5EF4-FFF2-40B4-BE49-F238E27FC236}">
-                <a16:creationId xmlns:a16="http://schemas.microsoft.com/office/drawing/2014/main" id="{0B536242-8FC1-429F-92FF-1463E5AF1A41}"/>
-              </a:ext>
-            </a:extLst>
-          </p:cNvPr>
-          <p:cNvSpPr txBox="1"/>
-          <p:nvPr/>
-        </p:nvSpPr>
-        <p:spPr>
-          <a:xfrm>
-            <a:off x="4029093" y="4924283"/>
-            <a:ext cx="7071744" cy="369332"/>
-          </a:xfrm>
-          <a:prstGeom prst="rect">
-            <a:avLst/>
-          </a:prstGeom>
-          <a:noFill/>
-        </p:spPr>
-        <p:txBody>
-          <a:bodyPr wrap="none" rtlCol="0">
-            <a:spAutoFit/>
-          </a:bodyPr>
-          <a:lstStyle/>
-          <a:p>
-            <a:r>
-              <a:rPr lang="en-US" dirty="0"/>
-              <a:t>Functional Data: position, </a:t>
-            </a:r>
+          <a:p>
+            <a:r>
+              <a:rPr lang="en-US" dirty="0"/>
+              <a:t>Scope of testing? </a:t>
+            </a:r>
+          </a:p>
+          <a:p>
+            <a:pPr lvl="1"/>
+            <a:r>
+              <a:rPr lang="en-US" dirty="0"/>
+              <a:t>Doc-testing / unit-testing </a:t>
+            </a:r>
+          </a:p>
+          <a:p>
+            <a:r>
+              <a:rPr lang="en-US" dirty="0"/>
+              <a:t>Language Preference? Currently using mix of python, R, bash</a:t>
+            </a:r>
+          </a:p>
+          <a:p>
             <a:r>
               <a:rPr lang="en-US" dirty="0" err="1"/>
-              <a:t>lab_id</a:t>
-            </a:r>
-            <a:r>
-              <a:rPr lang="en-US" dirty="0"/>
-              <a:t> -&gt; concentration, inhibitor (long format) </a:t>
+              <a:t>Dockerize</a:t>
+            </a:r>
+            <a:r>
+              <a:rPr lang="en-US" dirty="0"/>
+              <a:t> environment? </a:t>
             </a:r>
           </a:p>
         </p:txBody>
@@ -6948,7 +8209,113 @@
     </p:spTree>
     <p:extLst>
       <p:ext uri="{BB962C8B-B14F-4D97-AF65-F5344CB8AC3E}">
-        <p14:creationId xmlns:p14="http://schemas.microsoft.com/office/powerpoint/2010/main" val="4159740835"/>
+        <p14:creationId xmlns:p14="http://schemas.microsoft.com/office/powerpoint/2010/main" val="2085471528"/>
+      </p:ext>
+    </p:extLst>
+  </p:cSld>
+  <p:clrMapOvr>
+    <a:masterClrMapping/>
+  </p:clrMapOvr>
+</p:sld>
+</file>
+
+<file path=ppt/slides/slide9.xml><?xml version="1.0" encoding="utf-8"?>
+<p:sld xmlns:a="http://schemas.openxmlformats.org/drawingml/2006/main" xmlns:r="http://schemas.openxmlformats.org/officeDocument/2006/relationships" xmlns:p="http://schemas.openxmlformats.org/presentationml/2006/main">
+  <p:cSld>
+    <p:spTree>
+      <p:nvGrpSpPr>
+        <p:cNvPr id="1" name=""/>
+        <p:cNvGrpSpPr/>
+        <p:nvPr/>
+      </p:nvGrpSpPr>
+      <p:grpSpPr>
+        <a:xfrm>
+          <a:off x="0" y="0"/>
+          <a:ext cx="0" cy="0"/>
+          <a:chOff x="0" y="0"/>
+          <a:chExt cx="0" cy="0"/>
+        </a:xfrm>
+      </p:grpSpPr>
+      <p:sp>
+        <p:nvSpPr>
+          <p:cNvPr id="2" name="Title 1">
+            <a:extLst>
+              <a:ext uri="{FF2B5EF4-FFF2-40B4-BE49-F238E27FC236}">
+                <a16:creationId xmlns:a16="http://schemas.microsoft.com/office/drawing/2014/main" id="{4237EC28-2B26-49FD-A131-DB5B6A520B7D}"/>
+              </a:ext>
+            </a:extLst>
+          </p:cNvPr>
+          <p:cNvSpPr>
+            <a:spLocks noGrp="1"/>
+          </p:cNvSpPr>
+          <p:nvPr>
+            <p:ph type="title"/>
+          </p:nvPr>
+        </p:nvSpPr>
+        <p:spPr/>
+        <p:txBody>
+          <a:bodyPr/>
+          <a:lstStyle/>
+          <a:p>
+            <a:r>
+              <a:rPr lang="en-US" dirty="0"/>
+              <a:t>Verification </a:t>
+            </a:r>
+          </a:p>
+        </p:txBody>
+      </p:sp>
+      <p:sp>
+        <p:nvSpPr>
+          <p:cNvPr id="3" name="Content Placeholder 2">
+            <a:extLst>
+              <a:ext uri="{FF2B5EF4-FFF2-40B4-BE49-F238E27FC236}">
+                <a16:creationId xmlns:a16="http://schemas.microsoft.com/office/drawing/2014/main" id="{5397CA38-22D3-4A95-893E-CB1214384E6A}"/>
+              </a:ext>
+            </a:extLst>
+          </p:cNvPr>
+          <p:cNvSpPr>
+            <a:spLocks noGrp="1"/>
+          </p:cNvSpPr>
+          <p:nvPr>
+            <p:ph idx="1"/>
+          </p:nvPr>
+        </p:nvSpPr>
+        <p:spPr/>
+        <p:txBody>
+          <a:bodyPr/>
+          <a:lstStyle/>
+          <a:p>
+            <a:r>
+              <a:rPr lang="en-US" dirty="0"/>
+              <a:t>Run </a:t>
+            </a:r>
+            <a:r>
+              <a:rPr lang="en-US" dirty="0" err="1"/>
+              <a:t>beatAML</a:t>
+            </a:r>
+            <a:r>
+              <a:rPr lang="en-US" dirty="0"/>
+              <a:t> data and compare to values </a:t>
+            </a:r>
+          </a:p>
+          <a:p>
+            <a:r>
+              <a:rPr lang="en-US" dirty="0"/>
+              <a:t>Unit testing </a:t>
+            </a:r>
+          </a:p>
+          <a:p>
+            <a:r>
+              <a:rPr lang="en-US" dirty="0"/>
+              <a:t>Doc testing</a:t>
+            </a:r>
+          </a:p>
+        </p:txBody>
+      </p:sp>
+    </p:spTree>
+    <p:extLst>
+      <p:ext uri="{BB962C8B-B14F-4D97-AF65-F5344CB8AC3E}">
+        <p14:creationId xmlns:p14="http://schemas.microsoft.com/office/powerpoint/2010/main" val="2935630697"/>
       </p:ext>
     </p:extLst>
   </p:cSld>

</xml_diff>

<commit_message>
updated ppt to include slide on probit convergence issues with perfect separation
</commit_message>
<xml_diff>
--- a/docs/HNSCC_functional_assay_pipeline_development.pptx
+++ b/docs/HNSCC_functional_assay_pipeline_development.pptx
@@ -9,12 +9,13 @@
     <p:sldId id="260" r:id="rId3"/>
     <p:sldId id="263" r:id="rId4"/>
     <p:sldId id="264" r:id="rId5"/>
-    <p:sldId id="257" r:id="rId6"/>
-    <p:sldId id="258" r:id="rId7"/>
-    <p:sldId id="261" r:id="rId8"/>
-    <p:sldId id="259" r:id="rId9"/>
-    <p:sldId id="265" r:id="rId10"/>
-    <p:sldId id="262" r:id="rId11"/>
+    <p:sldId id="266" r:id="rId6"/>
+    <p:sldId id="257" r:id="rId7"/>
+    <p:sldId id="258" r:id="rId8"/>
+    <p:sldId id="261" r:id="rId9"/>
+    <p:sldId id="259" r:id="rId10"/>
+    <p:sldId id="265" r:id="rId11"/>
+    <p:sldId id="262" r:id="rId12"/>
   </p:sldIdLst>
   <p:sldSz cx="12192000" cy="6858000"/>
   <p:notesSz cx="6858000" cy="9144000"/>
@@ -268,7 +269,7 @@
           <a:p>
             <a:fld id="{ABBD65A0-F140-476D-B606-1C9D07B9F5C7}" type="datetimeFigureOut">
               <a:rPr lang="en-US" smtClean="0"/>
-              <a:t>8/14/2019</a:t>
+              <a:t>8/15/2019</a:t>
             </a:fld>
             <a:endParaRPr lang="en-US"/>
           </a:p>
@@ -466,7 +467,7 @@
           <a:p>
             <a:fld id="{ABBD65A0-F140-476D-B606-1C9D07B9F5C7}" type="datetimeFigureOut">
               <a:rPr lang="en-US" smtClean="0"/>
-              <a:t>8/14/2019</a:t>
+              <a:t>8/15/2019</a:t>
             </a:fld>
             <a:endParaRPr lang="en-US"/>
           </a:p>
@@ -674,7 +675,7 @@
           <a:p>
             <a:fld id="{ABBD65A0-F140-476D-B606-1C9D07B9F5C7}" type="datetimeFigureOut">
               <a:rPr lang="en-US" smtClean="0"/>
-              <a:t>8/14/2019</a:t>
+              <a:t>8/15/2019</a:t>
             </a:fld>
             <a:endParaRPr lang="en-US"/>
           </a:p>
@@ -872,7 +873,7 @@
           <a:p>
             <a:fld id="{ABBD65A0-F140-476D-B606-1C9D07B9F5C7}" type="datetimeFigureOut">
               <a:rPr lang="en-US" smtClean="0"/>
-              <a:t>8/14/2019</a:t>
+              <a:t>8/15/2019</a:t>
             </a:fld>
             <a:endParaRPr lang="en-US"/>
           </a:p>
@@ -1147,7 +1148,7 @@
           <a:p>
             <a:fld id="{ABBD65A0-F140-476D-B606-1C9D07B9F5C7}" type="datetimeFigureOut">
               <a:rPr lang="en-US" smtClean="0"/>
-              <a:t>8/14/2019</a:t>
+              <a:t>8/15/2019</a:t>
             </a:fld>
             <a:endParaRPr lang="en-US"/>
           </a:p>
@@ -1412,7 +1413,7 @@
           <a:p>
             <a:fld id="{ABBD65A0-F140-476D-B606-1C9D07B9F5C7}" type="datetimeFigureOut">
               <a:rPr lang="en-US" smtClean="0"/>
-              <a:t>8/14/2019</a:t>
+              <a:t>8/15/2019</a:t>
             </a:fld>
             <a:endParaRPr lang="en-US"/>
           </a:p>
@@ -1824,7 +1825,7 @@
           <a:p>
             <a:fld id="{ABBD65A0-F140-476D-B606-1C9D07B9F5C7}" type="datetimeFigureOut">
               <a:rPr lang="en-US" smtClean="0"/>
-              <a:t>8/14/2019</a:t>
+              <a:t>8/15/2019</a:t>
             </a:fld>
             <a:endParaRPr lang="en-US"/>
           </a:p>
@@ -1965,7 +1966,7 @@
           <a:p>
             <a:fld id="{ABBD65A0-F140-476D-B606-1C9D07B9F5C7}" type="datetimeFigureOut">
               <a:rPr lang="en-US" smtClean="0"/>
-              <a:t>8/14/2019</a:t>
+              <a:t>8/15/2019</a:t>
             </a:fld>
             <a:endParaRPr lang="en-US"/>
           </a:p>
@@ -2078,7 +2079,7 @@
           <a:p>
             <a:fld id="{ABBD65A0-F140-476D-B606-1C9D07B9F5C7}" type="datetimeFigureOut">
               <a:rPr lang="en-US" smtClean="0"/>
-              <a:t>8/14/2019</a:t>
+              <a:t>8/15/2019</a:t>
             </a:fld>
             <a:endParaRPr lang="en-US"/>
           </a:p>
@@ -2389,7 +2390,7 @@
           <a:p>
             <a:fld id="{ABBD65A0-F140-476D-B606-1C9D07B9F5C7}" type="datetimeFigureOut">
               <a:rPr lang="en-US" smtClean="0"/>
-              <a:t>8/14/2019</a:t>
+              <a:t>8/15/2019</a:t>
             </a:fld>
             <a:endParaRPr lang="en-US"/>
           </a:p>
@@ -2677,7 +2678,7 @@
           <a:p>
             <a:fld id="{ABBD65A0-F140-476D-B606-1C9D07B9F5C7}" type="datetimeFigureOut">
               <a:rPr lang="en-US" smtClean="0"/>
-              <a:t>8/14/2019</a:t>
+              <a:t>8/15/2019</a:t>
             </a:fld>
             <a:endParaRPr lang="en-US"/>
           </a:p>
@@ -2918,7 +2919,7 @@
           <a:p>
             <a:fld id="{ABBD65A0-F140-476D-B606-1C9D07B9F5C7}" type="datetimeFigureOut">
               <a:rPr lang="en-US" smtClean="0"/>
-              <a:t>8/14/2019</a:t>
+              <a:t>8/15/2019</a:t>
             </a:fld>
             <a:endParaRPr lang="en-US"/>
           </a:p>
@@ -3426,6 +3427,112 @@
           <p:cNvPr id="2" name="Title 1">
             <a:extLst>
               <a:ext uri="{FF2B5EF4-FFF2-40B4-BE49-F238E27FC236}">
+                <a16:creationId xmlns:a16="http://schemas.microsoft.com/office/drawing/2014/main" id="{4237EC28-2B26-49FD-A131-DB5B6A520B7D}"/>
+              </a:ext>
+            </a:extLst>
+          </p:cNvPr>
+          <p:cNvSpPr>
+            <a:spLocks noGrp="1"/>
+          </p:cNvSpPr>
+          <p:nvPr>
+            <p:ph type="title"/>
+          </p:nvPr>
+        </p:nvSpPr>
+        <p:spPr/>
+        <p:txBody>
+          <a:bodyPr/>
+          <a:lstStyle/>
+          <a:p>
+            <a:r>
+              <a:rPr lang="en-US" dirty="0"/>
+              <a:t>Verification </a:t>
+            </a:r>
+          </a:p>
+        </p:txBody>
+      </p:sp>
+      <p:sp>
+        <p:nvSpPr>
+          <p:cNvPr id="3" name="Content Placeholder 2">
+            <a:extLst>
+              <a:ext uri="{FF2B5EF4-FFF2-40B4-BE49-F238E27FC236}">
+                <a16:creationId xmlns:a16="http://schemas.microsoft.com/office/drawing/2014/main" id="{5397CA38-22D3-4A95-893E-CB1214384E6A}"/>
+              </a:ext>
+            </a:extLst>
+          </p:cNvPr>
+          <p:cNvSpPr>
+            <a:spLocks noGrp="1"/>
+          </p:cNvSpPr>
+          <p:nvPr>
+            <p:ph idx="1"/>
+          </p:nvPr>
+        </p:nvSpPr>
+        <p:spPr/>
+        <p:txBody>
+          <a:bodyPr/>
+          <a:lstStyle/>
+          <a:p>
+            <a:r>
+              <a:rPr lang="en-US" dirty="0"/>
+              <a:t>Run </a:t>
+            </a:r>
+            <a:r>
+              <a:rPr lang="en-US" dirty="0" err="1"/>
+              <a:t>beatAML</a:t>
+            </a:r>
+            <a:r>
+              <a:rPr lang="en-US" dirty="0"/>
+              <a:t> data and compare to values </a:t>
+            </a:r>
+          </a:p>
+          <a:p>
+            <a:r>
+              <a:rPr lang="en-US" dirty="0"/>
+              <a:t>Unit testing </a:t>
+            </a:r>
+          </a:p>
+          <a:p>
+            <a:r>
+              <a:rPr lang="en-US" dirty="0"/>
+              <a:t>Doc testing</a:t>
+            </a:r>
+          </a:p>
+        </p:txBody>
+      </p:sp>
+    </p:spTree>
+    <p:extLst>
+      <p:ext uri="{BB962C8B-B14F-4D97-AF65-F5344CB8AC3E}">
+        <p14:creationId xmlns:p14="http://schemas.microsoft.com/office/powerpoint/2010/main" val="2935630697"/>
+      </p:ext>
+    </p:extLst>
+  </p:cSld>
+  <p:clrMapOvr>
+    <a:masterClrMapping/>
+  </p:clrMapOvr>
+</p:sld>
+</file>
+
+<file path=ppt/slides/slide11.xml><?xml version="1.0" encoding="utf-8"?>
+<p:sld xmlns:a="http://schemas.openxmlformats.org/drawingml/2006/main" xmlns:r="http://schemas.openxmlformats.org/officeDocument/2006/relationships" xmlns:p="http://schemas.openxmlformats.org/presentationml/2006/main">
+  <p:cSld>
+    <p:spTree>
+      <p:nvGrpSpPr>
+        <p:cNvPr id="1" name=""/>
+        <p:cNvGrpSpPr/>
+        <p:nvPr/>
+      </p:nvGrpSpPr>
+      <p:grpSpPr>
+        <a:xfrm>
+          <a:off x="0" y="0"/>
+          <a:ext cx="0" cy="0"/>
+          <a:chOff x="0" y="0"/>
+          <a:chExt cx="0" cy="0"/>
+        </a:xfrm>
+      </p:grpSpPr>
+      <p:sp>
+        <p:nvSpPr>
+          <p:cNvPr id="2" name="Title 1">
+            <a:extLst>
+              <a:ext uri="{FF2B5EF4-FFF2-40B4-BE49-F238E27FC236}">
                 <a16:creationId xmlns:a16="http://schemas.microsoft.com/office/drawing/2014/main" id="{9F360E29-9B45-4B5B-98A2-111B090352C2}"/>
               </a:ext>
             </a:extLst>
@@ -7645,7 +7752,7 @@
           <p:cNvPr id="2" name="Title 1">
             <a:extLst>
               <a:ext uri="{FF2B5EF4-FFF2-40B4-BE49-F238E27FC236}">
-                <a16:creationId xmlns:a16="http://schemas.microsoft.com/office/drawing/2014/main" id="{0C9934DF-8684-482D-A4AA-A6412C0D074C}"/>
+                <a16:creationId xmlns:a16="http://schemas.microsoft.com/office/drawing/2014/main" id="{43B430A9-25ED-481A-B22A-EA4DAB1D18BC}"/>
               </a:ext>
             </a:extLst>
           </p:cNvPr>
@@ -7662,8 +7769,12 @@
           <a:lstStyle/>
           <a:p>
             <a:r>
-              <a:rPr lang="en-US" dirty="0"/>
-              <a:t>Overview </a:t>
+              <a:rPr lang="en-US" dirty="0" err="1"/>
+              <a:t>Probit</a:t>
+            </a:r>
+            <a:r>
+              <a:rPr lang="en-US" dirty="0"/>
+              <a:t> Fitting Convergence</a:t>
             </a:r>
           </a:p>
         </p:txBody>
@@ -7673,7 +7784,7 @@
           <p:cNvPr id="3" name="Content Placeholder 2">
             <a:extLst>
               <a:ext uri="{FF2B5EF4-FFF2-40B4-BE49-F238E27FC236}">
-                <a16:creationId xmlns:a16="http://schemas.microsoft.com/office/drawing/2014/main" id="{D14D1252-27F6-45E4-AC18-DBBDBC8B95FE}"/>
+                <a16:creationId xmlns:a16="http://schemas.microsoft.com/office/drawing/2014/main" id="{2479A295-7211-447A-93F5-5C45A4AEBCA3}"/>
               </a:ext>
             </a:extLst>
           </p:cNvPr>
@@ -7686,102 +7797,39 @@
         </p:nvSpPr>
         <p:spPr/>
         <p:txBody>
-          <a:bodyPr>
-            <a:normAutofit lnSpcReduction="10000"/>
-          </a:bodyPr>
-          <a:lstStyle/>
-          <a:p>
-            <a:r>
-              <a:rPr lang="en-US" dirty="0"/>
-              <a:t>Number of HNSCC patients:  11 HNSCC patients [7/20] </a:t>
-            </a:r>
-          </a:p>
-          <a:p>
-            <a:r>
-              <a:rPr lang="en-US" dirty="0"/>
-              <a:t>Plate map versions </a:t>
+          <a:bodyPr/>
+          <a:lstStyle/>
+          <a:p>
+            <a:r>
+              <a:rPr lang="en-US" dirty="0"/>
+              <a:t>Perfect separation occurs when all [or most] of the cell viability values are identical. </a:t>
             </a:r>
           </a:p>
           <a:p>
             <a:pPr lvl="1"/>
             <a:r>
               <a:rPr lang="en-US" dirty="0"/>
-              <a:t>Plates 1-3 (rev 001), Plates 1-6 (rev 002) &lt;- combinatorial </a:t>
+              <a:t>If all are identical I just fit with the max </a:t>
+            </a:r>
+            <a:r>
+              <a:rPr lang="en-US" dirty="0" err="1"/>
+              <a:t>auc</a:t>
+            </a:r>
+            <a:r>
+              <a:rPr lang="en-US" dirty="0"/>
+              <a:t> value </a:t>
             </a:r>
           </a:p>
           <a:p>
             <a:pPr lvl="1"/>
             <a:r>
               <a:rPr lang="en-US" dirty="0"/>
-              <a:t>Tyner panels – still need to be re-worked into HNSCC format</a:t>
-            </a:r>
-          </a:p>
-          <a:p>
-            <a:pPr lvl="1"/>
-            <a:r>
-              <a:rPr lang="en-US" dirty="0"/>
-              <a:t>+1 assay with 7… require additional work </a:t>
-            </a:r>
-          </a:p>
-          <a:p>
-            <a:pPr lvl="1"/>
-            <a:r>
-              <a:rPr lang="en-US" dirty="0"/>
-              <a:t>Excel files with pages: meta, concentration_&lt;num&gt;, inhibitor_&lt;num&gt;</a:t>
-            </a:r>
-          </a:p>
-          <a:p>
-            <a:r>
-              <a:rPr lang="en-US" dirty="0"/>
-              <a:t>Naming convention</a:t>
-            </a:r>
-          </a:p>
-          <a:p>
-            <a:pPr lvl="1"/>
-            <a:r>
-              <a:rPr lang="en-US" dirty="0"/>
-              <a:t>Unique ID for each assay? Or we need to distinguish replicates</a:t>
-            </a:r>
-          </a:p>
-          <a:p>
-            <a:pPr lvl="1"/>
-            <a:r>
-              <a:rPr lang="en-US" dirty="0"/>
-              <a:t>Date of assay? </a:t>
-            </a:r>
-          </a:p>
-          <a:p>
-            <a:pPr lvl="1"/>
-            <a:r>
-              <a:rPr lang="en-US" dirty="0"/>
-              <a:t>MTS sitting time? </a:t>
-            </a:r>
-          </a:p>
-          <a:p>
-            <a:pPr lvl="1"/>
-            <a:r>
-              <a:rPr lang="en-US" dirty="0" err="1"/>
-              <a:t>lab_id</a:t>
-            </a:r>
-            <a:r>
-              <a:rPr lang="en-US" dirty="0"/>
-              <a:t>=XXXXX-norm=XXX-</a:t>
-            </a:r>
-            <a:r>
-              <a:rPr lang="en-US" dirty="0" err="1"/>
-              <a:t>plate_version_id</a:t>
-            </a:r>
-            <a:r>
-              <a:rPr lang="en-US" dirty="0"/>
-              <a:t>=XXXX</a:t>
-            </a:r>
-          </a:p>
-          <a:p>
-            <a:pPr lvl="1"/>
-            <a:endParaRPr lang="en-US" dirty="0"/>
-          </a:p>
-          <a:p>
-            <a:pPr lvl="1"/>
+              <a:t>If not all are identical, I fit with </a:t>
+            </a:r>
+            <a:r>
+              <a:rPr lang="en-US"/>
+              <a:t>linear regression. </a:t>
+            </a:r>
             <a:endParaRPr lang="en-US" dirty="0"/>
           </a:p>
         </p:txBody>
@@ -7789,7 +7837,7 @@
     </p:spTree>
     <p:extLst>
       <p:ext uri="{BB962C8B-B14F-4D97-AF65-F5344CB8AC3E}">
-        <p14:creationId xmlns:p14="http://schemas.microsoft.com/office/powerpoint/2010/main" val="3771634021"/>
+        <p14:creationId xmlns:p14="http://schemas.microsoft.com/office/powerpoint/2010/main" val="1587776220"/>
       </p:ext>
     </p:extLst>
   </p:cSld>
@@ -7821,7 +7869,7 @@
           <p:cNvPr id="2" name="Title 1">
             <a:extLst>
               <a:ext uri="{FF2B5EF4-FFF2-40B4-BE49-F238E27FC236}">
-                <a16:creationId xmlns:a16="http://schemas.microsoft.com/office/drawing/2014/main" id="{4C925E0A-FDA2-482C-B32C-BD02E0F5FDD5}"/>
+                <a16:creationId xmlns:a16="http://schemas.microsoft.com/office/drawing/2014/main" id="{0C9934DF-8684-482D-A4AA-A6412C0D074C}"/>
               </a:ext>
             </a:extLst>
           </p:cNvPr>
@@ -7839,7 +7887,7 @@
           <a:p>
             <a:r>
               <a:rPr lang="en-US" dirty="0"/>
-              <a:t>Plate Map Revisions </a:t>
+              <a:t>Overview </a:t>
             </a:r>
           </a:p>
         </p:txBody>
@@ -7849,7 +7897,7 @@
           <p:cNvPr id="3" name="Content Placeholder 2">
             <a:extLst>
               <a:ext uri="{FF2B5EF4-FFF2-40B4-BE49-F238E27FC236}">
-                <a16:creationId xmlns:a16="http://schemas.microsoft.com/office/drawing/2014/main" id="{287DDDA0-A034-491E-AF68-7EC8860582A7}"/>
+                <a16:creationId xmlns:a16="http://schemas.microsoft.com/office/drawing/2014/main" id="{D14D1252-27F6-45E4-AC18-DBBDBC8B95FE}"/>
               </a:ext>
             </a:extLst>
           </p:cNvPr>
@@ -7862,42 +7910,102 @@
         </p:nvSpPr>
         <p:spPr/>
         <p:txBody>
-          <a:bodyPr/>
-          <a:lstStyle/>
-          <a:p>
-            <a:r>
-              <a:rPr lang="en-US" dirty="0"/>
-              <a:t>Drug Names, there are some inconsistencies – need to define clear nomenclature to avoid redundancy. </a:t>
+          <a:bodyPr>
+            <a:normAutofit lnSpcReduction="10000"/>
+          </a:bodyPr>
+          <a:lstStyle/>
+          <a:p>
+            <a:r>
+              <a:rPr lang="en-US" dirty="0"/>
+              <a:t>Number of HNSCC patients:  11 HNSCC patients [7/20] </a:t>
+            </a:r>
+          </a:p>
+          <a:p>
+            <a:r>
+              <a:rPr lang="en-US" dirty="0"/>
+              <a:t>Plate map versions </a:t>
             </a:r>
           </a:p>
           <a:p>
             <a:pPr lvl="1"/>
             <a:r>
               <a:rPr lang="en-US" dirty="0"/>
-              <a:t>I can provide a list of all used names, if someone can review and choose the right names. </a:t>
+              <a:t>Plates 1-3 (rev 001), Plates 1-6 (rev 002) &lt;- combinatorial </a:t>
             </a:r>
           </a:p>
           <a:p>
             <a:pPr lvl="1"/>
             <a:r>
               <a:rPr lang="en-US" dirty="0"/>
-              <a:t>Alternatively, if there is a list of acceptable drug names, I can do it myself. </a:t>
-            </a:r>
-          </a:p>
-          <a:p>
-            <a:r>
-              <a:rPr lang="en-US" dirty="0"/>
-              <a:t>I’d like a review of my concentration mapping [request] </a:t>
+              <a:t>Tyner panels – still need to be re-worked into HNSCC format</a:t>
             </a:r>
           </a:p>
           <a:p>
             <a:pPr lvl="1"/>
             <a:r>
               <a:rPr lang="en-US" dirty="0"/>
-              <a:t>Ashley volunteered to review, but a second pair of eyes would be useful as well. </a:t>
-            </a:r>
-          </a:p>
-          <a:p>
+              <a:t>+1 assay with 7… require additional work </a:t>
+            </a:r>
+          </a:p>
+          <a:p>
+            <a:pPr lvl="1"/>
+            <a:r>
+              <a:rPr lang="en-US" dirty="0"/>
+              <a:t>Excel files with pages: meta, concentration_&lt;num&gt;, inhibitor_&lt;num&gt;</a:t>
+            </a:r>
+          </a:p>
+          <a:p>
+            <a:r>
+              <a:rPr lang="en-US" dirty="0"/>
+              <a:t>Naming convention</a:t>
+            </a:r>
+          </a:p>
+          <a:p>
+            <a:pPr lvl="1"/>
+            <a:r>
+              <a:rPr lang="en-US" dirty="0"/>
+              <a:t>Unique ID for each assay? Or we need to distinguish replicates</a:t>
+            </a:r>
+          </a:p>
+          <a:p>
+            <a:pPr lvl="1"/>
+            <a:r>
+              <a:rPr lang="en-US" dirty="0"/>
+              <a:t>Date of assay? </a:t>
+            </a:r>
+          </a:p>
+          <a:p>
+            <a:pPr lvl="1"/>
+            <a:r>
+              <a:rPr lang="en-US" dirty="0"/>
+              <a:t>MTS sitting time? </a:t>
+            </a:r>
+          </a:p>
+          <a:p>
+            <a:pPr lvl="1"/>
+            <a:r>
+              <a:rPr lang="en-US" dirty="0" err="1"/>
+              <a:t>lab_id</a:t>
+            </a:r>
+            <a:r>
+              <a:rPr lang="en-US" dirty="0"/>
+              <a:t>=XXXXX-norm=XXX-</a:t>
+            </a:r>
+            <a:r>
+              <a:rPr lang="en-US" dirty="0" err="1"/>
+              <a:t>plate_version_id</a:t>
+            </a:r>
+            <a:r>
+              <a:rPr lang="en-US" dirty="0"/>
+              <a:t>=XXXX</a:t>
+            </a:r>
+          </a:p>
+          <a:p>
+            <a:pPr lvl="1"/>
+            <a:endParaRPr lang="en-US" dirty="0"/>
+          </a:p>
+          <a:p>
+            <a:pPr lvl="1"/>
             <a:endParaRPr lang="en-US" dirty="0"/>
           </a:p>
         </p:txBody>
@@ -7905,7 +8013,7 @@
     </p:spTree>
     <p:extLst>
       <p:ext uri="{BB962C8B-B14F-4D97-AF65-F5344CB8AC3E}">
-        <p14:creationId xmlns:p14="http://schemas.microsoft.com/office/powerpoint/2010/main" val="629140933"/>
+        <p14:creationId xmlns:p14="http://schemas.microsoft.com/office/powerpoint/2010/main" val="3771634021"/>
       </p:ext>
     </p:extLst>
   </p:cSld>
@@ -7937,7 +8045,7 @@
           <p:cNvPr id="2" name="Title 1">
             <a:extLst>
               <a:ext uri="{FF2B5EF4-FFF2-40B4-BE49-F238E27FC236}">
-                <a16:creationId xmlns:a16="http://schemas.microsoft.com/office/drawing/2014/main" id="{2A317F86-1610-446D-A724-4889497B751D}"/>
+                <a16:creationId xmlns:a16="http://schemas.microsoft.com/office/drawing/2014/main" id="{4C925E0A-FDA2-482C-B32C-BD02E0F5FDD5}"/>
               </a:ext>
             </a:extLst>
           </p:cNvPr>
@@ -7955,7 +8063,7 @@
           <a:p>
             <a:r>
               <a:rPr lang="en-US" dirty="0"/>
-              <a:t>Data output documentation issues</a:t>
+              <a:t>Plate Map Revisions </a:t>
             </a:r>
           </a:p>
         </p:txBody>
@@ -7965,7 +8073,7 @@
           <p:cNvPr id="3" name="Content Placeholder 2">
             <a:extLst>
               <a:ext uri="{FF2B5EF4-FFF2-40B4-BE49-F238E27FC236}">
-                <a16:creationId xmlns:a16="http://schemas.microsoft.com/office/drawing/2014/main" id="{E5775B40-57DE-42CA-A49B-0046E6B9E424}"/>
+                <a16:creationId xmlns:a16="http://schemas.microsoft.com/office/drawing/2014/main" id="{287DDDA0-A034-491E-AF68-7EC8860582A7}"/>
               </a:ext>
             </a:extLst>
           </p:cNvPr>
@@ -7978,79 +8086,50 @@
         </p:nvSpPr>
         <p:spPr/>
         <p:txBody>
-          <a:bodyPr>
-            <a:normAutofit/>
-          </a:bodyPr>
-          <a:lstStyle/>
-          <a:p>
-            <a:r>
-              <a:rPr lang="en-US" dirty="0"/>
-              <a:t>There are a number of assays that are labeled as having been normalized by positive controls (labeled as “blank490”), however, the output file shows discrepancies that indicate it was not.</a:t>
-            </a:r>
-          </a:p>
-          <a:p>
-            <a:r>
-              <a:rPr lang="en-US" dirty="0"/>
-              <a:t>[</a:t>
-            </a:r>
-            <a:r>
-              <a:rPr lang="en-US" dirty="0" err="1"/>
-              <a:t>lab_id</a:t>
-            </a:r>
-            <a:r>
-              <a:rPr lang="en-US" dirty="0"/>
-              <a:t>=10308,notes=NA]</a:t>
-            </a:r>
-          </a:p>
-          <a:p>
-            <a:r>
-              <a:rPr lang="en-US" dirty="0"/>
-              <a:t>[</a:t>
-            </a:r>
-            <a:r>
-              <a:rPr lang="en-US" dirty="0" err="1"/>
-              <a:t>lab_id</a:t>
-            </a:r>
-            <a:r>
-              <a:rPr lang="en-US" dirty="0"/>
-              <a:t>=10309,notes=matched normal 10308]</a:t>
-            </a:r>
-          </a:p>
-          <a:p>
-            <a:pPr marL="0" indent="0">
-              <a:buNone/>
-            </a:pPr>
+          <a:bodyPr/>
+          <a:lstStyle/>
+          <a:p>
+            <a:r>
+              <a:rPr lang="en-US" dirty="0"/>
+              <a:t>Drug Names, there are some inconsistencies – need to define clear nomenclature to avoid redundancy. </a:t>
+            </a:r>
+          </a:p>
+          <a:p>
+            <a:pPr lvl="1"/>
+            <a:r>
+              <a:rPr lang="en-US" dirty="0"/>
+              <a:t>I can provide a list of all used names, if someone can review and choose the right names. </a:t>
+            </a:r>
+          </a:p>
+          <a:p>
+            <a:pPr lvl="1"/>
+            <a:r>
+              <a:rPr lang="en-US" dirty="0"/>
+              <a:t>Alternatively, if there is a list of acceptable drug names, I can do it myself. </a:t>
+            </a:r>
+          </a:p>
+          <a:p>
+            <a:r>
+              <a:rPr lang="en-US" dirty="0"/>
+              <a:t>I’d like a review of my concentration mapping [request] </a:t>
+            </a:r>
+          </a:p>
+          <a:p>
+            <a:pPr lvl="1"/>
+            <a:r>
+              <a:rPr lang="en-US" dirty="0"/>
+              <a:t>Ashley volunteered to review, but a second pair of eyes would be useful as well. </a:t>
+            </a:r>
+          </a:p>
+          <a:p>
             <a:endParaRPr lang="en-US" dirty="0"/>
-          </a:p>
-          <a:p>
-            <a:pPr marL="0" indent="0">
-              <a:buNone/>
-            </a:pPr>
-            <a:endParaRPr lang="en-US" dirty="0"/>
-          </a:p>
-          <a:p>
-            <a:pPr marL="0" indent="0">
-              <a:buNone/>
-            </a:pPr>
-            <a:r>
-              <a:rPr lang="en-US" dirty="0"/>
-              <a:t>*these two assay outputs don’t have a 26</a:t>
-            </a:r>
-            <a:r>
-              <a:rPr lang="en-US" baseline="30000" dirty="0"/>
-              <a:t>th</a:t>
-            </a:r>
-            <a:r>
-              <a:rPr lang="en-US" dirty="0"/>
-              <a:t> column, which usually says “blank490” in each row. </a:t>
-            </a:r>
           </a:p>
         </p:txBody>
       </p:sp>
     </p:spTree>
     <p:extLst>
       <p:ext uri="{BB962C8B-B14F-4D97-AF65-F5344CB8AC3E}">
-        <p14:creationId xmlns:p14="http://schemas.microsoft.com/office/powerpoint/2010/main" val="4284564905"/>
+        <p14:creationId xmlns:p14="http://schemas.microsoft.com/office/powerpoint/2010/main" val="629140933"/>
       </p:ext>
     </p:extLst>
   </p:cSld>
@@ -8082,7 +8161,7 @@
           <p:cNvPr id="2" name="Title 1">
             <a:extLst>
               <a:ext uri="{FF2B5EF4-FFF2-40B4-BE49-F238E27FC236}">
-                <a16:creationId xmlns:a16="http://schemas.microsoft.com/office/drawing/2014/main" id="{541CAFB3-FD96-4F76-A791-BBC842554556}"/>
+                <a16:creationId xmlns:a16="http://schemas.microsoft.com/office/drawing/2014/main" id="{2A317F86-1610-446D-A724-4889497B751D}"/>
               </a:ext>
             </a:extLst>
           </p:cNvPr>
@@ -8100,7 +8179,7 @@
           <a:p>
             <a:r>
               <a:rPr lang="en-US" dirty="0"/>
-              <a:t>Standing Questions</a:t>
+              <a:t>Data output documentation issues</a:t>
             </a:r>
           </a:p>
         </p:txBody>
@@ -8110,7 +8189,7 @@
           <p:cNvPr id="3" name="Content Placeholder 2">
             <a:extLst>
               <a:ext uri="{FF2B5EF4-FFF2-40B4-BE49-F238E27FC236}">
-                <a16:creationId xmlns:a16="http://schemas.microsoft.com/office/drawing/2014/main" id="{F1B73B27-1B41-4F73-9206-3BA2925E5813}"/>
+                <a16:creationId xmlns:a16="http://schemas.microsoft.com/office/drawing/2014/main" id="{E5775B40-57DE-42CA-A49B-0046E6B9E424}"/>
               </a:ext>
             </a:extLst>
           </p:cNvPr>
@@ -8123,85 +8202,71 @@
         </p:nvSpPr>
         <p:spPr/>
         <p:txBody>
-          <a:bodyPr/>
-          <a:lstStyle/>
-          <a:p>
-            <a:r>
-              <a:rPr lang="en-US" dirty="0"/>
-              <a:t>Blank 490, how is this normalization done?</a:t>
-            </a:r>
-          </a:p>
-          <a:p>
-            <a:r>
-              <a:rPr lang="en-US" dirty="0"/>
-              <a:t>Scope of documentation?   </a:t>
-            </a:r>
-          </a:p>
-          <a:p>
-            <a:pPr lvl="1"/>
-            <a:r>
-              <a:rPr lang="en-US" dirty="0"/>
-              <a:t>Code version control – </a:t>
+          <a:bodyPr>
+            <a:normAutofit/>
+          </a:bodyPr>
+          <a:lstStyle/>
+          <a:p>
+            <a:r>
+              <a:rPr lang="en-US" dirty="0"/>
+              <a:t>There are a number of assays that are labeled as having been normalized by positive controls (labeled as “blank490”), however, the output file shows discrepancies that indicate it was not.</a:t>
+            </a:r>
+          </a:p>
+          <a:p>
+            <a:r>
+              <a:rPr lang="en-US" dirty="0"/>
+              <a:t>[</a:t>
             </a:r>
             <a:r>
               <a:rPr lang="en-US" dirty="0" err="1"/>
-              <a:t>github</a:t>
-            </a:r>
-            <a:r>
-              <a:rPr lang="en-US" dirty="0"/>
-              <a:t> repo? </a:t>
-            </a:r>
-          </a:p>
-          <a:p>
-            <a:pPr lvl="1"/>
+              <a:t>lab_id</a:t>
+            </a:r>
+            <a:r>
+              <a:rPr lang="en-US" dirty="0"/>
+              <a:t>=10308,notes=NA]</a:t>
+            </a:r>
+          </a:p>
+          <a:p>
+            <a:r>
+              <a:rPr lang="en-US" dirty="0"/>
+              <a:t>[</a:t>
+            </a:r>
             <a:r>
               <a:rPr lang="en-US" dirty="0" err="1"/>
-              <a:t>Biocompute</a:t>
-            </a:r>
-            <a:r>
-              <a:rPr lang="en-US" dirty="0"/>
-              <a:t> object </a:t>
-            </a:r>
-          </a:p>
-          <a:p>
-            <a:pPr lvl="1"/>
-            <a:r>
-              <a:rPr lang="en-US" dirty="0"/>
-              <a:t>R/</a:t>
-            </a:r>
-            <a:r>
-              <a:rPr lang="en-US" dirty="0" err="1"/>
-              <a:t>Doxygen</a:t>
-            </a:r>
+              <a:t>lab_id</a:t>
+            </a:r>
+            <a:r>
+              <a:rPr lang="en-US" dirty="0"/>
+              <a:t>=10309,notes=matched normal 10308]</a:t>
+            </a:r>
+          </a:p>
+          <a:p>
+            <a:pPr marL="0" indent="0">
+              <a:buNone/>
+            </a:pPr>
             <a:endParaRPr lang="en-US" dirty="0"/>
           </a:p>
           <a:p>
-            <a:r>
-              <a:rPr lang="en-US" dirty="0"/>
-              <a:t>Scope of testing? </a:t>
-            </a:r>
-          </a:p>
-          <a:p>
-            <a:pPr lvl="1"/>
-            <a:r>
-              <a:rPr lang="en-US" dirty="0"/>
-              <a:t>Doc-testing / unit-testing </a:t>
-            </a:r>
-          </a:p>
-          <a:p>
-            <a:r>
-              <a:rPr lang="en-US" dirty="0"/>
-              <a:t>Language Preference? Currently using mix of python, R, bash</a:t>
-            </a:r>
-          </a:p>
-          <a:p>
-            <a:r>
-              <a:rPr lang="en-US" dirty="0" err="1"/>
-              <a:t>Dockerize</a:t>
-            </a:r>
-            <a:r>
-              <a:rPr lang="en-US" dirty="0"/>
-              <a:t> environment? </a:t>
+            <a:pPr marL="0" indent="0">
+              <a:buNone/>
+            </a:pPr>
+            <a:endParaRPr lang="en-US" dirty="0"/>
+          </a:p>
+          <a:p>
+            <a:pPr marL="0" indent="0">
+              <a:buNone/>
+            </a:pPr>
+            <a:r>
+              <a:rPr lang="en-US" dirty="0"/>
+              <a:t>*these two assay outputs don’t have a 26</a:t>
+            </a:r>
+            <a:r>
+              <a:rPr lang="en-US" baseline="30000" dirty="0"/>
+              <a:t>th</a:t>
+            </a:r>
+            <a:r>
+              <a:rPr lang="en-US" dirty="0"/>
+              <a:t> column, which usually says “blank490” in each row. </a:t>
             </a:r>
           </a:p>
         </p:txBody>
@@ -8209,7 +8274,7 @@
     </p:spTree>
     <p:extLst>
       <p:ext uri="{BB962C8B-B14F-4D97-AF65-F5344CB8AC3E}">
-        <p14:creationId xmlns:p14="http://schemas.microsoft.com/office/powerpoint/2010/main" val="2085471528"/>
+        <p14:creationId xmlns:p14="http://schemas.microsoft.com/office/powerpoint/2010/main" val="4284564905"/>
       </p:ext>
     </p:extLst>
   </p:cSld>
@@ -8241,7 +8306,7 @@
           <p:cNvPr id="2" name="Title 1">
             <a:extLst>
               <a:ext uri="{FF2B5EF4-FFF2-40B4-BE49-F238E27FC236}">
-                <a16:creationId xmlns:a16="http://schemas.microsoft.com/office/drawing/2014/main" id="{4237EC28-2B26-49FD-A131-DB5B6A520B7D}"/>
+                <a16:creationId xmlns:a16="http://schemas.microsoft.com/office/drawing/2014/main" id="{541CAFB3-FD96-4F76-A791-BBC842554556}"/>
               </a:ext>
             </a:extLst>
           </p:cNvPr>
@@ -8259,7 +8324,7 @@
           <a:p>
             <a:r>
               <a:rPr lang="en-US" dirty="0"/>
-              <a:t>Verification </a:t>
+              <a:t>Standing Questions</a:t>
             </a:r>
           </a:p>
         </p:txBody>
@@ -8269,7 +8334,7 @@
           <p:cNvPr id="3" name="Content Placeholder 2">
             <a:extLst>
               <a:ext uri="{FF2B5EF4-FFF2-40B4-BE49-F238E27FC236}">
-                <a16:creationId xmlns:a16="http://schemas.microsoft.com/office/drawing/2014/main" id="{5397CA38-22D3-4A95-893E-CB1214384E6A}"/>
+                <a16:creationId xmlns:a16="http://schemas.microsoft.com/office/drawing/2014/main" id="{F1B73B27-1B41-4F73-9206-3BA2925E5813}"/>
               </a:ext>
             </a:extLst>
           </p:cNvPr>
@@ -8287,27 +8352,80 @@
           <a:p>
             <a:r>
               <a:rPr lang="en-US" dirty="0"/>
-              <a:t>Run </a:t>
+              <a:t>Blank 490, how is this normalization done?</a:t>
+            </a:r>
+          </a:p>
+          <a:p>
+            <a:r>
+              <a:rPr lang="en-US" dirty="0"/>
+              <a:t>Scope of documentation?   </a:t>
+            </a:r>
+          </a:p>
+          <a:p>
+            <a:pPr lvl="1"/>
+            <a:r>
+              <a:rPr lang="en-US" dirty="0"/>
+              <a:t>Code version control – </a:t>
             </a:r>
             <a:r>
               <a:rPr lang="en-US" dirty="0" err="1"/>
-              <a:t>beatAML</a:t>
-            </a:r>
-            <a:r>
-              <a:rPr lang="en-US" dirty="0"/>
-              <a:t> data and compare to values </a:t>
-            </a:r>
-          </a:p>
-          <a:p>
-            <a:r>
-              <a:rPr lang="en-US" dirty="0"/>
-              <a:t>Unit testing </a:t>
-            </a:r>
-          </a:p>
-          <a:p>
-            <a:r>
-              <a:rPr lang="en-US" dirty="0"/>
-              <a:t>Doc testing</a:t>
+              <a:t>github</a:t>
+            </a:r>
+            <a:r>
+              <a:rPr lang="en-US" dirty="0"/>
+              <a:t> repo? </a:t>
+            </a:r>
+          </a:p>
+          <a:p>
+            <a:pPr lvl="1"/>
+            <a:r>
+              <a:rPr lang="en-US" dirty="0" err="1"/>
+              <a:t>Biocompute</a:t>
+            </a:r>
+            <a:r>
+              <a:rPr lang="en-US" dirty="0"/>
+              <a:t> object </a:t>
+            </a:r>
+          </a:p>
+          <a:p>
+            <a:pPr lvl="1"/>
+            <a:r>
+              <a:rPr lang="en-US" dirty="0"/>
+              <a:t>R/</a:t>
+            </a:r>
+            <a:r>
+              <a:rPr lang="en-US" dirty="0" err="1"/>
+              <a:t>Doxygen</a:t>
+            </a:r>
+            <a:endParaRPr lang="en-US" dirty="0"/>
+          </a:p>
+          <a:p>
+            <a:r>
+              <a:rPr lang="en-US" dirty="0"/>
+              <a:t>Scope of testing? </a:t>
+            </a:r>
+          </a:p>
+          <a:p>
+            <a:pPr lvl="1"/>
+            <a:r>
+              <a:rPr lang="en-US" dirty="0"/>
+              <a:t>Doc-testing / unit-testing </a:t>
+            </a:r>
+          </a:p>
+          <a:p>
+            <a:r>
+              <a:rPr lang="en-US" dirty="0"/>
+              <a:t>Language Preference? Currently using mix of python, R, bash</a:t>
+            </a:r>
+          </a:p>
+          <a:p>
+            <a:r>
+              <a:rPr lang="en-US" dirty="0" err="1"/>
+              <a:t>Dockerize</a:t>
+            </a:r>
+            <a:r>
+              <a:rPr lang="en-US" dirty="0"/>
+              <a:t> environment? </a:t>
             </a:r>
           </a:p>
         </p:txBody>
@@ -8315,7 +8433,7 @@
     </p:spTree>
     <p:extLst>
       <p:ext uri="{BB962C8B-B14F-4D97-AF65-F5344CB8AC3E}">
-        <p14:creationId xmlns:p14="http://schemas.microsoft.com/office/powerpoint/2010/main" val="2935630697"/>
+        <p14:creationId xmlns:p14="http://schemas.microsoft.com/office/powerpoint/2010/main" val="2085471528"/>
       </p:ext>
     </p:extLst>
   </p:cSld>

</xml_diff>

<commit_message>
added "sequenital_processing_job.py" and "combine_processed_panels.py"; see issue #6 - still occuring.
</commit_message>
<xml_diff>
--- a/docs/HNSCC_functional_assay_pipeline_development.pptx
+++ b/docs/HNSCC_functional_assay_pipeline_development.pptx
@@ -8,14 +8,15 @@
     <p:sldId id="256" r:id="rId2"/>
     <p:sldId id="260" r:id="rId3"/>
     <p:sldId id="263" r:id="rId4"/>
-    <p:sldId id="264" r:id="rId5"/>
-    <p:sldId id="266" r:id="rId6"/>
-    <p:sldId id="257" r:id="rId7"/>
-    <p:sldId id="258" r:id="rId8"/>
-    <p:sldId id="261" r:id="rId9"/>
-    <p:sldId id="259" r:id="rId10"/>
-    <p:sldId id="265" r:id="rId11"/>
-    <p:sldId id="262" r:id="rId12"/>
+    <p:sldId id="267" r:id="rId5"/>
+    <p:sldId id="264" r:id="rId6"/>
+    <p:sldId id="266" r:id="rId7"/>
+    <p:sldId id="257" r:id="rId8"/>
+    <p:sldId id="258" r:id="rId9"/>
+    <p:sldId id="261" r:id="rId10"/>
+    <p:sldId id="259" r:id="rId11"/>
+    <p:sldId id="265" r:id="rId12"/>
+    <p:sldId id="262" r:id="rId13"/>
   </p:sldIdLst>
   <p:sldSz cx="12192000" cy="6858000"/>
   <p:notesSz cx="6858000" cy="9144000"/>
@@ -269,7 +270,7 @@
           <a:p>
             <a:fld id="{ABBD65A0-F140-476D-B606-1C9D07B9F5C7}" type="datetimeFigureOut">
               <a:rPr lang="en-US" smtClean="0"/>
-              <a:t>8/15/2019</a:t>
+              <a:t>8/16/2019</a:t>
             </a:fld>
             <a:endParaRPr lang="en-US"/>
           </a:p>
@@ -467,7 +468,7 @@
           <a:p>
             <a:fld id="{ABBD65A0-F140-476D-B606-1C9D07B9F5C7}" type="datetimeFigureOut">
               <a:rPr lang="en-US" smtClean="0"/>
-              <a:t>8/15/2019</a:t>
+              <a:t>8/16/2019</a:t>
             </a:fld>
             <a:endParaRPr lang="en-US"/>
           </a:p>
@@ -675,7 +676,7 @@
           <a:p>
             <a:fld id="{ABBD65A0-F140-476D-B606-1C9D07B9F5C7}" type="datetimeFigureOut">
               <a:rPr lang="en-US" smtClean="0"/>
-              <a:t>8/15/2019</a:t>
+              <a:t>8/16/2019</a:t>
             </a:fld>
             <a:endParaRPr lang="en-US"/>
           </a:p>
@@ -873,7 +874,7 @@
           <a:p>
             <a:fld id="{ABBD65A0-F140-476D-B606-1C9D07B9F5C7}" type="datetimeFigureOut">
               <a:rPr lang="en-US" smtClean="0"/>
-              <a:t>8/15/2019</a:t>
+              <a:t>8/16/2019</a:t>
             </a:fld>
             <a:endParaRPr lang="en-US"/>
           </a:p>
@@ -1148,7 +1149,7 @@
           <a:p>
             <a:fld id="{ABBD65A0-F140-476D-B606-1C9D07B9F5C7}" type="datetimeFigureOut">
               <a:rPr lang="en-US" smtClean="0"/>
-              <a:t>8/15/2019</a:t>
+              <a:t>8/16/2019</a:t>
             </a:fld>
             <a:endParaRPr lang="en-US"/>
           </a:p>
@@ -1413,7 +1414,7 @@
           <a:p>
             <a:fld id="{ABBD65A0-F140-476D-B606-1C9D07B9F5C7}" type="datetimeFigureOut">
               <a:rPr lang="en-US" smtClean="0"/>
-              <a:t>8/15/2019</a:t>
+              <a:t>8/16/2019</a:t>
             </a:fld>
             <a:endParaRPr lang="en-US"/>
           </a:p>
@@ -1825,7 +1826,7 @@
           <a:p>
             <a:fld id="{ABBD65A0-F140-476D-B606-1C9D07B9F5C7}" type="datetimeFigureOut">
               <a:rPr lang="en-US" smtClean="0"/>
-              <a:t>8/15/2019</a:t>
+              <a:t>8/16/2019</a:t>
             </a:fld>
             <a:endParaRPr lang="en-US"/>
           </a:p>
@@ -1966,7 +1967,7 @@
           <a:p>
             <a:fld id="{ABBD65A0-F140-476D-B606-1C9D07B9F5C7}" type="datetimeFigureOut">
               <a:rPr lang="en-US" smtClean="0"/>
-              <a:t>8/15/2019</a:t>
+              <a:t>8/16/2019</a:t>
             </a:fld>
             <a:endParaRPr lang="en-US"/>
           </a:p>
@@ -2079,7 +2080,7 @@
           <a:p>
             <a:fld id="{ABBD65A0-F140-476D-B606-1C9D07B9F5C7}" type="datetimeFigureOut">
               <a:rPr lang="en-US" smtClean="0"/>
-              <a:t>8/15/2019</a:t>
+              <a:t>8/16/2019</a:t>
             </a:fld>
             <a:endParaRPr lang="en-US"/>
           </a:p>
@@ -2390,7 +2391,7 @@
           <a:p>
             <a:fld id="{ABBD65A0-F140-476D-B606-1C9D07B9F5C7}" type="datetimeFigureOut">
               <a:rPr lang="en-US" smtClean="0"/>
-              <a:t>8/15/2019</a:t>
+              <a:t>8/16/2019</a:t>
             </a:fld>
             <a:endParaRPr lang="en-US"/>
           </a:p>
@@ -2678,7 +2679,7 @@
           <a:p>
             <a:fld id="{ABBD65A0-F140-476D-B606-1C9D07B9F5C7}" type="datetimeFigureOut">
               <a:rPr lang="en-US" smtClean="0"/>
-              <a:t>8/15/2019</a:t>
+              <a:t>8/16/2019</a:t>
             </a:fld>
             <a:endParaRPr lang="en-US"/>
           </a:p>
@@ -2919,7 +2920,7 @@
           <a:p>
             <a:fld id="{ABBD65A0-F140-476D-B606-1C9D07B9F5C7}" type="datetimeFigureOut">
               <a:rPr lang="en-US" smtClean="0"/>
-              <a:t>8/15/2019</a:t>
+              <a:t>8/16/2019</a:t>
             </a:fld>
             <a:endParaRPr lang="en-US"/>
           </a:p>
@@ -3427,6 +3428,165 @@
           <p:cNvPr id="2" name="Title 1">
             <a:extLst>
               <a:ext uri="{FF2B5EF4-FFF2-40B4-BE49-F238E27FC236}">
+                <a16:creationId xmlns:a16="http://schemas.microsoft.com/office/drawing/2014/main" id="{541CAFB3-FD96-4F76-A791-BBC842554556}"/>
+              </a:ext>
+            </a:extLst>
+          </p:cNvPr>
+          <p:cNvSpPr>
+            <a:spLocks noGrp="1"/>
+          </p:cNvSpPr>
+          <p:nvPr>
+            <p:ph type="title"/>
+          </p:nvPr>
+        </p:nvSpPr>
+        <p:spPr/>
+        <p:txBody>
+          <a:bodyPr/>
+          <a:lstStyle/>
+          <a:p>
+            <a:r>
+              <a:rPr lang="en-US" dirty="0"/>
+              <a:t>Standing Questions</a:t>
+            </a:r>
+          </a:p>
+        </p:txBody>
+      </p:sp>
+      <p:sp>
+        <p:nvSpPr>
+          <p:cNvPr id="3" name="Content Placeholder 2">
+            <a:extLst>
+              <a:ext uri="{FF2B5EF4-FFF2-40B4-BE49-F238E27FC236}">
+                <a16:creationId xmlns:a16="http://schemas.microsoft.com/office/drawing/2014/main" id="{F1B73B27-1B41-4F73-9206-3BA2925E5813}"/>
+              </a:ext>
+            </a:extLst>
+          </p:cNvPr>
+          <p:cNvSpPr>
+            <a:spLocks noGrp="1"/>
+          </p:cNvSpPr>
+          <p:nvPr>
+            <p:ph idx="1"/>
+          </p:nvPr>
+        </p:nvSpPr>
+        <p:spPr/>
+        <p:txBody>
+          <a:bodyPr/>
+          <a:lstStyle/>
+          <a:p>
+            <a:r>
+              <a:rPr lang="en-US" dirty="0"/>
+              <a:t>Blank 490, how is this normalization done?</a:t>
+            </a:r>
+          </a:p>
+          <a:p>
+            <a:r>
+              <a:rPr lang="en-US" dirty="0"/>
+              <a:t>Scope of documentation?   </a:t>
+            </a:r>
+          </a:p>
+          <a:p>
+            <a:pPr lvl="1"/>
+            <a:r>
+              <a:rPr lang="en-US" dirty="0"/>
+              <a:t>Code version control – </a:t>
+            </a:r>
+            <a:r>
+              <a:rPr lang="en-US" dirty="0" err="1"/>
+              <a:t>github</a:t>
+            </a:r>
+            <a:r>
+              <a:rPr lang="en-US" dirty="0"/>
+              <a:t> repo? </a:t>
+            </a:r>
+          </a:p>
+          <a:p>
+            <a:pPr lvl="1"/>
+            <a:r>
+              <a:rPr lang="en-US" dirty="0" err="1"/>
+              <a:t>Biocompute</a:t>
+            </a:r>
+            <a:r>
+              <a:rPr lang="en-US" dirty="0"/>
+              <a:t> object </a:t>
+            </a:r>
+          </a:p>
+          <a:p>
+            <a:pPr lvl="1"/>
+            <a:r>
+              <a:rPr lang="en-US" dirty="0"/>
+              <a:t>R/</a:t>
+            </a:r>
+            <a:r>
+              <a:rPr lang="en-US" dirty="0" err="1"/>
+              <a:t>Doxygen</a:t>
+            </a:r>
+            <a:endParaRPr lang="en-US" dirty="0"/>
+          </a:p>
+          <a:p>
+            <a:r>
+              <a:rPr lang="en-US" dirty="0"/>
+              <a:t>Scope of testing? </a:t>
+            </a:r>
+          </a:p>
+          <a:p>
+            <a:pPr lvl="1"/>
+            <a:r>
+              <a:rPr lang="en-US" dirty="0"/>
+              <a:t>Doc-testing / unit-testing </a:t>
+            </a:r>
+          </a:p>
+          <a:p>
+            <a:r>
+              <a:rPr lang="en-US" dirty="0"/>
+              <a:t>Language Preference? Currently using mix of python, R, bash</a:t>
+            </a:r>
+          </a:p>
+          <a:p>
+            <a:r>
+              <a:rPr lang="en-US" dirty="0" err="1"/>
+              <a:t>Dockerize</a:t>
+            </a:r>
+            <a:r>
+              <a:rPr lang="en-US" dirty="0"/>
+              <a:t> environment? </a:t>
+            </a:r>
+          </a:p>
+        </p:txBody>
+      </p:sp>
+    </p:spTree>
+    <p:extLst>
+      <p:ext uri="{BB962C8B-B14F-4D97-AF65-F5344CB8AC3E}">
+        <p14:creationId xmlns:p14="http://schemas.microsoft.com/office/powerpoint/2010/main" val="2085471528"/>
+      </p:ext>
+    </p:extLst>
+  </p:cSld>
+  <p:clrMapOvr>
+    <a:masterClrMapping/>
+  </p:clrMapOvr>
+</p:sld>
+</file>
+
+<file path=ppt/slides/slide11.xml><?xml version="1.0" encoding="utf-8"?>
+<p:sld xmlns:a="http://schemas.openxmlformats.org/drawingml/2006/main" xmlns:r="http://schemas.openxmlformats.org/officeDocument/2006/relationships" xmlns:p="http://schemas.openxmlformats.org/presentationml/2006/main">
+  <p:cSld>
+    <p:spTree>
+      <p:nvGrpSpPr>
+        <p:cNvPr id="1" name=""/>
+        <p:cNvGrpSpPr/>
+        <p:nvPr/>
+      </p:nvGrpSpPr>
+      <p:grpSpPr>
+        <a:xfrm>
+          <a:off x="0" y="0"/>
+          <a:ext cx="0" cy="0"/>
+          <a:chOff x="0" y="0"/>
+          <a:chExt cx="0" cy="0"/>
+        </a:xfrm>
+      </p:grpSpPr>
+      <p:sp>
+        <p:nvSpPr>
+          <p:cNvPr id="2" name="Title 1">
+            <a:extLst>
+              <a:ext uri="{FF2B5EF4-FFF2-40B4-BE49-F238E27FC236}">
                 <a16:creationId xmlns:a16="http://schemas.microsoft.com/office/drawing/2014/main" id="{4237EC28-2B26-49FD-A131-DB5B6A520B7D}"/>
               </a:ext>
             </a:extLst>
@@ -3511,7 +3671,7 @@
 </p:sld>
 </file>
 
-<file path=ppt/slides/slide11.xml><?xml version="1.0" encoding="utf-8"?>
+<file path=ppt/slides/slide12.xml><?xml version="1.0" encoding="utf-8"?>
 <p:sld xmlns:a="http://schemas.openxmlformats.org/drawingml/2006/main" xmlns:r="http://schemas.openxmlformats.org/officeDocument/2006/relationships" xmlns:p="http://schemas.openxmlformats.org/presentationml/2006/main">
   <p:cSld>
     <p:spTree>
@@ -6761,6 +6921,1394 @@
 </file>
 
 <file path=ppt/slides/slide4.xml><?xml version="1.0" encoding="utf-8"?>
+<p:sld xmlns:a="http://schemas.openxmlformats.org/drawingml/2006/main" xmlns:r="http://schemas.openxmlformats.org/officeDocument/2006/relationships" xmlns:p="http://schemas.openxmlformats.org/presentationml/2006/main">
+  <p:cSld>
+    <p:spTree>
+      <p:nvGrpSpPr>
+        <p:cNvPr id="1" name=""/>
+        <p:cNvGrpSpPr/>
+        <p:nvPr/>
+      </p:nvGrpSpPr>
+      <p:grpSpPr>
+        <a:xfrm>
+          <a:off x="0" y="0"/>
+          <a:ext cx="0" cy="0"/>
+          <a:chOff x="0" y="0"/>
+          <a:chExt cx="0" cy="0"/>
+        </a:xfrm>
+      </p:grpSpPr>
+      <p:sp>
+        <p:nvSpPr>
+          <p:cNvPr id="24" name="Rectangle: Rounded Corners 23">
+            <a:extLst>
+              <a:ext uri="{FF2B5EF4-FFF2-40B4-BE49-F238E27FC236}">
+                <a16:creationId xmlns:a16="http://schemas.microsoft.com/office/drawing/2014/main" id="{166D446E-B385-473D-B5D5-0F426DB64B1D}"/>
+              </a:ext>
+            </a:extLst>
+          </p:cNvPr>
+          <p:cNvSpPr/>
+          <p:nvPr/>
+        </p:nvSpPr>
+        <p:spPr>
+          <a:xfrm>
+            <a:off x="1670447" y="295266"/>
+            <a:ext cx="1662113" cy="990599"/>
+          </a:xfrm>
+          <a:prstGeom prst="roundRect">
+            <a:avLst/>
+          </a:prstGeom>
+        </p:spPr>
+        <p:style>
+          <a:lnRef idx="2">
+            <a:schemeClr val="accent1">
+              <a:shade val="50000"/>
+            </a:schemeClr>
+          </a:lnRef>
+          <a:fillRef idx="1">
+            <a:schemeClr val="accent1"/>
+          </a:fillRef>
+          <a:effectRef idx="0">
+            <a:schemeClr val="accent1"/>
+          </a:effectRef>
+          <a:fontRef idx="minor">
+            <a:schemeClr val="lt1"/>
+          </a:fontRef>
+        </p:style>
+        <p:txBody>
+          <a:bodyPr rtlCol="0" anchor="ctr"/>
+          <a:lstStyle/>
+          <a:p>
+            <a:pPr algn="ctr"/>
+            <a:r>
+              <a:rPr lang="en-US" dirty="0"/>
+              <a:t>Regression Fitting</a:t>
+            </a:r>
+          </a:p>
+          <a:p>
+            <a:pPr algn="ctr"/>
+            <a:r>
+              <a:rPr lang="en-US" sz="900" dirty="0"/>
+              <a:t>[Probit_calc.py]</a:t>
+            </a:r>
+          </a:p>
+        </p:txBody>
+      </p:sp>
+      <p:cxnSp>
+        <p:nvCxnSpPr>
+          <p:cNvPr id="37" name="Connector: Elbow 36">
+            <a:extLst>
+              <a:ext uri="{FF2B5EF4-FFF2-40B4-BE49-F238E27FC236}">
+                <a16:creationId xmlns:a16="http://schemas.microsoft.com/office/drawing/2014/main" id="{200F9EFA-8A24-478B-B621-6E021720A03C}"/>
+              </a:ext>
+            </a:extLst>
+          </p:cNvPr>
+          <p:cNvCxnSpPr>
+            <a:cxnSpLocks/>
+            <a:endCxn id="24" idx="1"/>
+          </p:cNvCxnSpPr>
+          <p:nvPr/>
+        </p:nvCxnSpPr>
+        <p:spPr>
+          <a:xfrm>
+            <a:off x="230217" y="790563"/>
+            <a:ext cx="1440230" cy="3"/>
+          </a:xfrm>
+          <a:prstGeom prst="bentConnector3">
+            <a:avLst/>
+          </a:prstGeom>
+          <a:ln>
+            <a:tailEnd type="triangle"/>
+          </a:ln>
+        </p:spPr>
+        <p:style>
+          <a:lnRef idx="1">
+            <a:schemeClr val="accent1"/>
+          </a:lnRef>
+          <a:fillRef idx="0">
+            <a:schemeClr val="accent1"/>
+          </a:fillRef>
+          <a:effectRef idx="0">
+            <a:schemeClr val="accent1"/>
+          </a:effectRef>
+          <a:fontRef idx="minor">
+            <a:schemeClr val="tx1"/>
+          </a:fontRef>
+        </p:style>
+      </p:cxnSp>
+      <p:sp>
+        <p:nvSpPr>
+          <p:cNvPr id="31" name="Rectangle: Rounded Corners 30">
+            <a:extLst>
+              <a:ext uri="{FF2B5EF4-FFF2-40B4-BE49-F238E27FC236}">
+                <a16:creationId xmlns:a16="http://schemas.microsoft.com/office/drawing/2014/main" id="{D2ED3B51-58BF-41CB-9E78-8A2410C61004}"/>
+              </a:ext>
+            </a:extLst>
+          </p:cNvPr>
+          <p:cNvSpPr/>
+          <p:nvPr/>
+        </p:nvSpPr>
+        <p:spPr>
+          <a:xfrm>
+            <a:off x="4406503" y="295263"/>
+            <a:ext cx="1662113" cy="990599"/>
+          </a:xfrm>
+          <a:prstGeom prst="roundRect">
+            <a:avLst/>
+          </a:prstGeom>
+        </p:spPr>
+        <p:style>
+          <a:lnRef idx="2">
+            <a:schemeClr val="accent1">
+              <a:shade val="50000"/>
+            </a:schemeClr>
+          </a:lnRef>
+          <a:fillRef idx="1">
+            <a:schemeClr val="accent1"/>
+          </a:fillRef>
+          <a:effectRef idx="0">
+            <a:schemeClr val="accent1"/>
+          </a:effectRef>
+          <a:fontRef idx="minor">
+            <a:schemeClr val="lt1"/>
+          </a:fontRef>
+        </p:style>
+        <p:txBody>
+          <a:bodyPr rtlCol="0" anchor="ctr"/>
+          <a:lstStyle/>
+          <a:p>
+            <a:pPr algn="ctr"/>
+            <a:r>
+              <a:rPr lang="en-US" dirty="0"/>
+              <a:t>post-processing</a:t>
+            </a:r>
+          </a:p>
+          <a:p>
+            <a:pPr algn="ctr"/>
+            <a:r>
+              <a:rPr lang="en-US" sz="900" dirty="0"/>
+              <a:t>[name – not in dev yet]</a:t>
+            </a:r>
+          </a:p>
+        </p:txBody>
+      </p:sp>
+      <p:cxnSp>
+        <p:nvCxnSpPr>
+          <p:cNvPr id="17" name="Connector: Elbow 16">
+            <a:extLst>
+              <a:ext uri="{FF2B5EF4-FFF2-40B4-BE49-F238E27FC236}">
+                <a16:creationId xmlns:a16="http://schemas.microsoft.com/office/drawing/2014/main" id="{530F30A7-EA33-470B-BA30-AED110703EDD}"/>
+              </a:ext>
+            </a:extLst>
+          </p:cNvPr>
+          <p:cNvCxnSpPr>
+            <a:stCxn id="24" idx="3"/>
+            <a:endCxn id="31" idx="1"/>
+          </p:cNvCxnSpPr>
+          <p:nvPr/>
+        </p:nvCxnSpPr>
+        <p:spPr>
+          <a:xfrm flipV="1">
+            <a:off x="3332560" y="790563"/>
+            <a:ext cx="1073943" cy="3"/>
+          </a:xfrm>
+          <a:prstGeom prst="bentConnector3">
+            <a:avLst/>
+          </a:prstGeom>
+          <a:ln>
+            <a:tailEnd type="triangle"/>
+          </a:ln>
+        </p:spPr>
+        <p:style>
+          <a:lnRef idx="1">
+            <a:schemeClr val="accent1"/>
+          </a:lnRef>
+          <a:fillRef idx="0">
+            <a:schemeClr val="accent1"/>
+          </a:fillRef>
+          <a:effectRef idx="0">
+            <a:schemeClr val="accent1"/>
+          </a:effectRef>
+          <a:fontRef idx="minor">
+            <a:schemeClr val="tx1"/>
+          </a:fontRef>
+        </p:style>
+      </p:cxnSp>
+      <p:sp>
+        <p:nvSpPr>
+          <p:cNvPr id="34" name="Rectangle: Rounded Corners 33">
+            <a:extLst>
+              <a:ext uri="{FF2B5EF4-FFF2-40B4-BE49-F238E27FC236}">
+                <a16:creationId xmlns:a16="http://schemas.microsoft.com/office/drawing/2014/main" id="{EFF2346E-C21A-403A-8EFC-ED6B514CC6AC}"/>
+              </a:ext>
+            </a:extLst>
+          </p:cNvPr>
+          <p:cNvSpPr/>
+          <p:nvPr/>
+        </p:nvSpPr>
+        <p:spPr>
+          <a:xfrm>
+            <a:off x="1670447" y="1466841"/>
+            <a:ext cx="1662113" cy="990599"/>
+          </a:xfrm>
+          <a:prstGeom prst="roundRect">
+            <a:avLst/>
+          </a:prstGeom>
+        </p:spPr>
+        <p:style>
+          <a:lnRef idx="2">
+            <a:schemeClr val="accent1">
+              <a:shade val="50000"/>
+            </a:schemeClr>
+          </a:lnRef>
+          <a:fillRef idx="1">
+            <a:schemeClr val="accent1"/>
+          </a:fillRef>
+          <a:effectRef idx="0">
+            <a:schemeClr val="accent1"/>
+          </a:effectRef>
+          <a:fontRef idx="minor">
+            <a:schemeClr val="lt1"/>
+          </a:fontRef>
+        </p:style>
+        <p:txBody>
+          <a:bodyPr rtlCol="0" anchor="ctr"/>
+          <a:lstStyle/>
+          <a:p>
+            <a:pPr algn="ctr"/>
+            <a:r>
+              <a:rPr lang="en-US" dirty="0"/>
+              <a:t>Regression Fitting</a:t>
+            </a:r>
+          </a:p>
+          <a:p>
+            <a:pPr algn="ctr"/>
+            <a:r>
+              <a:rPr lang="en-US" sz="900" dirty="0"/>
+              <a:t>[Probit_calc.py]</a:t>
+            </a:r>
+          </a:p>
+        </p:txBody>
+      </p:sp>
+      <p:cxnSp>
+        <p:nvCxnSpPr>
+          <p:cNvPr id="36" name="Connector: Elbow 35">
+            <a:extLst>
+              <a:ext uri="{FF2B5EF4-FFF2-40B4-BE49-F238E27FC236}">
+                <a16:creationId xmlns:a16="http://schemas.microsoft.com/office/drawing/2014/main" id="{76EE54F4-383B-4039-B44A-4F509DD087CE}"/>
+              </a:ext>
+            </a:extLst>
+          </p:cNvPr>
+          <p:cNvCxnSpPr>
+            <a:cxnSpLocks/>
+            <a:endCxn id="34" idx="1"/>
+          </p:cNvCxnSpPr>
+          <p:nvPr/>
+        </p:nvCxnSpPr>
+        <p:spPr>
+          <a:xfrm>
+            <a:off x="230217" y="1962138"/>
+            <a:ext cx="1440230" cy="3"/>
+          </a:xfrm>
+          <a:prstGeom prst="bentConnector3">
+            <a:avLst/>
+          </a:prstGeom>
+          <a:ln>
+            <a:tailEnd type="triangle"/>
+          </a:ln>
+        </p:spPr>
+        <p:style>
+          <a:lnRef idx="1">
+            <a:schemeClr val="accent1"/>
+          </a:lnRef>
+          <a:fillRef idx="0">
+            <a:schemeClr val="accent1"/>
+          </a:fillRef>
+          <a:effectRef idx="0">
+            <a:schemeClr val="accent1"/>
+          </a:effectRef>
+          <a:fontRef idx="minor">
+            <a:schemeClr val="tx1"/>
+          </a:fontRef>
+        </p:style>
+      </p:cxnSp>
+      <p:sp>
+        <p:nvSpPr>
+          <p:cNvPr id="38" name="Rectangle: Rounded Corners 37">
+            <a:extLst>
+              <a:ext uri="{FF2B5EF4-FFF2-40B4-BE49-F238E27FC236}">
+                <a16:creationId xmlns:a16="http://schemas.microsoft.com/office/drawing/2014/main" id="{2033EF19-D7E9-4AD2-8160-419B5A81713A}"/>
+              </a:ext>
+            </a:extLst>
+          </p:cNvPr>
+          <p:cNvSpPr/>
+          <p:nvPr/>
+        </p:nvSpPr>
+        <p:spPr>
+          <a:xfrm>
+            <a:off x="4406503" y="1466838"/>
+            <a:ext cx="1662113" cy="990599"/>
+          </a:xfrm>
+          <a:prstGeom prst="roundRect">
+            <a:avLst/>
+          </a:prstGeom>
+        </p:spPr>
+        <p:style>
+          <a:lnRef idx="2">
+            <a:schemeClr val="accent1">
+              <a:shade val="50000"/>
+            </a:schemeClr>
+          </a:lnRef>
+          <a:fillRef idx="1">
+            <a:schemeClr val="accent1"/>
+          </a:fillRef>
+          <a:effectRef idx="0">
+            <a:schemeClr val="accent1"/>
+          </a:effectRef>
+          <a:fontRef idx="minor">
+            <a:schemeClr val="lt1"/>
+          </a:fontRef>
+        </p:style>
+        <p:txBody>
+          <a:bodyPr rtlCol="0" anchor="ctr"/>
+          <a:lstStyle/>
+          <a:p>
+            <a:pPr algn="ctr"/>
+            <a:r>
+              <a:rPr lang="en-US" dirty="0"/>
+              <a:t>post-processing</a:t>
+            </a:r>
+          </a:p>
+          <a:p>
+            <a:pPr algn="ctr"/>
+            <a:r>
+              <a:rPr lang="en-US" sz="900" dirty="0"/>
+              <a:t>[name – not in dev yet]</a:t>
+            </a:r>
+          </a:p>
+        </p:txBody>
+      </p:sp>
+      <p:cxnSp>
+        <p:nvCxnSpPr>
+          <p:cNvPr id="39" name="Connector: Elbow 38">
+            <a:extLst>
+              <a:ext uri="{FF2B5EF4-FFF2-40B4-BE49-F238E27FC236}">
+                <a16:creationId xmlns:a16="http://schemas.microsoft.com/office/drawing/2014/main" id="{EA387ED4-9FFD-46AB-A08C-12D140A073AE}"/>
+              </a:ext>
+            </a:extLst>
+          </p:cNvPr>
+          <p:cNvCxnSpPr>
+            <a:stCxn id="34" idx="3"/>
+            <a:endCxn id="38" idx="1"/>
+          </p:cNvCxnSpPr>
+          <p:nvPr/>
+        </p:nvCxnSpPr>
+        <p:spPr>
+          <a:xfrm flipV="1">
+            <a:off x="3332560" y="1962138"/>
+            <a:ext cx="1073943" cy="3"/>
+          </a:xfrm>
+          <a:prstGeom prst="bentConnector3">
+            <a:avLst/>
+          </a:prstGeom>
+          <a:ln>
+            <a:tailEnd type="triangle"/>
+          </a:ln>
+        </p:spPr>
+        <p:style>
+          <a:lnRef idx="1">
+            <a:schemeClr val="accent1"/>
+          </a:lnRef>
+          <a:fillRef idx="0">
+            <a:schemeClr val="accent1"/>
+          </a:fillRef>
+          <a:effectRef idx="0">
+            <a:schemeClr val="accent1"/>
+          </a:effectRef>
+          <a:fontRef idx="minor">
+            <a:schemeClr val="tx1"/>
+          </a:fontRef>
+        </p:style>
+      </p:cxnSp>
+      <p:sp>
+        <p:nvSpPr>
+          <p:cNvPr id="40" name="Rectangle: Rounded Corners 39">
+            <a:extLst>
+              <a:ext uri="{FF2B5EF4-FFF2-40B4-BE49-F238E27FC236}">
+                <a16:creationId xmlns:a16="http://schemas.microsoft.com/office/drawing/2014/main" id="{E00C8772-35DE-4C19-BB08-C8AE6612F512}"/>
+              </a:ext>
+            </a:extLst>
+          </p:cNvPr>
+          <p:cNvSpPr/>
+          <p:nvPr/>
+        </p:nvSpPr>
+        <p:spPr>
+          <a:xfrm>
+            <a:off x="1670447" y="2638413"/>
+            <a:ext cx="1662113" cy="990599"/>
+          </a:xfrm>
+          <a:prstGeom prst="roundRect">
+            <a:avLst/>
+          </a:prstGeom>
+        </p:spPr>
+        <p:style>
+          <a:lnRef idx="2">
+            <a:schemeClr val="accent1">
+              <a:shade val="50000"/>
+            </a:schemeClr>
+          </a:lnRef>
+          <a:fillRef idx="1">
+            <a:schemeClr val="accent1"/>
+          </a:fillRef>
+          <a:effectRef idx="0">
+            <a:schemeClr val="accent1"/>
+          </a:effectRef>
+          <a:fontRef idx="minor">
+            <a:schemeClr val="lt1"/>
+          </a:fontRef>
+        </p:style>
+        <p:txBody>
+          <a:bodyPr rtlCol="0" anchor="ctr"/>
+          <a:lstStyle/>
+          <a:p>
+            <a:pPr algn="ctr"/>
+            <a:r>
+              <a:rPr lang="en-US" dirty="0"/>
+              <a:t>Regression Fitting</a:t>
+            </a:r>
+          </a:p>
+          <a:p>
+            <a:pPr algn="ctr"/>
+            <a:r>
+              <a:rPr lang="en-US" sz="900" dirty="0"/>
+              <a:t>[Probit_calc.py]</a:t>
+            </a:r>
+          </a:p>
+        </p:txBody>
+      </p:sp>
+      <p:cxnSp>
+        <p:nvCxnSpPr>
+          <p:cNvPr id="41" name="Connector: Elbow 40">
+            <a:extLst>
+              <a:ext uri="{FF2B5EF4-FFF2-40B4-BE49-F238E27FC236}">
+                <a16:creationId xmlns:a16="http://schemas.microsoft.com/office/drawing/2014/main" id="{DF9B3827-08E0-4FDD-88B7-C83F774CC82A}"/>
+              </a:ext>
+            </a:extLst>
+          </p:cNvPr>
+          <p:cNvCxnSpPr>
+            <a:cxnSpLocks/>
+            <a:endCxn id="40" idx="1"/>
+          </p:cNvCxnSpPr>
+          <p:nvPr/>
+        </p:nvCxnSpPr>
+        <p:spPr>
+          <a:xfrm>
+            <a:off x="230217" y="3133710"/>
+            <a:ext cx="1440230" cy="3"/>
+          </a:xfrm>
+          <a:prstGeom prst="bentConnector3">
+            <a:avLst/>
+          </a:prstGeom>
+          <a:ln>
+            <a:tailEnd type="triangle"/>
+          </a:ln>
+        </p:spPr>
+        <p:style>
+          <a:lnRef idx="1">
+            <a:schemeClr val="accent1"/>
+          </a:lnRef>
+          <a:fillRef idx="0">
+            <a:schemeClr val="accent1"/>
+          </a:fillRef>
+          <a:effectRef idx="0">
+            <a:schemeClr val="accent1"/>
+          </a:effectRef>
+          <a:fontRef idx="minor">
+            <a:schemeClr val="tx1"/>
+          </a:fontRef>
+        </p:style>
+      </p:cxnSp>
+      <p:sp>
+        <p:nvSpPr>
+          <p:cNvPr id="43" name="Rectangle: Rounded Corners 42">
+            <a:extLst>
+              <a:ext uri="{FF2B5EF4-FFF2-40B4-BE49-F238E27FC236}">
+                <a16:creationId xmlns:a16="http://schemas.microsoft.com/office/drawing/2014/main" id="{A6DFC731-9CAE-44CC-9A30-9EC27A5D9C19}"/>
+              </a:ext>
+            </a:extLst>
+          </p:cNvPr>
+          <p:cNvSpPr/>
+          <p:nvPr/>
+        </p:nvSpPr>
+        <p:spPr>
+          <a:xfrm>
+            <a:off x="4406503" y="2638410"/>
+            <a:ext cx="1662113" cy="990599"/>
+          </a:xfrm>
+          <a:prstGeom prst="roundRect">
+            <a:avLst/>
+          </a:prstGeom>
+        </p:spPr>
+        <p:style>
+          <a:lnRef idx="2">
+            <a:schemeClr val="accent1">
+              <a:shade val="50000"/>
+            </a:schemeClr>
+          </a:lnRef>
+          <a:fillRef idx="1">
+            <a:schemeClr val="accent1"/>
+          </a:fillRef>
+          <a:effectRef idx="0">
+            <a:schemeClr val="accent1"/>
+          </a:effectRef>
+          <a:fontRef idx="minor">
+            <a:schemeClr val="lt1"/>
+          </a:fontRef>
+        </p:style>
+        <p:txBody>
+          <a:bodyPr rtlCol="0" anchor="ctr"/>
+          <a:lstStyle/>
+          <a:p>
+            <a:pPr algn="ctr"/>
+            <a:r>
+              <a:rPr lang="en-US" dirty="0"/>
+              <a:t>post-processing</a:t>
+            </a:r>
+          </a:p>
+          <a:p>
+            <a:pPr algn="ctr"/>
+            <a:r>
+              <a:rPr lang="en-US" sz="900" dirty="0"/>
+              <a:t>[name – not in dev yet]</a:t>
+            </a:r>
+          </a:p>
+        </p:txBody>
+      </p:sp>
+      <p:cxnSp>
+        <p:nvCxnSpPr>
+          <p:cNvPr id="44" name="Connector: Elbow 43">
+            <a:extLst>
+              <a:ext uri="{FF2B5EF4-FFF2-40B4-BE49-F238E27FC236}">
+                <a16:creationId xmlns:a16="http://schemas.microsoft.com/office/drawing/2014/main" id="{DAA2F029-9F9F-43EE-B714-71ADF0CA1D95}"/>
+              </a:ext>
+            </a:extLst>
+          </p:cNvPr>
+          <p:cNvCxnSpPr>
+            <a:stCxn id="40" idx="3"/>
+            <a:endCxn id="43" idx="1"/>
+          </p:cNvCxnSpPr>
+          <p:nvPr/>
+        </p:nvCxnSpPr>
+        <p:spPr>
+          <a:xfrm flipV="1">
+            <a:off x="3332560" y="3133710"/>
+            <a:ext cx="1073943" cy="3"/>
+          </a:xfrm>
+          <a:prstGeom prst="bentConnector3">
+            <a:avLst/>
+          </a:prstGeom>
+          <a:ln>
+            <a:tailEnd type="triangle"/>
+          </a:ln>
+        </p:spPr>
+        <p:style>
+          <a:lnRef idx="1">
+            <a:schemeClr val="accent1"/>
+          </a:lnRef>
+          <a:fillRef idx="0">
+            <a:schemeClr val="accent1"/>
+          </a:fillRef>
+          <a:effectRef idx="0">
+            <a:schemeClr val="accent1"/>
+          </a:effectRef>
+          <a:fontRef idx="minor">
+            <a:schemeClr val="tx1"/>
+          </a:fontRef>
+        </p:style>
+      </p:cxnSp>
+      <p:sp>
+        <p:nvSpPr>
+          <p:cNvPr id="45" name="Rectangle: Rounded Corners 44">
+            <a:extLst>
+              <a:ext uri="{FF2B5EF4-FFF2-40B4-BE49-F238E27FC236}">
+                <a16:creationId xmlns:a16="http://schemas.microsoft.com/office/drawing/2014/main" id="{231A3087-DF0B-467D-8640-82E0C38A7EB5}"/>
+              </a:ext>
+            </a:extLst>
+          </p:cNvPr>
+          <p:cNvSpPr/>
+          <p:nvPr/>
+        </p:nvSpPr>
+        <p:spPr>
+          <a:xfrm>
+            <a:off x="1670447" y="5391159"/>
+            <a:ext cx="1662113" cy="990599"/>
+          </a:xfrm>
+          <a:prstGeom prst="roundRect">
+            <a:avLst/>
+          </a:prstGeom>
+        </p:spPr>
+        <p:style>
+          <a:lnRef idx="2">
+            <a:schemeClr val="accent1">
+              <a:shade val="50000"/>
+            </a:schemeClr>
+          </a:lnRef>
+          <a:fillRef idx="1">
+            <a:schemeClr val="accent1"/>
+          </a:fillRef>
+          <a:effectRef idx="0">
+            <a:schemeClr val="accent1"/>
+          </a:effectRef>
+          <a:fontRef idx="minor">
+            <a:schemeClr val="lt1"/>
+          </a:fontRef>
+        </p:style>
+        <p:txBody>
+          <a:bodyPr rtlCol="0" anchor="ctr"/>
+          <a:lstStyle/>
+          <a:p>
+            <a:pPr algn="ctr"/>
+            <a:r>
+              <a:rPr lang="en-US" dirty="0"/>
+              <a:t>Regression Fitting</a:t>
+            </a:r>
+          </a:p>
+          <a:p>
+            <a:pPr algn="ctr"/>
+            <a:r>
+              <a:rPr lang="en-US" sz="900" dirty="0"/>
+              <a:t>[Probit_calc.py]</a:t>
+            </a:r>
+          </a:p>
+        </p:txBody>
+      </p:sp>
+      <p:cxnSp>
+        <p:nvCxnSpPr>
+          <p:cNvPr id="47" name="Connector: Elbow 46">
+            <a:extLst>
+              <a:ext uri="{FF2B5EF4-FFF2-40B4-BE49-F238E27FC236}">
+                <a16:creationId xmlns:a16="http://schemas.microsoft.com/office/drawing/2014/main" id="{7E4307AF-9886-4E84-B8F6-CEEBDDB0741B}"/>
+              </a:ext>
+            </a:extLst>
+          </p:cNvPr>
+          <p:cNvCxnSpPr>
+            <a:cxnSpLocks/>
+            <a:endCxn id="45" idx="1"/>
+          </p:cNvCxnSpPr>
+          <p:nvPr/>
+        </p:nvCxnSpPr>
+        <p:spPr>
+          <a:xfrm>
+            <a:off x="230217" y="5886456"/>
+            <a:ext cx="1440230" cy="3"/>
+          </a:xfrm>
+          <a:prstGeom prst="bentConnector3">
+            <a:avLst/>
+          </a:prstGeom>
+          <a:ln>
+            <a:tailEnd type="triangle"/>
+          </a:ln>
+        </p:spPr>
+        <p:style>
+          <a:lnRef idx="1">
+            <a:schemeClr val="accent1"/>
+          </a:lnRef>
+          <a:fillRef idx="0">
+            <a:schemeClr val="accent1"/>
+          </a:fillRef>
+          <a:effectRef idx="0">
+            <a:schemeClr val="accent1"/>
+          </a:effectRef>
+          <a:fontRef idx="minor">
+            <a:schemeClr val="tx1"/>
+          </a:fontRef>
+        </p:style>
+      </p:cxnSp>
+      <p:sp>
+        <p:nvSpPr>
+          <p:cNvPr id="48" name="Rectangle: Rounded Corners 47">
+            <a:extLst>
+              <a:ext uri="{FF2B5EF4-FFF2-40B4-BE49-F238E27FC236}">
+                <a16:creationId xmlns:a16="http://schemas.microsoft.com/office/drawing/2014/main" id="{ADD1412A-D74C-48B1-8253-BEBA210DE175}"/>
+              </a:ext>
+            </a:extLst>
+          </p:cNvPr>
+          <p:cNvSpPr/>
+          <p:nvPr/>
+        </p:nvSpPr>
+        <p:spPr>
+          <a:xfrm>
+            <a:off x="4406503" y="5391156"/>
+            <a:ext cx="1662113" cy="990599"/>
+          </a:xfrm>
+          <a:prstGeom prst="roundRect">
+            <a:avLst/>
+          </a:prstGeom>
+        </p:spPr>
+        <p:style>
+          <a:lnRef idx="2">
+            <a:schemeClr val="accent1">
+              <a:shade val="50000"/>
+            </a:schemeClr>
+          </a:lnRef>
+          <a:fillRef idx="1">
+            <a:schemeClr val="accent1"/>
+          </a:fillRef>
+          <a:effectRef idx="0">
+            <a:schemeClr val="accent1"/>
+          </a:effectRef>
+          <a:fontRef idx="minor">
+            <a:schemeClr val="lt1"/>
+          </a:fontRef>
+        </p:style>
+        <p:txBody>
+          <a:bodyPr rtlCol="0" anchor="ctr"/>
+          <a:lstStyle/>
+          <a:p>
+            <a:pPr algn="ctr"/>
+            <a:r>
+              <a:rPr lang="en-US" dirty="0"/>
+              <a:t>post-processing</a:t>
+            </a:r>
+          </a:p>
+          <a:p>
+            <a:pPr algn="ctr"/>
+            <a:r>
+              <a:rPr lang="en-US" sz="900" dirty="0"/>
+              <a:t>[name – not in dev yet]</a:t>
+            </a:r>
+          </a:p>
+        </p:txBody>
+      </p:sp>
+      <p:cxnSp>
+        <p:nvCxnSpPr>
+          <p:cNvPr id="49" name="Connector: Elbow 48">
+            <a:extLst>
+              <a:ext uri="{FF2B5EF4-FFF2-40B4-BE49-F238E27FC236}">
+                <a16:creationId xmlns:a16="http://schemas.microsoft.com/office/drawing/2014/main" id="{AD2FE90B-59A9-4EB4-9C4E-1B9B8D21A0FE}"/>
+              </a:ext>
+            </a:extLst>
+          </p:cNvPr>
+          <p:cNvCxnSpPr>
+            <a:stCxn id="45" idx="3"/>
+            <a:endCxn id="48" idx="1"/>
+          </p:cNvCxnSpPr>
+          <p:nvPr/>
+        </p:nvCxnSpPr>
+        <p:spPr>
+          <a:xfrm flipV="1">
+            <a:off x="3332560" y="5886456"/>
+            <a:ext cx="1073943" cy="3"/>
+          </a:xfrm>
+          <a:prstGeom prst="bentConnector3">
+            <a:avLst/>
+          </a:prstGeom>
+          <a:ln>
+            <a:tailEnd type="triangle"/>
+          </a:ln>
+        </p:spPr>
+        <p:style>
+          <a:lnRef idx="1">
+            <a:schemeClr val="accent1"/>
+          </a:lnRef>
+          <a:fillRef idx="0">
+            <a:schemeClr val="accent1"/>
+          </a:fillRef>
+          <a:effectRef idx="0">
+            <a:schemeClr val="accent1"/>
+          </a:effectRef>
+          <a:fontRef idx="minor">
+            <a:schemeClr val="tx1"/>
+          </a:fontRef>
+        </p:style>
+      </p:cxnSp>
+      <p:sp>
+        <p:nvSpPr>
+          <p:cNvPr id="2" name="Oval 1">
+            <a:extLst>
+              <a:ext uri="{FF2B5EF4-FFF2-40B4-BE49-F238E27FC236}">
+                <a16:creationId xmlns:a16="http://schemas.microsoft.com/office/drawing/2014/main" id="{00E55EBB-DCD8-4DE8-AD98-299370CAF03D}"/>
+              </a:ext>
+            </a:extLst>
+          </p:cNvPr>
+          <p:cNvSpPr/>
+          <p:nvPr/>
+        </p:nvSpPr>
+        <p:spPr>
+          <a:xfrm>
+            <a:off x="3712368" y="3810001"/>
+            <a:ext cx="295275" cy="304797"/>
+          </a:xfrm>
+          <a:prstGeom prst="ellipse">
+            <a:avLst/>
+          </a:prstGeom>
+        </p:spPr>
+        <p:style>
+          <a:lnRef idx="2">
+            <a:schemeClr val="accent1">
+              <a:shade val="50000"/>
+            </a:schemeClr>
+          </a:lnRef>
+          <a:fillRef idx="1">
+            <a:schemeClr val="accent1"/>
+          </a:fillRef>
+          <a:effectRef idx="0">
+            <a:schemeClr val="accent1"/>
+          </a:effectRef>
+          <a:fontRef idx="minor">
+            <a:schemeClr val="lt1"/>
+          </a:fontRef>
+        </p:style>
+        <p:txBody>
+          <a:bodyPr rtlCol="0" anchor="ctr"/>
+          <a:lstStyle/>
+          <a:p>
+            <a:pPr algn="ctr"/>
+            <a:endParaRPr lang="en-US"/>
+          </a:p>
+        </p:txBody>
+      </p:sp>
+      <p:sp>
+        <p:nvSpPr>
+          <p:cNvPr id="50" name="Oval 49">
+            <a:extLst>
+              <a:ext uri="{FF2B5EF4-FFF2-40B4-BE49-F238E27FC236}">
+                <a16:creationId xmlns:a16="http://schemas.microsoft.com/office/drawing/2014/main" id="{A49A2A0D-8EDA-4115-8C8D-2176B06BA7E6}"/>
+              </a:ext>
+            </a:extLst>
+          </p:cNvPr>
+          <p:cNvSpPr/>
+          <p:nvPr/>
+        </p:nvSpPr>
+        <p:spPr>
+          <a:xfrm>
+            <a:off x="3721893" y="4238624"/>
+            <a:ext cx="295275" cy="304797"/>
+          </a:xfrm>
+          <a:prstGeom prst="ellipse">
+            <a:avLst/>
+          </a:prstGeom>
+        </p:spPr>
+        <p:style>
+          <a:lnRef idx="2">
+            <a:schemeClr val="accent1">
+              <a:shade val="50000"/>
+            </a:schemeClr>
+          </a:lnRef>
+          <a:fillRef idx="1">
+            <a:schemeClr val="accent1"/>
+          </a:fillRef>
+          <a:effectRef idx="0">
+            <a:schemeClr val="accent1"/>
+          </a:effectRef>
+          <a:fontRef idx="minor">
+            <a:schemeClr val="lt1"/>
+          </a:fontRef>
+        </p:style>
+        <p:txBody>
+          <a:bodyPr rtlCol="0" anchor="ctr"/>
+          <a:lstStyle/>
+          <a:p>
+            <a:pPr algn="ctr"/>
+            <a:endParaRPr lang="en-US"/>
+          </a:p>
+        </p:txBody>
+      </p:sp>
+      <p:sp>
+        <p:nvSpPr>
+          <p:cNvPr id="51" name="Oval 50">
+            <a:extLst>
+              <a:ext uri="{FF2B5EF4-FFF2-40B4-BE49-F238E27FC236}">
+                <a16:creationId xmlns:a16="http://schemas.microsoft.com/office/drawing/2014/main" id="{02CC91F7-FB52-4B73-BF2C-917D6694F91D}"/>
+              </a:ext>
+            </a:extLst>
+          </p:cNvPr>
+          <p:cNvSpPr/>
+          <p:nvPr/>
+        </p:nvSpPr>
+        <p:spPr>
+          <a:xfrm>
+            <a:off x="3712367" y="4667247"/>
+            <a:ext cx="295275" cy="304797"/>
+          </a:xfrm>
+          <a:prstGeom prst="ellipse">
+            <a:avLst/>
+          </a:prstGeom>
+        </p:spPr>
+        <p:style>
+          <a:lnRef idx="2">
+            <a:schemeClr val="accent1">
+              <a:shade val="50000"/>
+            </a:schemeClr>
+          </a:lnRef>
+          <a:fillRef idx="1">
+            <a:schemeClr val="accent1"/>
+          </a:fillRef>
+          <a:effectRef idx="0">
+            <a:schemeClr val="accent1"/>
+          </a:effectRef>
+          <a:fontRef idx="minor">
+            <a:schemeClr val="lt1"/>
+          </a:fontRef>
+        </p:style>
+        <p:txBody>
+          <a:bodyPr rtlCol="0" anchor="ctr"/>
+          <a:lstStyle/>
+          <a:p>
+            <a:pPr algn="ctr"/>
+            <a:endParaRPr lang="en-US"/>
+          </a:p>
+        </p:txBody>
+      </p:sp>
+      <p:sp>
+        <p:nvSpPr>
+          <p:cNvPr id="3" name="TextBox 2">
+            <a:extLst>
+              <a:ext uri="{FF2B5EF4-FFF2-40B4-BE49-F238E27FC236}">
+                <a16:creationId xmlns:a16="http://schemas.microsoft.com/office/drawing/2014/main" id="{7C25C203-EC60-46B5-BD3D-B4FDEF62628A}"/>
+              </a:ext>
+            </a:extLst>
+          </p:cNvPr>
+          <p:cNvSpPr txBox="1"/>
+          <p:nvPr/>
+        </p:nvSpPr>
+        <p:spPr>
+          <a:xfrm>
+            <a:off x="264456" y="468820"/>
+            <a:ext cx="869020" cy="369332"/>
+          </a:xfrm>
+          <a:prstGeom prst="rect">
+            <a:avLst/>
+          </a:prstGeom>
+          <a:noFill/>
+        </p:spPr>
+        <p:txBody>
+          <a:bodyPr wrap="none" rtlCol="0">
+            <a:spAutoFit/>
+          </a:bodyPr>
+          <a:lstStyle/>
+          <a:p>
+            <a:r>
+              <a:rPr lang="en-US" dirty="0"/>
+              <a:t>Panel 1</a:t>
+            </a:r>
+          </a:p>
+        </p:txBody>
+      </p:sp>
+      <p:sp>
+        <p:nvSpPr>
+          <p:cNvPr id="52" name="TextBox 51">
+            <a:extLst>
+              <a:ext uri="{FF2B5EF4-FFF2-40B4-BE49-F238E27FC236}">
+                <a16:creationId xmlns:a16="http://schemas.microsoft.com/office/drawing/2014/main" id="{629D823A-3CA4-42CD-972C-7ABDCAFAD129}"/>
+              </a:ext>
+            </a:extLst>
+          </p:cNvPr>
+          <p:cNvSpPr txBox="1"/>
+          <p:nvPr/>
+        </p:nvSpPr>
+        <p:spPr>
+          <a:xfrm>
+            <a:off x="264456" y="1640389"/>
+            <a:ext cx="869020" cy="369332"/>
+          </a:xfrm>
+          <a:prstGeom prst="rect">
+            <a:avLst/>
+          </a:prstGeom>
+          <a:noFill/>
+        </p:spPr>
+        <p:txBody>
+          <a:bodyPr wrap="none" rtlCol="0">
+            <a:spAutoFit/>
+          </a:bodyPr>
+          <a:lstStyle/>
+          <a:p>
+            <a:r>
+              <a:rPr lang="en-US" dirty="0"/>
+              <a:t>Panel 2</a:t>
+            </a:r>
+          </a:p>
+        </p:txBody>
+      </p:sp>
+      <p:sp>
+        <p:nvSpPr>
+          <p:cNvPr id="53" name="TextBox 52">
+            <a:extLst>
+              <a:ext uri="{FF2B5EF4-FFF2-40B4-BE49-F238E27FC236}">
+                <a16:creationId xmlns:a16="http://schemas.microsoft.com/office/drawing/2014/main" id="{756A4B43-FFB3-4D57-9983-8DDBF5FD7B97}"/>
+              </a:ext>
+            </a:extLst>
+          </p:cNvPr>
+          <p:cNvSpPr txBox="1"/>
+          <p:nvPr/>
+        </p:nvSpPr>
+        <p:spPr>
+          <a:xfrm>
+            <a:off x="230217" y="2776011"/>
+            <a:ext cx="869020" cy="369332"/>
+          </a:xfrm>
+          <a:prstGeom prst="rect">
+            <a:avLst/>
+          </a:prstGeom>
+          <a:noFill/>
+        </p:spPr>
+        <p:txBody>
+          <a:bodyPr wrap="none" rtlCol="0">
+            <a:spAutoFit/>
+          </a:bodyPr>
+          <a:lstStyle/>
+          <a:p>
+            <a:r>
+              <a:rPr lang="en-US" dirty="0"/>
+              <a:t>Panel 3</a:t>
+            </a:r>
+          </a:p>
+        </p:txBody>
+      </p:sp>
+      <p:sp>
+        <p:nvSpPr>
+          <p:cNvPr id="54" name="TextBox 53">
+            <a:extLst>
+              <a:ext uri="{FF2B5EF4-FFF2-40B4-BE49-F238E27FC236}">
+                <a16:creationId xmlns:a16="http://schemas.microsoft.com/office/drawing/2014/main" id="{C4EF53AB-F35D-4062-AA99-6F05F1655FA4}"/>
+              </a:ext>
+            </a:extLst>
+          </p:cNvPr>
+          <p:cNvSpPr txBox="1"/>
+          <p:nvPr/>
+        </p:nvSpPr>
+        <p:spPr>
+          <a:xfrm>
+            <a:off x="230217" y="5454142"/>
+            <a:ext cx="873829" cy="369332"/>
+          </a:xfrm>
+          <a:prstGeom prst="rect">
+            <a:avLst/>
+          </a:prstGeom>
+          <a:noFill/>
+        </p:spPr>
+        <p:txBody>
+          <a:bodyPr wrap="none" rtlCol="0">
+            <a:spAutoFit/>
+          </a:bodyPr>
+          <a:lstStyle/>
+          <a:p>
+            <a:r>
+              <a:rPr lang="en-US" dirty="0"/>
+              <a:t>Panel n</a:t>
+            </a:r>
+          </a:p>
+        </p:txBody>
+      </p:sp>
+      <p:sp>
+        <p:nvSpPr>
+          <p:cNvPr id="55" name="Rectangle: Rounded Corners 54">
+            <a:extLst>
+              <a:ext uri="{FF2B5EF4-FFF2-40B4-BE49-F238E27FC236}">
+                <a16:creationId xmlns:a16="http://schemas.microsoft.com/office/drawing/2014/main" id="{3E876D1F-FEB9-4F05-B03F-469B81A8058E}"/>
+              </a:ext>
+            </a:extLst>
+          </p:cNvPr>
+          <p:cNvSpPr/>
+          <p:nvPr/>
+        </p:nvSpPr>
+        <p:spPr>
+          <a:xfrm>
+            <a:off x="7025876" y="2819402"/>
+            <a:ext cx="1662113" cy="990599"/>
+          </a:xfrm>
+          <a:prstGeom prst="roundRect">
+            <a:avLst/>
+          </a:prstGeom>
+        </p:spPr>
+        <p:style>
+          <a:lnRef idx="2">
+            <a:schemeClr val="accent1">
+              <a:shade val="50000"/>
+            </a:schemeClr>
+          </a:lnRef>
+          <a:fillRef idx="1">
+            <a:schemeClr val="accent1"/>
+          </a:fillRef>
+          <a:effectRef idx="0">
+            <a:schemeClr val="accent1"/>
+          </a:effectRef>
+          <a:fontRef idx="minor">
+            <a:schemeClr val="lt1"/>
+          </a:fontRef>
+        </p:style>
+        <p:txBody>
+          <a:bodyPr rtlCol="0" anchor="ctr"/>
+          <a:lstStyle/>
+          <a:p>
+            <a:pPr algn="ctr"/>
+            <a:r>
+              <a:rPr lang="en-US" dirty="0"/>
+              <a:t>Merge data</a:t>
+            </a:r>
+          </a:p>
+        </p:txBody>
+      </p:sp>
+      <p:sp>
+        <p:nvSpPr>
+          <p:cNvPr id="8" name="Right Brace 7">
+            <a:extLst>
+              <a:ext uri="{FF2B5EF4-FFF2-40B4-BE49-F238E27FC236}">
+                <a16:creationId xmlns:a16="http://schemas.microsoft.com/office/drawing/2014/main" id="{CDAE305B-8DCC-4379-BBA0-FA4C4A57B0C3}"/>
+              </a:ext>
+            </a:extLst>
+          </p:cNvPr>
+          <p:cNvSpPr/>
+          <p:nvPr/>
+        </p:nvSpPr>
+        <p:spPr>
+          <a:xfrm>
+            <a:off x="6247804" y="123825"/>
+            <a:ext cx="675084" cy="6387557"/>
+          </a:xfrm>
+          <a:prstGeom prst="rightBrace">
+            <a:avLst/>
+          </a:prstGeom>
+        </p:spPr>
+        <p:style>
+          <a:lnRef idx="1">
+            <a:schemeClr val="accent1"/>
+          </a:lnRef>
+          <a:fillRef idx="0">
+            <a:schemeClr val="accent1"/>
+          </a:fillRef>
+          <a:effectRef idx="0">
+            <a:schemeClr val="accent1"/>
+          </a:effectRef>
+          <a:fontRef idx="minor">
+            <a:schemeClr val="tx1"/>
+          </a:fontRef>
+        </p:style>
+        <p:txBody>
+          <a:bodyPr rtlCol="0" anchor="ctr"/>
+          <a:lstStyle/>
+          <a:p>
+            <a:pPr algn="ctr"/>
+            <a:endParaRPr lang="en-US"/>
+          </a:p>
+        </p:txBody>
+      </p:sp>
+      <p:sp>
+        <p:nvSpPr>
+          <p:cNvPr id="57" name="Rectangle: Rounded Corners 56">
+            <a:extLst>
+              <a:ext uri="{FF2B5EF4-FFF2-40B4-BE49-F238E27FC236}">
+                <a16:creationId xmlns:a16="http://schemas.microsoft.com/office/drawing/2014/main" id="{2981F278-59BC-4FFE-979C-C89B511E2915}"/>
+              </a:ext>
+            </a:extLst>
+          </p:cNvPr>
+          <p:cNvSpPr/>
+          <p:nvPr/>
+        </p:nvSpPr>
+        <p:spPr>
+          <a:xfrm>
+            <a:off x="9588101" y="2819402"/>
+            <a:ext cx="1662113" cy="990599"/>
+          </a:xfrm>
+          <a:prstGeom prst="roundRect">
+            <a:avLst/>
+          </a:prstGeom>
+        </p:spPr>
+        <p:style>
+          <a:lnRef idx="2">
+            <a:schemeClr val="accent1">
+              <a:shade val="50000"/>
+            </a:schemeClr>
+          </a:lnRef>
+          <a:fillRef idx="1">
+            <a:schemeClr val="accent1"/>
+          </a:fillRef>
+          <a:effectRef idx="0">
+            <a:schemeClr val="accent1"/>
+          </a:effectRef>
+          <a:fontRef idx="minor">
+            <a:schemeClr val="lt1"/>
+          </a:fontRef>
+        </p:style>
+        <p:txBody>
+          <a:bodyPr rtlCol="0" anchor="ctr"/>
+          <a:lstStyle/>
+          <a:p>
+            <a:pPr algn="ctr"/>
+            <a:r>
+              <a:rPr lang="en-US" dirty="0"/>
+              <a:t>Filter Data</a:t>
+            </a:r>
+          </a:p>
+        </p:txBody>
+      </p:sp>
+      <p:sp>
+        <p:nvSpPr>
+          <p:cNvPr id="60" name="Rectangle: Rounded Corners 59">
+            <a:extLst>
+              <a:ext uri="{FF2B5EF4-FFF2-40B4-BE49-F238E27FC236}">
+                <a16:creationId xmlns:a16="http://schemas.microsoft.com/office/drawing/2014/main" id="{1D09DF65-61B7-41B9-AB0E-DC5355C4AF9D}"/>
+              </a:ext>
+            </a:extLst>
+          </p:cNvPr>
+          <p:cNvSpPr/>
+          <p:nvPr/>
+        </p:nvSpPr>
+        <p:spPr>
+          <a:xfrm>
+            <a:off x="8597501" y="942964"/>
+            <a:ext cx="1662113" cy="990599"/>
+          </a:xfrm>
+          <a:prstGeom prst="roundRect">
+            <a:avLst/>
+          </a:prstGeom>
+        </p:spPr>
+        <p:style>
+          <a:lnRef idx="2">
+            <a:schemeClr val="accent1">
+              <a:shade val="50000"/>
+            </a:schemeClr>
+          </a:lnRef>
+          <a:fillRef idx="1">
+            <a:schemeClr val="accent1"/>
+          </a:fillRef>
+          <a:effectRef idx="0">
+            <a:schemeClr val="accent1"/>
+          </a:effectRef>
+          <a:fontRef idx="minor">
+            <a:schemeClr val="lt1"/>
+          </a:fontRef>
+        </p:style>
+        <p:txBody>
+          <a:bodyPr rtlCol="0" anchor="ctr"/>
+          <a:lstStyle/>
+          <a:p>
+            <a:pPr algn="ctr"/>
+            <a:r>
+              <a:rPr lang="en-US" dirty="0"/>
+              <a:t>EDA / Batch Effects Search</a:t>
+            </a:r>
+          </a:p>
+        </p:txBody>
+      </p:sp>
+      <p:sp>
+        <p:nvSpPr>
+          <p:cNvPr id="62" name="Rectangle: Rounded Corners 61">
+            <a:extLst>
+              <a:ext uri="{FF2B5EF4-FFF2-40B4-BE49-F238E27FC236}">
+                <a16:creationId xmlns:a16="http://schemas.microsoft.com/office/drawing/2014/main" id="{3E2C030F-32F1-45CA-9E71-90AA1964CF04}"/>
+              </a:ext>
+            </a:extLst>
+          </p:cNvPr>
+          <p:cNvSpPr/>
+          <p:nvPr/>
+        </p:nvSpPr>
+        <p:spPr>
+          <a:xfrm>
+            <a:off x="10332242" y="4257689"/>
+            <a:ext cx="1662113" cy="876302"/>
+          </a:xfrm>
+          <a:prstGeom prst="roundRect">
+            <a:avLst/>
+          </a:prstGeom>
+        </p:spPr>
+        <p:style>
+          <a:lnRef idx="2">
+            <a:schemeClr val="accent1">
+              <a:shade val="50000"/>
+            </a:schemeClr>
+          </a:lnRef>
+          <a:fillRef idx="1">
+            <a:schemeClr val="accent1"/>
+          </a:fillRef>
+          <a:effectRef idx="0">
+            <a:schemeClr val="accent1"/>
+          </a:effectRef>
+          <a:fontRef idx="minor">
+            <a:schemeClr val="lt1"/>
+          </a:fontRef>
+        </p:style>
+        <p:txBody>
+          <a:bodyPr rtlCol="0" anchor="ctr"/>
+          <a:lstStyle/>
+          <a:p>
+            <a:pPr algn="ctr"/>
+            <a:r>
+              <a:rPr lang="en-US" dirty="0"/>
+              <a:t>Batch Effect Correction</a:t>
+            </a:r>
+          </a:p>
+          <a:p>
+            <a:pPr algn="ctr"/>
+            <a:r>
+              <a:rPr lang="en-US" dirty="0"/>
+              <a:t>[If necessary]</a:t>
+            </a:r>
+          </a:p>
+        </p:txBody>
+      </p:sp>
+      <p:sp>
+        <p:nvSpPr>
+          <p:cNvPr id="64" name="Rectangle: Rounded Corners 63">
+            <a:extLst>
+              <a:ext uri="{FF2B5EF4-FFF2-40B4-BE49-F238E27FC236}">
+                <a16:creationId xmlns:a16="http://schemas.microsoft.com/office/drawing/2014/main" id="{4FFF4484-8DFD-4470-99BC-190B09E8ED7B}"/>
+              </a:ext>
+            </a:extLst>
+          </p:cNvPr>
+          <p:cNvSpPr/>
+          <p:nvPr/>
+        </p:nvSpPr>
+        <p:spPr>
+          <a:xfrm>
+            <a:off x="9588101" y="5492192"/>
+            <a:ext cx="1662113" cy="990599"/>
+          </a:xfrm>
+          <a:prstGeom prst="roundRect">
+            <a:avLst/>
+          </a:prstGeom>
+        </p:spPr>
+        <p:style>
+          <a:lnRef idx="2">
+            <a:schemeClr val="accent1">
+              <a:shade val="50000"/>
+            </a:schemeClr>
+          </a:lnRef>
+          <a:fillRef idx="1">
+            <a:schemeClr val="accent1"/>
+          </a:fillRef>
+          <a:effectRef idx="0">
+            <a:schemeClr val="accent1"/>
+          </a:effectRef>
+          <a:fontRef idx="minor">
+            <a:schemeClr val="lt1"/>
+          </a:fontRef>
+        </p:style>
+        <p:txBody>
+          <a:bodyPr rtlCol="0" anchor="ctr"/>
+          <a:lstStyle/>
+          <a:p>
+            <a:pPr algn="ctr"/>
+            <a:r>
+              <a:rPr lang="en-US" dirty="0"/>
+              <a:t>Assign Sensitivity Labels</a:t>
+            </a:r>
+          </a:p>
+        </p:txBody>
+      </p:sp>
+    </p:spTree>
+    <p:extLst>
+      <p:ext uri="{BB962C8B-B14F-4D97-AF65-F5344CB8AC3E}">
+        <p14:creationId xmlns:p14="http://schemas.microsoft.com/office/powerpoint/2010/main" val="4161191841"/>
+      </p:ext>
+    </p:extLst>
+  </p:cSld>
+  <p:clrMapOvr>
+    <a:masterClrMapping/>
+  </p:clrMapOvr>
+</p:sld>
+</file>
+
+<file path=ppt/slides/slide5.xml><?xml version="1.0" encoding="utf-8"?>
 <p:sld xmlns:a="http://schemas.openxmlformats.org/drawingml/2006/main" xmlns:r="http://schemas.openxmlformats.org/officeDocument/2006/relationships" xmlns:p="http://schemas.openxmlformats.org/presentationml/2006/main">
   <p:cSld>
     <p:spTree>
@@ -7730,123 +9278,6 @@
 </p:sld>
 </file>
 
-<file path=ppt/slides/slide5.xml><?xml version="1.0" encoding="utf-8"?>
-<p:sld xmlns:a="http://schemas.openxmlformats.org/drawingml/2006/main" xmlns:r="http://schemas.openxmlformats.org/officeDocument/2006/relationships" xmlns:p="http://schemas.openxmlformats.org/presentationml/2006/main">
-  <p:cSld>
-    <p:spTree>
-      <p:nvGrpSpPr>
-        <p:cNvPr id="1" name=""/>
-        <p:cNvGrpSpPr/>
-        <p:nvPr/>
-      </p:nvGrpSpPr>
-      <p:grpSpPr>
-        <a:xfrm>
-          <a:off x="0" y="0"/>
-          <a:ext cx="0" cy="0"/>
-          <a:chOff x="0" y="0"/>
-          <a:chExt cx="0" cy="0"/>
-        </a:xfrm>
-      </p:grpSpPr>
-      <p:sp>
-        <p:nvSpPr>
-          <p:cNvPr id="2" name="Title 1">
-            <a:extLst>
-              <a:ext uri="{FF2B5EF4-FFF2-40B4-BE49-F238E27FC236}">
-                <a16:creationId xmlns:a16="http://schemas.microsoft.com/office/drawing/2014/main" id="{43B430A9-25ED-481A-B22A-EA4DAB1D18BC}"/>
-              </a:ext>
-            </a:extLst>
-          </p:cNvPr>
-          <p:cNvSpPr>
-            <a:spLocks noGrp="1"/>
-          </p:cNvSpPr>
-          <p:nvPr>
-            <p:ph type="title"/>
-          </p:nvPr>
-        </p:nvSpPr>
-        <p:spPr/>
-        <p:txBody>
-          <a:bodyPr/>
-          <a:lstStyle/>
-          <a:p>
-            <a:r>
-              <a:rPr lang="en-US" dirty="0" err="1"/>
-              <a:t>Probit</a:t>
-            </a:r>
-            <a:r>
-              <a:rPr lang="en-US" dirty="0"/>
-              <a:t> Fitting Convergence</a:t>
-            </a:r>
-          </a:p>
-        </p:txBody>
-      </p:sp>
-      <p:sp>
-        <p:nvSpPr>
-          <p:cNvPr id="3" name="Content Placeholder 2">
-            <a:extLst>
-              <a:ext uri="{FF2B5EF4-FFF2-40B4-BE49-F238E27FC236}">
-                <a16:creationId xmlns:a16="http://schemas.microsoft.com/office/drawing/2014/main" id="{2479A295-7211-447A-93F5-5C45A4AEBCA3}"/>
-              </a:ext>
-            </a:extLst>
-          </p:cNvPr>
-          <p:cNvSpPr>
-            <a:spLocks noGrp="1"/>
-          </p:cNvSpPr>
-          <p:nvPr>
-            <p:ph idx="1"/>
-          </p:nvPr>
-        </p:nvSpPr>
-        <p:spPr/>
-        <p:txBody>
-          <a:bodyPr/>
-          <a:lstStyle/>
-          <a:p>
-            <a:r>
-              <a:rPr lang="en-US" dirty="0"/>
-              <a:t>Perfect separation occurs when all [or most] of the cell viability values are identical. </a:t>
-            </a:r>
-          </a:p>
-          <a:p>
-            <a:pPr lvl="1"/>
-            <a:r>
-              <a:rPr lang="en-US" dirty="0"/>
-              <a:t>If all are identical I just fit with the max </a:t>
-            </a:r>
-            <a:r>
-              <a:rPr lang="en-US" dirty="0" err="1"/>
-              <a:t>auc</a:t>
-            </a:r>
-            <a:r>
-              <a:rPr lang="en-US" dirty="0"/>
-              <a:t> value </a:t>
-            </a:r>
-          </a:p>
-          <a:p>
-            <a:pPr lvl="1"/>
-            <a:r>
-              <a:rPr lang="en-US" dirty="0"/>
-              <a:t>If not all are identical, I fit with </a:t>
-            </a:r>
-            <a:r>
-              <a:rPr lang="en-US"/>
-              <a:t>linear regression. </a:t>
-            </a:r>
-            <a:endParaRPr lang="en-US" dirty="0"/>
-          </a:p>
-        </p:txBody>
-      </p:sp>
-    </p:spTree>
-    <p:extLst>
-      <p:ext uri="{BB962C8B-B14F-4D97-AF65-F5344CB8AC3E}">
-        <p14:creationId xmlns:p14="http://schemas.microsoft.com/office/powerpoint/2010/main" val="1587776220"/>
-      </p:ext>
-    </p:extLst>
-  </p:cSld>
-  <p:clrMapOvr>
-    <a:masterClrMapping/>
-  </p:clrMapOvr>
-</p:sld>
-</file>
-
 <file path=ppt/slides/slide6.xml><?xml version="1.0" encoding="utf-8"?>
 <p:sld xmlns:a="http://schemas.openxmlformats.org/drawingml/2006/main" xmlns:r="http://schemas.openxmlformats.org/officeDocument/2006/relationships" xmlns:p="http://schemas.openxmlformats.org/presentationml/2006/main">
   <p:cSld>
@@ -7869,7 +9300,7 @@
           <p:cNvPr id="2" name="Title 1">
             <a:extLst>
               <a:ext uri="{FF2B5EF4-FFF2-40B4-BE49-F238E27FC236}">
-                <a16:creationId xmlns:a16="http://schemas.microsoft.com/office/drawing/2014/main" id="{0C9934DF-8684-482D-A4AA-A6412C0D074C}"/>
+                <a16:creationId xmlns:a16="http://schemas.microsoft.com/office/drawing/2014/main" id="{43B430A9-25ED-481A-B22A-EA4DAB1D18BC}"/>
               </a:ext>
             </a:extLst>
           </p:cNvPr>
@@ -7886,8 +9317,12 @@
           <a:lstStyle/>
           <a:p>
             <a:r>
-              <a:rPr lang="en-US" dirty="0"/>
-              <a:t>Overview </a:t>
+              <a:rPr lang="en-US" dirty="0" err="1"/>
+              <a:t>Probit</a:t>
+            </a:r>
+            <a:r>
+              <a:rPr lang="en-US" dirty="0"/>
+              <a:t> Fitting Convergence</a:t>
             </a:r>
           </a:p>
         </p:txBody>
@@ -7897,7 +9332,7 @@
           <p:cNvPr id="3" name="Content Placeholder 2">
             <a:extLst>
               <a:ext uri="{FF2B5EF4-FFF2-40B4-BE49-F238E27FC236}">
-                <a16:creationId xmlns:a16="http://schemas.microsoft.com/office/drawing/2014/main" id="{D14D1252-27F6-45E4-AC18-DBBDBC8B95FE}"/>
+                <a16:creationId xmlns:a16="http://schemas.microsoft.com/office/drawing/2014/main" id="{2479A295-7211-447A-93F5-5C45A4AEBCA3}"/>
               </a:ext>
             </a:extLst>
           </p:cNvPr>
@@ -7910,102 +9345,39 @@
         </p:nvSpPr>
         <p:spPr/>
         <p:txBody>
-          <a:bodyPr>
-            <a:normAutofit lnSpcReduction="10000"/>
-          </a:bodyPr>
-          <a:lstStyle/>
-          <a:p>
-            <a:r>
-              <a:rPr lang="en-US" dirty="0"/>
-              <a:t>Number of HNSCC patients:  11 HNSCC patients [7/20] </a:t>
-            </a:r>
-          </a:p>
-          <a:p>
-            <a:r>
-              <a:rPr lang="en-US" dirty="0"/>
-              <a:t>Plate map versions </a:t>
+          <a:bodyPr/>
+          <a:lstStyle/>
+          <a:p>
+            <a:r>
+              <a:rPr lang="en-US" dirty="0"/>
+              <a:t>Perfect separation occurs when all [or most] of the cell viability values are identical. </a:t>
             </a:r>
           </a:p>
           <a:p>
             <a:pPr lvl="1"/>
             <a:r>
               <a:rPr lang="en-US" dirty="0"/>
-              <a:t>Plates 1-3 (rev 001), Plates 1-6 (rev 002) &lt;- combinatorial </a:t>
+              <a:t>If all are identical I just fit with the max </a:t>
+            </a:r>
+            <a:r>
+              <a:rPr lang="en-US" dirty="0" err="1"/>
+              <a:t>auc</a:t>
+            </a:r>
+            <a:r>
+              <a:rPr lang="en-US" dirty="0"/>
+              <a:t> value </a:t>
             </a:r>
           </a:p>
           <a:p>
             <a:pPr lvl="1"/>
             <a:r>
               <a:rPr lang="en-US" dirty="0"/>
-              <a:t>Tyner panels – still need to be re-worked into HNSCC format</a:t>
-            </a:r>
-          </a:p>
-          <a:p>
-            <a:pPr lvl="1"/>
-            <a:r>
-              <a:rPr lang="en-US" dirty="0"/>
-              <a:t>+1 assay with 7… require additional work </a:t>
-            </a:r>
-          </a:p>
-          <a:p>
-            <a:pPr lvl="1"/>
-            <a:r>
-              <a:rPr lang="en-US" dirty="0"/>
-              <a:t>Excel files with pages: meta, concentration_&lt;num&gt;, inhibitor_&lt;num&gt;</a:t>
-            </a:r>
-          </a:p>
-          <a:p>
-            <a:r>
-              <a:rPr lang="en-US" dirty="0"/>
-              <a:t>Naming convention</a:t>
-            </a:r>
-          </a:p>
-          <a:p>
-            <a:pPr lvl="1"/>
-            <a:r>
-              <a:rPr lang="en-US" dirty="0"/>
-              <a:t>Unique ID for each assay? Or we need to distinguish replicates</a:t>
-            </a:r>
-          </a:p>
-          <a:p>
-            <a:pPr lvl="1"/>
-            <a:r>
-              <a:rPr lang="en-US" dirty="0"/>
-              <a:t>Date of assay? </a:t>
-            </a:r>
-          </a:p>
-          <a:p>
-            <a:pPr lvl="1"/>
-            <a:r>
-              <a:rPr lang="en-US" dirty="0"/>
-              <a:t>MTS sitting time? </a:t>
-            </a:r>
-          </a:p>
-          <a:p>
-            <a:pPr lvl="1"/>
-            <a:r>
-              <a:rPr lang="en-US" dirty="0" err="1"/>
-              <a:t>lab_id</a:t>
-            </a:r>
-            <a:r>
-              <a:rPr lang="en-US" dirty="0"/>
-              <a:t>=XXXXX-norm=XXX-</a:t>
-            </a:r>
-            <a:r>
-              <a:rPr lang="en-US" dirty="0" err="1"/>
-              <a:t>plate_version_id</a:t>
-            </a:r>
-            <a:r>
-              <a:rPr lang="en-US" dirty="0"/>
-              <a:t>=XXXX</a:t>
-            </a:r>
-          </a:p>
-          <a:p>
-            <a:pPr lvl="1"/>
-            <a:endParaRPr lang="en-US" dirty="0"/>
-          </a:p>
-          <a:p>
-            <a:pPr lvl="1"/>
+              <a:t>If not all are identical, I fit with </a:t>
+            </a:r>
+            <a:r>
+              <a:rPr lang="en-US"/>
+              <a:t>linear regression. </a:t>
+            </a:r>
             <a:endParaRPr lang="en-US" dirty="0"/>
           </a:p>
         </p:txBody>
@@ -8013,7 +9385,7 @@
     </p:spTree>
     <p:extLst>
       <p:ext uri="{BB962C8B-B14F-4D97-AF65-F5344CB8AC3E}">
-        <p14:creationId xmlns:p14="http://schemas.microsoft.com/office/powerpoint/2010/main" val="3771634021"/>
+        <p14:creationId xmlns:p14="http://schemas.microsoft.com/office/powerpoint/2010/main" val="1587776220"/>
       </p:ext>
     </p:extLst>
   </p:cSld>
@@ -8045,7 +9417,7 @@
           <p:cNvPr id="2" name="Title 1">
             <a:extLst>
               <a:ext uri="{FF2B5EF4-FFF2-40B4-BE49-F238E27FC236}">
-                <a16:creationId xmlns:a16="http://schemas.microsoft.com/office/drawing/2014/main" id="{4C925E0A-FDA2-482C-B32C-BD02E0F5FDD5}"/>
+                <a16:creationId xmlns:a16="http://schemas.microsoft.com/office/drawing/2014/main" id="{0C9934DF-8684-482D-A4AA-A6412C0D074C}"/>
               </a:ext>
             </a:extLst>
           </p:cNvPr>
@@ -8063,7 +9435,7 @@
           <a:p>
             <a:r>
               <a:rPr lang="en-US" dirty="0"/>
-              <a:t>Plate Map Revisions </a:t>
+              <a:t>Overview </a:t>
             </a:r>
           </a:p>
         </p:txBody>
@@ -8073,7 +9445,7 @@
           <p:cNvPr id="3" name="Content Placeholder 2">
             <a:extLst>
               <a:ext uri="{FF2B5EF4-FFF2-40B4-BE49-F238E27FC236}">
-                <a16:creationId xmlns:a16="http://schemas.microsoft.com/office/drawing/2014/main" id="{287DDDA0-A034-491E-AF68-7EC8860582A7}"/>
+                <a16:creationId xmlns:a16="http://schemas.microsoft.com/office/drawing/2014/main" id="{D14D1252-27F6-45E4-AC18-DBBDBC8B95FE}"/>
               </a:ext>
             </a:extLst>
           </p:cNvPr>
@@ -8086,42 +9458,102 @@
         </p:nvSpPr>
         <p:spPr/>
         <p:txBody>
-          <a:bodyPr/>
-          <a:lstStyle/>
-          <a:p>
-            <a:r>
-              <a:rPr lang="en-US" dirty="0"/>
-              <a:t>Drug Names, there are some inconsistencies – need to define clear nomenclature to avoid redundancy. </a:t>
+          <a:bodyPr>
+            <a:normAutofit lnSpcReduction="10000"/>
+          </a:bodyPr>
+          <a:lstStyle/>
+          <a:p>
+            <a:r>
+              <a:rPr lang="en-US" dirty="0"/>
+              <a:t>Number of HNSCC patients:  11 HNSCC patients [7/20] </a:t>
+            </a:r>
+          </a:p>
+          <a:p>
+            <a:r>
+              <a:rPr lang="en-US" dirty="0"/>
+              <a:t>Plate map versions </a:t>
             </a:r>
           </a:p>
           <a:p>
             <a:pPr lvl="1"/>
             <a:r>
               <a:rPr lang="en-US" dirty="0"/>
-              <a:t>I can provide a list of all used names, if someone can review and choose the right names. </a:t>
+              <a:t>Plates 1-3 (rev 001), Plates 1-6 (rev 002) &lt;- combinatorial </a:t>
             </a:r>
           </a:p>
           <a:p>
             <a:pPr lvl="1"/>
             <a:r>
               <a:rPr lang="en-US" dirty="0"/>
-              <a:t>Alternatively, if there is a list of acceptable drug names, I can do it myself. </a:t>
-            </a:r>
-          </a:p>
-          <a:p>
-            <a:r>
-              <a:rPr lang="en-US" dirty="0"/>
-              <a:t>I’d like a review of my concentration mapping [request] </a:t>
+              <a:t>Tyner panels – still need to be re-worked into HNSCC format</a:t>
             </a:r>
           </a:p>
           <a:p>
             <a:pPr lvl="1"/>
             <a:r>
               <a:rPr lang="en-US" dirty="0"/>
-              <a:t>Ashley volunteered to review, but a second pair of eyes would be useful as well. </a:t>
-            </a:r>
-          </a:p>
-          <a:p>
+              <a:t>+1 assay with 7… require additional work </a:t>
+            </a:r>
+          </a:p>
+          <a:p>
+            <a:pPr lvl="1"/>
+            <a:r>
+              <a:rPr lang="en-US" dirty="0"/>
+              <a:t>Excel files with pages: meta, concentration_&lt;num&gt;, inhibitor_&lt;num&gt;</a:t>
+            </a:r>
+          </a:p>
+          <a:p>
+            <a:r>
+              <a:rPr lang="en-US" dirty="0"/>
+              <a:t>Naming convention</a:t>
+            </a:r>
+          </a:p>
+          <a:p>
+            <a:pPr lvl="1"/>
+            <a:r>
+              <a:rPr lang="en-US" dirty="0"/>
+              <a:t>Unique ID for each assay? Or we need to distinguish replicates</a:t>
+            </a:r>
+          </a:p>
+          <a:p>
+            <a:pPr lvl="1"/>
+            <a:r>
+              <a:rPr lang="en-US" dirty="0"/>
+              <a:t>Date of assay? </a:t>
+            </a:r>
+          </a:p>
+          <a:p>
+            <a:pPr lvl="1"/>
+            <a:r>
+              <a:rPr lang="en-US" dirty="0"/>
+              <a:t>MTS sitting time? </a:t>
+            </a:r>
+          </a:p>
+          <a:p>
+            <a:pPr lvl="1"/>
+            <a:r>
+              <a:rPr lang="en-US" dirty="0" err="1"/>
+              <a:t>lab_id</a:t>
+            </a:r>
+            <a:r>
+              <a:rPr lang="en-US" dirty="0"/>
+              <a:t>=XXXXX-norm=XXX-</a:t>
+            </a:r>
+            <a:r>
+              <a:rPr lang="en-US" dirty="0" err="1"/>
+              <a:t>plate_version_id</a:t>
+            </a:r>
+            <a:r>
+              <a:rPr lang="en-US" dirty="0"/>
+              <a:t>=XXXX</a:t>
+            </a:r>
+          </a:p>
+          <a:p>
+            <a:pPr lvl="1"/>
+            <a:endParaRPr lang="en-US" dirty="0"/>
+          </a:p>
+          <a:p>
+            <a:pPr lvl="1"/>
             <a:endParaRPr lang="en-US" dirty="0"/>
           </a:p>
         </p:txBody>
@@ -8129,7 +9561,7 @@
     </p:spTree>
     <p:extLst>
       <p:ext uri="{BB962C8B-B14F-4D97-AF65-F5344CB8AC3E}">
-        <p14:creationId xmlns:p14="http://schemas.microsoft.com/office/powerpoint/2010/main" val="629140933"/>
+        <p14:creationId xmlns:p14="http://schemas.microsoft.com/office/powerpoint/2010/main" val="3771634021"/>
       </p:ext>
     </p:extLst>
   </p:cSld>
@@ -8161,7 +9593,7 @@
           <p:cNvPr id="2" name="Title 1">
             <a:extLst>
               <a:ext uri="{FF2B5EF4-FFF2-40B4-BE49-F238E27FC236}">
-                <a16:creationId xmlns:a16="http://schemas.microsoft.com/office/drawing/2014/main" id="{2A317F86-1610-446D-A724-4889497B751D}"/>
+                <a16:creationId xmlns:a16="http://schemas.microsoft.com/office/drawing/2014/main" id="{4C925E0A-FDA2-482C-B32C-BD02E0F5FDD5}"/>
               </a:ext>
             </a:extLst>
           </p:cNvPr>
@@ -8179,7 +9611,7 @@
           <a:p>
             <a:r>
               <a:rPr lang="en-US" dirty="0"/>
-              <a:t>Data output documentation issues</a:t>
+              <a:t>Plate Map Revisions </a:t>
             </a:r>
           </a:p>
         </p:txBody>
@@ -8189,7 +9621,7 @@
           <p:cNvPr id="3" name="Content Placeholder 2">
             <a:extLst>
               <a:ext uri="{FF2B5EF4-FFF2-40B4-BE49-F238E27FC236}">
-                <a16:creationId xmlns:a16="http://schemas.microsoft.com/office/drawing/2014/main" id="{E5775B40-57DE-42CA-A49B-0046E6B9E424}"/>
+                <a16:creationId xmlns:a16="http://schemas.microsoft.com/office/drawing/2014/main" id="{287DDDA0-A034-491E-AF68-7EC8860582A7}"/>
               </a:ext>
             </a:extLst>
           </p:cNvPr>
@@ -8202,79 +9634,50 @@
         </p:nvSpPr>
         <p:spPr/>
         <p:txBody>
-          <a:bodyPr>
-            <a:normAutofit/>
-          </a:bodyPr>
-          <a:lstStyle/>
-          <a:p>
-            <a:r>
-              <a:rPr lang="en-US" dirty="0"/>
-              <a:t>There are a number of assays that are labeled as having been normalized by positive controls (labeled as “blank490”), however, the output file shows discrepancies that indicate it was not.</a:t>
-            </a:r>
-          </a:p>
-          <a:p>
-            <a:r>
-              <a:rPr lang="en-US" dirty="0"/>
-              <a:t>[</a:t>
-            </a:r>
-            <a:r>
-              <a:rPr lang="en-US" dirty="0" err="1"/>
-              <a:t>lab_id</a:t>
-            </a:r>
-            <a:r>
-              <a:rPr lang="en-US" dirty="0"/>
-              <a:t>=10308,notes=NA]</a:t>
-            </a:r>
-          </a:p>
-          <a:p>
-            <a:r>
-              <a:rPr lang="en-US" dirty="0"/>
-              <a:t>[</a:t>
-            </a:r>
-            <a:r>
-              <a:rPr lang="en-US" dirty="0" err="1"/>
-              <a:t>lab_id</a:t>
-            </a:r>
-            <a:r>
-              <a:rPr lang="en-US" dirty="0"/>
-              <a:t>=10309,notes=matched normal 10308]</a:t>
-            </a:r>
-          </a:p>
-          <a:p>
-            <a:pPr marL="0" indent="0">
-              <a:buNone/>
-            </a:pPr>
+          <a:bodyPr/>
+          <a:lstStyle/>
+          <a:p>
+            <a:r>
+              <a:rPr lang="en-US" dirty="0"/>
+              <a:t>Drug Names, there are some inconsistencies – need to define clear nomenclature to avoid redundancy. </a:t>
+            </a:r>
+          </a:p>
+          <a:p>
+            <a:pPr lvl="1"/>
+            <a:r>
+              <a:rPr lang="en-US" dirty="0"/>
+              <a:t>I can provide a list of all used names, if someone can review and choose the right names. </a:t>
+            </a:r>
+          </a:p>
+          <a:p>
+            <a:pPr lvl="1"/>
+            <a:r>
+              <a:rPr lang="en-US" dirty="0"/>
+              <a:t>Alternatively, if there is a list of acceptable drug names, I can do it myself. </a:t>
+            </a:r>
+          </a:p>
+          <a:p>
+            <a:r>
+              <a:rPr lang="en-US" dirty="0"/>
+              <a:t>I’d like a review of my concentration mapping [request] </a:t>
+            </a:r>
+          </a:p>
+          <a:p>
+            <a:pPr lvl="1"/>
+            <a:r>
+              <a:rPr lang="en-US" dirty="0"/>
+              <a:t>Ashley volunteered to review, but a second pair of eyes would be useful as well. </a:t>
+            </a:r>
+          </a:p>
+          <a:p>
             <a:endParaRPr lang="en-US" dirty="0"/>
-          </a:p>
-          <a:p>
-            <a:pPr marL="0" indent="0">
-              <a:buNone/>
-            </a:pPr>
-            <a:endParaRPr lang="en-US" dirty="0"/>
-          </a:p>
-          <a:p>
-            <a:pPr marL="0" indent="0">
-              <a:buNone/>
-            </a:pPr>
-            <a:r>
-              <a:rPr lang="en-US" dirty="0"/>
-              <a:t>*these two assay outputs don’t have a 26</a:t>
-            </a:r>
-            <a:r>
-              <a:rPr lang="en-US" baseline="30000" dirty="0"/>
-              <a:t>th</a:t>
-            </a:r>
-            <a:r>
-              <a:rPr lang="en-US" dirty="0"/>
-              <a:t> column, which usually says “blank490” in each row. </a:t>
-            </a:r>
           </a:p>
         </p:txBody>
       </p:sp>
     </p:spTree>
     <p:extLst>
       <p:ext uri="{BB962C8B-B14F-4D97-AF65-F5344CB8AC3E}">
-        <p14:creationId xmlns:p14="http://schemas.microsoft.com/office/powerpoint/2010/main" val="4284564905"/>
+        <p14:creationId xmlns:p14="http://schemas.microsoft.com/office/powerpoint/2010/main" val="629140933"/>
       </p:ext>
     </p:extLst>
   </p:cSld>
@@ -8306,7 +9709,7 @@
           <p:cNvPr id="2" name="Title 1">
             <a:extLst>
               <a:ext uri="{FF2B5EF4-FFF2-40B4-BE49-F238E27FC236}">
-                <a16:creationId xmlns:a16="http://schemas.microsoft.com/office/drawing/2014/main" id="{541CAFB3-FD96-4F76-A791-BBC842554556}"/>
+                <a16:creationId xmlns:a16="http://schemas.microsoft.com/office/drawing/2014/main" id="{2A317F86-1610-446D-A724-4889497B751D}"/>
               </a:ext>
             </a:extLst>
           </p:cNvPr>
@@ -8324,7 +9727,7 @@
           <a:p>
             <a:r>
               <a:rPr lang="en-US" dirty="0"/>
-              <a:t>Standing Questions</a:t>
+              <a:t>Data output documentation issues</a:t>
             </a:r>
           </a:p>
         </p:txBody>
@@ -8334,7 +9737,7 @@
           <p:cNvPr id="3" name="Content Placeholder 2">
             <a:extLst>
               <a:ext uri="{FF2B5EF4-FFF2-40B4-BE49-F238E27FC236}">
-                <a16:creationId xmlns:a16="http://schemas.microsoft.com/office/drawing/2014/main" id="{F1B73B27-1B41-4F73-9206-3BA2925E5813}"/>
+                <a16:creationId xmlns:a16="http://schemas.microsoft.com/office/drawing/2014/main" id="{E5775B40-57DE-42CA-A49B-0046E6B9E424}"/>
               </a:ext>
             </a:extLst>
           </p:cNvPr>
@@ -8347,85 +9750,71 @@
         </p:nvSpPr>
         <p:spPr/>
         <p:txBody>
-          <a:bodyPr/>
-          <a:lstStyle/>
-          <a:p>
-            <a:r>
-              <a:rPr lang="en-US" dirty="0"/>
-              <a:t>Blank 490, how is this normalization done?</a:t>
-            </a:r>
-          </a:p>
-          <a:p>
-            <a:r>
-              <a:rPr lang="en-US" dirty="0"/>
-              <a:t>Scope of documentation?   </a:t>
-            </a:r>
-          </a:p>
-          <a:p>
-            <a:pPr lvl="1"/>
-            <a:r>
-              <a:rPr lang="en-US" dirty="0"/>
-              <a:t>Code version control – </a:t>
+          <a:bodyPr>
+            <a:normAutofit/>
+          </a:bodyPr>
+          <a:lstStyle/>
+          <a:p>
+            <a:r>
+              <a:rPr lang="en-US" dirty="0"/>
+              <a:t>There are a number of assays that are labeled as having been normalized by positive controls (labeled as “blank490”), however, the output file shows discrepancies that indicate it was not.</a:t>
+            </a:r>
+          </a:p>
+          <a:p>
+            <a:r>
+              <a:rPr lang="en-US" dirty="0"/>
+              <a:t>[</a:t>
             </a:r>
             <a:r>
               <a:rPr lang="en-US" dirty="0" err="1"/>
-              <a:t>github</a:t>
-            </a:r>
-            <a:r>
-              <a:rPr lang="en-US" dirty="0"/>
-              <a:t> repo? </a:t>
-            </a:r>
-          </a:p>
-          <a:p>
-            <a:pPr lvl="1"/>
+              <a:t>lab_id</a:t>
+            </a:r>
+            <a:r>
+              <a:rPr lang="en-US" dirty="0"/>
+              <a:t>=10308,notes=NA]</a:t>
+            </a:r>
+          </a:p>
+          <a:p>
+            <a:r>
+              <a:rPr lang="en-US" dirty="0"/>
+              <a:t>[</a:t>
+            </a:r>
             <a:r>
               <a:rPr lang="en-US" dirty="0" err="1"/>
-              <a:t>Biocompute</a:t>
-            </a:r>
-            <a:r>
-              <a:rPr lang="en-US" dirty="0"/>
-              <a:t> object </a:t>
-            </a:r>
-          </a:p>
-          <a:p>
-            <a:pPr lvl="1"/>
-            <a:r>
-              <a:rPr lang="en-US" dirty="0"/>
-              <a:t>R/</a:t>
-            </a:r>
-            <a:r>
-              <a:rPr lang="en-US" dirty="0" err="1"/>
-              <a:t>Doxygen</a:t>
-            </a:r>
+              <a:t>lab_id</a:t>
+            </a:r>
+            <a:r>
+              <a:rPr lang="en-US" dirty="0"/>
+              <a:t>=10309,notes=matched normal 10308]</a:t>
+            </a:r>
+          </a:p>
+          <a:p>
+            <a:pPr marL="0" indent="0">
+              <a:buNone/>
+            </a:pPr>
             <a:endParaRPr lang="en-US" dirty="0"/>
           </a:p>
           <a:p>
-            <a:r>
-              <a:rPr lang="en-US" dirty="0"/>
-              <a:t>Scope of testing? </a:t>
-            </a:r>
-          </a:p>
-          <a:p>
-            <a:pPr lvl="1"/>
-            <a:r>
-              <a:rPr lang="en-US" dirty="0"/>
-              <a:t>Doc-testing / unit-testing </a:t>
-            </a:r>
-          </a:p>
-          <a:p>
-            <a:r>
-              <a:rPr lang="en-US" dirty="0"/>
-              <a:t>Language Preference? Currently using mix of python, R, bash</a:t>
-            </a:r>
-          </a:p>
-          <a:p>
-            <a:r>
-              <a:rPr lang="en-US" dirty="0" err="1"/>
-              <a:t>Dockerize</a:t>
-            </a:r>
-            <a:r>
-              <a:rPr lang="en-US" dirty="0"/>
-              <a:t> environment? </a:t>
+            <a:pPr marL="0" indent="0">
+              <a:buNone/>
+            </a:pPr>
+            <a:endParaRPr lang="en-US" dirty="0"/>
+          </a:p>
+          <a:p>
+            <a:pPr marL="0" indent="0">
+              <a:buNone/>
+            </a:pPr>
+            <a:r>
+              <a:rPr lang="en-US" dirty="0"/>
+              <a:t>*these two assay outputs don’t have a 26</a:t>
+            </a:r>
+            <a:r>
+              <a:rPr lang="en-US" baseline="30000" dirty="0"/>
+              <a:t>th</a:t>
+            </a:r>
+            <a:r>
+              <a:rPr lang="en-US" dirty="0"/>
+              <a:t> column, which usually says “blank490” in each row. </a:t>
             </a:r>
           </a:p>
         </p:txBody>
@@ -8433,7 +9822,7 @@
     </p:spTree>
     <p:extLst>
       <p:ext uri="{BB962C8B-B14F-4D97-AF65-F5344CB8AC3E}">
-        <p14:creationId xmlns:p14="http://schemas.microsoft.com/office/powerpoint/2010/main" val="2085471528"/>
+        <p14:creationId xmlns:p14="http://schemas.microsoft.com/office/powerpoint/2010/main" val="4284564905"/>
       </p:ext>
     </p:extLst>
   </p:cSld>

</xml_diff>

<commit_message>
working on ppt and viewer app; added app table, cleaned QC filtering up
</commit_message>
<xml_diff>
--- a/docs/HNSCC_functional_assay_pipeline_development.pptx
+++ b/docs/HNSCC_functional_assay_pipeline_development.pptx
@@ -270,7 +270,7 @@
           <a:p>
             <a:fld id="{ABBD65A0-F140-476D-B606-1C9D07B9F5C7}" type="datetimeFigureOut">
               <a:rPr lang="en-US" smtClean="0"/>
-              <a:t>8/16/2019</a:t>
+              <a:t>8/23/2019</a:t>
             </a:fld>
             <a:endParaRPr lang="en-US"/>
           </a:p>
@@ -468,7 +468,7 @@
           <a:p>
             <a:fld id="{ABBD65A0-F140-476D-B606-1C9D07B9F5C7}" type="datetimeFigureOut">
               <a:rPr lang="en-US" smtClean="0"/>
-              <a:t>8/16/2019</a:t>
+              <a:t>8/23/2019</a:t>
             </a:fld>
             <a:endParaRPr lang="en-US"/>
           </a:p>
@@ -676,7 +676,7 @@
           <a:p>
             <a:fld id="{ABBD65A0-F140-476D-B606-1C9D07B9F5C7}" type="datetimeFigureOut">
               <a:rPr lang="en-US" smtClean="0"/>
-              <a:t>8/16/2019</a:t>
+              <a:t>8/23/2019</a:t>
             </a:fld>
             <a:endParaRPr lang="en-US"/>
           </a:p>
@@ -874,7 +874,7 @@
           <a:p>
             <a:fld id="{ABBD65A0-F140-476D-B606-1C9D07B9F5C7}" type="datetimeFigureOut">
               <a:rPr lang="en-US" smtClean="0"/>
-              <a:t>8/16/2019</a:t>
+              <a:t>8/23/2019</a:t>
             </a:fld>
             <a:endParaRPr lang="en-US"/>
           </a:p>
@@ -1149,7 +1149,7 @@
           <a:p>
             <a:fld id="{ABBD65A0-F140-476D-B606-1C9D07B9F5C7}" type="datetimeFigureOut">
               <a:rPr lang="en-US" smtClean="0"/>
-              <a:t>8/16/2019</a:t>
+              <a:t>8/23/2019</a:t>
             </a:fld>
             <a:endParaRPr lang="en-US"/>
           </a:p>
@@ -1414,7 +1414,7 @@
           <a:p>
             <a:fld id="{ABBD65A0-F140-476D-B606-1C9D07B9F5C7}" type="datetimeFigureOut">
               <a:rPr lang="en-US" smtClean="0"/>
-              <a:t>8/16/2019</a:t>
+              <a:t>8/23/2019</a:t>
             </a:fld>
             <a:endParaRPr lang="en-US"/>
           </a:p>
@@ -1826,7 +1826,7 @@
           <a:p>
             <a:fld id="{ABBD65A0-F140-476D-B606-1C9D07B9F5C7}" type="datetimeFigureOut">
               <a:rPr lang="en-US" smtClean="0"/>
-              <a:t>8/16/2019</a:t>
+              <a:t>8/23/2019</a:t>
             </a:fld>
             <a:endParaRPr lang="en-US"/>
           </a:p>
@@ -1967,7 +1967,7 @@
           <a:p>
             <a:fld id="{ABBD65A0-F140-476D-B606-1C9D07B9F5C7}" type="datetimeFigureOut">
               <a:rPr lang="en-US" smtClean="0"/>
-              <a:t>8/16/2019</a:t>
+              <a:t>8/23/2019</a:t>
             </a:fld>
             <a:endParaRPr lang="en-US"/>
           </a:p>
@@ -2080,7 +2080,7 @@
           <a:p>
             <a:fld id="{ABBD65A0-F140-476D-B606-1C9D07B9F5C7}" type="datetimeFigureOut">
               <a:rPr lang="en-US" smtClean="0"/>
-              <a:t>8/16/2019</a:t>
+              <a:t>8/23/2019</a:t>
             </a:fld>
             <a:endParaRPr lang="en-US"/>
           </a:p>
@@ -2391,7 +2391,7 @@
           <a:p>
             <a:fld id="{ABBD65A0-F140-476D-B606-1C9D07B9F5C7}" type="datetimeFigureOut">
               <a:rPr lang="en-US" smtClean="0"/>
-              <a:t>8/16/2019</a:t>
+              <a:t>8/23/2019</a:t>
             </a:fld>
             <a:endParaRPr lang="en-US"/>
           </a:p>
@@ -2679,7 +2679,7 @@
           <a:p>
             <a:fld id="{ABBD65A0-F140-476D-B606-1C9D07B9F5C7}" type="datetimeFigureOut">
               <a:rPr lang="en-US" smtClean="0"/>
-              <a:t>8/16/2019</a:t>
+              <a:t>8/23/2019</a:t>
             </a:fld>
             <a:endParaRPr lang="en-US"/>
           </a:p>
@@ -2920,7 +2920,7 @@
           <a:p>
             <a:fld id="{ABBD65A0-F140-476D-B606-1C9D07B9F5C7}" type="datetimeFigureOut">
               <a:rPr lang="en-US" smtClean="0"/>
-              <a:t>8/16/2019</a:t>
+              <a:t>8/23/2019</a:t>
             </a:fld>
             <a:endParaRPr lang="en-US"/>
           </a:p>
@@ -5251,10 +5251,10 @@
       </p:sp>
       <p:sp>
         <p:nvSpPr>
-          <p:cNvPr id="9" name="Rectangle 8">
-            <a:extLst>
-              <a:ext uri="{FF2B5EF4-FFF2-40B4-BE49-F238E27FC236}">
-                <a16:creationId xmlns:a16="http://schemas.microsoft.com/office/drawing/2014/main" id="{1A30B135-2F23-4CDC-9A4F-89BC83BDAEF9}"/>
+          <p:cNvPr id="4" name="Rectangle: Rounded Corners 3">
+            <a:extLst>
+              <a:ext uri="{FF2B5EF4-FFF2-40B4-BE49-F238E27FC236}">
+                <a16:creationId xmlns:a16="http://schemas.microsoft.com/office/drawing/2014/main" id="{193C7284-B2C1-47ED-AEF4-38405D32A456}"/>
               </a:ext>
             </a:extLst>
           </p:cNvPr>
@@ -5263,8 +5263,235 @@
         </p:nvSpPr>
         <p:spPr>
           <a:xfrm>
-            <a:off x="2527697" y="1733310"/>
-            <a:ext cx="1843088" cy="1133476"/>
+            <a:off x="2527697" y="761761"/>
+            <a:ext cx="1843088" cy="971545"/>
+          </a:xfrm>
+          <a:prstGeom prst="roundRect">
+            <a:avLst/>
+          </a:prstGeom>
+        </p:spPr>
+        <p:style>
+          <a:lnRef idx="2">
+            <a:schemeClr val="accent1">
+              <a:shade val="50000"/>
+            </a:schemeClr>
+          </a:lnRef>
+          <a:fillRef idx="1">
+            <a:schemeClr val="accent1"/>
+          </a:fillRef>
+          <a:effectRef idx="0">
+            <a:schemeClr val="accent1"/>
+          </a:effectRef>
+          <a:fontRef idx="minor">
+            <a:schemeClr val="lt1"/>
+          </a:fontRef>
+        </p:style>
+        <p:txBody>
+          <a:bodyPr rtlCol="0" anchor="ctr"/>
+          <a:lstStyle/>
+          <a:p>
+            <a:pPr algn="ctr"/>
+            <a:r>
+              <a:rPr lang="en-US" dirty="0"/>
+              <a:t>Plate Mapping</a:t>
+            </a:r>
+          </a:p>
+          <a:p>
+            <a:pPr algn="ctr"/>
+            <a:r>
+              <a:rPr lang="en-US" sz="900" dirty="0"/>
+              <a:t>[HNSCC_plate_data_mapper.py]</a:t>
+            </a:r>
+          </a:p>
+        </p:txBody>
+      </p:sp>
+      <p:sp>
+        <p:nvSpPr>
+          <p:cNvPr id="5" name="Rectangle: Rounded Corners 4">
+            <a:extLst>
+              <a:ext uri="{FF2B5EF4-FFF2-40B4-BE49-F238E27FC236}">
+                <a16:creationId xmlns:a16="http://schemas.microsoft.com/office/drawing/2014/main" id="{797472C0-924C-453D-85FE-D9F751F91C8F}"/>
+              </a:ext>
+            </a:extLst>
+          </p:cNvPr>
+          <p:cNvSpPr/>
+          <p:nvPr/>
+        </p:nvSpPr>
+        <p:spPr>
+          <a:xfrm>
+            <a:off x="7717291" y="761761"/>
+            <a:ext cx="1843088" cy="990599"/>
+          </a:xfrm>
+          <a:prstGeom prst="roundRect">
+            <a:avLst/>
+          </a:prstGeom>
+        </p:spPr>
+        <p:style>
+          <a:lnRef idx="2">
+            <a:schemeClr val="accent1">
+              <a:shade val="50000"/>
+            </a:schemeClr>
+          </a:lnRef>
+          <a:fillRef idx="1">
+            <a:schemeClr val="accent1"/>
+          </a:fillRef>
+          <a:effectRef idx="0">
+            <a:schemeClr val="accent1"/>
+          </a:effectRef>
+          <a:fontRef idx="minor">
+            <a:schemeClr val="lt1"/>
+          </a:fontRef>
+        </p:style>
+        <p:txBody>
+          <a:bodyPr rtlCol="0" anchor="ctr"/>
+          <a:lstStyle/>
+          <a:p>
+            <a:pPr algn="ctr"/>
+            <a:r>
+              <a:rPr lang="en-US" dirty="0"/>
+              <a:t>Normalization (1) </a:t>
+            </a:r>
+          </a:p>
+          <a:p>
+            <a:pPr algn="ctr"/>
+            <a:r>
+              <a:rPr lang="en-US" sz="900" dirty="0"/>
+              <a:t>[name – not in dev yet]</a:t>
+            </a:r>
+          </a:p>
+        </p:txBody>
+      </p:sp>
+      <p:sp>
+        <p:nvSpPr>
+          <p:cNvPr id="6" name="Rectangle: Rounded Corners 5">
+            <a:extLst>
+              <a:ext uri="{FF2B5EF4-FFF2-40B4-BE49-F238E27FC236}">
+                <a16:creationId xmlns:a16="http://schemas.microsoft.com/office/drawing/2014/main" id="{C6C10FA8-B0D6-47D7-892A-BA503F3CCFD4}"/>
+              </a:ext>
+            </a:extLst>
+          </p:cNvPr>
+          <p:cNvSpPr/>
+          <p:nvPr/>
+        </p:nvSpPr>
+        <p:spPr>
+          <a:xfrm>
+            <a:off x="14288" y="1376359"/>
+            <a:ext cx="1943100" cy="990600"/>
+          </a:xfrm>
+          <a:prstGeom prst="roundRect">
+            <a:avLst/>
+          </a:prstGeom>
+          <a:solidFill>
+            <a:schemeClr val="accent2">
+              <a:lumMod val="75000"/>
+            </a:schemeClr>
+          </a:solidFill>
+        </p:spPr>
+        <p:style>
+          <a:lnRef idx="2">
+            <a:schemeClr val="accent1">
+              <a:shade val="50000"/>
+            </a:schemeClr>
+          </a:lnRef>
+          <a:fillRef idx="1">
+            <a:schemeClr val="accent1"/>
+          </a:fillRef>
+          <a:effectRef idx="0">
+            <a:schemeClr val="accent1"/>
+          </a:effectRef>
+          <a:fontRef idx="minor">
+            <a:schemeClr val="lt1"/>
+          </a:fontRef>
+        </p:style>
+        <p:txBody>
+          <a:bodyPr rtlCol="0" anchor="ctr"/>
+          <a:lstStyle/>
+          <a:p>
+            <a:pPr algn="ctr"/>
+            <a:r>
+              <a:rPr lang="en-US" dirty="0"/>
+              <a:t>Photo spectrometer</a:t>
+            </a:r>
+          </a:p>
+          <a:p>
+            <a:pPr algn="ctr"/>
+            <a:r>
+              <a:rPr lang="en-US" dirty="0"/>
+              <a:t>Output </a:t>
+            </a:r>
+          </a:p>
+        </p:txBody>
+      </p:sp>
+      <p:sp>
+        <p:nvSpPr>
+          <p:cNvPr id="7" name="Rectangle: Rounded Corners 6">
+            <a:extLst>
+              <a:ext uri="{FF2B5EF4-FFF2-40B4-BE49-F238E27FC236}">
+                <a16:creationId xmlns:a16="http://schemas.microsoft.com/office/drawing/2014/main" id="{D82A4DB4-FBC5-48B8-B9F0-A45C22464930}"/>
+              </a:ext>
+            </a:extLst>
+          </p:cNvPr>
+          <p:cNvSpPr/>
+          <p:nvPr/>
+        </p:nvSpPr>
+        <p:spPr>
+          <a:xfrm>
+            <a:off x="14288" y="118046"/>
+            <a:ext cx="1943100" cy="1063053"/>
+          </a:xfrm>
+          <a:prstGeom prst="roundRect">
+            <a:avLst/>
+          </a:prstGeom>
+          <a:solidFill>
+            <a:schemeClr val="accent2">
+              <a:lumMod val="75000"/>
+            </a:schemeClr>
+          </a:solidFill>
+        </p:spPr>
+        <p:style>
+          <a:lnRef idx="2">
+            <a:schemeClr val="accent1">
+              <a:shade val="50000"/>
+            </a:schemeClr>
+          </a:lnRef>
+          <a:fillRef idx="1">
+            <a:schemeClr val="accent1"/>
+          </a:fillRef>
+          <a:effectRef idx="0">
+            <a:schemeClr val="accent1"/>
+          </a:effectRef>
+          <a:fontRef idx="minor">
+            <a:schemeClr val="lt1"/>
+          </a:fontRef>
+        </p:style>
+        <p:txBody>
+          <a:bodyPr rtlCol="0" anchor="ctr"/>
+          <a:lstStyle/>
+          <a:p>
+            <a:pPr algn="ctr"/>
+            <a:r>
+              <a:rPr lang="en-US" dirty="0"/>
+              <a:t>Plate Map</a:t>
+            </a:r>
+          </a:p>
+        </p:txBody>
+      </p:sp>
+      <p:sp>
+        <p:nvSpPr>
+          <p:cNvPr id="11" name="Rectangle 10">
+            <a:extLst>
+              <a:ext uri="{FF2B5EF4-FFF2-40B4-BE49-F238E27FC236}">
+                <a16:creationId xmlns:a16="http://schemas.microsoft.com/office/drawing/2014/main" id="{E04EB8EF-55B2-46F6-84B0-5768C4CA29F0}"/>
+              </a:ext>
+            </a:extLst>
+          </p:cNvPr>
+          <p:cNvSpPr/>
+          <p:nvPr/>
+        </p:nvSpPr>
+        <p:spPr>
+          <a:xfrm>
+            <a:off x="9974716" y="1742827"/>
+            <a:ext cx="1843088" cy="962022"/>
           </a:xfrm>
           <a:prstGeom prst="rect">
             <a:avLst/>
@@ -5291,40 +5518,29 @@
             <a:pPr algn="ctr"/>
             <a:r>
               <a:rPr lang="en-US" sz="1200" dirty="0"/>
-              <a:t>Convert from matrix format to long data and merge plate map. Critical output features: </a:t>
+              <a:t>Set floor of zero </a:t>
             </a:r>
           </a:p>
           <a:p>
             <a:pPr algn="ctr"/>
             <a:r>
               <a:rPr lang="en-US" sz="1200" dirty="0"/>
-              <a:t>[conc, </a:t>
-            </a:r>
-            <a:r>
-              <a:rPr lang="en-US" sz="1200" dirty="0" err="1"/>
-              <a:t>optical_density</a:t>
-            </a:r>
-            <a:r>
-              <a:rPr lang="en-US" sz="1200" dirty="0"/>
-              <a:t>, </a:t>
-            </a:r>
-            <a:r>
-              <a:rPr lang="en-US" sz="1200" dirty="0" err="1"/>
-              <a:t>lab_id</a:t>
-            </a:r>
-            <a:r>
-              <a:rPr lang="en-US" sz="1200" dirty="0"/>
-              <a:t>, inhibitor] </a:t>
-            </a:r>
-          </a:p>
-        </p:txBody>
-      </p:sp>
-      <p:sp>
-        <p:nvSpPr>
-          <p:cNvPr id="4" name="Rectangle: Rounded Corners 3">
-            <a:extLst>
-              <a:ext uri="{FF2B5EF4-FFF2-40B4-BE49-F238E27FC236}">
-                <a16:creationId xmlns:a16="http://schemas.microsoft.com/office/drawing/2014/main" id="{193C7284-B2C1-47ED-AEF4-38405D32A456}"/>
+              <a:t>QC: </a:t>
+            </a:r>
+            <a:r>
+              <a:rPr lang="en-US" sz="1200" b="1" dirty="0"/>
+              <a:t>Negative assay value adjustment ?</a:t>
+            </a:r>
+            <a:endParaRPr lang="en-US" sz="1200" dirty="0"/>
+          </a:p>
+        </p:txBody>
+      </p:sp>
+      <p:sp>
+        <p:nvSpPr>
+          <p:cNvPr id="12" name="Rectangle: Rounded Corners 11">
+            <a:extLst>
+              <a:ext uri="{FF2B5EF4-FFF2-40B4-BE49-F238E27FC236}">
+                <a16:creationId xmlns:a16="http://schemas.microsoft.com/office/drawing/2014/main" id="{4BE75838-738C-4D64-BD60-FCB6E46DFA95}"/>
               </a:ext>
             </a:extLst>
           </p:cNvPr>
@@ -5333,8 +5549,8 @@
         </p:nvSpPr>
         <p:spPr>
           <a:xfrm>
-            <a:off x="2527697" y="761761"/>
-            <a:ext cx="1843088" cy="971545"/>
+            <a:off x="9974716" y="761765"/>
+            <a:ext cx="1843088" cy="981069"/>
           </a:xfrm>
           <a:prstGeom prst="roundRect">
             <a:avLst/>
@@ -5363,63 +5579,14 @@
             <a:pPr algn="ctr"/>
             <a:r>
               <a:rPr lang="en-US" dirty="0"/>
-              <a:t>Plate Mapping</a:t>
+              <a:t>Normalization</a:t>
             </a:r>
           </a:p>
           <a:p>
             <a:pPr algn="ctr"/>
             <a:r>
-              <a:rPr lang="en-US" sz="900" dirty="0"/>
-              <a:t>[HNSCC_plate_data_mapper.py]</a:t>
-            </a:r>
-          </a:p>
-        </p:txBody>
-      </p:sp>
-      <p:sp>
-        <p:nvSpPr>
-          <p:cNvPr id="5" name="Rectangle: Rounded Corners 4">
-            <a:extLst>
-              <a:ext uri="{FF2B5EF4-FFF2-40B4-BE49-F238E27FC236}">
-                <a16:creationId xmlns:a16="http://schemas.microsoft.com/office/drawing/2014/main" id="{797472C0-924C-453D-85FE-D9F751F91C8F}"/>
-              </a:ext>
-            </a:extLst>
-          </p:cNvPr>
-          <p:cNvSpPr/>
-          <p:nvPr/>
-        </p:nvSpPr>
-        <p:spPr>
-          <a:xfrm>
-            <a:off x="7717291" y="761761"/>
-            <a:ext cx="1843088" cy="990599"/>
-          </a:xfrm>
-          <a:prstGeom prst="roundRect">
-            <a:avLst/>
-          </a:prstGeom>
-        </p:spPr>
-        <p:style>
-          <a:lnRef idx="2">
-            <a:schemeClr val="accent1">
-              <a:shade val="50000"/>
-            </a:schemeClr>
-          </a:lnRef>
-          <a:fillRef idx="1">
-            <a:schemeClr val="accent1"/>
-          </a:fillRef>
-          <a:effectRef idx="0">
-            <a:schemeClr val="accent1"/>
-          </a:effectRef>
-          <a:fontRef idx="minor">
-            <a:schemeClr val="lt1"/>
-          </a:fontRef>
-        </p:style>
-        <p:txBody>
-          <a:bodyPr rtlCol="0" anchor="ctr"/>
-          <a:lstStyle/>
-          <a:p>
-            <a:pPr algn="ctr"/>
-            <a:r>
-              <a:rPr lang="en-US" dirty="0"/>
-              <a:t>Normalization (1) </a:t>
+              <a:rPr lang="en-US" dirty="0"/>
+              <a:t>(2) </a:t>
             </a:r>
           </a:p>
           <a:p>
@@ -5433,10 +5600,10 @@
       </p:sp>
       <p:sp>
         <p:nvSpPr>
-          <p:cNvPr id="6" name="Rectangle: Rounded Corners 5">
-            <a:extLst>
-              <a:ext uri="{FF2B5EF4-FFF2-40B4-BE49-F238E27FC236}">
-                <a16:creationId xmlns:a16="http://schemas.microsoft.com/office/drawing/2014/main" id="{C6C10FA8-B0D6-47D7-892A-BA503F3CCFD4}"/>
+          <p:cNvPr id="13" name="Rectangle 12">
+            <a:extLst>
+              <a:ext uri="{FF2B5EF4-FFF2-40B4-BE49-F238E27FC236}">
+                <a16:creationId xmlns:a16="http://schemas.microsoft.com/office/drawing/2014/main" id="{E7F93816-43F2-4B1A-9171-0FF2E4500C69}"/>
               </a:ext>
             </a:extLst>
           </p:cNvPr>
@@ -5445,123 +5612,8 @@
         </p:nvSpPr>
         <p:spPr>
           <a:xfrm>
-            <a:off x="14288" y="1376359"/>
-            <a:ext cx="1943100" cy="990600"/>
-          </a:xfrm>
-          <a:prstGeom prst="roundRect">
-            <a:avLst/>
-          </a:prstGeom>
-          <a:solidFill>
-            <a:schemeClr val="accent2">
-              <a:lumMod val="75000"/>
-            </a:schemeClr>
-          </a:solidFill>
-        </p:spPr>
-        <p:style>
-          <a:lnRef idx="2">
-            <a:schemeClr val="accent1">
-              <a:shade val="50000"/>
-            </a:schemeClr>
-          </a:lnRef>
-          <a:fillRef idx="1">
-            <a:schemeClr val="accent1"/>
-          </a:fillRef>
-          <a:effectRef idx="0">
-            <a:schemeClr val="accent1"/>
-          </a:effectRef>
-          <a:fontRef idx="minor">
-            <a:schemeClr val="lt1"/>
-          </a:fontRef>
-        </p:style>
-        <p:txBody>
-          <a:bodyPr rtlCol="0" anchor="ctr"/>
-          <a:lstStyle/>
-          <a:p>
-            <a:pPr algn="ctr"/>
-            <a:r>
-              <a:rPr lang="en-US" dirty="0"/>
-              <a:t>Photo spectrometer</a:t>
-            </a:r>
-          </a:p>
-          <a:p>
-            <a:pPr algn="ctr"/>
-            <a:r>
-              <a:rPr lang="en-US" dirty="0"/>
-              <a:t>Output </a:t>
-            </a:r>
-          </a:p>
-        </p:txBody>
-      </p:sp>
-      <p:sp>
-        <p:nvSpPr>
-          <p:cNvPr id="7" name="Rectangle: Rounded Corners 6">
-            <a:extLst>
-              <a:ext uri="{FF2B5EF4-FFF2-40B4-BE49-F238E27FC236}">
-                <a16:creationId xmlns:a16="http://schemas.microsoft.com/office/drawing/2014/main" id="{D82A4DB4-FBC5-48B8-B9F0-A45C22464930}"/>
-              </a:ext>
-            </a:extLst>
-          </p:cNvPr>
-          <p:cNvSpPr/>
-          <p:nvPr/>
-        </p:nvSpPr>
-        <p:spPr>
-          <a:xfrm>
-            <a:off x="14288" y="118046"/>
-            <a:ext cx="1943100" cy="1063053"/>
-          </a:xfrm>
-          <a:prstGeom prst="roundRect">
-            <a:avLst/>
-          </a:prstGeom>
-          <a:solidFill>
-            <a:schemeClr val="accent2">
-              <a:lumMod val="75000"/>
-            </a:schemeClr>
-          </a:solidFill>
-        </p:spPr>
-        <p:style>
-          <a:lnRef idx="2">
-            <a:schemeClr val="accent1">
-              <a:shade val="50000"/>
-            </a:schemeClr>
-          </a:lnRef>
-          <a:fillRef idx="1">
-            <a:schemeClr val="accent1"/>
-          </a:fillRef>
-          <a:effectRef idx="0">
-            <a:schemeClr val="accent1"/>
-          </a:effectRef>
-          <a:fontRef idx="minor">
-            <a:schemeClr val="lt1"/>
-          </a:fontRef>
-        </p:style>
-        <p:txBody>
-          <a:bodyPr rtlCol="0" anchor="ctr"/>
-          <a:lstStyle/>
-          <a:p>
-            <a:pPr algn="ctr"/>
-            <a:r>
-              <a:rPr lang="en-US" dirty="0"/>
-              <a:t>Plate Map</a:t>
-            </a:r>
-          </a:p>
-        </p:txBody>
-      </p:sp>
-      <p:sp>
-        <p:nvSpPr>
-          <p:cNvPr id="11" name="Rectangle 10">
-            <a:extLst>
-              <a:ext uri="{FF2B5EF4-FFF2-40B4-BE49-F238E27FC236}">
-                <a16:creationId xmlns:a16="http://schemas.microsoft.com/office/drawing/2014/main" id="{E04EB8EF-55B2-46F6-84B0-5768C4CA29F0}"/>
-              </a:ext>
-            </a:extLst>
-          </p:cNvPr>
-          <p:cNvSpPr/>
-          <p:nvPr/>
-        </p:nvSpPr>
-        <p:spPr>
-          <a:xfrm>
-            <a:off x="9974716" y="1742827"/>
-            <a:ext cx="1843088" cy="962022"/>
+            <a:off x="494110" y="5200637"/>
+            <a:ext cx="2382440" cy="1533768"/>
           </a:xfrm>
           <a:prstGeom prst="rect">
             <a:avLst/>
@@ -5585,32 +5637,35 @@
           <a:bodyPr rtlCol="0" anchor="ctr"/>
           <a:lstStyle/>
           <a:p>
-            <a:pPr algn="ctr"/>
-            <a:r>
-              <a:rPr lang="en-US" sz="1200" dirty="0"/>
-              <a:t>Set floor of zero </a:t>
-            </a:r>
-          </a:p>
-          <a:p>
-            <a:pPr algn="ctr"/>
-            <a:r>
-              <a:rPr lang="en-US" sz="1200" dirty="0"/>
-              <a:t>QC: </a:t>
-            </a:r>
-            <a:r>
-              <a:rPr lang="en-US" sz="1200" b="1" dirty="0"/>
-              <a:t>Negative assay value adjustment ?</a:t>
-            </a:r>
-            <a:endParaRPr lang="en-US" sz="1200" dirty="0"/>
-          </a:p>
-        </p:txBody>
-      </p:sp>
-      <p:sp>
-        <p:nvSpPr>
-          <p:cNvPr id="12" name="Rectangle: Rounded Corners 11">
-            <a:extLst>
-              <a:ext uri="{FF2B5EF4-FFF2-40B4-BE49-F238E27FC236}">
-                <a16:creationId xmlns:a16="http://schemas.microsoft.com/office/drawing/2014/main" id="{4BE75838-738C-4D64-BD60-FCB6E46DFA95}"/>
+            <a:pPr marL="228600" indent="-228600" algn="ctr">
+              <a:buAutoNum type="arabicParenBoth"/>
+            </a:pPr>
+            <a:r>
+              <a:rPr lang="en-US" sz="1100" b="1" dirty="0"/>
+              <a:t>Within-plate replicates are fit with linear regression and drugs with AUC differences &gt; 1 are removed. Remaining are averaged. </a:t>
+            </a:r>
+          </a:p>
+          <a:p>
+            <a:pPr marL="228600" indent="-228600" algn="ctr">
+              <a:buAutoNum type="arabicParenBoth"/>
+            </a:pPr>
+            <a:r>
+              <a:rPr lang="en-US" sz="1100" b="1" dirty="0"/>
+              <a:t>Across-plate replicates are fit with linear regression and AUC differences &gt; 0.75 are removed. Remaining are averaged.  </a:t>
+            </a:r>
+            <a:r>
+              <a:rPr lang="en-US" sz="1100" dirty="0"/>
+              <a:t> </a:t>
+            </a:r>
+          </a:p>
+        </p:txBody>
+      </p:sp>
+      <p:sp>
+        <p:nvSpPr>
+          <p:cNvPr id="14" name="Rectangle: Rounded Corners 13">
+            <a:extLst>
+              <a:ext uri="{FF2B5EF4-FFF2-40B4-BE49-F238E27FC236}">
+                <a16:creationId xmlns:a16="http://schemas.microsoft.com/office/drawing/2014/main" id="{E73C5A82-F3C2-4E54-AE36-C924CDC3C367}"/>
               </a:ext>
             </a:extLst>
           </p:cNvPr>
@@ -5619,12 +5674,18 @@
         </p:nvSpPr>
         <p:spPr>
           <a:xfrm>
-            <a:off x="9974716" y="761765"/>
-            <a:ext cx="1843088" cy="981069"/>
+            <a:off x="765572" y="4229088"/>
+            <a:ext cx="1843088" cy="971545"/>
           </a:xfrm>
           <a:prstGeom prst="roundRect">
             <a:avLst/>
           </a:prstGeom>
+          <a:solidFill>
+            <a:schemeClr val="accent1">
+              <a:lumMod val="60000"/>
+              <a:lumOff val="40000"/>
+            </a:schemeClr>
+          </a:solidFill>
         </p:spPr>
         <p:style>
           <a:lnRef idx="2">
@@ -5656,7 +5717,7 @@
             <a:pPr algn="ctr"/>
             <a:r>
               <a:rPr lang="en-US" dirty="0"/>
-              <a:t>(2) </a:t>
+              <a:t>(3) </a:t>
             </a:r>
           </a:p>
           <a:p>
@@ -5670,10 +5731,10 @@
       </p:sp>
       <p:sp>
         <p:nvSpPr>
-          <p:cNvPr id="13" name="Rectangle 12">
-            <a:extLst>
-              <a:ext uri="{FF2B5EF4-FFF2-40B4-BE49-F238E27FC236}">
-                <a16:creationId xmlns:a16="http://schemas.microsoft.com/office/drawing/2014/main" id="{E7F93816-43F2-4B1A-9171-0FF2E4500C69}"/>
+          <p:cNvPr id="15" name="Rectangle 14">
+            <a:extLst>
+              <a:ext uri="{FF2B5EF4-FFF2-40B4-BE49-F238E27FC236}">
+                <a16:creationId xmlns:a16="http://schemas.microsoft.com/office/drawing/2014/main" id="{87CA49F1-FAE7-47BA-847B-A196A3941387}"/>
               </a:ext>
             </a:extLst>
           </p:cNvPr>
@@ -5682,8 +5743,8 @@
         </p:nvSpPr>
         <p:spPr>
           <a:xfrm>
-            <a:off x="494110" y="5200637"/>
-            <a:ext cx="2382440" cy="1533768"/>
+            <a:off x="3902104" y="5229214"/>
+            <a:ext cx="1843088" cy="862010"/>
           </a:xfrm>
           <a:prstGeom prst="rect">
             <a:avLst/>
@@ -5707,35 +5768,27 @@
           <a:bodyPr rtlCol="0" anchor="ctr"/>
           <a:lstStyle/>
           <a:p>
-            <a:pPr marL="228600" indent="-228600" algn="ctr">
-              <a:buAutoNum type="arabicParenBoth"/>
-            </a:pPr>
-            <a:r>
-              <a:rPr lang="en-US" sz="1100" b="1" dirty="0"/>
-              <a:t>Within-plate replicates are fit with linear regression and drugs with AUC differences &gt; 1 are removed. Remaining are averaged. </a:t>
-            </a:r>
-          </a:p>
-          <a:p>
-            <a:pPr marL="228600" indent="-228600" algn="ctr">
-              <a:buAutoNum type="arabicParenBoth"/>
-            </a:pPr>
-            <a:r>
-              <a:rPr lang="en-US" sz="1100" b="1" dirty="0"/>
-              <a:t>Across-plate replicates are fit with linear regression and AUC differences &gt; 0.75 are removed. Remaining are averaged.  </a:t>
-            </a:r>
-            <a:r>
-              <a:rPr lang="en-US" sz="1100" dirty="0"/>
-              <a:t> </a:t>
-            </a:r>
-          </a:p>
-        </p:txBody>
-      </p:sp>
-      <p:sp>
-        <p:nvSpPr>
-          <p:cNvPr id="14" name="Rectangle: Rounded Corners 13">
-            <a:extLst>
-              <a:ext uri="{FF2B5EF4-FFF2-40B4-BE49-F238E27FC236}">
-                <a16:creationId xmlns:a16="http://schemas.microsoft.com/office/drawing/2014/main" id="{E73C5A82-F3C2-4E54-AE36-C924CDC3C367}"/>
+            <a:pPr algn="ctr"/>
+            <a:r>
+              <a:rPr lang="en-US" sz="1200" dirty="0"/>
+              <a:t>Apply ceiling of 1 </a:t>
+            </a:r>
+          </a:p>
+          <a:p>
+            <a:pPr algn="ctr"/>
+            <a:r>
+              <a:rPr lang="en-US" sz="1200" dirty="0"/>
+              <a:t>(Dan’s protocol uses 100 – note for AUC threshold adjustments)  </a:t>
+            </a:r>
+          </a:p>
+        </p:txBody>
+      </p:sp>
+      <p:sp>
+        <p:nvSpPr>
+          <p:cNvPr id="16" name="Rectangle: Rounded Corners 15">
+            <a:extLst>
+              <a:ext uri="{FF2B5EF4-FFF2-40B4-BE49-F238E27FC236}">
+                <a16:creationId xmlns:a16="http://schemas.microsoft.com/office/drawing/2014/main" id="{4370392D-A95D-4954-BA28-E3499372B6EA}"/>
               </a:ext>
             </a:extLst>
           </p:cNvPr>
@@ -5744,18 +5797,12 @@
         </p:nvSpPr>
         <p:spPr>
           <a:xfrm>
-            <a:off x="765572" y="4229088"/>
-            <a:ext cx="1843088" cy="971545"/>
+            <a:off x="3902104" y="4229088"/>
+            <a:ext cx="1843088" cy="990599"/>
           </a:xfrm>
           <a:prstGeom prst="roundRect">
             <a:avLst/>
           </a:prstGeom>
-          <a:solidFill>
-            <a:schemeClr val="accent1">
-              <a:lumMod val="60000"/>
-              <a:lumOff val="40000"/>
-            </a:schemeClr>
-          </a:solidFill>
         </p:spPr>
         <p:style>
           <a:lnRef idx="2">
@@ -5780,14 +5827,57 @@
             <a:pPr algn="ctr"/>
             <a:r>
               <a:rPr lang="en-US" dirty="0"/>
-              <a:t>Normalization</a:t>
-            </a:r>
-          </a:p>
+              <a:t>Normalization (4)</a:t>
+            </a:r>
+            <a:endParaRPr lang="en-US" sz="900" dirty="0"/>
+          </a:p>
+        </p:txBody>
+      </p:sp>
+      <p:sp>
+        <p:nvSpPr>
+          <p:cNvPr id="22" name="Rectangle: Rounded Corners 21">
+            <a:extLst>
+              <a:ext uri="{FF2B5EF4-FFF2-40B4-BE49-F238E27FC236}">
+                <a16:creationId xmlns:a16="http://schemas.microsoft.com/office/drawing/2014/main" id="{5C4DD129-C784-4D04-9C24-E40DDCD0D3DF}"/>
+              </a:ext>
+            </a:extLst>
+          </p:cNvPr>
+          <p:cNvSpPr/>
+          <p:nvPr/>
+        </p:nvSpPr>
+        <p:spPr>
+          <a:xfrm>
+            <a:off x="5043146" y="1628781"/>
+            <a:ext cx="1662113" cy="990599"/>
+          </a:xfrm>
+          <a:prstGeom prst="roundRect">
+            <a:avLst/>
+          </a:prstGeom>
+        </p:spPr>
+        <p:style>
+          <a:lnRef idx="2">
+            <a:schemeClr val="accent1">
+              <a:shade val="50000"/>
+            </a:schemeClr>
+          </a:lnRef>
+          <a:fillRef idx="1">
+            <a:schemeClr val="accent1"/>
+          </a:fillRef>
+          <a:effectRef idx="0">
+            <a:schemeClr val="accent1"/>
+          </a:effectRef>
+          <a:fontRef idx="minor">
+            <a:schemeClr val="lt1"/>
+          </a:fontRef>
+        </p:style>
+        <p:txBody>
+          <a:bodyPr rtlCol="0" anchor="ctr"/>
+          <a:lstStyle/>
           <a:p>
             <a:pPr algn="ctr"/>
             <a:r>
               <a:rPr lang="en-US" dirty="0"/>
-              <a:t>(3) </a:t>
+              <a:t>Combination-Agents Normalization</a:t>
             </a:r>
           </a:p>
           <a:p>
@@ -5801,10 +5891,10 @@
       </p:sp>
       <p:sp>
         <p:nvSpPr>
-          <p:cNvPr id="15" name="Rectangle 14">
-            <a:extLst>
-              <a:ext uri="{FF2B5EF4-FFF2-40B4-BE49-F238E27FC236}">
-                <a16:creationId xmlns:a16="http://schemas.microsoft.com/office/drawing/2014/main" id="{87CA49F1-FAE7-47BA-847B-A196A3941387}"/>
+          <p:cNvPr id="24" name="Rectangle: Rounded Corners 23">
+            <a:extLst>
+              <a:ext uri="{FF2B5EF4-FFF2-40B4-BE49-F238E27FC236}">
+                <a16:creationId xmlns:a16="http://schemas.microsoft.com/office/drawing/2014/main" id="{166D446E-B385-473D-B5D5-0F426DB64B1D}"/>
               </a:ext>
             </a:extLst>
           </p:cNvPr>
@@ -5813,8 +5903,64 @@
         </p:nvSpPr>
         <p:spPr>
           <a:xfrm>
-            <a:off x="3902104" y="5229214"/>
-            <a:ext cx="1843088" cy="862010"/>
+            <a:off x="7185422" y="4229091"/>
+            <a:ext cx="1662113" cy="990599"/>
+          </a:xfrm>
+          <a:prstGeom prst="roundRect">
+            <a:avLst/>
+          </a:prstGeom>
+        </p:spPr>
+        <p:style>
+          <a:lnRef idx="2">
+            <a:schemeClr val="accent1">
+              <a:shade val="50000"/>
+            </a:schemeClr>
+          </a:lnRef>
+          <a:fillRef idx="1">
+            <a:schemeClr val="accent1"/>
+          </a:fillRef>
+          <a:effectRef idx="0">
+            <a:schemeClr val="accent1"/>
+          </a:effectRef>
+          <a:fontRef idx="minor">
+            <a:schemeClr val="lt1"/>
+          </a:fontRef>
+        </p:style>
+        <p:txBody>
+          <a:bodyPr rtlCol="0" anchor="ctr"/>
+          <a:lstStyle/>
+          <a:p>
+            <a:pPr algn="ctr"/>
+            <a:r>
+              <a:rPr lang="en-US" dirty="0"/>
+              <a:t>Regression Fitting</a:t>
+            </a:r>
+          </a:p>
+          <a:p>
+            <a:pPr algn="ctr"/>
+            <a:r>
+              <a:rPr lang="en-US" sz="900" dirty="0"/>
+              <a:t>[Probit_calc.py]</a:t>
+            </a:r>
+          </a:p>
+        </p:txBody>
+      </p:sp>
+      <p:sp>
+        <p:nvSpPr>
+          <p:cNvPr id="25" name="Rectangle 24">
+            <a:extLst>
+              <a:ext uri="{FF2B5EF4-FFF2-40B4-BE49-F238E27FC236}">
+                <a16:creationId xmlns:a16="http://schemas.microsoft.com/office/drawing/2014/main" id="{44F8A642-34FC-4C9D-BD5E-4F69D6C4C988}"/>
+              </a:ext>
+            </a:extLst>
+          </p:cNvPr>
+          <p:cNvSpPr/>
+          <p:nvPr/>
+        </p:nvSpPr>
+        <p:spPr>
+          <a:xfrm>
+            <a:off x="6613071" y="5219687"/>
+            <a:ext cx="2947308" cy="1104907"/>
           </a:xfrm>
           <a:prstGeom prst="rect">
             <a:avLst/>
@@ -5840,25 +5986,312 @@
           <a:p>
             <a:pPr algn="ctr"/>
             <a:r>
+              <a:rPr lang="en-US" sz="1200" dirty="0" err="1"/>
+              <a:t>Probit</a:t>
+            </a:r>
+            <a:r>
               <a:rPr lang="en-US" sz="1200" dirty="0"/>
-              <a:t>Apply ceiling of 1 </a:t>
+              <a:t> Regression &amp; 5</a:t>
+            </a:r>
+            <a:r>
+              <a:rPr lang="en-US" sz="1200" baseline="30000" dirty="0"/>
+              <a:t>th</a:t>
+            </a:r>
+            <a:r>
+              <a:rPr lang="en-US" sz="1200" dirty="0"/>
+              <a:t> order polynomial regression. For each calculate: </a:t>
             </a:r>
           </a:p>
           <a:p>
             <a:pPr algn="ctr"/>
             <a:r>
-              <a:rPr lang="en-US" sz="1200" dirty="0"/>
-              <a:t>(Dan’s protocol uses 100 – note for AUC threshold adjustments)  </a:t>
-            </a:r>
-          </a:p>
-        </p:txBody>
-      </p:sp>
-      <p:sp>
-        <p:nvSpPr>
-          <p:cNvPr id="16" name="Rectangle: Rounded Corners 15">
-            <a:extLst>
-              <a:ext uri="{FF2B5EF4-FFF2-40B4-BE49-F238E27FC236}">
-                <a16:creationId xmlns:a16="http://schemas.microsoft.com/office/drawing/2014/main" id="{4370392D-A95D-4954-BA28-E3499372B6EA}"/>
+              <a:rPr lang="en-US" sz="1200" b="1" dirty="0"/>
+              <a:t>AIC, BIC </a:t>
+            </a:r>
+          </a:p>
+          <a:p>
+            <a:pPr algn="ctr"/>
+            <a:r>
+              <a:rPr lang="en-US" sz="1200" b="1" dirty="0"/>
+              <a:t>Deviance</a:t>
+            </a:r>
+          </a:p>
+          <a:p>
+            <a:pPr algn="ctr"/>
+            <a:r>
+              <a:rPr lang="en-US" sz="1200" b="1" dirty="0"/>
+              <a:t>P value, z-statistic</a:t>
+            </a:r>
+          </a:p>
+          <a:p>
+            <a:pPr algn="ctr"/>
+            <a:r>
+              <a:rPr lang="en-US" sz="1200" b="1" dirty="0"/>
+              <a:t>AUC</a:t>
+            </a:r>
+          </a:p>
+        </p:txBody>
+      </p:sp>
+      <p:sp>
+        <p:nvSpPr>
+          <p:cNvPr id="35" name="TextBox 34">
+            <a:extLst>
+              <a:ext uri="{FF2B5EF4-FFF2-40B4-BE49-F238E27FC236}">
+                <a16:creationId xmlns:a16="http://schemas.microsoft.com/office/drawing/2014/main" id="{A023506D-3C78-4D3C-B858-72512FFC1144}"/>
+              </a:ext>
+            </a:extLst>
+          </p:cNvPr>
+          <p:cNvSpPr txBox="1"/>
+          <p:nvPr/>
+        </p:nvSpPr>
+        <p:spPr>
+          <a:xfrm>
+            <a:off x="5552317" y="1057988"/>
+            <a:ext cx="869149" cy="246221"/>
+          </a:xfrm>
+          <a:prstGeom prst="rect">
+            <a:avLst/>
+          </a:prstGeom>
+          <a:noFill/>
+        </p:spPr>
+        <p:txBody>
+          <a:bodyPr wrap="none" rtlCol="0">
+            <a:spAutoFit/>
+          </a:bodyPr>
+          <a:lstStyle/>
+          <a:p>
+            <a:r>
+              <a:rPr lang="en-US" sz="1000" dirty="0"/>
+              <a:t>Single agents</a:t>
+            </a:r>
+          </a:p>
+        </p:txBody>
+      </p:sp>
+      <p:cxnSp>
+        <p:nvCxnSpPr>
+          <p:cNvPr id="37" name="Connector: Elbow 36">
+            <a:extLst>
+              <a:ext uri="{FF2B5EF4-FFF2-40B4-BE49-F238E27FC236}">
+                <a16:creationId xmlns:a16="http://schemas.microsoft.com/office/drawing/2014/main" id="{200F9EFA-8A24-478B-B621-6E021720A03C}"/>
+              </a:ext>
+            </a:extLst>
+          </p:cNvPr>
+          <p:cNvCxnSpPr>
+            <a:cxnSpLocks/>
+            <a:stCxn id="16" idx="3"/>
+            <a:endCxn id="24" idx="1"/>
+          </p:cNvCxnSpPr>
+          <p:nvPr/>
+        </p:nvCxnSpPr>
+        <p:spPr>
+          <a:xfrm>
+            <a:off x="5745192" y="4724388"/>
+            <a:ext cx="1440230" cy="3"/>
+          </a:xfrm>
+          <a:prstGeom prst="bentConnector3">
+            <a:avLst/>
+          </a:prstGeom>
+          <a:ln>
+            <a:tailEnd type="triangle"/>
+          </a:ln>
+        </p:spPr>
+        <p:style>
+          <a:lnRef idx="1">
+            <a:schemeClr val="accent1"/>
+          </a:lnRef>
+          <a:fillRef idx="0">
+            <a:schemeClr val="accent1"/>
+          </a:fillRef>
+          <a:effectRef idx="0">
+            <a:schemeClr val="accent1"/>
+          </a:effectRef>
+          <a:fontRef idx="minor">
+            <a:schemeClr val="tx1"/>
+          </a:fontRef>
+        </p:style>
+      </p:cxnSp>
+      <p:cxnSp>
+        <p:nvCxnSpPr>
+          <p:cNvPr id="42" name="Connector: Elbow 41">
+            <a:extLst>
+              <a:ext uri="{FF2B5EF4-FFF2-40B4-BE49-F238E27FC236}">
+                <a16:creationId xmlns:a16="http://schemas.microsoft.com/office/drawing/2014/main" id="{BDBB7400-744E-4BD2-8112-34334606A46D}"/>
+              </a:ext>
+            </a:extLst>
+          </p:cNvPr>
+          <p:cNvCxnSpPr>
+            <a:cxnSpLocks/>
+            <a:stCxn id="12" idx="3"/>
+            <a:endCxn id="14" idx="1"/>
+          </p:cNvCxnSpPr>
+          <p:nvPr/>
+        </p:nvCxnSpPr>
+        <p:spPr>
+          <a:xfrm flipH="1">
+            <a:off x="765572" y="1252300"/>
+            <a:ext cx="11052232" cy="3462561"/>
+          </a:xfrm>
+          <a:prstGeom prst="bentConnector5">
+            <a:avLst>
+              <a:gd name="adj1" fmla="val -2068"/>
+              <a:gd name="adj2" fmla="val 72940"/>
+              <a:gd name="adj3" fmla="val 102068"/>
+            </a:avLst>
+          </a:prstGeom>
+          <a:ln>
+            <a:tailEnd type="triangle"/>
+          </a:ln>
+        </p:spPr>
+        <p:style>
+          <a:lnRef idx="1">
+            <a:schemeClr val="accent1"/>
+          </a:lnRef>
+          <a:fillRef idx="0">
+            <a:schemeClr val="accent1"/>
+          </a:fillRef>
+          <a:effectRef idx="0">
+            <a:schemeClr val="accent1"/>
+          </a:effectRef>
+          <a:fontRef idx="minor">
+            <a:schemeClr val="tx1"/>
+          </a:fontRef>
+        </p:style>
+      </p:cxnSp>
+      <p:cxnSp>
+        <p:nvCxnSpPr>
+          <p:cNvPr id="46" name="Connector: Elbow 45">
+            <a:extLst>
+              <a:ext uri="{FF2B5EF4-FFF2-40B4-BE49-F238E27FC236}">
+                <a16:creationId xmlns:a16="http://schemas.microsoft.com/office/drawing/2014/main" id="{28DD8D46-FFF1-4F1F-9353-223CADAC0240}"/>
+              </a:ext>
+            </a:extLst>
+          </p:cNvPr>
+          <p:cNvCxnSpPr>
+            <a:cxnSpLocks/>
+            <a:stCxn id="5" idx="3"/>
+            <a:endCxn id="12" idx="1"/>
+          </p:cNvCxnSpPr>
+          <p:nvPr/>
+        </p:nvCxnSpPr>
+        <p:spPr>
+          <a:xfrm flipV="1">
+            <a:off x="9560379" y="1252300"/>
+            <a:ext cx="414337" cy="4761"/>
+          </a:xfrm>
+          <a:prstGeom prst="bentConnector3">
+            <a:avLst>
+              <a:gd name="adj1" fmla="val 50000"/>
+            </a:avLst>
+          </a:prstGeom>
+          <a:ln>
+            <a:tailEnd type="triangle"/>
+          </a:ln>
+        </p:spPr>
+        <p:style>
+          <a:lnRef idx="1">
+            <a:schemeClr val="accent1"/>
+          </a:lnRef>
+          <a:fillRef idx="0">
+            <a:schemeClr val="accent1"/>
+          </a:fillRef>
+          <a:effectRef idx="0">
+            <a:schemeClr val="accent1"/>
+          </a:effectRef>
+          <a:fontRef idx="minor">
+            <a:schemeClr val="tx1"/>
+          </a:fontRef>
+        </p:style>
+      </p:cxnSp>
+      <p:cxnSp>
+        <p:nvCxnSpPr>
+          <p:cNvPr id="56" name="Connector: Elbow 55">
+            <a:extLst>
+              <a:ext uri="{FF2B5EF4-FFF2-40B4-BE49-F238E27FC236}">
+                <a16:creationId xmlns:a16="http://schemas.microsoft.com/office/drawing/2014/main" id="{BE15BE37-F947-4C81-A10A-02C20E653A5A}"/>
+              </a:ext>
+            </a:extLst>
+          </p:cNvPr>
+          <p:cNvCxnSpPr>
+            <a:stCxn id="7" idx="3"/>
+            <a:endCxn id="4" idx="1"/>
+          </p:cNvCxnSpPr>
+          <p:nvPr/>
+        </p:nvCxnSpPr>
+        <p:spPr>
+          <a:xfrm>
+            <a:off x="1957388" y="649573"/>
+            <a:ext cx="570309" cy="597961"/>
+          </a:xfrm>
+          <a:prstGeom prst="bentConnector3">
+            <a:avLst/>
+          </a:prstGeom>
+          <a:ln>
+            <a:tailEnd type="triangle"/>
+          </a:ln>
+        </p:spPr>
+        <p:style>
+          <a:lnRef idx="1">
+            <a:schemeClr val="accent1"/>
+          </a:lnRef>
+          <a:fillRef idx="0">
+            <a:schemeClr val="accent1"/>
+          </a:fillRef>
+          <a:effectRef idx="0">
+            <a:schemeClr val="accent1"/>
+          </a:effectRef>
+          <a:fontRef idx="minor">
+            <a:schemeClr val="tx1"/>
+          </a:fontRef>
+        </p:style>
+      </p:cxnSp>
+      <p:cxnSp>
+        <p:nvCxnSpPr>
+          <p:cNvPr id="59" name="Connector: Elbow 58">
+            <a:extLst>
+              <a:ext uri="{FF2B5EF4-FFF2-40B4-BE49-F238E27FC236}">
+                <a16:creationId xmlns:a16="http://schemas.microsoft.com/office/drawing/2014/main" id="{76F118B5-2782-4BF9-B983-9020DA116658}"/>
+              </a:ext>
+            </a:extLst>
+          </p:cNvPr>
+          <p:cNvCxnSpPr>
+            <a:stCxn id="6" idx="3"/>
+            <a:endCxn id="4" idx="1"/>
+          </p:cNvCxnSpPr>
+          <p:nvPr/>
+        </p:nvCxnSpPr>
+        <p:spPr>
+          <a:xfrm flipV="1">
+            <a:off x="1957388" y="1247534"/>
+            <a:ext cx="570309" cy="624125"/>
+          </a:xfrm>
+          <a:prstGeom prst="bentConnector3">
+            <a:avLst/>
+          </a:prstGeom>
+          <a:ln>
+            <a:tailEnd type="triangle"/>
+          </a:ln>
+        </p:spPr>
+        <p:style>
+          <a:lnRef idx="1">
+            <a:schemeClr val="accent1"/>
+          </a:lnRef>
+          <a:fillRef idx="0">
+            <a:schemeClr val="accent1"/>
+          </a:fillRef>
+          <a:effectRef idx="0">
+            <a:schemeClr val="accent1"/>
+          </a:effectRef>
+          <a:fontRef idx="minor">
+            <a:schemeClr val="tx1"/>
+          </a:fontRef>
+        </p:style>
+      </p:cxnSp>
+      <p:sp>
+        <p:nvSpPr>
+          <p:cNvPr id="31" name="Rectangle: Rounded Corners 30">
+            <a:extLst>
+              <a:ext uri="{FF2B5EF4-FFF2-40B4-BE49-F238E27FC236}">
+                <a16:creationId xmlns:a16="http://schemas.microsoft.com/office/drawing/2014/main" id="{D2ED3B51-58BF-41CB-9E78-8A2410C61004}"/>
               </a:ext>
             </a:extLst>
           </p:cNvPr>
@@ -5867,8 +6300,8 @@
         </p:nvSpPr>
         <p:spPr>
           <a:xfrm>
-            <a:off x="3902104" y="4229088"/>
-            <a:ext cx="1843088" cy="990599"/>
+            <a:off x="9921478" y="4229088"/>
+            <a:ext cx="1662113" cy="990599"/>
           </a:xfrm>
           <a:prstGeom prst="roundRect">
             <a:avLst/>
@@ -5897,57 +6330,7 @@
             <a:pPr algn="ctr"/>
             <a:r>
               <a:rPr lang="en-US" dirty="0"/>
-              <a:t>Normalization (4)</a:t>
-            </a:r>
-            <a:endParaRPr lang="en-US" sz="900" dirty="0"/>
-          </a:p>
-        </p:txBody>
-      </p:sp>
-      <p:sp>
-        <p:nvSpPr>
-          <p:cNvPr id="22" name="Rectangle: Rounded Corners 21">
-            <a:extLst>
-              <a:ext uri="{FF2B5EF4-FFF2-40B4-BE49-F238E27FC236}">
-                <a16:creationId xmlns:a16="http://schemas.microsoft.com/office/drawing/2014/main" id="{5C4DD129-C784-4D04-9C24-E40DDCD0D3DF}"/>
-              </a:ext>
-            </a:extLst>
-          </p:cNvPr>
-          <p:cNvSpPr/>
-          <p:nvPr/>
-        </p:nvSpPr>
-        <p:spPr>
-          <a:xfrm>
-            <a:off x="5043146" y="1628781"/>
-            <a:ext cx="1662113" cy="990599"/>
-          </a:xfrm>
-          <a:prstGeom prst="roundRect">
-            <a:avLst/>
-          </a:prstGeom>
-        </p:spPr>
-        <p:style>
-          <a:lnRef idx="2">
-            <a:schemeClr val="accent1">
-              <a:shade val="50000"/>
-            </a:schemeClr>
-          </a:lnRef>
-          <a:fillRef idx="1">
-            <a:schemeClr val="accent1"/>
-          </a:fillRef>
-          <a:effectRef idx="0">
-            <a:schemeClr val="accent1"/>
-          </a:effectRef>
-          <a:fontRef idx="minor">
-            <a:schemeClr val="lt1"/>
-          </a:fontRef>
-        </p:style>
-        <p:txBody>
-          <a:bodyPr rtlCol="0" anchor="ctr"/>
-          <a:lstStyle/>
-          <a:p>
-            <a:pPr algn="ctr"/>
-            <a:r>
-              <a:rPr lang="en-US" dirty="0"/>
-              <a:t>Combination-Agents Normalization</a:t>
+              <a:t>post-processing</a:t>
             </a:r>
           </a:p>
           <a:p>
@@ -5961,10 +6344,10 @@
       </p:sp>
       <p:sp>
         <p:nvSpPr>
-          <p:cNvPr id="23" name="Rectangle 22">
-            <a:extLst>
-              <a:ext uri="{FF2B5EF4-FFF2-40B4-BE49-F238E27FC236}">
-                <a16:creationId xmlns:a16="http://schemas.microsoft.com/office/drawing/2014/main" id="{327CE092-1F7B-4C9F-8F42-9D535FEE76B5}"/>
+          <p:cNvPr id="33" name="Rectangle 32">
+            <a:extLst>
+              <a:ext uri="{FF2B5EF4-FFF2-40B4-BE49-F238E27FC236}">
+                <a16:creationId xmlns:a16="http://schemas.microsoft.com/office/drawing/2014/main" id="{9BA202C5-0C46-4E82-98BC-E15CFAA5C3CD}"/>
               </a:ext>
             </a:extLst>
           </p:cNvPr>
@@ -5973,8 +6356,8 @@
         </p:nvSpPr>
         <p:spPr>
           <a:xfrm>
-            <a:off x="5013380" y="2619380"/>
-            <a:ext cx="1843088" cy="881063"/>
+            <a:off x="9854802" y="5229207"/>
+            <a:ext cx="1843088" cy="1269564"/>
           </a:xfrm>
           <a:prstGeom prst="rect">
             <a:avLst/>
@@ -6001,514 +6384,6 @@
             <a:pPr algn="ctr"/>
             <a:r>
               <a:rPr lang="en-US" sz="1200" dirty="0"/>
-              <a:t>Concentrations have to be represented as </a:t>
-            </a:r>
-            <a:r>
-              <a:rPr lang="en-US" sz="1200" dirty="0" err="1"/>
-              <a:t>euclidean</a:t>
-            </a:r>
-            <a:r>
-              <a:rPr lang="en-US" sz="1200" dirty="0"/>
-              <a:t> distances in concentration space to provide accurate plate to fit along. </a:t>
-            </a:r>
-          </a:p>
-        </p:txBody>
-      </p:sp>
-      <p:sp>
-        <p:nvSpPr>
-          <p:cNvPr id="24" name="Rectangle: Rounded Corners 23">
-            <a:extLst>
-              <a:ext uri="{FF2B5EF4-FFF2-40B4-BE49-F238E27FC236}">
-                <a16:creationId xmlns:a16="http://schemas.microsoft.com/office/drawing/2014/main" id="{166D446E-B385-473D-B5D5-0F426DB64B1D}"/>
-              </a:ext>
-            </a:extLst>
-          </p:cNvPr>
-          <p:cNvSpPr/>
-          <p:nvPr/>
-        </p:nvSpPr>
-        <p:spPr>
-          <a:xfrm>
-            <a:off x="7185422" y="4229091"/>
-            <a:ext cx="1662113" cy="990599"/>
-          </a:xfrm>
-          <a:prstGeom prst="roundRect">
-            <a:avLst/>
-          </a:prstGeom>
-        </p:spPr>
-        <p:style>
-          <a:lnRef idx="2">
-            <a:schemeClr val="accent1">
-              <a:shade val="50000"/>
-            </a:schemeClr>
-          </a:lnRef>
-          <a:fillRef idx="1">
-            <a:schemeClr val="accent1"/>
-          </a:fillRef>
-          <a:effectRef idx="0">
-            <a:schemeClr val="accent1"/>
-          </a:effectRef>
-          <a:fontRef idx="minor">
-            <a:schemeClr val="lt1"/>
-          </a:fontRef>
-        </p:style>
-        <p:txBody>
-          <a:bodyPr rtlCol="0" anchor="ctr"/>
-          <a:lstStyle/>
-          <a:p>
-            <a:pPr algn="ctr"/>
-            <a:r>
-              <a:rPr lang="en-US" dirty="0"/>
-              <a:t>Regression Fitting</a:t>
-            </a:r>
-          </a:p>
-          <a:p>
-            <a:pPr algn="ctr"/>
-            <a:r>
-              <a:rPr lang="en-US" sz="900" dirty="0"/>
-              <a:t>[Probit_calc.py]</a:t>
-            </a:r>
-          </a:p>
-        </p:txBody>
-      </p:sp>
-      <p:sp>
-        <p:nvSpPr>
-          <p:cNvPr id="25" name="Rectangle 24">
-            <a:extLst>
-              <a:ext uri="{FF2B5EF4-FFF2-40B4-BE49-F238E27FC236}">
-                <a16:creationId xmlns:a16="http://schemas.microsoft.com/office/drawing/2014/main" id="{44F8A642-34FC-4C9D-BD5E-4F69D6C4C988}"/>
-              </a:ext>
-            </a:extLst>
-          </p:cNvPr>
-          <p:cNvSpPr/>
-          <p:nvPr/>
-        </p:nvSpPr>
-        <p:spPr>
-          <a:xfrm>
-            <a:off x="6613071" y="5219687"/>
-            <a:ext cx="2947308" cy="1104907"/>
-          </a:xfrm>
-          <a:prstGeom prst="rect">
-            <a:avLst/>
-          </a:prstGeom>
-        </p:spPr>
-        <p:style>
-          <a:lnRef idx="2">
-            <a:schemeClr val="dk1"/>
-          </a:lnRef>
-          <a:fillRef idx="1">
-            <a:schemeClr val="lt1"/>
-          </a:fillRef>
-          <a:effectRef idx="0">
-            <a:schemeClr val="dk1"/>
-          </a:effectRef>
-          <a:fontRef idx="minor">
-            <a:schemeClr val="dk1"/>
-          </a:fontRef>
-        </p:style>
-        <p:txBody>
-          <a:bodyPr rtlCol="0" anchor="ctr"/>
-          <a:lstStyle/>
-          <a:p>
-            <a:pPr algn="ctr"/>
-            <a:r>
-              <a:rPr lang="en-US" sz="1200" dirty="0" err="1"/>
-              <a:t>Probit</a:t>
-            </a:r>
-            <a:r>
-              <a:rPr lang="en-US" sz="1200" dirty="0"/>
-              <a:t> Regression &amp; 5</a:t>
-            </a:r>
-            <a:r>
-              <a:rPr lang="en-US" sz="1200" baseline="30000" dirty="0"/>
-              <a:t>th</a:t>
-            </a:r>
-            <a:r>
-              <a:rPr lang="en-US" sz="1200" dirty="0"/>
-              <a:t> order polynomial regression. For each calculate: </a:t>
-            </a:r>
-          </a:p>
-          <a:p>
-            <a:pPr algn="ctr"/>
-            <a:r>
-              <a:rPr lang="en-US" sz="1200" b="1" dirty="0"/>
-              <a:t>AIC, BIC </a:t>
-            </a:r>
-          </a:p>
-          <a:p>
-            <a:pPr algn="ctr"/>
-            <a:r>
-              <a:rPr lang="en-US" sz="1200" b="1" dirty="0"/>
-              <a:t>Deviance</a:t>
-            </a:r>
-          </a:p>
-          <a:p>
-            <a:pPr algn="ctr"/>
-            <a:r>
-              <a:rPr lang="en-US" sz="1200" b="1" dirty="0"/>
-              <a:t>P value, z-statistic</a:t>
-            </a:r>
-          </a:p>
-          <a:p>
-            <a:pPr algn="ctr"/>
-            <a:r>
-              <a:rPr lang="en-US" sz="1200" b="1" dirty="0"/>
-              <a:t>AUC</a:t>
-            </a:r>
-          </a:p>
-        </p:txBody>
-      </p:sp>
-      <p:sp>
-        <p:nvSpPr>
-          <p:cNvPr id="35" name="TextBox 34">
-            <a:extLst>
-              <a:ext uri="{FF2B5EF4-FFF2-40B4-BE49-F238E27FC236}">
-                <a16:creationId xmlns:a16="http://schemas.microsoft.com/office/drawing/2014/main" id="{A023506D-3C78-4D3C-B858-72512FFC1144}"/>
-              </a:ext>
-            </a:extLst>
-          </p:cNvPr>
-          <p:cNvSpPr txBox="1"/>
-          <p:nvPr/>
-        </p:nvSpPr>
-        <p:spPr>
-          <a:xfrm>
-            <a:off x="5552317" y="1057988"/>
-            <a:ext cx="869149" cy="246221"/>
-          </a:xfrm>
-          <a:prstGeom prst="rect">
-            <a:avLst/>
-          </a:prstGeom>
-          <a:noFill/>
-        </p:spPr>
-        <p:txBody>
-          <a:bodyPr wrap="none" rtlCol="0">
-            <a:spAutoFit/>
-          </a:bodyPr>
-          <a:lstStyle/>
-          <a:p>
-            <a:r>
-              <a:rPr lang="en-US" sz="1000" dirty="0"/>
-              <a:t>Single agents</a:t>
-            </a:r>
-          </a:p>
-        </p:txBody>
-      </p:sp>
-      <p:cxnSp>
-        <p:nvCxnSpPr>
-          <p:cNvPr id="37" name="Connector: Elbow 36">
-            <a:extLst>
-              <a:ext uri="{FF2B5EF4-FFF2-40B4-BE49-F238E27FC236}">
-                <a16:creationId xmlns:a16="http://schemas.microsoft.com/office/drawing/2014/main" id="{200F9EFA-8A24-478B-B621-6E021720A03C}"/>
-              </a:ext>
-            </a:extLst>
-          </p:cNvPr>
-          <p:cNvCxnSpPr>
-            <a:cxnSpLocks/>
-            <a:stCxn id="16" idx="3"/>
-            <a:endCxn id="24" idx="1"/>
-          </p:cNvCxnSpPr>
-          <p:nvPr/>
-        </p:nvCxnSpPr>
-        <p:spPr>
-          <a:xfrm>
-            <a:off x="5745192" y="4724388"/>
-            <a:ext cx="1440230" cy="3"/>
-          </a:xfrm>
-          <a:prstGeom prst="bentConnector3">
-            <a:avLst/>
-          </a:prstGeom>
-          <a:ln>
-            <a:tailEnd type="triangle"/>
-          </a:ln>
-        </p:spPr>
-        <p:style>
-          <a:lnRef idx="1">
-            <a:schemeClr val="accent1"/>
-          </a:lnRef>
-          <a:fillRef idx="0">
-            <a:schemeClr val="accent1"/>
-          </a:fillRef>
-          <a:effectRef idx="0">
-            <a:schemeClr val="accent1"/>
-          </a:effectRef>
-          <a:fontRef idx="minor">
-            <a:schemeClr val="tx1"/>
-          </a:fontRef>
-        </p:style>
-      </p:cxnSp>
-      <p:cxnSp>
-        <p:nvCxnSpPr>
-          <p:cNvPr id="42" name="Connector: Elbow 41">
-            <a:extLst>
-              <a:ext uri="{FF2B5EF4-FFF2-40B4-BE49-F238E27FC236}">
-                <a16:creationId xmlns:a16="http://schemas.microsoft.com/office/drawing/2014/main" id="{BDBB7400-744E-4BD2-8112-34334606A46D}"/>
-              </a:ext>
-            </a:extLst>
-          </p:cNvPr>
-          <p:cNvCxnSpPr>
-            <a:cxnSpLocks/>
-            <a:stCxn id="12" idx="3"/>
-            <a:endCxn id="14" idx="1"/>
-          </p:cNvCxnSpPr>
-          <p:nvPr/>
-        </p:nvCxnSpPr>
-        <p:spPr>
-          <a:xfrm flipH="1">
-            <a:off x="765572" y="1252300"/>
-            <a:ext cx="11052232" cy="3462561"/>
-          </a:xfrm>
-          <a:prstGeom prst="bentConnector5">
-            <a:avLst>
-              <a:gd name="adj1" fmla="val -2068"/>
-              <a:gd name="adj2" fmla="val 72940"/>
-              <a:gd name="adj3" fmla="val 102068"/>
-            </a:avLst>
-          </a:prstGeom>
-          <a:ln>
-            <a:tailEnd type="triangle"/>
-          </a:ln>
-        </p:spPr>
-        <p:style>
-          <a:lnRef idx="1">
-            <a:schemeClr val="accent1"/>
-          </a:lnRef>
-          <a:fillRef idx="0">
-            <a:schemeClr val="accent1"/>
-          </a:fillRef>
-          <a:effectRef idx="0">
-            <a:schemeClr val="accent1"/>
-          </a:effectRef>
-          <a:fontRef idx="minor">
-            <a:schemeClr val="tx1"/>
-          </a:fontRef>
-        </p:style>
-      </p:cxnSp>
-      <p:cxnSp>
-        <p:nvCxnSpPr>
-          <p:cNvPr id="46" name="Connector: Elbow 45">
-            <a:extLst>
-              <a:ext uri="{FF2B5EF4-FFF2-40B4-BE49-F238E27FC236}">
-                <a16:creationId xmlns:a16="http://schemas.microsoft.com/office/drawing/2014/main" id="{28DD8D46-FFF1-4F1F-9353-223CADAC0240}"/>
-              </a:ext>
-            </a:extLst>
-          </p:cNvPr>
-          <p:cNvCxnSpPr>
-            <a:cxnSpLocks/>
-            <a:stCxn id="5" idx="3"/>
-            <a:endCxn id="12" idx="1"/>
-          </p:cNvCxnSpPr>
-          <p:nvPr/>
-        </p:nvCxnSpPr>
-        <p:spPr>
-          <a:xfrm flipV="1">
-            <a:off x="9560379" y="1252300"/>
-            <a:ext cx="414337" cy="4761"/>
-          </a:xfrm>
-          <a:prstGeom prst="bentConnector3">
-            <a:avLst>
-              <a:gd name="adj1" fmla="val 50000"/>
-            </a:avLst>
-          </a:prstGeom>
-          <a:ln>
-            <a:tailEnd type="triangle"/>
-          </a:ln>
-        </p:spPr>
-        <p:style>
-          <a:lnRef idx="1">
-            <a:schemeClr val="accent1"/>
-          </a:lnRef>
-          <a:fillRef idx="0">
-            <a:schemeClr val="accent1"/>
-          </a:fillRef>
-          <a:effectRef idx="0">
-            <a:schemeClr val="accent1"/>
-          </a:effectRef>
-          <a:fontRef idx="minor">
-            <a:schemeClr val="tx1"/>
-          </a:fontRef>
-        </p:style>
-      </p:cxnSp>
-      <p:cxnSp>
-        <p:nvCxnSpPr>
-          <p:cNvPr id="56" name="Connector: Elbow 55">
-            <a:extLst>
-              <a:ext uri="{FF2B5EF4-FFF2-40B4-BE49-F238E27FC236}">
-                <a16:creationId xmlns:a16="http://schemas.microsoft.com/office/drawing/2014/main" id="{BE15BE37-F947-4C81-A10A-02C20E653A5A}"/>
-              </a:ext>
-            </a:extLst>
-          </p:cNvPr>
-          <p:cNvCxnSpPr>
-            <a:stCxn id="7" idx="3"/>
-            <a:endCxn id="4" idx="1"/>
-          </p:cNvCxnSpPr>
-          <p:nvPr/>
-        </p:nvCxnSpPr>
-        <p:spPr>
-          <a:xfrm>
-            <a:off x="1957388" y="649573"/>
-            <a:ext cx="570309" cy="597961"/>
-          </a:xfrm>
-          <a:prstGeom prst="bentConnector3">
-            <a:avLst/>
-          </a:prstGeom>
-          <a:ln>
-            <a:tailEnd type="triangle"/>
-          </a:ln>
-        </p:spPr>
-        <p:style>
-          <a:lnRef idx="1">
-            <a:schemeClr val="accent1"/>
-          </a:lnRef>
-          <a:fillRef idx="0">
-            <a:schemeClr val="accent1"/>
-          </a:fillRef>
-          <a:effectRef idx="0">
-            <a:schemeClr val="accent1"/>
-          </a:effectRef>
-          <a:fontRef idx="minor">
-            <a:schemeClr val="tx1"/>
-          </a:fontRef>
-        </p:style>
-      </p:cxnSp>
-      <p:cxnSp>
-        <p:nvCxnSpPr>
-          <p:cNvPr id="59" name="Connector: Elbow 58">
-            <a:extLst>
-              <a:ext uri="{FF2B5EF4-FFF2-40B4-BE49-F238E27FC236}">
-                <a16:creationId xmlns:a16="http://schemas.microsoft.com/office/drawing/2014/main" id="{76F118B5-2782-4BF9-B983-9020DA116658}"/>
-              </a:ext>
-            </a:extLst>
-          </p:cNvPr>
-          <p:cNvCxnSpPr>
-            <a:stCxn id="6" idx="3"/>
-            <a:endCxn id="4" idx="1"/>
-          </p:cNvCxnSpPr>
-          <p:nvPr/>
-        </p:nvCxnSpPr>
-        <p:spPr>
-          <a:xfrm flipV="1">
-            <a:off x="1957388" y="1247534"/>
-            <a:ext cx="570309" cy="624125"/>
-          </a:xfrm>
-          <a:prstGeom prst="bentConnector3">
-            <a:avLst/>
-          </a:prstGeom>
-          <a:ln>
-            <a:tailEnd type="triangle"/>
-          </a:ln>
-        </p:spPr>
-        <p:style>
-          <a:lnRef idx="1">
-            <a:schemeClr val="accent1"/>
-          </a:lnRef>
-          <a:fillRef idx="0">
-            <a:schemeClr val="accent1"/>
-          </a:fillRef>
-          <a:effectRef idx="0">
-            <a:schemeClr val="accent1"/>
-          </a:effectRef>
-          <a:fontRef idx="minor">
-            <a:schemeClr val="tx1"/>
-          </a:fontRef>
-        </p:style>
-      </p:cxnSp>
-      <p:sp>
-        <p:nvSpPr>
-          <p:cNvPr id="31" name="Rectangle: Rounded Corners 30">
-            <a:extLst>
-              <a:ext uri="{FF2B5EF4-FFF2-40B4-BE49-F238E27FC236}">
-                <a16:creationId xmlns:a16="http://schemas.microsoft.com/office/drawing/2014/main" id="{D2ED3B51-58BF-41CB-9E78-8A2410C61004}"/>
-              </a:ext>
-            </a:extLst>
-          </p:cNvPr>
-          <p:cNvSpPr/>
-          <p:nvPr/>
-        </p:nvSpPr>
-        <p:spPr>
-          <a:xfrm>
-            <a:off x="9921478" y="4229088"/>
-            <a:ext cx="1662113" cy="990599"/>
-          </a:xfrm>
-          <a:prstGeom prst="roundRect">
-            <a:avLst/>
-          </a:prstGeom>
-        </p:spPr>
-        <p:style>
-          <a:lnRef idx="2">
-            <a:schemeClr val="accent1">
-              <a:shade val="50000"/>
-            </a:schemeClr>
-          </a:lnRef>
-          <a:fillRef idx="1">
-            <a:schemeClr val="accent1"/>
-          </a:fillRef>
-          <a:effectRef idx="0">
-            <a:schemeClr val="accent1"/>
-          </a:effectRef>
-          <a:fontRef idx="minor">
-            <a:schemeClr val="lt1"/>
-          </a:fontRef>
-        </p:style>
-        <p:txBody>
-          <a:bodyPr rtlCol="0" anchor="ctr"/>
-          <a:lstStyle/>
-          <a:p>
-            <a:pPr algn="ctr"/>
-            <a:r>
-              <a:rPr lang="en-US" dirty="0"/>
-              <a:t>post-processing</a:t>
-            </a:r>
-          </a:p>
-          <a:p>
-            <a:pPr algn="ctr"/>
-            <a:r>
-              <a:rPr lang="en-US" sz="900" dirty="0"/>
-              <a:t>[name – not in dev yet]</a:t>
-            </a:r>
-          </a:p>
-        </p:txBody>
-      </p:sp>
-      <p:sp>
-        <p:nvSpPr>
-          <p:cNvPr id="33" name="Rectangle 32">
-            <a:extLst>
-              <a:ext uri="{FF2B5EF4-FFF2-40B4-BE49-F238E27FC236}">
-                <a16:creationId xmlns:a16="http://schemas.microsoft.com/office/drawing/2014/main" id="{9BA202C5-0C46-4E82-98BC-E15CFAA5C3CD}"/>
-              </a:ext>
-            </a:extLst>
-          </p:cNvPr>
-          <p:cNvSpPr/>
-          <p:nvPr/>
-        </p:nvSpPr>
-        <p:spPr>
-          <a:xfrm>
-            <a:off x="9854802" y="5229207"/>
-            <a:ext cx="1843088" cy="1269564"/>
-          </a:xfrm>
-          <a:prstGeom prst="rect">
-            <a:avLst/>
-          </a:prstGeom>
-        </p:spPr>
-        <p:style>
-          <a:lnRef idx="2">
-            <a:schemeClr val="dk1"/>
-          </a:lnRef>
-          <a:fillRef idx="1">
-            <a:schemeClr val="lt1"/>
-          </a:fillRef>
-          <a:effectRef idx="0">
-            <a:schemeClr val="dk1"/>
-          </a:effectRef>
-          <a:fontRef idx="minor">
-            <a:schemeClr val="dk1"/>
-          </a:fontRef>
-        </p:style>
-        <p:txBody>
-          <a:bodyPr rtlCol="0" anchor="ctr"/>
-          <a:lstStyle/>
-          <a:p>
-            <a:pPr algn="ctr"/>
-            <a:r>
-              <a:rPr lang="en-US" sz="1200" dirty="0"/>
               <a:t>Remove runs with: </a:t>
             </a:r>
           </a:p>
@@ -6834,7 +6709,7 @@
         </p:nvSpPr>
         <p:spPr>
           <a:xfrm>
-            <a:off x="4391242" y="-39715"/>
+            <a:off x="4491255" y="-11703"/>
             <a:ext cx="740567" cy="720522"/>
           </a:xfrm>
           <a:prstGeom prst="ellipse">
@@ -6903,6 +6778,76 @@
             <a:r>
               <a:rPr lang="en-US" sz="1200" dirty="0"/>
               <a:t>No within or across plate replicates on these panels</a:t>
+            </a:r>
+          </a:p>
+        </p:txBody>
+      </p:sp>
+      <p:sp>
+        <p:nvSpPr>
+          <p:cNvPr id="2" name="Rectangle 1">
+            <a:extLst>
+              <a:ext uri="{FF2B5EF4-FFF2-40B4-BE49-F238E27FC236}">
+                <a16:creationId xmlns:a16="http://schemas.microsoft.com/office/drawing/2014/main" id="{2ABF6F5A-A2EA-4477-8D66-A330B652E3CA}"/>
+              </a:ext>
+            </a:extLst>
+          </p:cNvPr>
+          <p:cNvSpPr/>
+          <p:nvPr/>
+        </p:nvSpPr>
+        <p:spPr>
+          <a:xfrm>
+            <a:off x="2485683" y="1716343"/>
+            <a:ext cx="1843088" cy="1200329"/>
+          </a:xfrm>
+          <a:prstGeom prst="rect">
+            <a:avLst/>
+          </a:prstGeom>
+        </p:spPr>
+        <p:txBody>
+          <a:bodyPr wrap="square">
+            <a:spAutoFit/>
+          </a:bodyPr>
+          <a:lstStyle/>
+          <a:p>
+            <a:pPr algn="ctr"/>
+            <a:r>
+              <a:rPr lang="en-US" dirty="0"/>
+              <a:t>Convert from matrix format to long data and merge plate map. </a:t>
+            </a:r>
+          </a:p>
+        </p:txBody>
+      </p:sp>
+      <p:sp>
+        <p:nvSpPr>
+          <p:cNvPr id="3" name="Rectangle 2">
+            <a:extLst>
+              <a:ext uri="{FF2B5EF4-FFF2-40B4-BE49-F238E27FC236}">
+                <a16:creationId xmlns:a16="http://schemas.microsoft.com/office/drawing/2014/main" id="{F12627A5-13E0-4909-A4A7-D7AF56D02160}"/>
+              </a:ext>
+            </a:extLst>
+          </p:cNvPr>
+          <p:cNvSpPr/>
+          <p:nvPr/>
+        </p:nvSpPr>
+        <p:spPr>
+          <a:xfrm>
+            <a:off x="4662254" y="2552514"/>
+            <a:ext cx="2423895" cy="1200329"/>
+          </a:xfrm>
+          <a:prstGeom prst="rect">
+            <a:avLst/>
+          </a:prstGeom>
+        </p:spPr>
+        <p:txBody>
+          <a:bodyPr wrap="square">
+            <a:spAutoFit/>
+          </a:bodyPr>
+          <a:lstStyle/>
+          <a:p>
+            <a:pPr algn="ctr"/>
+            <a:r>
+              <a:rPr lang="en-US" dirty="0"/>
+              <a:t>Represented combination-agent  conc. as Euclidean distance.</a:t>
             </a:r>
           </a:p>
         </p:txBody>

</xml_diff>

<commit_message>
finished functionality of `patient_sensitivity_assignment.py` and updated the app to show auc distribution
</commit_message>
<xml_diff>
--- a/docs/HNSCC_functional_assay_pipeline_development.pptx
+++ b/docs/HNSCC_functional_assay_pipeline_development.pptx
@@ -10,13 +10,14 @@
     <p:sldId id="267" r:id="rId4"/>
     <p:sldId id="264" r:id="rId5"/>
     <p:sldId id="266" r:id="rId6"/>
-    <p:sldId id="257" r:id="rId7"/>
-    <p:sldId id="258" r:id="rId8"/>
-    <p:sldId id="261" r:id="rId9"/>
-    <p:sldId id="259" r:id="rId10"/>
-    <p:sldId id="265" r:id="rId11"/>
-    <p:sldId id="262" r:id="rId12"/>
-    <p:sldId id="260" r:id="rId13"/>
+    <p:sldId id="268" r:id="rId7"/>
+    <p:sldId id="257" r:id="rId8"/>
+    <p:sldId id="258" r:id="rId9"/>
+    <p:sldId id="261" r:id="rId10"/>
+    <p:sldId id="259" r:id="rId11"/>
+    <p:sldId id="265" r:id="rId12"/>
+    <p:sldId id="262" r:id="rId13"/>
+    <p:sldId id="260" r:id="rId14"/>
   </p:sldIdLst>
   <p:sldSz cx="12192000" cy="6858000"/>
   <p:notesSz cx="6858000" cy="9144000"/>
@@ -270,7 +271,7 @@
           <a:p>
             <a:fld id="{ABBD65A0-F140-476D-B606-1C9D07B9F5C7}" type="datetimeFigureOut">
               <a:rPr lang="en-US" smtClean="0"/>
-              <a:t>8/28/2019</a:t>
+              <a:t>8/29/2019</a:t>
             </a:fld>
             <a:endParaRPr lang="en-US"/>
           </a:p>
@@ -468,7 +469,7 @@
           <a:p>
             <a:fld id="{ABBD65A0-F140-476D-B606-1C9D07B9F5C7}" type="datetimeFigureOut">
               <a:rPr lang="en-US" smtClean="0"/>
-              <a:t>8/28/2019</a:t>
+              <a:t>8/29/2019</a:t>
             </a:fld>
             <a:endParaRPr lang="en-US"/>
           </a:p>
@@ -676,7 +677,7 @@
           <a:p>
             <a:fld id="{ABBD65A0-F140-476D-B606-1C9D07B9F5C7}" type="datetimeFigureOut">
               <a:rPr lang="en-US" smtClean="0"/>
-              <a:t>8/28/2019</a:t>
+              <a:t>8/29/2019</a:t>
             </a:fld>
             <a:endParaRPr lang="en-US"/>
           </a:p>
@@ -874,7 +875,7 @@
           <a:p>
             <a:fld id="{ABBD65A0-F140-476D-B606-1C9D07B9F5C7}" type="datetimeFigureOut">
               <a:rPr lang="en-US" smtClean="0"/>
-              <a:t>8/28/2019</a:t>
+              <a:t>8/29/2019</a:t>
             </a:fld>
             <a:endParaRPr lang="en-US"/>
           </a:p>
@@ -1149,7 +1150,7 @@
           <a:p>
             <a:fld id="{ABBD65A0-F140-476D-B606-1C9D07B9F5C7}" type="datetimeFigureOut">
               <a:rPr lang="en-US" smtClean="0"/>
-              <a:t>8/28/2019</a:t>
+              <a:t>8/29/2019</a:t>
             </a:fld>
             <a:endParaRPr lang="en-US"/>
           </a:p>
@@ -1414,7 +1415,7 @@
           <a:p>
             <a:fld id="{ABBD65A0-F140-476D-B606-1C9D07B9F5C7}" type="datetimeFigureOut">
               <a:rPr lang="en-US" smtClean="0"/>
-              <a:t>8/28/2019</a:t>
+              <a:t>8/29/2019</a:t>
             </a:fld>
             <a:endParaRPr lang="en-US"/>
           </a:p>
@@ -1826,7 +1827,7 @@
           <a:p>
             <a:fld id="{ABBD65A0-F140-476D-B606-1C9D07B9F5C7}" type="datetimeFigureOut">
               <a:rPr lang="en-US" smtClean="0"/>
-              <a:t>8/28/2019</a:t>
+              <a:t>8/29/2019</a:t>
             </a:fld>
             <a:endParaRPr lang="en-US"/>
           </a:p>
@@ -1967,7 +1968,7 @@
           <a:p>
             <a:fld id="{ABBD65A0-F140-476D-B606-1C9D07B9F5C7}" type="datetimeFigureOut">
               <a:rPr lang="en-US" smtClean="0"/>
-              <a:t>8/28/2019</a:t>
+              <a:t>8/29/2019</a:t>
             </a:fld>
             <a:endParaRPr lang="en-US"/>
           </a:p>
@@ -2080,7 +2081,7 @@
           <a:p>
             <a:fld id="{ABBD65A0-F140-476D-B606-1C9D07B9F5C7}" type="datetimeFigureOut">
               <a:rPr lang="en-US" smtClean="0"/>
-              <a:t>8/28/2019</a:t>
+              <a:t>8/29/2019</a:t>
             </a:fld>
             <a:endParaRPr lang="en-US"/>
           </a:p>
@@ -2391,7 +2392,7 @@
           <a:p>
             <a:fld id="{ABBD65A0-F140-476D-B606-1C9D07B9F5C7}" type="datetimeFigureOut">
               <a:rPr lang="en-US" smtClean="0"/>
-              <a:t>8/28/2019</a:t>
+              <a:t>8/29/2019</a:t>
             </a:fld>
             <a:endParaRPr lang="en-US"/>
           </a:p>
@@ -2679,7 +2680,7 @@
           <a:p>
             <a:fld id="{ABBD65A0-F140-476D-B606-1C9D07B9F5C7}" type="datetimeFigureOut">
               <a:rPr lang="en-US" smtClean="0"/>
-              <a:t>8/28/2019</a:t>
+              <a:t>8/29/2019</a:t>
             </a:fld>
             <a:endParaRPr lang="en-US"/>
           </a:p>
@@ -2920,7 +2921,7 @@
           <a:p>
             <a:fld id="{ABBD65A0-F140-476D-B606-1C9D07B9F5C7}" type="datetimeFigureOut">
               <a:rPr lang="en-US" smtClean="0"/>
-              <a:t>8/28/2019</a:t>
+              <a:t>8/29/2019</a:t>
             </a:fld>
             <a:endParaRPr lang="en-US"/>
           </a:p>
@@ -3428,7 +3429,7 @@
           <p:cNvPr id="2" name="Title 1">
             <a:extLst>
               <a:ext uri="{FF2B5EF4-FFF2-40B4-BE49-F238E27FC236}">
-                <a16:creationId xmlns:a16="http://schemas.microsoft.com/office/drawing/2014/main" id="{4237EC28-2B26-49FD-A131-DB5B6A520B7D}"/>
+                <a16:creationId xmlns:a16="http://schemas.microsoft.com/office/drawing/2014/main" id="{541CAFB3-FD96-4F76-A791-BBC842554556}"/>
               </a:ext>
             </a:extLst>
           </p:cNvPr>
@@ -3446,7 +3447,7 @@
           <a:p>
             <a:r>
               <a:rPr lang="en-US" dirty="0"/>
-              <a:t>Verification </a:t>
+              <a:t>Standing Questions</a:t>
             </a:r>
           </a:p>
         </p:txBody>
@@ -3456,7 +3457,7 @@
           <p:cNvPr id="3" name="Content Placeholder 2">
             <a:extLst>
               <a:ext uri="{FF2B5EF4-FFF2-40B4-BE49-F238E27FC236}">
-                <a16:creationId xmlns:a16="http://schemas.microsoft.com/office/drawing/2014/main" id="{5397CA38-22D3-4A95-893E-CB1214384E6A}"/>
+                <a16:creationId xmlns:a16="http://schemas.microsoft.com/office/drawing/2014/main" id="{F1B73B27-1B41-4F73-9206-3BA2925E5813}"/>
               </a:ext>
             </a:extLst>
           </p:cNvPr>
@@ -3474,27 +3475,80 @@
           <a:p>
             <a:r>
               <a:rPr lang="en-US" dirty="0"/>
-              <a:t>Run </a:t>
+              <a:t>Blank 490, how is this normalization done?</a:t>
+            </a:r>
+          </a:p>
+          <a:p>
+            <a:r>
+              <a:rPr lang="en-US" dirty="0"/>
+              <a:t>Scope of documentation?   </a:t>
+            </a:r>
+          </a:p>
+          <a:p>
+            <a:pPr lvl="1"/>
+            <a:r>
+              <a:rPr lang="en-US" dirty="0"/>
+              <a:t>Code version control – </a:t>
             </a:r>
             <a:r>
               <a:rPr lang="en-US" dirty="0" err="1"/>
-              <a:t>beatAML</a:t>
-            </a:r>
-            <a:r>
-              <a:rPr lang="en-US" dirty="0"/>
-              <a:t> data and compare to values </a:t>
-            </a:r>
-          </a:p>
-          <a:p>
-            <a:r>
-              <a:rPr lang="en-US" dirty="0"/>
-              <a:t>Unit testing </a:t>
-            </a:r>
-          </a:p>
-          <a:p>
-            <a:r>
-              <a:rPr lang="en-US" dirty="0"/>
-              <a:t>Doc testing</a:t>
+              <a:t>github</a:t>
+            </a:r>
+            <a:r>
+              <a:rPr lang="en-US" dirty="0"/>
+              <a:t> repo? </a:t>
+            </a:r>
+          </a:p>
+          <a:p>
+            <a:pPr lvl="1"/>
+            <a:r>
+              <a:rPr lang="en-US" dirty="0" err="1"/>
+              <a:t>Biocompute</a:t>
+            </a:r>
+            <a:r>
+              <a:rPr lang="en-US" dirty="0"/>
+              <a:t> object </a:t>
+            </a:r>
+          </a:p>
+          <a:p>
+            <a:pPr lvl="1"/>
+            <a:r>
+              <a:rPr lang="en-US" dirty="0"/>
+              <a:t>R/</a:t>
+            </a:r>
+            <a:r>
+              <a:rPr lang="en-US" dirty="0" err="1"/>
+              <a:t>Doxygen</a:t>
+            </a:r>
+            <a:endParaRPr lang="en-US" dirty="0"/>
+          </a:p>
+          <a:p>
+            <a:r>
+              <a:rPr lang="en-US" dirty="0"/>
+              <a:t>Scope of testing? </a:t>
+            </a:r>
+          </a:p>
+          <a:p>
+            <a:pPr lvl="1"/>
+            <a:r>
+              <a:rPr lang="en-US" dirty="0"/>
+              <a:t>Doc-testing / unit-testing </a:t>
+            </a:r>
+          </a:p>
+          <a:p>
+            <a:r>
+              <a:rPr lang="en-US" dirty="0"/>
+              <a:t>Language Preference? Currently using mix of python, R, bash</a:t>
+            </a:r>
+          </a:p>
+          <a:p>
+            <a:r>
+              <a:rPr lang="en-US" dirty="0" err="1"/>
+              <a:t>Dockerize</a:t>
+            </a:r>
+            <a:r>
+              <a:rPr lang="en-US" dirty="0"/>
+              <a:t> environment? </a:t>
             </a:r>
           </a:p>
         </p:txBody>
@@ -3502,7 +3556,7 @@
     </p:spTree>
     <p:extLst>
       <p:ext uri="{BB962C8B-B14F-4D97-AF65-F5344CB8AC3E}">
-        <p14:creationId xmlns:p14="http://schemas.microsoft.com/office/powerpoint/2010/main" val="2935630697"/>
+        <p14:creationId xmlns:p14="http://schemas.microsoft.com/office/powerpoint/2010/main" val="2085471528"/>
       </p:ext>
     </p:extLst>
   </p:cSld>
@@ -3534,6 +3588,112 @@
           <p:cNvPr id="2" name="Title 1">
             <a:extLst>
               <a:ext uri="{FF2B5EF4-FFF2-40B4-BE49-F238E27FC236}">
+                <a16:creationId xmlns:a16="http://schemas.microsoft.com/office/drawing/2014/main" id="{4237EC28-2B26-49FD-A131-DB5B6A520B7D}"/>
+              </a:ext>
+            </a:extLst>
+          </p:cNvPr>
+          <p:cNvSpPr>
+            <a:spLocks noGrp="1"/>
+          </p:cNvSpPr>
+          <p:nvPr>
+            <p:ph type="title"/>
+          </p:nvPr>
+        </p:nvSpPr>
+        <p:spPr/>
+        <p:txBody>
+          <a:bodyPr/>
+          <a:lstStyle/>
+          <a:p>
+            <a:r>
+              <a:rPr lang="en-US" dirty="0"/>
+              <a:t>Verification </a:t>
+            </a:r>
+          </a:p>
+        </p:txBody>
+      </p:sp>
+      <p:sp>
+        <p:nvSpPr>
+          <p:cNvPr id="3" name="Content Placeholder 2">
+            <a:extLst>
+              <a:ext uri="{FF2B5EF4-FFF2-40B4-BE49-F238E27FC236}">
+                <a16:creationId xmlns:a16="http://schemas.microsoft.com/office/drawing/2014/main" id="{5397CA38-22D3-4A95-893E-CB1214384E6A}"/>
+              </a:ext>
+            </a:extLst>
+          </p:cNvPr>
+          <p:cNvSpPr>
+            <a:spLocks noGrp="1"/>
+          </p:cNvSpPr>
+          <p:nvPr>
+            <p:ph idx="1"/>
+          </p:nvPr>
+        </p:nvSpPr>
+        <p:spPr/>
+        <p:txBody>
+          <a:bodyPr/>
+          <a:lstStyle/>
+          <a:p>
+            <a:r>
+              <a:rPr lang="en-US" dirty="0"/>
+              <a:t>Run </a:t>
+            </a:r>
+            <a:r>
+              <a:rPr lang="en-US" dirty="0" err="1"/>
+              <a:t>beatAML</a:t>
+            </a:r>
+            <a:r>
+              <a:rPr lang="en-US" dirty="0"/>
+              <a:t> data and compare to values </a:t>
+            </a:r>
+          </a:p>
+          <a:p>
+            <a:r>
+              <a:rPr lang="en-US" dirty="0"/>
+              <a:t>Unit testing </a:t>
+            </a:r>
+          </a:p>
+          <a:p>
+            <a:r>
+              <a:rPr lang="en-US" dirty="0"/>
+              <a:t>Doc testing</a:t>
+            </a:r>
+          </a:p>
+        </p:txBody>
+      </p:sp>
+    </p:spTree>
+    <p:extLst>
+      <p:ext uri="{BB962C8B-B14F-4D97-AF65-F5344CB8AC3E}">
+        <p14:creationId xmlns:p14="http://schemas.microsoft.com/office/powerpoint/2010/main" val="2935630697"/>
+      </p:ext>
+    </p:extLst>
+  </p:cSld>
+  <p:clrMapOvr>
+    <a:masterClrMapping/>
+  </p:clrMapOvr>
+</p:sld>
+</file>
+
+<file path=ppt/slides/slide12.xml><?xml version="1.0" encoding="utf-8"?>
+<p:sld xmlns:a="http://schemas.openxmlformats.org/drawingml/2006/main" xmlns:r="http://schemas.openxmlformats.org/officeDocument/2006/relationships" xmlns:p="http://schemas.openxmlformats.org/presentationml/2006/main">
+  <p:cSld>
+    <p:spTree>
+      <p:nvGrpSpPr>
+        <p:cNvPr id="1" name=""/>
+        <p:cNvGrpSpPr/>
+        <p:nvPr/>
+      </p:nvGrpSpPr>
+      <p:grpSpPr>
+        <a:xfrm>
+          <a:off x="0" y="0"/>
+          <a:ext cx="0" cy="0"/>
+          <a:chOff x="0" y="0"/>
+          <a:chExt cx="0" cy="0"/>
+        </a:xfrm>
+      </p:grpSpPr>
+      <p:sp>
+        <p:nvSpPr>
+          <p:cNvPr id="2" name="Title 1">
+            <a:extLst>
+              <a:ext uri="{FF2B5EF4-FFF2-40B4-BE49-F238E27FC236}">
                 <a16:creationId xmlns:a16="http://schemas.microsoft.com/office/drawing/2014/main" id="{9F360E29-9B45-4B5B-98A2-111B090352C2}"/>
               </a:ext>
             </a:extLst>
@@ -3865,7 +4025,7 @@
 </p:sld>
 </file>
 
-<file path=ppt/slides/slide12.xml><?xml version="1.0" encoding="utf-8"?>
+<file path=ppt/slides/slide13.xml><?xml version="1.0" encoding="utf-8"?>
 <p:sld xmlns:a="http://schemas.openxmlformats.org/drawingml/2006/main" xmlns:r="http://schemas.openxmlformats.org/officeDocument/2006/relationships" xmlns:p="http://schemas.openxmlformats.org/presentationml/2006/main">
   <p:cSld>
     <p:spTree>
@@ -9409,7 +9569,7 @@
           <p:cNvPr id="2" name="Title 1">
             <a:extLst>
               <a:ext uri="{FF2B5EF4-FFF2-40B4-BE49-F238E27FC236}">
-                <a16:creationId xmlns:a16="http://schemas.microsoft.com/office/drawing/2014/main" id="{0C9934DF-8684-482D-A4AA-A6412C0D074C}"/>
+                <a16:creationId xmlns:a16="http://schemas.microsoft.com/office/drawing/2014/main" id="{0297ABED-367A-460C-9255-A4FDF04EAED2}"/>
               </a:ext>
             </a:extLst>
           </p:cNvPr>
@@ -9427,8 +9587,13 @@
           <a:p>
             <a:r>
               <a:rPr lang="en-US" dirty="0"/>
-              <a:t>Overview </a:t>
-            </a:r>
+              <a:t>Processing Time &amp; </a:t>
+            </a:r>
+            <a:r>
+              <a:rPr lang="en-US" dirty="0" err="1"/>
+              <a:t>Parrallelization</a:t>
+            </a:r>
+            <a:endParaRPr lang="en-US" dirty="0"/>
           </a:p>
         </p:txBody>
       </p:sp>
@@ -9437,7 +9602,7 @@
           <p:cNvPr id="3" name="Content Placeholder 2">
             <a:extLst>
               <a:ext uri="{FF2B5EF4-FFF2-40B4-BE49-F238E27FC236}">
-                <a16:creationId xmlns:a16="http://schemas.microsoft.com/office/drawing/2014/main" id="{D14D1252-27F6-45E4-AC18-DBBDBC8B95FE}"/>
+                <a16:creationId xmlns:a16="http://schemas.microsoft.com/office/drawing/2014/main" id="{F7CB10D4-5A22-4476-8C57-231B5860A651}"/>
               </a:ext>
             </a:extLst>
           </p:cNvPr>
@@ -9450,99 +9615,63 @@
         </p:nvSpPr>
         <p:spPr/>
         <p:txBody>
-          <a:bodyPr>
-            <a:normAutofit lnSpcReduction="10000"/>
-          </a:bodyPr>
-          <a:lstStyle/>
-          <a:p>
-            <a:r>
-              <a:rPr lang="en-US" dirty="0"/>
-              <a:t>Number of HNSCC patients:  11 HNSCC patients [7/20] </a:t>
-            </a:r>
-          </a:p>
-          <a:p>
-            <a:r>
-              <a:rPr lang="en-US" dirty="0"/>
-              <a:t>Plate map versions </a:t>
+          <a:bodyPr/>
+          <a:lstStyle/>
+          <a:p>
+            <a:endParaRPr lang="en-US" dirty="0"/>
+          </a:p>
+          <a:p>
+            <a:r>
+              <a:rPr lang="en-US" dirty="0"/>
+              <a:t>[20/21] - Total time elapsed: 0:25:10.298157 </a:t>
+            </a:r>
+          </a:p>
+          <a:p>
+            <a:pPr lvl="2"/>
+            <a:r>
+              <a:rPr lang="en-US" dirty="0"/>
+              <a:t>~75 sec / panel </a:t>
+            </a:r>
+          </a:p>
+          <a:p>
+            <a:pPr lvl="2"/>
+            <a:endParaRPr lang="en-US" dirty="0"/>
+          </a:p>
+          <a:p>
+            <a:r>
+              <a:rPr lang="en-US" dirty="0"/>
+              <a:t>Processing can parallelize to panel granularity </a:t>
             </a:r>
           </a:p>
           <a:p>
             <a:pPr lvl="1"/>
             <a:r>
               <a:rPr lang="en-US" dirty="0"/>
-              <a:t>Plates 1-3 (rev 001), Plates 1-6 (rev 002) &lt;- combinatorial </a:t>
+              <a:t>assuming </a:t>
+            </a:r>
+            <a:r>
+              <a:rPr lang="en-US" dirty="0" err="1"/>
+              <a:t>available_threads</a:t>
+            </a:r>
+            <a:r>
+              <a:rPr lang="en-US" dirty="0"/>
+              <a:t> &gt; </a:t>
+            </a:r>
+            <a:r>
+              <a:rPr lang="en-US" dirty="0" err="1"/>
+              <a:t>num_panels</a:t>
+            </a:r>
+            <a:r>
+              <a:rPr lang="en-US" dirty="0"/>
+              <a:t>, parallelization will reduce time complexity to O(c)</a:t>
             </a:r>
           </a:p>
           <a:p>
             <a:pPr lvl="1"/>
             <a:r>
               <a:rPr lang="en-US" dirty="0"/>
-              <a:t>Tyner panels – still need to be re-worked into HNSCC format</a:t>
-            </a:r>
-          </a:p>
-          <a:p>
-            <a:pPr lvl="1"/>
-            <a:r>
-              <a:rPr lang="en-US" dirty="0"/>
-              <a:t>+1 assay with 7… require additional work </a:t>
-            </a:r>
-          </a:p>
-          <a:p>
-            <a:pPr lvl="1"/>
-            <a:r>
-              <a:rPr lang="en-US" dirty="0"/>
-              <a:t>Excel files with pages: meta, concentration_&lt;num&gt;, inhibitor_&lt;num&gt;</a:t>
-            </a:r>
-          </a:p>
-          <a:p>
-            <a:r>
-              <a:rPr lang="en-US" dirty="0"/>
-              <a:t>Naming convention</a:t>
-            </a:r>
-          </a:p>
-          <a:p>
-            <a:pPr lvl="1"/>
-            <a:r>
-              <a:rPr lang="en-US" dirty="0"/>
-              <a:t>Unique ID for each assay? Or we need to distinguish replicates</a:t>
-            </a:r>
-          </a:p>
-          <a:p>
-            <a:pPr lvl="1"/>
-            <a:r>
-              <a:rPr lang="en-US" dirty="0"/>
-              <a:t>Date of assay? </a:t>
-            </a:r>
-          </a:p>
-          <a:p>
-            <a:pPr lvl="1"/>
-            <a:r>
-              <a:rPr lang="en-US" dirty="0"/>
-              <a:t>MTS sitting time? </a:t>
-            </a:r>
-          </a:p>
-          <a:p>
-            <a:pPr lvl="1"/>
-            <a:r>
-              <a:rPr lang="en-US" dirty="0" err="1"/>
-              <a:t>lab_id</a:t>
-            </a:r>
-            <a:r>
-              <a:rPr lang="en-US" dirty="0"/>
-              <a:t>=XXXXX-norm=XXX-</a:t>
-            </a:r>
-            <a:r>
-              <a:rPr lang="en-US" dirty="0" err="1"/>
-              <a:t>plate_version_id</a:t>
-            </a:r>
-            <a:r>
-              <a:rPr lang="en-US" dirty="0"/>
-              <a:t>=XXXX</a:t>
-            </a:r>
-          </a:p>
-          <a:p>
-            <a:pPr lvl="1"/>
-            <a:endParaRPr lang="en-US" dirty="0"/>
+              <a:t>Otherwise, O(n) </a:t>
+            </a:r>
           </a:p>
           <a:p>
             <a:pPr lvl="1"/>
@@ -9553,7 +9682,7 @@
     </p:spTree>
     <p:extLst>
       <p:ext uri="{BB962C8B-B14F-4D97-AF65-F5344CB8AC3E}">
-        <p14:creationId xmlns:p14="http://schemas.microsoft.com/office/powerpoint/2010/main" val="3771634021"/>
+        <p14:creationId xmlns:p14="http://schemas.microsoft.com/office/powerpoint/2010/main" val="818949328"/>
       </p:ext>
     </p:extLst>
   </p:cSld>
@@ -9585,7 +9714,7 @@
           <p:cNvPr id="2" name="Title 1">
             <a:extLst>
               <a:ext uri="{FF2B5EF4-FFF2-40B4-BE49-F238E27FC236}">
-                <a16:creationId xmlns:a16="http://schemas.microsoft.com/office/drawing/2014/main" id="{4C925E0A-FDA2-482C-B32C-BD02E0F5FDD5}"/>
+                <a16:creationId xmlns:a16="http://schemas.microsoft.com/office/drawing/2014/main" id="{0C9934DF-8684-482D-A4AA-A6412C0D074C}"/>
               </a:ext>
             </a:extLst>
           </p:cNvPr>
@@ -9603,7 +9732,7 @@
           <a:p>
             <a:r>
               <a:rPr lang="en-US" dirty="0"/>
-              <a:t>Plate Map Revisions </a:t>
+              <a:t>Overview </a:t>
             </a:r>
           </a:p>
         </p:txBody>
@@ -9613,7 +9742,7 @@
           <p:cNvPr id="3" name="Content Placeholder 2">
             <a:extLst>
               <a:ext uri="{FF2B5EF4-FFF2-40B4-BE49-F238E27FC236}">
-                <a16:creationId xmlns:a16="http://schemas.microsoft.com/office/drawing/2014/main" id="{287DDDA0-A034-491E-AF68-7EC8860582A7}"/>
+                <a16:creationId xmlns:a16="http://schemas.microsoft.com/office/drawing/2014/main" id="{D14D1252-27F6-45E4-AC18-DBBDBC8B95FE}"/>
               </a:ext>
             </a:extLst>
           </p:cNvPr>
@@ -9626,42 +9755,102 @@
         </p:nvSpPr>
         <p:spPr/>
         <p:txBody>
-          <a:bodyPr/>
-          <a:lstStyle/>
-          <a:p>
-            <a:r>
-              <a:rPr lang="en-US" dirty="0"/>
-              <a:t>Drug Names, there are some inconsistencies – need to define clear nomenclature to avoid redundancy. </a:t>
+          <a:bodyPr>
+            <a:normAutofit lnSpcReduction="10000"/>
+          </a:bodyPr>
+          <a:lstStyle/>
+          <a:p>
+            <a:r>
+              <a:rPr lang="en-US" dirty="0"/>
+              <a:t>Number of HNSCC patients:  11 HNSCC patients [7/20] </a:t>
+            </a:r>
+          </a:p>
+          <a:p>
+            <a:r>
+              <a:rPr lang="en-US" dirty="0"/>
+              <a:t>Plate map versions </a:t>
             </a:r>
           </a:p>
           <a:p>
             <a:pPr lvl="1"/>
             <a:r>
               <a:rPr lang="en-US" dirty="0"/>
-              <a:t>I can provide a list of all used names, if someone can review and choose the right names. </a:t>
+              <a:t>Plates 1-3 (rev 001), Plates 1-6 (rev 002) &lt;- combinatorial </a:t>
             </a:r>
           </a:p>
           <a:p>
             <a:pPr lvl="1"/>
             <a:r>
               <a:rPr lang="en-US" dirty="0"/>
-              <a:t>Alternatively, if there is a list of acceptable drug names, I can do it myself. </a:t>
-            </a:r>
-          </a:p>
-          <a:p>
-            <a:r>
-              <a:rPr lang="en-US" dirty="0"/>
-              <a:t>I’d like a review of my concentration mapping [request] </a:t>
+              <a:t>Tyner panels – still need to be re-worked into HNSCC format</a:t>
             </a:r>
           </a:p>
           <a:p>
             <a:pPr lvl="1"/>
             <a:r>
               <a:rPr lang="en-US" dirty="0"/>
-              <a:t>Ashley volunteered to review, but a second pair of eyes would be useful as well. </a:t>
-            </a:r>
-          </a:p>
-          <a:p>
+              <a:t>+1 assay with 7… require additional work </a:t>
+            </a:r>
+          </a:p>
+          <a:p>
+            <a:pPr lvl="1"/>
+            <a:r>
+              <a:rPr lang="en-US" dirty="0"/>
+              <a:t>Excel files with pages: meta, concentration_&lt;num&gt;, inhibitor_&lt;num&gt;</a:t>
+            </a:r>
+          </a:p>
+          <a:p>
+            <a:r>
+              <a:rPr lang="en-US" dirty="0"/>
+              <a:t>Naming convention</a:t>
+            </a:r>
+          </a:p>
+          <a:p>
+            <a:pPr lvl="1"/>
+            <a:r>
+              <a:rPr lang="en-US" dirty="0"/>
+              <a:t>Unique ID for each assay? Or we need to distinguish replicates</a:t>
+            </a:r>
+          </a:p>
+          <a:p>
+            <a:pPr lvl="1"/>
+            <a:r>
+              <a:rPr lang="en-US" dirty="0"/>
+              <a:t>Date of assay? </a:t>
+            </a:r>
+          </a:p>
+          <a:p>
+            <a:pPr lvl="1"/>
+            <a:r>
+              <a:rPr lang="en-US" dirty="0"/>
+              <a:t>MTS sitting time? </a:t>
+            </a:r>
+          </a:p>
+          <a:p>
+            <a:pPr lvl="1"/>
+            <a:r>
+              <a:rPr lang="en-US" dirty="0" err="1"/>
+              <a:t>lab_id</a:t>
+            </a:r>
+            <a:r>
+              <a:rPr lang="en-US" dirty="0"/>
+              <a:t>=XXXXX-norm=XXX-</a:t>
+            </a:r>
+            <a:r>
+              <a:rPr lang="en-US" dirty="0" err="1"/>
+              <a:t>plate_version_id</a:t>
+            </a:r>
+            <a:r>
+              <a:rPr lang="en-US" dirty="0"/>
+              <a:t>=XXXX</a:t>
+            </a:r>
+          </a:p>
+          <a:p>
+            <a:pPr lvl="1"/>
+            <a:endParaRPr lang="en-US" dirty="0"/>
+          </a:p>
+          <a:p>
+            <a:pPr lvl="1"/>
             <a:endParaRPr lang="en-US" dirty="0"/>
           </a:p>
         </p:txBody>
@@ -9669,7 +9858,7 @@
     </p:spTree>
     <p:extLst>
       <p:ext uri="{BB962C8B-B14F-4D97-AF65-F5344CB8AC3E}">
-        <p14:creationId xmlns:p14="http://schemas.microsoft.com/office/powerpoint/2010/main" val="629140933"/>
+        <p14:creationId xmlns:p14="http://schemas.microsoft.com/office/powerpoint/2010/main" val="3771634021"/>
       </p:ext>
     </p:extLst>
   </p:cSld>
@@ -9701,7 +9890,7 @@
           <p:cNvPr id="2" name="Title 1">
             <a:extLst>
               <a:ext uri="{FF2B5EF4-FFF2-40B4-BE49-F238E27FC236}">
-                <a16:creationId xmlns:a16="http://schemas.microsoft.com/office/drawing/2014/main" id="{2A317F86-1610-446D-A724-4889497B751D}"/>
+                <a16:creationId xmlns:a16="http://schemas.microsoft.com/office/drawing/2014/main" id="{4C925E0A-FDA2-482C-B32C-BD02E0F5FDD5}"/>
               </a:ext>
             </a:extLst>
           </p:cNvPr>
@@ -9719,7 +9908,7 @@
           <a:p>
             <a:r>
               <a:rPr lang="en-US" dirty="0"/>
-              <a:t>Data output documentation issues</a:t>
+              <a:t>Plate Map Revisions </a:t>
             </a:r>
           </a:p>
         </p:txBody>
@@ -9729,7 +9918,7 @@
           <p:cNvPr id="3" name="Content Placeholder 2">
             <a:extLst>
               <a:ext uri="{FF2B5EF4-FFF2-40B4-BE49-F238E27FC236}">
-                <a16:creationId xmlns:a16="http://schemas.microsoft.com/office/drawing/2014/main" id="{E5775B40-57DE-42CA-A49B-0046E6B9E424}"/>
+                <a16:creationId xmlns:a16="http://schemas.microsoft.com/office/drawing/2014/main" id="{287DDDA0-A034-491E-AF68-7EC8860582A7}"/>
               </a:ext>
             </a:extLst>
           </p:cNvPr>
@@ -9742,79 +9931,50 @@
         </p:nvSpPr>
         <p:spPr/>
         <p:txBody>
-          <a:bodyPr>
-            <a:normAutofit/>
-          </a:bodyPr>
-          <a:lstStyle/>
-          <a:p>
-            <a:r>
-              <a:rPr lang="en-US" dirty="0"/>
-              <a:t>There are a number of assays that are labeled as having been normalized by positive controls (labeled as “blank490”), however, the output file shows discrepancies that indicate it was not.</a:t>
-            </a:r>
-          </a:p>
-          <a:p>
-            <a:r>
-              <a:rPr lang="en-US" dirty="0"/>
-              <a:t>[</a:t>
-            </a:r>
-            <a:r>
-              <a:rPr lang="en-US" dirty="0" err="1"/>
-              <a:t>lab_id</a:t>
-            </a:r>
-            <a:r>
-              <a:rPr lang="en-US" dirty="0"/>
-              <a:t>=10308,notes=NA]</a:t>
-            </a:r>
-          </a:p>
-          <a:p>
-            <a:r>
-              <a:rPr lang="en-US" dirty="0"/>
-              <a:t>[</a:t>
-            </a:r>
-            <a:r>
-              <a:rPr lang="en-US" dirty="0" err="1"/>
-              <a:t>lab_id</a:t>
-            </a:r>
-            <a:r>
-              <a:rPr lang="en-US" dirty="0"/>
-              <a:t>=10309,notes=matched normal 10308]</a:t>
-            </a:r>
-          </a:p>
-          <a:p>
-            <a:pPr marL="0" indent="0">
-              <a:buNone/>
-            </a:pPr>
+          <a:bodyPr/>
+          <a:lstStyle/>
+          <a:p>
+            <a:r>
+              <a:rPr lang="en-US" dirty="0"/>
+              <a:t>Drug Names, there are some inconsistencies – need to define clear nomenclature to avoid redundancy. </a:t>
+            </a:r>
+          </a:p>
+          <a:p>
+            <a:pPr lvl="1"/>
+            <a:r>
+              <a:rPr lang="en-US" dirty="0"/>
+              <a:t>I can provide a list of all used names, if someone can review and choose the right names. </a:t>
+            </a:r>
+          </a:p>
+          <a:p>
+            <a:pPr lvl="1"/>
+            <a:r>
+              <a:rPr lang="en-US" dirty="0"/>
+              <a:t>Alternatively, if there is a list of acceptable drug names, I can do it myself. </a:t>
+            </a:r>
+          </a:p>
+          <a:p>
+            <a:r>
+              <a:rPr lang="en-US" dirty="0"/>
+              <a:t>I’d like a review of my concentration mapping [request] </a:t>
+            </a:r>
+          </a:p>
+          <a:p>
+            <a:pPr lvl="1"/>
+            <a:r>
+              <a:rPr lang="en-US" dirty="0"/>
+              <a:t>Ashley volunteered to review, but a second pair of eyes would be useful as well. </a:t>
+            </a:r>
+          </a:p>
+          <a:p>
             <a:endParaRPr lang="en-US" dirty="0"/>
-          </a:p>
-          <a:p>
-            <a:pPr marL="0" indent="0">
-              <a:buNone/>
-            </a:pPr>
-            <a:endParaRPr lang="en-US" dirty="0"/>
-          </a:p>
-          <a:p>
-            <a:pPr marL="0" indent="0">
-              <a:buNone/>
-            </a:pPr>
-            <a:r>
-              <a:rPr lang="en-US" dirty="0"/>
-              <a:t>*these two assay outputs don’t have a 26</a:t>
-            </a:r>
-            <a:r>
-              <a:rPr lang="en-US" baseline="30000" dirty="0"/>
-              <a:t>th</a:t>
-            </a:r>
-            <a:r>
-              <a:rPr lang="en-US" dirty="0"/>
-              <a:t> column, which usually says “blank490” in each row. </a:t>
-            </a:r>
           </a:p>
         </p:txBody>
       </p:sp>
     </p:spTree>
     <p:extLst>
       <p:ext uri="{BB962C8B-B14F-4D97-AF65-F5344CB8AC3E}">
-        <p14:creationId xmlns:p14="http://schemas.microsoft.com/office/powerpoint/2010/main" val="4284564905"/>
+        <p14:creationId xmlns:p14="http://schemas.microsoft.com/office/powerpoint/2010/main" val="629140933"/>
       </p:ext>
     </p:extLst>
   </p:cSld>
@@ -9846,7 +10006,7 @@
           <p:cNvPr id="2" name="Title 1">
             <a:extLst>
               <a:ext uri="{FF2B5EF4-FFF2-40B4-BE49-F238E27FC236}">
-                <a16:creationId xmlns:a16="http://schemas.microsoft.com/office/drawing/2014/main" id="{541CAFB3-FD96-4F76-A791-BBC842554556}"/>
+                <a16:creationId xmlns:a16="http://schemas.microsoft.com/office/drawing/2014/main" id="{2A317F86-1610-446D-A724-4889497B751D}"/>
               </a:ext>
             </a:extLst>
           </p:cNvPr>
@@ -9864,7 +10024,7 @@
           <a:p>
             <a:r>
               <a:rPr lang="en-US" dirty="0"/>
-              <a:t>Standing Questions</a:t>
+              <a:t>Data output documentation issues</a:t>
             </a:r>
           </a:p>
         </p:txBody>
@@ -9874,7 +10034,7 @@
           <p:cNvPr id="3" name="Content Placeholder 2">
             <a:extLst>
               <a:ext uri="{FF2B5EF4-FFF2-40B4-BE49-F238E27FC236}">
-                <a16:creationId xmlns:a16="http://schemas.microsoft.com/office/drawing/2014/main" id="{F1B73B27-1B41-4F73-9206-3BA2925E5813}"/>
+                <a16:creationId xmlns:a16="http://schemas.microsoft.com/office/drawing/2014/main" id="{E5775B40-57DE-42CA-A49B-0046E6B9E424}"/>
               </a:ext>
             </a:extLst>
           </p:cNvPr>
@@ -9887,85 +10047,71 @@
         </p:nvSpPr>
         <p:spPr/>
         <p:txBody>
-          <a:bodyPr/>
-          <a:lstStyle/>
-          <a:p>
-            <a:r>
-              <a:rPr lang="en-US" dirty="0"/>
-              <a:t>Blank 490, how is this normalization done?</a:t>
-            </a:r>
-          </a:p>
-          <a:p>
-            <a:r>
-              <a:rPr lang="en-US" dirty="0"/>
-              <a:t>Scope of documentation?   </a:t>
-            </a:r>
-          </a:p>
-          <a:p>
-            <a:pPr lvl="1"/>
-            <a:r>
-              <a:rPr lang="en-US" dirty="0"/>
-              <a:t>Code version control – </a:t>
+          <a:bodyPr>
+            <a:normAutofit/>
+          </a:bodyPr>
+          <a:lstStyle/>
+          <a:p>
+            <a:r>
+              <a:rPr lang="en-US" dirty="0"/>
+              <a:t>There are a number of assays that are labeled as having been normalized by positive controls (labeled as “blank490”), however, the output file shows discrepancies that indicate it was not.</a:t>
+            </a:r>
+          </a:p>
+          <a:p>
+            <a:r>
+              <a:rPr lang="en-US" dirty="0"/>
+              <a:t>[</a:t>
             </a:r>
             <a:r>
               <a:rPr lang="en-US" dirty="0" err="1"/>
-              <a:t>github</a:t>
-            </a:r>
-            <a:r>
-              <a:rPr lang="en-US" dirty="0"/>
-              <a:t> repo? </a:t>
-            </a:r>
-          </a:p>
-          <a:p>
-            <a:pPr lvl="1"/>
+              <a:t>lab_id</a:t>
+            </a:r>
+            <a:r>
+              <a:rPr lang="en-US" dirty="0"/>
+              <a:t>=10308,notes=NA]</a:t>
+            </a:r>
+          </a:p>
+          <a:p>
+            <a:r>
+              <a:rPr lang="en-US" dirty="0"/>
+              <a:t>[</a:t>
+            </a:r>
             <a:r>
               <a:rPr lang="en-US" dirty="0" err="1"/>
-              <a:t>Biocompute</a:t>
-            </a:r>
-            <a:r>
-              <a:rPr lang="en-US" dirty="0"/>
-              <a:t> object </a:t>
-            </a:r>
-          </a:p>
-          <a:p>
-            <a:pPr lvl="1"/>
-            <a:r>
-              <a:rPr lang="en-US" dirty="0"/>
-              <a:t>R/</a:t>
-            </a:r>
-            <a:r>
-              <a:rPr lang="en-US" dirty="0" err="1"/>
-              <a:t>Doxygen</a:t>
-            </a:r>
+              <a:t>lab_id</a:t>
+            </a:r>
+            <a:r>
+              <a:rPr lang="en-US" dirty="0"/>
+              <a:t>=10309,notes=matched normal 10308]</a:t>
+            </a:r>
+          </a:p>
+          <a:p>
+            <a:pPr marL="0" indent="0">
+              <a:buNone/>
+            </a:pPr>
             <a:endParaRPr lang="en-US" dirty="0"/>
           </a:p>
           <a:p>
-            <a:r>
-              <a:rPr lang="en-US" dirty="0"/>
-              <a:t>Scope of testing? </a:t>
-            </a:r>
-          </a:p>
-          <a:p>
-            <a:pPr lvl="1"/>
-            <a:r>
-              <a:rPr lang="en-US" dirty="0"/>
-              <a:t>Doc-testing / unit-testing </a:t>
-            </a:r>
-          </a:p>
-          <a:p>
-            <a:r>
-              <a:rPr lang="en-US" dirty="0"/>
-              <a:t>Language Preference? Currently using mix of python, R, bash</a:t>
-            </a:r>
-          </a:p>
-          <a:p>
-            <a:r>
-              <a:rPr lang="en-US" dirty="0" err="1"/>
-              <a:t>Dockerize</a:t>
-            </a:r>
-            <a:r>
-              <a:rPr lang="en-US" dirty="0"/>
-              <a:t> environment? </a:t>
+            <a:pPr marL="0" indent="0">
+              <a:buNone/>
+            </a:pPr>
+            <a:endParaRPr lang="en-US" dirty="0"/>
+          </a:p>
+          <a:p>
+            <a:pPr marL="0" indent="0">
+              <a:buNone/>
+            </a:pPr>
+            <a:r>
+              <a:rPr lang="en-US" dirty="0"/>
+              <a:t>*these two assay outputs don’t have a 26</a:t>
+            </a:r>
+            <a:r>
+              <a:rPr lang="en-US" baseline="30000" dirty="0"/>
+              <a:t>th</a:t>
+            </a:r>
+            <a:r>
+              <a:rPr lang="en-US" dirty="0"/>
+              <a:t> column, which usually says “blank490” in each row. </a:t>
             </a:r>
           </a:p>
         </p:txBody>
@@ -9973,7 +10119,7 @@
     </p:spTree>
     <p:extLst>
       <p:ext uri="{BB962C8B-B14F-4D97-AF65-F5344CB8AC3E}">
-        <p14:creationId xmlns:p14="http://schemas.microsoft.com/office/powerpoint/2010/main" val="2085471528"/>
+        <p14:creationId xmlns:p14="http://schemas.microsoft.com/office/powerpoint/2010/main" val="4284564905"/>
       </p:ext>
     </p:extLst>
   </p:cSld>

</xml_diff>